<commit_message>
add new figure for repos
</commit_message>
<xml_diff>
--- a/papers/tr2017/diagrams.pptx
+++ b/papers/tr2017/diagrams.pptx
@@ -214,7 +214,7 @@
           <a:p>
             <a:fld id="{C0237B04-0BFF-4188-AE10-E77C3C5257C8}" type="datetimeFigureOut">
               <a:rPr lang="en-US" smtClean="0"/>
-              <a:t>9/11/2017</a:t>
+              <a:t>9/14/2017</a:t>
             </a:fld>
             <a:endParaRPr lang="en-US"/>
           </a:p>
@@ -1169,7 +1169,7 @@
           <a:p>
             <a:fld id="{E504D85E-2087-4C48-BE7E-1A197735EA07}" type="datetimeFigureOut">
               <a:rPr lang="en-US" smtClean="0"/>
-              <a:t>9/11/2017</a:t>
+              <a:t>9/14/2017</a:t>
             </a:fld>
             <a:endParaRPr lang="en-US"/>
           </a:p>
@@ -1367,7 +1367,7 @@
           <a:p>
             <a:fld id="{E504D85E-2087-4C48-BE7E-1A197735EA07}" type="datetimeFigureOut">
               <a:rPr lang="en-US" smtClean="0"/>
-              <a:t>9/11/2017</a:t>
+              <a:t>9/14/2017</a:t>
             </a:fld>
             <a:endParaRPr lang="en-US"/>
           </a:p>
@@ -1575,7 +1575,7 @@
           <a:p>
             <a:fld id="{E504D85E-2087-4C48-BE7E-1A197735EA07}" type="datetimeFigureOut">
               <a:rPr lang="en-US" smtClean="0"/>
-              <a:t>9/11/2017</a:t>
+              <a:t>9/14/2017</a:t>
             </a:fld>
             <a:endParaRPr lang="en-US"/>
           </a:p>
@@ -1773,7 +1773,7 @@
           <a:p>
             <a:fld id="{E504D85E-2087-4C48-BE7E-1A197735EA07}" type="datetimeFigureOut">
               <a:rPr lang="en-US" smtClean="0"/>
-              <a:t>9/11/2017</a:t>
+              <a:t>9/14/2017</a:t>
             </a:fld>
             <a:endParaRPr lang="en-US"/>
           </a:p>
@@ -2048,7 +2048,7 @@
           <a:p>
             <a:fld id="{E504D85E-2087-4C48-BE7E-1A197735EA07}" type="datetimeFigureOut">
               <a:rPr lang="en-US" smtClean="0"/>
-              <a:t>9/11/2017</a:t>
+              <a:t>9/14/2017</a:t>
             </a:fld>
             <a:endParaRPr lang="en-US"/>
           </a:p>
@@ -2313,7 +2313,7 @@
           <a:p>
             <a:fld id="{E504D85E-2087-4C48-BE7E-1A197735EA07}" type="datetimeFigureOut">
               <a:rPr lang="en-US" smtClean="0"/>
-              <a:t>9/11/2017</a:t>
+              <a:t>9/14/2017</a:t>
             </a:fld>
             <a:endParaRPr lang="en-US"/>
           </a:p>
@@ -2725,7 +2725,7 @@
           <a:p>
             <a:fld id="{E504D85E-2087-4C48-BE7E-1A197735EA07}" type="datetimeFigureOut">
               <a:rPr lang="en-US" smtClean="0"/>
-              <a:t>9/11/2017</a:t>
+              <a:t>9/14/2017</a:t>
             </a:fld>
             <a:endParaRPr lang="en-US"/>
           </a:p>
@@ -2866,7 +2866,7 @@
           <a:p>
             <a:fld id="{E504D85E-2087-4C48-BE7E-1A197735EA07}" type="datetimeFigureOut">
               <a:rPr lang="en-US" smtClean="0"/>
-              <a:t>9/11/2017</a:t>
+              <a:t>9/14/2017</a:t>
             </a:fld>
             <a:endParaRPr lang="en-US"/>
           </a:p>
@@ -2979,7 +2979,7 @@
           <a:p>
             <a:fld id="{E504D85E-2087-4C48-BE7E-1A197735EA07}" type="datetimeFigureOut">
               <a:rPr lang="en-US" smtClean="0"/>
-              <a:t>9/11/2017</a:t>
+              <a:t>9/14/2017</a:t>
             </a:fld>
             <a:endParaRPr lang="en-US"/>
           </a:p>
@@ -3290,7 +3290,7 @@
           <a:p>
             <a:fld id="{E504D85E-2087-4C48-BE7E-1A197735EA07}" type="datetimeFigureOut">
               <a:rPr lang="en-US" smtClean="0"/>
-              <a:t>9/11/2017</a:t>
+              <a:t>9/14/2017</a:t>
             </a:fld>
             <a:endParaRPr lang="en-US"/>
           </a:p>
@@ -3578,7 +3578,7 @@
           <a:p>
             <a:fld id="{E504D85E-2087-4C48-BE7E-1A197735EA07}" type="datetimeFigureOut">
               <a:rPr lang="en-US" smtClean="0"/>
-              <a:t>9/11/2017</a:t>
+              <a:t>9/14/2017</a:t>
             </a:fld>
             <a:endParaRPr lang="en-US"/>
           </a:p>
@@ -3819,7 +3819,7 @@
           <a:p>
             <a:fld id="{E504D85E-2087-4C48-BE7E-1A197735EA07}" type="datetimeFigureOut">
               <a:rPr lang="en-US" smtClean="0"/>
-              <a:t>9/11/2017</a:t>
+              <a:t>9/14/2017</a:t>
             </a:fld>
             <a:endParaRPr lang="en-US"/>
           </a:p>
@@ -7708,41 +7708,6 @@
       </p:grpSpPr>
       <p:sp>
         <p:nvSpPr>
-          <p:cNvPr id="3" name="TextBox 2">
-            <a:extLst>
-              <a:ext uri="{FF2B5EF4-FFF2-40B4-BE49-F238E27FC236}">
-                <a16:creationId xmlns:a16="http://schemas.microsoft.com/office/drawing/2014/main" id="{6FA220E7-ED74-4AE6-AD11-93EC6F909764}"/>
-              </a:ext>
-            </a:extLst>
-          </p:cNvPr>
-          <p:cNvSpPr txBox="1"/>
-          <p:nvPr/>
-        </p:nvSpPr>
-        <p:spPr>
-          <a:xfrm>
-            <a:off x="293511" y="203199"/>
-            <a:ext cx="2066207" cy="369332"/>
-          </a:xfrm>
-          <a:prstGeom prst="rect">
-            <a:avLst/>
-          </a:prstGeom>
-          <a:noFill/>
-        </p:spPr>
-        <p:txBody>
-          <a:bodyPr wrap="none" rtlCol="0">
-            <a:spAutoFit/>
-          </a:bodyPr>
-          <a:lstStyle/>
-          <a:p>
-            <a:r>
-              <a:rPr lang="en-US" dirty="0"/>
-              <a:t>How a target is built</a:t>
-            </a:r>
-          </a:p>
-        </p:txBody>
-      </p:sp>
-      <p:sp>
-        <p:nvSpPr>
           <p:cNvPr id="4" name="Rectangle 3">
             <a:extLst>
               <a:ext uri="{FF2B5EF4-FFF2-40B4-BE49-F238E27FC236}">
@@ -7755,7 +7720,7 @@
         </p:nvSpPr>
         <p:spPr>
           <a:xfrm>
-            <a:off x="612042" y="931460"/>
+            <a:off x="1178379" y="1973322"/>
             <a:ext cx="2212622" cy="733778"/>
           </a:xfrm>
           <a:prstGeom prst="rect">
@@ -7808,7 +7773,7 @@
         </p:nvSpPr>
         <p:spPr>
           <a:xfrm>
-            <a:off x="612042" y="5015480"/>
+            <a:off x="5062844" y="1969343"/>
             <a:ext cx="2212622" cy="733778"/>
           </a:xfrm>
           <a:prstGeom prst="rect">
@@ -7837,8 +7802,12 @@
           <a:p>
             <a:pPr algn="ctr"/>
             <a:r>
+              <a:rPr lang="en-US" dirty="0" err="1"/>
+              <a:t>pxt</a:t>
+            </a:r>
+            <a:r>
               <a:rPr lang="en-US" dirty="0"/>
-              <a:t>common-packages</a:t>
+              <a:t>-common-packages</a:t>
             </a:r>
           </a:p>
         </p:txBody>
@@ -7857,7 +7826,7 @@
         </p:nvSpPr>
         <p:spPr>
           <a:xfrm>
-            <a:off x="1326614" y="2986879"/>
+            <a:off x="1535665" y="5022887"/>
             <a:ext cx="2212622" cy="733778"/>
           </a:xfrm>
           <a:prstGeom prst="rect">
@@ -7906,7 +7875,7 @@
         </p:nvSpPr>
         <p:spPr>
           <a:xfrm>
-            <a:off x="1326614" y="1938089"/>
+            <a:off x="1535665" y="3427403"/>
             <a:ext cx="2212622" cy="733778"/>
           </a:xfrm>
           <a:prstGeom prst="rect">
@@ -7955,7 +7924,7 @@
         </p:nvSpPr>
         <p:spPr>
           <a:xfrm>
-            <a:off x="612042" y="4008851"/>
+            <a:off x="5062844" y="4124608"/>
             <a:ext cx="2212622" cy="733778"/>
           </a:xfrm>
           <a:prstGeom prst="rect">
@@ -7993,131 +7962,7 @@
             <a:pPr algn="ctr"/>
             <a:r>
               <a:rPr lang="en-US" dirty="0"/>
-              <a:t>(shell)</a:t>
-            </a:r>
-          </a:p>
-        </p:txBody>
-      </p:sp>
-      <p:sp>
-        <p:nvSpPr>
-          <p:cNvPr id="9" name="TextBox 8">
-            <a:extLst>
-              <a:ext uri="{FF2B5EF4-FFF2-40B4-BE49-F238E27FC236}">
-                <a16:creationId xmlns:a16="http://schemas.microsoft.com/office/drawing/2014/main" id="{942B9781-1CCD-4C01-ACA1-4303B22DAAB3}"/>
-              </a:ext>
-            </a:extLst>
-          </p:cNvPr>
-          <p:cNvSpPr txBox="1"/>
-          <p:nvPr/>
-        </p:nvSpPr>
-        <p:spPr>
-          <a:xfrm>
-            <a:off x="5934730" y="-1200329"/>
-            <a:ext cx="5545557" cy="1200329"/>
-          </a:xfrm>
-          <a:prstGeom prst="rect">
-            <a:avLst/>
-          </a:prstGeom>
-          <a:noFill/>
-        </p:spPr>
-        <p:txBody>
-          <a:bodyPr wrap="none" rtlCol="0">
-            <a:spAutoFit/>
-          </a:bodyPr>
-          <a:lstStyle/>
-          <a:p>
-            <a:r>
-              <a:rPr lang="en-US" dirty="0"/>
-              <a:t>libs/[</a:t>
-            </a:r>
-            <a:r>
-              <a:rPr lang="en-US" dirty="0" err="1"/>
-              <a:t>core,base</a:t>
-            </a:r>
-            <a:r>
-              <a:rPr lang="en-US" dirty="0"/>
-              <a:t>] [pin map, i2c, </a:t>
-            </a:r>
-            <a:r>
-              <a:rPr lang="en-US" dirty="0" err="1"/>
-              <a:t>init_codal</a:t>
-            </a:r>
-            <a:r>
-              <a:rPr lang="en-US" dirty="0"/>
-              <a:t>, </a:t>
-            </a:r>
-            <a:r>
-              <a:rPr lang="en-US" dirty="0" err="1"/>
-              <a:t>eventing</a:t>
-            </a:r>
-            <a:r>
-              <a:rPr lang="en-US" dirty="0"/>
-              <a:t>, HID, </a:t>
-            </a:r>
-          </a:p>
-          <a:p>
-            <a:r>
-              <a:rPr lang="en-US" dirty="0"/>
-              <a:t>libs/buttons</a:t>
-            </a:r>
-          </a:p>
-          <a:p>
-            <a:r>
-              <a:rPr lang="en-US" dirty="0"/>
-              <a:t>libs/accelerometer</a:t>
-            </a:r>
-          </a:p>
-          <a:p>
-            <a:r>
-              <a:rPr lang="en-US" dirty="0"/>
-              <a:t>…</a:t>
-            </a:r>
-          </a:p>
-        </p:txBody>
-      </p:sp>
-      <p:sp>
-        <p:nvSpPr>
-          <p:cNvPr id="10" name="TextBox 9">
-            <a:extLst>
-              <a:ext uri="{FF2B5EF4-FFF2-40B4-BE49-F238E27FC236}">
-                <a16:creationId xmlns:a16="http://schemas.microsoft.com/office/drawing/2014/main" id="{D7892494-B103-42A8-B929-7C7616DD7C3E}"/>
-              </a:ext>
-            </a:extLst>
-          </p:cNvPr>
-          <p:cNvSpPr txBox="1"/>
-          <p:nvPr/>
-        </p:nvSpPr>
-        <p:spPr>
-          <a:xfrm>
-            <a:off x="498181" y="-1492073"/>
-            <a:ext cx="4854855" cy="923330"/>
-          </a:xfrm>
-          <a:prstGeom prst="rect">
-            <a:avLst/>
-          </a:prstGeom>
-          <a:noFill/>
-        </p:spPr>
-        <p:txBody>
-          <a:bodyPr wrap="none" rtlCol="0">
-            <a:spAutoFit/>
-          </a:bodyPr>
-          <a:lstStyle/>
-          <a:p>
-            <a:r>
-              <a:rPr lang="en-US" dirty="0"/>
-              <a:t>Core: object model, messaging, heap</a:t>
-            </a:r>
-          </a:p>
-          <a:p>
-            <a:r>
-              <a:rPr lang="en-US" dirty="0"/>
-              <a:t>Drivers: pin, serial, timer, i2c hid, analog sensor, …</a:t>
-            </a:r>
-          </a:p>
-          <a:p>
-            <a:r>
-              <a:rPr lang="en-US" dirty="0"/>
-              <a:t>Types: coordinate system, list, managed types, …</a:t>
+              <a:t>(build shell)</a:t>
             </a:r>
           </a:p>
         </p:txBody>
@@ -8136,44 +7981,18 @@
         </p:nvSpPr>
         <p:spPr>
           <a:xfrm>
-            <a:off x="2886730" y="861664"/>
-            <a:ext cx="6096000" cy="923330"/>
+            <a:off x="1136386" y="2745264"/>
+            <a:ext cx="1725159" cy="369332"/>
           </a:xfrm>
           <a:prstGeom prst="rect">
             <a:avLst/>
           </a:prstGeom>
         </p:spPr>
         <p:txBody>
-          <a:bodyPr>
+          <a:bodyPr wrap="square">
             <a:spAutoFit/>
           </a:bodyPr>
           <a:lstStyle/>
-          <a:p>
-            <a:r>
-              <a:rPr lang="en-US" dirty="0">
-                <a:solidFill>
-                  <a:srgbClr val="569CD6"/>
-                </a:solidFill>
-                <a:latin typeface="Consolas" panose="020B0609020204030204" pitchFamily="49" charset="0"/>
-              </a:rPr>
-              <a:t>class </a:t>
-            </a:r>
-            <a:r>
-              <a:rPr lang="en-US" dirty="0">
-                <a:solidFill>
-                  <a:srgbClr val="4EC9B0"/>
-                </a:solidFill>
-                <a:latin typeface="Consolas" panose="020B0609020204030204" pitchFamily="49" charset="0"/>
-              </a:rPr>
-              <a:t>Component</a:t>
-            </a:r>
-            <a:endParaRPr lang="en-US" dirty="0">
-              <a:solidFill>
-                <a:srgbClr val="569CD6"/>
-              </a:solidFill>
-              <a:latin typeface="Consolas" panose="020B0609020204030204" pitchFamily="49" charset="0"/>
-            </a:endParaRPr>
-          </a:p>
           <a:p>
             <a:r>
               <a:rPr lang="en-US" dirty="0">
@@ -8200,124 +8019,7 @@
                 </a:solidFill>
                 <a:latin typeface="Consolas" panose="020B0609020204030204" pitchFamily="49" charset="0"/>
               </a:rPr>
-              <a:t>Pin   </a:t>
-            </a:r>
-            <a:r>
-              <a:rPr lang="en-US" dirty="0">
-                <a:solidFill>
-                  <a:srgbClr val="608B4E"/>
-                </a:solidFill>
-                <a:latin typeface="Consolas" panose="020B0609020204030204" pitchFamily="49" charset="0"/>
-              </a:rPr>
-              <a:t>// represents an I/O pin</a:t>
-            </a:r>
-            <a:endParaRPr lang="en-US" dirty="0">
-              <a:solidFill>
-                <a:srgbClr val="D4D4D4"/>
-              </a:solidFill>
-              <a:latin typeface="Consolas" panose="020B0609020204030204" pitchFamily="49" charset="0"/>
-            </a:endParaRPr>
-          </a:p>
-          <a:p>
-            <a:endParaRPr lang="en-US" b="0" dirty="0">
-              <a:solidFill>
-                <a:srgbClr val="D4D4D4"/>
-              </a:solidFill>
-              <a:effectLst/>
-              <a:latin typeface="Consolas" panose="020B0609020204030204" pitchFamily="49" charset="0"/>
-            </a:endParaRPr>
-          </a:p>
-        </p:txBody>
-      </p:sp>
-      <p:sp>
-        <p:nvSpPr>
-          <p:cNvPr id="12" name="Rectangle 11">
-            <a:extLst>
-              <a:ext uri="{FF2B5EF4-FFF2-40B4-BE49-F238E27FC236}">
-                <a16:creationId xmlns:a16="http://schemas.microsoft.com/office/drawing/2014/main" id="{7B8314DD-0A66-41DB-B5BF-E68DF4AA1B0A}"/>
-              </a:ext>
-            </a:extLst>
-          </p:cNvPr>
-          <p:cNvSpPr/>
-          <p:nvPr/>
-        </p:nvSpPr>
-        <p:spPr>
-          <a:xfrm>
-            <a:off x="3754145" y="1815762"/>
-            <a:ext cx="3983783" cy="369332"/>
-          </a:xfrm>
-          <a:prstGeom prst="rect">
-            <a:avLst/>
-          </a:prstGeom>
-        </p:spPr>
-        <p:txBody>
-          <a:bodyPr wrap="none">
-            <a:spAutoFit/>
-          </a:bodyPr>
-          <a:lstStyle/>
-          <a:p>
-            <a:r>
-              <a:rPr lang="en-US" dirty="0">
-                <a:solidFill>
-                  <a:srgbClr val="569CD6"/>
-                </a:solidFill>
-                <a:latin typeface="Consolas" panose="020B0609020204030204" pitchFamily="49" charset="0"/>
-              </a:rPr>
-              <a:t>class</a:t>
-            </a:r>
-            <a:r>
-              <a:rPr lang="en-US" dirty="0">
-                <a:solidFill>
-                  <a:srgbClr val="D4D4D4"/>
-                </a:solidFill>
-                <a:latin typeface="Consolas" panose="020B0609020204030204" pitchFamily="49" charset="0"/>
-              </a:rPr>
-              <a:t> </a:t>
-            </a:r>
-            <a:r>
-              <a:rPr lang="en-US" dirty="0" err="1">
-                <a:solidFill>
-                  <a:srgbClr val="4EC9B0"/>
-                </a:solidFill>
-                <a:latin typeface="Consolas" panose="020B0609020204030204" pitchFamily="49" charset="0"/>
-              </a:rPr>
-              <a:t>ATMegaPin</a:t>
-            </a:r>
-            <a:r>
-              <a:rPr lang="en-US" dirty="0">
-                <a:solidFill>
-                  <a:srgbClr val="D4D4D4"/>
-                </a:solidFill>
-                <a:latin typeface="Consolas" panose="020B0609020204030204" pitchFamily="49" charset="0"/>
-              </a:rPr>
-              <a:t>   : </a:t>
-            </a:r>
-            <a:r>
-              <a:rPr lang="en-US" dirty="0">
-                <a:solidFill>
-                  <a:srgbClr val="569CD6"/>
-                </a:solidFill>
-                <a:latin typeface="Consolas" panose="020B0609020204030204" pitchFamily="49" charset="0"/>
-              </a:rPr>
-              <a:t>public</a:t>
-            </a:r>
-            <a:r>
-              <a:rPr lang="en-US" dirty="0">
-                <a:solidFill>
-                  <a:srgbClr val="D4D4D4"/>
-                </a:solidFill>
-                <a:latin typeface="Consolas" panose="020B0609020204030204" pitchFamily="49" charset="0"/>
-              </a:rPr>
-              <a:t> </a:t>
-            </a:r>
-            <a:r>
-              <a:rPr lang="en-US" dirty="0">
-                <a:solidFill>
-                  <a:srgbClr val="4EC9B0"/>
-                </a:solidFill>
-                <a:latin typeface="Consolas" panose="020B0609020204030204" pitchFamily="49" charset="0"/>
-              </a:rPr>
-              <a:t>Pin</a:t>
+              <a:t>Timer</a:t>
             </a:r>
             <a:endParaRPr lang="en-US" b="0" dirty="0">
               <a:solidFill>
@@ -8343,8 +8045,8 @@
         </p:nvSpPr>
         <p:spPr>
           <a:xfrm>
-            <a:off x="3754145" y="2182651"/>
-            <a:ext cx="4237057" cy="369332"/>
+            <a:off x="1521911" y="4199345"/>
+            <a:ext cx="2590774" cy="646331"/>
           </a:xfrm>
           <a:prstGeom prst="rect">
             <a:avLst/>
@@ -8390,7 +8092,18 @@
                 </a:solidFill>
                 <a:latin typeface="Consolas" panose="020B0609020204030204" pitchFamily="49" charset="0"/>
               </a:rPr>
-              <a:t> : </a:t>
+              <a:t>: </a:t>
+            </a:r>
+          </a:p>
+          <a:p>
+            <a:r>
+              <a:rPr lang="en-US" dirty="0">
+                <a:solidFill>
+                  <a:srgbClr val="D4D4D4"/>
+                </a:solidFill>
+                <a:latin typeface="Consolas" panose="020B0609020204030204" pitchFamily="49" charset="0"/>
+              </a:rPr>
+              <a:t>   </a:t>
             </a:r>
             <a:r>
               <a:rPr lang="en-US" dirty="0">
@@ -8429,12 +8142,103 @@
           </a:p>
         </p:txBody>
       </p:sp>
-      <p:sp>
-        <p:nvSpPr>
-          <p:cNvPr id="14" name="Rectangle 13">
+      <p:cxnSp>
+        <p:nvCxnSpPr>
+          <p:cNvPr id="16" name="Connector: Elbow 15">
             <a:extLst>
               <a:ext uri="{FF2B5EF4-FFF2-40B4-BE49-F238E27FC236}">
-                <a16:creationId xmlns:a16="http://schemas.microsoft.com/office/drawing/2014/main" id="{8AC4A865-E8F6-4415-A219-181A6204B8E9}"/>
+                <a16:creationId xmlns:a16="http://schemas.microsoft.com/office/drawing/2014/main" id="{8311314B-2261-48F7-8392-22D61FC10F4C}"/>
+              </a:ext>
+            </a:extLst>
+          </p:cNvPr>
+          <p:cNvCxnSpPr>
+            <a:stCxn id="4" idx="1"/>
+            <a:endCxn id="7" idx="1"/>
+          </p:cNvCxnSpPr>
+          <p:nvPr/>
+        </p:nvCxnSpPr>
+        <p:spPr>
+          <a:xfrm rot="10800000" flipH="1" flipV="1">
+            <a:off x="1178379" y="2340210"/>
+            <a:ext cx="357286" cy="1454081"/>
+          </a:xfrm>
+          <a:prstGeom prst="bentConnector3">
+            <a:avLst>
+              <a:gd name="adj1" fmla="val -63982"/>
+            </a:avLst>
+          </a:prstGeom>
+          <a:ln>
+            <a:headEnd type="triangle" w="lg" len="lg"/>
+            <a:tailEnd type="none"/>
+          </a:ln>
+        </p:spPr>
+        <p:style>
+          <a:lnRef idx="1">
+            <a:schemeClr val="accent1"/>
+          </a:lnRef>
+          <a:fillRef idx="0">
+            <a:schemeClr val="accent1"/>
+          </a:fillRef>
+          <a:effectRef idx="0">
+            <a:schemeClr val="accent1"/>
+          </a:effectRef>
+          <a:fontRef idx="minor">
+            <a:schemeClr val="tx1"/>
+          </a:fontRef>
+        </p:style>
+      </p:cxnSp>
+      <p:cxnSp>
+        <p:nvCxnSpPr>
+          <p:cNvPr id="17" name="Connector: Elbow 16">
+            <a:extLst>
+              <a:ext uri="{FF2B5EF4-FFF2-40B4-BE49-F238E27FC236}">
+                <a16:creationId xmlns:a16="http://schemas.microsoft.com/office/drawing/2014/main" id="{433064AB-FEF6-4A7D-AAAE-AB72F5F2430F}"/>
+              </a:ext>
+            </a:extLst>
+          </p:cNvPr>
+          <p:cNvCxnSpPr>
+            <a:cxnSpLocks/>
+            <a:stCxn id="4" idx="1"/>
+            <a:endCxn id="6" idx="1"/>
+          </p:cNvCxnSpPr>
+          <p:nvPr/>
+        </p:nvCxnSpPr>
+        <p:spPr>
+          <a:xfrm rot="10800000" flipH="1" flipV="1">
+            <a:off x="1178379" y="2340210"/>
+            <a:ext cx="357286" cy="3049565"/>
+          </a:xfrm>
+          <a:prstGeom prst="bentConnector3">
+            <a:avLst>
+              <a:gd name="adj1" fmla="val -63982"/>
+            </a:avLst>
+          </a:prstGeom>
+          <a:ln>
+            <a:headEnd type="triangle" w="lg" len="lg"/>
+            <a:tailEnd type="none"/>
+          </a:ln>
+        </p:spPr>
+        <p:style>
+          <a:lnRef idx="1">
+            <a:schemeClr val="accent1"/>
+          </a:lnRef>
+          <a:fillRef idx="0">
+            <a:schemeClr val="accent1"/>
+          </a:fillRef>
+          <a:effectRef idx="0">
+            <a:schemeClr val="accent1"/>
+          </a:effectRef>
+          <a:fontRef idx="minor">
+            <a:schemeClr val="tx1"/>
+          </a:fontRef>
+        </p:style>
+      </p:cxnSp>
+      <p:sp>
+        <p:nvSpPr>
+          <p:cNvPr id="22" name="Rectangle 21">
+            <a:extLst>
+              <a:ext uri="{FF2B5EF4-FFF2-40B4-BE49-F238E27FC236}">
+                <a16:creationId xmlns:a16="http://schemas.microsoft.com/office/drawing/2014/main" id="{EB56C870-F1D4-4FF7-A9CD-127DA5AA0C10}"/>
               </a:ext>
             </a:extLst>
           </p:cNvPr>
@@ -8443,19 +8247,506 @@
         </p:nvSpPr>
         <p:spPr>
           <a:xfrm>
-            <a:off x="3754145" y="2551983"/>
-            <a:ext cx="4996881" cy="369332"/>
+            <a:off x="8443713" y="3024706"/>
+            <a:ext cx="2212622" cy="733778"/>
           </a:xfrm>
           <a:prstGeom prst="rect">
             <a:avLst/>
           </a:prstGeom>
         </p:spPr>
+        <p:style>
+          <a:lnRef idx="2">
+            <a:schemeClr val="accent1">
+              <a:shade val="50000"/>
+            </a:schemeClr>
+          </a:lnRef>
+          <a:fillRef idx="1">
+            <a:schemeClr val="accent1"/>
+          </a:fillRef>
+          <a:effectRef idx="0">
+            <a:schemeClr val="accent1"/>
+          </a:effectRef>
+          <a:fontRef idx="minor">
+            <a:schemeClr val="lt1"/>
+          </a:fontRef>
+        </p:style>
+        <p:txBody>
+          <a:bodyPr rtlCol="0" anchor="ctr"/>
+          <a:lstStyle/>
+          <a:p>
+            <a:pPr algn="ctr"/>
+            <a:r>
+              <a:rPr lang="en-US" dirty="0" err="1"/>
+              <a:t>pxt</a:t>
+            </a:r>
+            <a:r>
+              <a:rPr lang="en-US" dirty="0"/>
+              <a:t>-target</a:t>
+            </a:r>
+          </a:p>
+        </p:txBody>
+      </p:sp>
+      <p:sp>
+        <p:nvSpPr>
+          <p:cNvPr id="25" name="TextBox 24">
+            <a:extLst>
+              <a:ext uri="{FF2B5EF4-FFF2-40B4-BE49-F238E27FC236}">
+                <a16:creationId xmlns:a16="http://schemas.microsoft.com/office/drawing/2014/main" id="{37047921-7782-4EE5-9840-B18851900A7C}"/>
+              </a:ext>
+            </a:extLst>
+          </p:cNvPr>
+          <p:cNvSpPr txBox="1"/>
+          <p:nvPr/>
+        </p:nvSpPr>
+        <p:spPr>
+          <a:xfrm>
+            <a:off x="296364" y="5410193"/>
+            <a:ext cx="1298241" cy="646331"/>
+          </a:xfrm>
+          <a:prstGeom prst="rect">
+            <a:avLst/>
+          </a:prstGeom>
+          <a:noFill/>
+        </p:spPr>
+        <p:txBody>
+          <a:bodyPr wrap="none" rtlCol="0">
+            <a:spAutoFit/>
+          </a:bodyPr>
+          <a:lstStyle/>
+          <a:p>
+            <a:r>
+              <a:rPr lang="en-US" dirty="0"/>
+              <a:t>extends,</a:t>
+            </a:r>
+          </a:p>
+          <a:p>
+            <a:r>
+              <a:rPr lang="en-US" dirty="0"/>
+              <a:t>implements</a:t>
+            </a:r>
+          </a:p>
+        </p:txBody>
+      </p:sp>
+      <p:sp>
+        <p:nvSpPr>
+          <p:cNvPr id="27" name="Right Brace 26">
+            <a:extLst>
+              <a:ext uri="{FF2B5EF4-FFF2-40B4-BE49-F238E27FC236}">
+                <a16:creationId xmlns:a16="http://schemas.microsoft.com/office/drawing/2014/main" id="{C30BEFF4-A930-4D26-BC0A-2B7945E3A077}"/>
+              </a:ext>
+            </a:extLst>
+          </p:cNvPr>
+          <p:cNvSpPr/>
+          <p:nvPr/>
+        </p:nvSpPr>
+        <p:spPr>
+          <a:xfrm>
+            <a:off x="4216420" y="3759093"/>
+            <a:ext cx="613533" cy="1657518"/>
+          </a:xfrm>
+          <a:prstGeom prst="rightBrace">
+            <a:avLst/>
+          </a:prstGeom>
+        </p:spPr>
+        <p:style>
+          <a:lnRef idx="1">
+            <a:schemeClr val="accent1"/>
+          </a:lnRef>
+          <a:fillRef idx="0">
+            <a:schemeClr val="accent1"/>
+          </a:fillRef>
+          <a:effectRef idx="0">
+            <a:schemeClr val="accent1"/>
+          </a:effectRef>
+          <a:fontRef idx="minor">
+            <a:schemeClr val="tx1"/>
+          </a:fontRef>
+        </p:style>
+        <p:txBody>
+          <a:bodyPr rtlCol="0" anchor="ctr"/>
+          <a:lstStyle/>
+          <a:p>
+            <a:pPr algn="ctr"/>
+            <a:endParaRPr lang="en-US"/>
+          </a:p>
+        </p:txBody>
+      </p:sp>
+      <p:cxnSp>
+        <p:nvCxnSpPr>
+          <p:cNvPr id="29" name="Straight Arrow Connector 28">
+            <a:extLst>
+              <a:ext uri="{FF2B5EF4-FFF2-40B4-BE49-F238E27FC236}">
+                <a16:creationId xmlns:a16="http://schemas.microsoft.com/office/drawing/2014/main" id="{EE3F40A0-7C8D-4ADB-90B9-EB1D02B7AA3D}"/>
+              </a:ext>
+            </a:extLst>
+          </p:cNvPr>
+          <p:cNvCxnSpPr>
+            <a:stCxn id="5" idx="1"/>
+            <a:endCxn id="4" idx="3"/>
+          </p:cNvCxnSpPr>
+          <p:nvPr/>
+        </p:nvCxnSpPr>
+        <p:spPr>
+          <a:xfrm flipH="1">
+            <a:off x="3391001" y="2336232"/>
+            <a:ext cx="1671843" cy="3979"/>
+          </a:xfrm>
+          <a:prstGeom prst="straightConnector1">
+            <a:avLst/>
+          </a:prstGeom>
+          <a:ln>
+            <a:headEnd w="lg" len="lg"/>
+            <a:tailEnd type="triangle" w="lg" len="lg"/>
+          </a:ln>
+        </p:spPr>
+        <p:style>
+          <a:lnRef idx="1">
+            <a:schemeClr val="accent1"/>
+          </a:lnRef>
+          <a:fillRef idx="0">
+            <a:schemeClr val="accent1"/>
+          </a:fillRef>
+          <a:effectRef idx="0">
+            <a:schemeClr val="accent1"/>
+          </a:effectRef>
+          <a:fontRef idx="minor">
+            <a:schemeClr val="tx1"/>
+          </a:fontRef>
+        </p:style>
+      </p:cxnSp>
+      <p:sp>
+        <p:nvSpPr>
+          <p:cNvPr id="31" name="TextBox 30">
+            <a:extLst>
+              <a:ext uri="{FF2B5EF4-FFF2-40B4-BE49-F238E27FC236}">
+                <a16:creationId xmlns:a16="http://schemas.microsoft.com/office/drawing/2014/main" id="{A6244731-7AA7-48F7-A92A-B8327107C4B2}"/>
+              </a:ext>
+            </a:extLst>
+          </p:cNvPr>
+          <p:cNvSpPr txBox="1"/>
+          <p:nvPr/>
+        </p:nvSpPr>
+        <p:spPr>
+          <a:xfrm>
+            <a:off x="3748287" y="1969255"/>
+            <a:ext cx="1172693" cy="369332"/>
+          </a:xfrm>
+          <a:prstGeom prst="rect">
+            <a:avLst/>
+          </a:prstGeom>
+          <a:noFill/>
+        </p:spPr>
+        <p:txBody>
+          <a:bodyPr wrap="none" rtlCol="0">
+            <a:spAutoFit/>
+          </a:bodyPr>
+          <a:lstStyle/>
+          <a:p>
+            <a:r>
+              <a:rPr lang="en-US" dirty="0"/>
+              <a:t>references</a:t>
+            </a:r>
+          </a:p>
+        </p:txBody>
+      </p:sp>
+      <p:cxnSp>
+        <p:nvCxnSpPr>
+          <p:cNvPr id="32" name="Connector: Elbow 31">
+            <a:extLst>
+              <a:ext uri="{FF2B5EF4-FFF2-40B4-BE49-F238E27FC236}">
+                <a16:creationId xmlns:a16="http://schemas.microsoft.com/office/drawing/2014/main" id="{3B57CAE9-5C1A-4B63-85D5-72A12C63BC26}"/>
+              </a:ext>
+            </a:extLst>
+          </p:cNvPr>
+          <p:cNvCxnSpPr>
+            <a:cxnSpLocks/>
+            <a:stCxn id="22" idx="0"/>
+            <a:endCxn id="5" idx="3"/>
+          </p:cNvCxnSpPr>
+          <p:nvPr/>
+        </p:nvCxnSpPr>
+        <p:spPr>
+          <a:xfrm rot="16200000" flipV="1">
+            <a:off x="8068508" y="1543190"/>
+            <a:ext cx="688474" cy="2274558"/>
+          </a:xfrm>
+          <a:prstGeom prst="bentConnector2">
+            <a:avLst/>
+          </a:prstGeom>
+          <a:ln>
+            <a:tailEnd type="triangle" w="lg" len="lg"/>
+          </a:ln>
+        </p:spPr>
+        <p:style>
+          <a:lnRef idx="1">
+            <a:schemeClr val="accent1"/>
+          </a:lnRef>
+          <a:fillRef idx="0">
+            <a:schemeClr val="accent1"/>
+          </a:fillRef>
+          <a:effectRef idx="0">
+            <a:schemeClr val="accent1"/>
+          </a:effectRef>
+          <a:fontRef idx="minor">
+            <a:schemeClr val="tx1"/>
+          </a:fontRef>
+        </p:style>
+      </p:cxnSp>
+      <p:cxnSp>
+        <p:nvCxnSpPr>
+          <p:cNvPr id="36" name="Connector: Elbow 35">
+            <a:extLst>
+              <a:ext uri="{FF2B5EF4-FFF2-40B4-BE49-F238E27FC236}">
+                <a16:creationId xmlns:a16="http://schemas.microsoft.com/office/drawing/2014/main" id="{0B095D52-A62A-405D-B022-DAFB391611CC}"/>
+              </a:ext>
+            </a:extLst>
+          </p:cNvPr>
+          <p:cNvCxnSpPr>
+            <a:cxnSpLocks/>
+            <a:stCxn id="22" idx="2"/>
+            <a:endCxn id="8" idx="3"/>
+          </p:cNvCxnSpPr>
+          <p:nvPr/>
+        </p:nvCxnSpPr>
+        <p:spPr>
+          <a:xfrm rot="5400000">
+            <a:off x="8046239" y="2987711"/>
+            <a:ext cx="733013" cy="2274558"/>
+          </a:xfrm>
+          <a:prstGeom prst="bentConnector2">
+            <a:avLst/>
+          </a:prstGeom>
+          <a:ln>
+            <a:tailEnd type="triangle" w="lg" len="lg"/>
+          </a:ln>
+        </p:spPr>
+        <p:style>
+          <a:lnRef idx="1">
+            <a:schemeClr val="accent1"/>
+          </a:lnRef>
+          <a:fillRef idx="0">
+            <a:schemeClr val="accent1"/>
+          </a:fillRef>
+          <a:effectRef idx="0">
+            <a:schemeClr val="accent1"/>
+          </a:effectRef>
+          <a:fontRef idx="minor">
+            <a:schemeClr val="tx1"/>
+          </a:fontRef>
+        </p:style>
+      </p:cxnSp>
+      <p:sp>
+        <p:nvSpPr>
+          <p:cNvPr id="41" name="TextBox 40">
+            <a:extLst>
+              <a:ext uri="{FF2B5EF4-FFF2-40B4-BE49-F238E27FC236}">
+                <a16:creationId xmlns:a16="http://schemas.microsoft.com/office/drawing/2014/main" id="{067D5DB3-C55C-4D8A-89FD-2A4CD21598C5}"/>
+              </a:ext>
+            </a:extLst>
+          </p:cNvPr>
+          <p:cNvSpPr txBox="1"/>
+          <p:nvPr/>
+        </p:nvSpPr>
+        <p:spPr>
+          <a:xfrm>
+            <a:off x="7508558" y="2375932"/>
+            <a:ext cx="601447" cy="369332"/>
+          </a:xfrm>
+          <a:prstGeom prst="rect">
+            <a:avLst/>
+          </a:prstGeom>
+          <a:noFill/>
+        </p:spPr>
+        <p:txBody>
+          <a:bodyPr wrap="none" rtlCol="0">
+            <a:spAutoFit/>
+          </a:bodyPr>
+          <a:lstStyle/>
+          <a:p>
+            <a:r>
+              <a:rPr lang="en-US" dirty="0"/>
+              <a:t>uses</a:t>
+            </a:r>
+          </a:p>
+        </p:txBody>
+      </p:sp>
+      <p:sp>
+        <p:nvSpPr>
+          <p:cNvPr id="42" name="TextBox 41">
+            <a:extLst>
+              <a:ext uri="{FF2B5EF4-FFF2-40B4-BE49-F238E27FC236}">
+                <a16:creationId xmlns:a16="http://schemas.microsoft.com/office/drawing/2014/main" id="{DE95D27C-DC41-4F7E-9CC9-A50CCBB3371F}"/>
+              </a:ext>
+            </a:extLst>
+          </p:cNvPr>
+          <p:cNvSpPr txBox="1"/>
+          <p:nvPr/>
+        </p:nvSpPr>
+        <p:spPr>
+          <a:xfrm>
+            <a:off x="5353036" y="2745264"/>
+            <a:ext cx="1634422" cy="646331"/>
+          </a:xfrm>
+          <a:prstGeom prst="rect">
+            <a:avLst/>
+          </a:prstGeom>
+          <a:noFill/>
+        </p:spPr>
+        <p:txBody>
+          <a:bodyPr wrap="none" rtlCol="0">
+            <a:spAutoFit/>
+          </a:bodyPr>
+          <a:lstStyle/>
+          <a:p>
+            <a:r>
+              <a:rPr lang="en-US" dirty="0"/>
+              <a:t>simplified APIs</a:t>
+            </a:r>
+          </a:p>
+          <a:p>
+            <a:r>
+              <a:rPr lang="en-US" dirty="0"/>
+              <a:t>block metadata</a:t>
+            </a:r>
+          </a:p>
+        </p:txBody>
+      </p:sp>
+      <p:sp>
+        <p:nvSpPr>
+          <p:cNvPr id="45" name="TextBox 44">
+            <a:extLst>
+              <a:ext uri="{FF2B5EF4-FFF2-40B4-BE49-F238E27FC236}">
+                <a16:creationId xmlns:a16="http://schemas.microsoft.com/office/drawing/2014/main" id="{312BB9C3-B601-4D3C-8456-0F41916C7D26}"/>
+              </a:ext>
+            </a:extLst>
+          </p:cNvPr>
+          <p:cNvSpPr txBox="1"/>
+          <p:nvPr/>
+        </p:nvSpPr>
+        <p:spPr>
+          <a:xfrm>
+            <a:off x="7508557" y="4547357"/>
+            <a:ext cx="601447" cy="369332"/>
+          </a:xfrm>
+          <a:prstGeom prst="rect">
+            <a:avLst/>
+          </a:prstGeom>
+          <a:noFill/>
+        </p:spPr>
+        <p:txBody>
+          <a:bodyPr wrap="none" rtlCol="0">
+            <a:spAutoFit/>
+          </a:bodyPr>
+          <a:lstStyle/>
+          <a:p>
+            <a:r>
+              <a:rPr lang="en-US" dirty="0"/>
+              <a:t>uses</a:t>
+            </a:r>
+          </a:p>
+        </p:txBody>
+      </p:sp>
+      <p:sp>
+        <p:nvSpPr>
+          <p:cNvPr id="46" name="TextBox 45">
+            <a:extLst>
+              <a:ext uri="{FF2B5EF4-FFF2-40B4-BE49-F238E27FC236}">
+                <a16:creationId xmlns:a16="http://schemas.microsoft.com/office/drawing/2014/main" id="{86FD97B9-49E3-42B7-AB21-6850CF4B2081}"/>
+              </a:ext>
+            </a:extLst>
+          </p:cNvPr>
+          <p:cNvSpPr txBox="1"/>
+          <p:nvPr/>
+        </p:nvSpPr>
+        <p:spPr>
+          <a:xfrm>
+            <a:off x="4633737" y="5066071"/>
+            <a:ext cx="1328697" cy="369332"/>
+          </a:xfrm>
+          <a:prstGeom prst="rect">
+            <a:avLst/>
+          </a:prstGeom>
+          <a:noFill/>
+        </p:spPr>
+        <p:txBody>
+          <a:bodyPr wrap="none" rtlCol="0">
+            <a:spAutoFit/>
+          </a:bodyPr>
+          <a:lstStyle/>
+          <a:p>
+            <a:r>
+              <a:rPr lang="en-US" dirty="0"/>
+              <a:t>selects from</a:t>
+            </a:r>
+          </a:p>
+        </p:txBody>
+      </p:sp>
+      <p:sp>
+        <p:nvSpPr>
+          <p:cNvPr id="47" name="Rectangle 46">
+            <a:extLst>
+              <a:ext uri="{FF2B5EF4-FFF2-40B4-BE49-F238E27FC236}">
+                <a16:creationId xmlns:a16="http://schemas.microsoft.com/office/drawing/2014/main" id="{DF064F12-C257-4D6E-8195-E4C3CE3A3528}"/>
+              </a:ext>
+            </a:extLst>
+          </p:cNvPr>
+          <p:cNvSpPr/>
+          <p:nvPr/>
+        </p:nvSpPr>
+        <p:spPr>
+          <a:xfrm>
+            <a:off x="1535665" y="5935142"/>
+            <a:ext cx="2210862" cy="646331"/>
+          </a:xfrm>
+          <a:prstGeom prst="rect">
+            <a:avLst/>
+          </a:prstGeom>
+        </p:spPr>
         <p:txBody>
           <a:bodyPr wrap="none">
             <a:spAutoFit/>
           </a:bodyPr>
           <a:lstStyle/>
           <a:p>
+            <a:r>
+              <a:rPr lang="en-US" dirty="0">
+                <a:solidFill>
+                  <a:srgbClr val="4EC9B0"/>
+                </a:solidFill>
+                <a:latin typeface="Consolas" panose="020B0609020204030204" pitchFamily="49" charset="0"/>
+              </a:rPr>
+              <a:t>class </a:t>
+            </a:r>
+            <a:r>
+              <a:rPr lang="en-US" dirty="0" err="1">
+                <a:solidFill>
+                  <a:srgbClr val="4EC9B0"/>
+                </a:solidFill>
+                <a:latin typeface="Consolas" panose="020B0609020204030204" pitchFamily="49" charset="0"/>
+              </a:rPr>
+              <a:t>mbedTimer</a:t>
+            </a:r>
+            <a:r>
+              <a:rPr lang="en-US" dirty="0">
+                <a:solidFill>
+                  <a:srgbClr val="4EC9B0"/>
+                </a:solidFill>
+                <a:latin typeface="Consolas" panose="020B0609020204030204" pitchFamily="49" charset="0"/>
+              </a:rPr>
+              <a:t>:</a:t>
+            </a:r>
+          </a:p>
+          <a:p>
+            <a:r>
+              <a:rPr lang="en-US" b="0" dirty="0">
+                <a:solidFill>
+                  <a:srgbClr val="4EC9B0"/>
+                </a:solidFill>
+                <a:effectLst/>
+                <a:latin typeface="Consolas" panose="020B0609020204030204" pitchFamily="49" charset="0"/>
+              </a:rPr>
+              <a:t>   </a:t>
+            </a:r>
             <a:r>
               <a:rPr lang="en-US" dirty="0">
                 <a:solidFill>
@@ -8463,7 +8754,7 @@
                 </a:solidFill>
                 <a:latin typeface="Consolas" panose="020B0609020204030204" pitchFamily="49" charset="0"/>
               </a:rPr>
-              <a:t>class</a:t>
+              <a:t>public</a:t>
             </a:r>
             <a:r>
               <a:rPr lang="en-US" dirty="0">
@@ -8475,49 +8766,13 @@
               <a:t> </a:t>
             </a:r>
             <a:r>
-              <a:rPr lang="en-US" dirty="0" err="1">
+              <a:rPr lang="en-US" dirty="0">
                 <a:solidFill>
                   <a:srgbClr val="4EC9B0"/>
                 </a:solidFill>
                 <a:latin typeface="Consolas" panose="020B0609020204030204" pitchFamily="49" charset="0"/>
               </a:rPr>
-              <a:t>ArduinoUno</a:t>
-            </a:r>
-            <a:r>
-              <a:rPr lang="en-US" dirty="0">
-                <a:solidFill>
-                  <a:srgbClr val="D4D4D4"/>
-                </a:solidFill>
-                <a:latin typeface="Consolas" panose="020B0609020204030204" pitchFamily="49" charset="0"/>
-              </a:rPr>
-              <a:t>  : </a:t>
-            </a:r>
-            <a:r>
-              <a:rPr lang="en-US" dirty="0">
-                <a:solidFill>
-                  <a:srgbClr val="569CD6"/>
-                </a:solidFill>
-                <a:latin typeface="Consolas" panose="020B0609020204030204" pitchFamily="49" charset="0"/>
-              </a:rPr>
-              <a:t>public</a:t>
-            </a:r>
-            <a:r>
-              <a:rPr lang="en-US" dirty="0">
-                <a:solidFill>
-                  <a:srgbClr val="D4D4D4"/>
-                </a:solidFill>
-                <a:latin typeface="Consolas" panose="020B0609020204030204" pitchFamily="49" charset="0"/>
-              </a:rPr>
-              <a:t> </a:t>
-            </a:r>
-            <a:r>
-              <a:rPr lang="en-US" dirty="0" err="1">
-                <a:solidFill>
-                  <a:srgbClr val="4EC9B0"/>
-                </a:solidFill>
-                <a:latin typeface="Consolas" panose="020B0609020204030204" pitchFamily="49" charset="0"/>
-              </a:rPr>
-              <a:t>CodalDevice</a:t>
+              <a:t>Timer</a:t>
             </a:r>
             <a:endParaRPr lang="en-US" b="0" dirty="0">
               <a:solidFill>
@@ -8526,6 +8781,362 @@
               <a:effectLst/>
               <a:latin typeface="Consolas" panose="020B0609020204030204" pitchFamily="49" charset="0"/>
             </a:endParaRPr>
+          </a:p>
+        </p:txBody>
+      </p:sp>
+      <p:sp>
+        <p:nvSpPr>
+          <p:cNvPr id="50" name="Rectangle 49">
+            <a:extLst>
+              <a:ext uri="{FF2B5EF4-FFF2-40B4-BE49-F238E27FC236}">
+                <a16:creationId xmlns:a16="http://schemas.microsoft.com/office/drawing/2014/main" id="{A9163D93-520B-4E65-A557-35D98D084B8A}"/>
+              </a:ext>
+            </a:extLst>
+          </p:cNvPr>
+          <p:cNvSpPr/>
+          <p:nvPr/>
+        </p:nvSpPr>
+        <p:spPr>
+          <a:xfrm>
+            <a:off x="8412745" y="551502"/>
+            <a:ext cx="2212622" cy="733778"/>
+          </a:xfrm>
+          <a:prstGeom prst="rect">
+            <a:avLst/>
+          </a:prstGeom>
+        </p:spPr>
+        <p:style>
+          <a:lnRef idx="2">
+            <a:schemeClr val="accent1">
+              <a:shade val="50000"/>
+            </a:schemeClr>
+          </a:lnRef>
+          <a:fillRef idx="1">
+            <a:schemeClr val="accent1"/>
+          </a:fillRef>
+          <a:effectRef idx="0">
+            <a:schemeClr val="accent1"/>
+          </a:effectRef>
+          <a:fontRef idx="minor">
+            <a:schemeClr val="lt1"/>
+          </a:fontRef>
+        </p:style>
+        <p:txBody>
+          <a:bodyPr rtlCol="0" anchor="ctr"/>
+          <a:lstStyle/>
+          <a:p>
+            <a:pPr algn="ctr"/>
+            <a:r>
+              <a:rPr lang="en-US" dirty="0" err="1"/>
+              <a:t>pxt</a:t>
+            </a:r>
+            <a:r>
+              <a:rPr lang="en-US" dirty="0"/>
+              <a:t>-core</a:t>
+            </a:r>
+          </a:p>
+        </p:txBody>
+      </p:sp>
+      <p:cxnSp>
+        <p:nvCxnSpPr>
+          <p:cNvPr id="51" name="Connector: Elbow 50">
+            <a:extLst>
+              <a:ext uri="{FF2B5EF4-FFF2-40B4-BE49-F238E27FC236}">
+                <a16:creationId xmlns:a16="http://schemas.microsoft.com/office/drawing/2014/main" id="{F3D8DFA2-C1E2-4373-A2F9-2122211B7CAB}"/>
+              </a:ext>
+            </a:extLst>
+          </p:cNvPr>
+          <p:cNvCxnSpPr>
+            <a:cxnSpLocks/>
+            <a:stCxn id="22" idx="3"/>
+            <a:endCxn id="50" idx="3"/>
+          </p:cNvCxnSpPr>
+          <p:nvPr/>
+        </p:nvCxnSpPr>
+        <p:spPr>
+          <a:xfrm flipH="1" flipV="1">
+            <a:off x="10625367" y="918391"/>
+            <a:ext cx="30968" cy="2473204"/>
+          </a:xfrm>
+          <a:prstGeom prst="bentConnector3">
+            <a:avLst>
+              <a:gd name="adj1" fmla="val -738181"/>
+            </a:avLst>
+          </a:prstGeom>
+          <a:ln>
+            <a:tailEnd type="triangle" w="lg" len="lg"/>
+          </a:ln>
+        </p:spPr>
+        <p:style>
+          <a:lnRef idx="1">
+            <a:schemeClr val="accent1"/>
+          </a:lnRef>
+          <a:fillRef idx="0">
+            <a:schemeClr val="accent1"/>
+          </a:fillRef>
+          <a:effectRef idx="0">
+            <a:schemeClr val="accent1"/>
+          </a:effectRef>
+          <a:fontRef idx="minor">
+            <a:schemeClr val="tx1"/>
+          </a:fontRef>
+        </p:style>
+      </p:cxnSp>
+      <p:sp>
+        <p:nvSpPr>
+          <p:cNvPr id="55" name="TextBox 54">
+            <a:extLst>
+              <a:ext uri="{FF2B5EF4-FFF2-40B4-BE49-F238E27FC236}">
+                <a16:creationId xmlns:a16="http://schemas.microsoft.com/office/drawing/2014/main" id="{30A842BA-3F1C-4DE9-86F9-282669FBEE29}"/>
+              </a:ext>
+            </a:extLst>
+          </p:cNvPr>
+          <p:cNvSpPr txBox="1"/>
+          <p:nvPr/>
+        </p:nvSpPr>
+        <p:spPr>
+          <a:xfrm>
+            <a:off x="10895222" y="2929930"/>
+            <a:ext cx="1298241" cy="646331"/>
+          </a:xfrm>
+          <a:prstGeom prst="rect">
+            <a:avLst/>
+          </a:prstGeom>
+          <a:noFill/>
+        </p:spPr>
+        <p:txBody>
+          <a:bodyPr wrap="none" rtlCol="0">
+            <a:spAutoFit/>
+          </a:bodyPr>
+          <a:lstStyle/>
+          <a:p>
+            <a:r>
+              <a:rPr lang="en-US" dirty="0"/>
+              <a:t>extends,</a:t>
+            </a:r>
+          </a:p>
+          <a:p>
+            <a:r>
+              <a:rPr lang="en-US" dirty="0"/>
+              <a:t>implements</a:t>
+            </a:r>
+          </a:p>
+        </p:txBody>
+      </p:sp>
+      <p:sp>
+        <p:nvSpPr>
+          <p:cNvPr id="56" name="Rectangle 55">
+            <a:extLst>
+              <a:ext uri="{FF2B5EF4-FFF2-40B4-BE49-F238E27FC236}">
+                <a16:creationId xmlns:a16="http://schemas.microsoft.com/office/drawing/2014/main" id="{6D75D475-06B9-44A3-92FE-ED96EA1E4978}"/>
+              </a:ext>
+            </a:extLst>
+          </p:cNvPr>
+          <p:cNvSpPr/>
+          <p:nvPr/>
+        </p:nvSpPr>
+        <p:spPr>
+          <a:xfrm>
+            <a:off x="5093812" y="552279"/>
+            <a:ext cx="2212622" cy="733778"/>
+          </a:xfrm>
+          <a:prstGeom prst="rect">
+            <a:avLst/>
+          </a:prstGeom>
+        </p:spPr>
+        <p:style>
+          <a:lnRef idx="3">
+            <a:schemeClr val="lt1"/>
+          </a:lnRef>
+          <a:fillRef idx="1">
+            <a:schemeClr val="accent6"/>
+          </a:fillRef>
+          <a:effectRef idx="1">
+            <a:schemeClr val="accent6"/>
+          </a:effectRef>
+          <a:fontRef idx="minor">
+            <a:schemeClr val="lt1"/>
+          </a:fontRef>
+        </p:style>
+        <p:txBody>
+          <a:bodyPr rtlCol="0" anchor="ctr"/>
+          <a:lstStyle/>
+          <a:p>
+            <a:pPr algn="ctr"/>
+            <a:r>
+              <a:rPr lang="en-US" dirty="0" err="1"/>
+              <a:t>Blockly</a:t>
+            </a:r>
+            <a:r>
+              <a:rPr lang="en-US" dirty="0"/>
+              <a:t>,</a:t>
+            </a:r>
+          </a:p>
+          <a:p>
+            <a:pPr algn="ctr"/>
+            <a:r>
+              <a:rPr lang="en-US" dirty="0"/>
+              <a:t>Typescript, Monaco</a:t>
+            </a:r>
+          </a:p>
+        </p:txBody>
+      </p:sp>
+      <p:cxnSp>
+        <p:nvCxnSpPr>
+          <p:cNvPr id="63" name="Straight Arrow Connector 62">
+            <a:extLst>
+              <a:ext uri="{FF2B5EF4-FFF2-40B4-BE49-F238E27FC236}">
+                <a16:creationId xmlns:a16="http://schemas.microsoft.com/office/drawing/2014/main" id="{E7100880-5040-4C7F-9262-C2CEA4F51398}"/>
+              </a:ext>
+            </a:extLst>
+          </p:cNvPr>
+          <p:cNvCxnSpPr>
+            <a:cxnSpLocks/>
+            <a:stCxn id="50" idx="1"/>
+            <a:endCxn id="56" idx="3"/>
+          </p:cNvCxnSpPr>
+          <p:nvPr/>
+        </p:nvCxnSpPr>
+        <p:spPr>
+          <a:xfrm flipH="1">
+            <a:off x="7306434" y="918391"/>
+            <a:ext cx="1106311" cy="777"/>
+          </a:xfrm>
+          <a:prstGeom prst="straightConnector1">
+            <a:avLst/>
+          </a:prstGeom>
+          <a:ln>
+            <a:headEnd w="lg" len="lg"/>
+            <a:tailEnd type="triangle" w="lg" len="lg"/>
+          </a:ln>
+        </p:spPr>
+        <p:style>
+          <a:lnRef idx="1">
+            <a:schemeClr val="accent1"/>
+          </a:lnRef>
+          <a:fillRef idx="0">
+            <a:schemeClr val="accent1"/>
+          </a:fillRef>
+          <a:effectRef idx="0">
+            <a:schemeClr val="accent1"/>
+          </a:effectRef>
+          <a:fontRef idx="minor">
+            <a:schemeClr val="tx1"/>
+          </a:fontRef>
+        </p:style>
+      </p:cxnSp>
+      <p:sp>
+        <p:nvSpPr>
+          <p:cNvPr id="67" name="TextBox 66">
+            <a:extLst>
+              <a:ext uri="{FF2B5EF4-FFF2-40B4-BE49-F238E27FC236}">
+                <a16:creationId xmlns:a16="http://schemas.microsoft.com/office/drawing/2014/main" id="{1EA0612B-38D3-44A7-AA9B-7E50E02E7D7F}"/>
+              </a:ext>
+            </a:extLst>
+          </p:cNvPr>
+          <p:cNvSpPr txBox="1"/>
+          <p:nvPr/>
+        </p:nvSpPr>
+        <p:spPr>
+          <a:xfrm>
+            <a:off x="7508558" y="946140"/>
+            <a:ext cx="601447" cy="369332"/>
+          </a:xfrm>
+          <a:prstGeom prst="rect">
+            <a:avLst/>
+          </a:prstGeom>
+          <a:noFill/>
+        </p:spPr>
+        <p:txBody>
+          <a:bodyPr wrap="none" rtlCol="0">
+            <a:spAutoFit/>
+          </a:bodyPr>
+          <a:lstStyle/>
+          <a:p>
+            <a:r>
+              <a:rPr lang="en-US" dirty="0"/>
+              <a:t>uses</a:t>
+            </a:r>
+          </a:p>
+        </p:txBody>
+      </p:sp>
+      <p:cxnSp>
+        <p:nvCxnSpPr>
+          <p:cNvPr id="68" name="Connector: Elbow 67">
+            <a:extLst>
+              <a:ext uri="{FF2B5EF4-FFF2-40B4-BE49-F238E27FC236}">
+                <a16:creationId xmlns:a16="http://schemas.microsoft.com/office/drawing/2014/main" id="{7C269C97-D3FA-4B23-BFD0-4B1F5507032C}"/>
+              </a:ext>
+            </a:extLst>
+          </p:cNvPr>
+          <p:cNvCxnSpPr>
+            <a:cxnSpLocks/>
+            <a:stCxn id="5" idx="0"/>
+            <a:endCxn id="50" idx="2"/>
+          </p:cNvCxnSpPr>
+          <p:nvPr/>
+        </p:nvCxnSpPr>
+        <p:spPr>
+          <a:xfrm rot="5400000" flipH="1" flipV="1">
+            <a:off x="7502074" y="-47638"/>
+            <a:ext cx="684063" cy="3349901"/>
+          </a:xfrm>
+          <a:prstGeom prst="bentConnector3">
+            <a:avLst>
+              <a:gd name="adj1" fmla="val 50000"/>
+            </a:avLst>
+          </a:prstGeom>
+          <a:ln>
+            <a:tailEnd type="triangle" w="lg" len="lg"/>
+          </a:ln>
+        </p:spPr>
+        <p:style>
+          <a:lnRef idx="1">
+            <a:schemeClr val="accent1"/>
+          </a:lnRef>
+          <a:fillRef idx="0">
+            <a:schemeClr val="accent1"/>
+          </a:fillRef>
+          <a:effectRef idx="0">
+            <a:schemeClr val="accent1"/>
+          </a:effectRef>
+          <a:fontRef idx="minor">
+            <a:schemeClr val="tx1"/>
+          </a:fontRef>
+        </p:style>
+      </p:cxnSp>
+      <p:sp>
+        <p:nvSpPr>
+          <p:cNvPr id="71" name="TextBox 70">
+            <a:extLst>
+              <a:ext uri="{FF2B5EF4-FFF2-40B4-BE49-F238E27FC236}">
+                <a16:creationId xmlns:a16="http://schemas.microsoft.com/office/drawing/2014/main" id="{51E6A0BF-B978-415A-8FE1-547ACFB66EE3}"/>
+              </a:ext>
+            </a:extLst>
+          </p:cNvPr>
+          <p:cNvSpPr txBox="1"/>
+          <p:nvPr/>
+        </p:nvSpPr>
+        <p:spPr>
+          <a:xfrm>
+            <a:off x="8361343" y="1651392"/>
+            <a:ext cx="1172693" cy="369332"/>
+          </a:xfrm>
+          <a:prstGeom prst="rect">
+            <a:avLst/>
+          </a:prstGeom>
+          <a:noFill/>
+        </p:spPr>
+        <p:txBody>
+          <a:bodyPr wrap="none" rtlCol="0">
+            <a:spAutoFit/>
+          </a:bodyPr>
+          <a:lstStyle/>
+          <a:p>
+            <a:r>
+              <a:rPr lang="en-US" dirty="0"/>
+              <a:t>references</a:t>
+            </a:r>
           </a:p>
         </p:txBody>
       </p:sp>

</xml_diff>

<commit_message>
more work on repo fig
</commit_message>
<xml_diff>
--- a/papers/tr2017/diagrams.pptx
+++ b/papers/tr2017/diagrams.pptx
@@ -610,375 +610,8 @@
           <a:lstStyle/>
           <a:p>
             <a:r>
-              <a:rPr lang="en-US" sz="1200" b="0" kern="1200" dirty="0">
-                <a:solidFill>
-                  <a:schemeClr val="tx1"/>
-                </a:solidFill>
-                <a:effectLst/>
-                <a:latin typeface="+mn-lt"/>
-                <a:ea typeface="+mn-ea"/>
-                <a:cs typeface="+mn-cs"/>
-              </a:rPr>
-              <a:t>extern "C"</a:t>
-            </a:r>
-          </a:p>
-          <a:p>
-            <a:r>
-              <a:rPr lang="en-US" sz="1200" b="0" kern="1200" dirty="0">
-                <a:solidFill>
-                  <a:schemeClr val="tx1"/>
-                </a:solidFill>
-                <a:effectLst/>
-                <a:latin typeface="+mn-lt"/>
-                <a:ea typeface="+mn-ea"/>
-                <a:cs typeface="+mn-cs"/>
-              </a:rPr>
-              <a:t>{</a:t>
-            </a:r>
-          </a:p>
-          <a:p>
-            <a:r>
-              <a:rPr lang="en-US" sz="1200" b="0" kern="1200" dirty="0">
-                <a:solidFill>
-                  <a:schemeClr val="tx1"/>
-                </a:solidFill>
-                <a:effectLst/>
-                <a:latin typeface="+mn-lt"/>
-                <a:ea typeface="+mn-ea"/>
-                <a:cs typeface="+mn-cs"/>
-              </a:rPr>
-              <a:t>void </a:t>
-            </a:r>
-            <a:r>
-              <a:rPr lang="en-US" sz="1200" b="0" kern="1200" dirty="0" err="1">
-                <a:solidFill>
-                  <a:schemeClr val="tx1"/>
-                </a:solidFill>
-                <a:effectLst/>
-                <a:latin typeface="+mn-lt"/>
-                <a:ea typeface="+mn-ea"/>
-                <a:cs typeface="+mn-cs"/>
-              </a:rPr>
-              <a:t>target_enable_irq</a:t>
-            </a:r>
-            <a:r>
-              <a:rPr lang="en-US" sz="1200" b="0" kern="1200" dirty="0">
-                <a:solidFill>
-                  <a:schemeClr val="tx1"/>
-                </a:solidFill>
-                <a:effectLst/>
-                <a:latin typeface="+mn-lt"/>
-                <a:ea typeface="+mn-ea"/>
-                <a:cs typeface="+mn-cs"/>
-              </a:rPr>
-              <a:t>();</a:t>
-            </a:r>
-          </a:p>
-          <a:p>
-            <a:br>
-              <a:rPr lang="en-US" sz="1200" b="0" kern="1200" dirty="0">
-                <a:solidFill>
-                  <a:schemeClr val="tx1"/>
-                </a:solidFill>
-                <a:effectLst/>
-                <a:latin typeface="+mn-lt"/>
-                <a:ea typeface="+mn-ea"/>
-                <a:cs typeface="+mn-cs"/>
-              </a:rPr>
-            </a:br>
-            <a:r>
-              <a:rPr lang="en-US" sz="1200" b="0" kern="1200" dirty="0">
-                <a:solidFill>
-                  <a:schemeClr val="tx1"/>
-                </a:solidFill>
-                <a:effectLst/>
-                <a:latin typeface="+mn-lt"/>
-                <a:ea typeface="+mn-ea"/>
-                <a:cs typeface="+mn-cs"/>
-              </a:rPr>
-              <a:t>void </a:t>
-            </a:r>
-            <a:r>
-              <a:rPr lang="en-US" sz="1200" b="0" kern="1200" dirty="0" err="1">
-                <a:solidFill>
-                  <a:schemeClr val="tx1"/>
-                </a:solidFill>
-                <a:effectLst/>
-                <a:latin typeface="+mn-lt"/>
-                <a:ea typeface="+mn-ea"/>
-                <a:cs typeface="+mn-cs"/>
-              </a:rPr>
-              <a:t>target_disable_irq</a:t>
-            </a:r>
-            <a:r>
-              <a:rPr lang="en-US" sz="1200" b="0" kern="1200" dirty="0">
-                <a:solidFill>
-                  <a:schemeClr val="tx1"/>
-                </a:solidFill>
-                <a:effectLst/>
-                <a:latin typeface="+mn-lt"/>
-                <a:ea typeface="+mn-ea"/>
-                <a:cs typeface="+mn-cs"/>
-              </a:rPr>
-              <a:t>();</a:t>
-            </a:r>
-          </a:p>
-          <a:p>
-            <a:br>
-              <a:rPr lang="en-US" sz="1200" b="0" kern="1200" dirty="0">
-                <a:solidFill>
-                  <a:schemeClr val="tx1"/>
-                </a:solidFill>
-                <a:effectLst/>
-                <a:latin typeface="+mn-lt"/>
-                <a:ea typeface="+mn-ea"/>
-                <a:cs typeface="+mn-cs"/>
-              </a:rPr>
-            </a:br>
-            <a:r>
-              <a:rPr lang="en-US" sz="1200" b="0" kern="1200" dirty="0">
-                <a:solidFill>
-                  <a:schemeClr val="tx1"/>
-                </a:solidFill>
-                <a:effectLst/>
-                <a:latin typeface="+mn-lt"/>
-                <a:ea typeface="+mn-ea"/>
-                <a:cs typeface="+mn-cs"/>
-              </a:rPr>
-              <a:t>void </a:t>
-            </a:r>
-            <a:r>
-              <a:rPr lang="en-US" sz="1200" b="0" kern="1200" dirty="0" err="1">
-                <a:solidFill>
-                  <a:schemeClr val="tx1"/>
-                </a:solidFill>
-                <a:effectLst/>
-                <a:latin typeface="+mn-lt"/>
-                <a:ea typeface="+mn-ea"/>
-                <a:cs typeface="+mn-cs"/>
-              </a:rPr>
-              <a:t>target_reset</a:t>
-            </a:r>
-            <a:r>
-              <a:rPr lang="en-US" sz="1200" b="0" kern="1200" dirty="0">
-                <a:solidFill>
-                  <a:schemeClr val="tx1"/>
-                </a:solidFill>
-                <a:effectLst/>
-                <a:latin typeface="+mn-lt"/>
-                <a:ea typeface="+mn-ea"/>
-                <a:cs typeface="+mn-cs"/>
-              </a:rPr>
-              <a:t>();</a:t>
-            </a:r>
-          </a:p>
-          <a:p>
-            <a:br>
-              <a:rPr lang="en-US" sz="1200" b="0" kern="1200" dirty="0">
-                <a:solidFill>
-                  <a:schemeClr val="tx1"/>
-                </a:solidFill>
-                <a:effectLst/>
-                <a:latin typeface="+mn-lt"/>
-                <a:ea typeface="+mn-ea"/>
-                <a:cs typeface="+mn-cs"/>
-              </a:rPr>
-            </a:br>
-            <a:r>
-              <a:rPr lang="en-US" sz="1200" b="0" kern="1200" dirty="0">
-                <a:solidFill>
-                  <a:schemeClr val="tx1"/>
-                </a:solidFill>
-                <a:effectLst/>
-                <a:latin typeface="+mn-lt"/>
-                <a:ea typeface="+mn-ea"/>
-                <a:cs typeface="+mn-cs"/>
-              </a:rPr>
-              <a:t>void </a:t>
-            </a:r>
-            <a:r>
-              <a:rPr lang="en-US" sz="1200" b="0" kern="1200" dirty="0" err="1">
-                <a:solidFill>
-                  <a:schemeClr val="tx1"/>
-                </a:solidFill>
-                <a:effectLst/>
-                <a:latin typeface="+mn-lt"/>
-                <a:ea typeface="+mn-ea"/>
-                <a:cs typeface="+mn-cs"/>
-              </a:rPr>
-              <a:t>target_wait</a:t>
-            </a:r>
-            <a:r>
-              <a:rPr lang="en-US" sz="1200" b="0" kern="1200" dirty="0">
-                <a:solidFill>
-                  <a:schemeClr val="tx1"/>
-                </a:solidFill>
-                <a:effectLst/>
-                <a:latin typeface="+mn-lt"/>
-                <a:ea typeface="+mn-ea"/>
-                <a:cs typeface="+mn-cs"/>
-              </a:rPr>
-              <a:t>(unsigned long milliseconds);</a:t>
-            </a:r>
-          </a:p>
-          <a:p>
-            <a:br>
-              <a:rPr lang="en-US" sz="1200" b="0" kern="1200" dirty="0">
-                <a:solidFill>
-                  <a:schemeClr val="tx1"/>
-                </a:solidFill>
-                <a:effectLst/>
-                <a:latin typeface="+mn-lt"/>
-                <a:ea typeface="+mn-ea"/>
-                <a:cs typeface="+mn-cs"/>
-              </a:rPr>
-            </a:br>
-            <a:r>
-              <a:rPr lang="en-US" sz="1200" b="0" kern="1200" dirty="0">
-                <a:solidFill>
-                  <a:schemeClr val="tx1"/>
-                </a:solidFill>
-                <a:effectLst/>
-                <a:latin typeface="+mn-lt"/>
-                <a:ea typeface="+mn-ea"/>
-                <a:cs typeface="+mn-cs"/>
-              </a:rPr>
-              <a:t>void </a:t>
-            </a:r>
-            <a:r>
-              <a:rPr lang="en-US" sz="1200" b="0" kern="1200" dirty="0" err="1">
-                <a:solidFill>
-                  <a:schemeClr val="tx1"/>
-                </a:solidFill>
-                <a:effectLst/>
-                <a:latin typeface="+mn-lt"/>
-                <a:ea typeface="+mn-ea"/>
-                <a:cs typeface="+mn-cs"/>
-              </a:rPr>
-              <a:t>target_wait_for_event</a:t>
-            </a:r>
-            <a:r>
-              <a:rPr lang="en-US" sz="1200" b="0" kern="1200" dirty="0">
-                <a:solidFill>
-                  <a:schemeClr val="tx1"/>
-                </a:solidFill>
-                <a:effectLst/>
-                <a:latin typeface="+mn-lt"/>
-                <a:ea typeface="+mn-ea"/>
-                <a:cs typeface="+mn-cs"/>
-              </a:rPr>
-              <a:t>();</a:t>
-            </a:r>
-          </a:p>
-          <a:p>
-            <a:br>
-              <a:rPr lang="en-US" sz="1200" b="0" kern="1200" dirty="0">
-                <a:solidFill>
-                  <a:schemeClr val="tx1"/>
-                </a:solidFill>
-                <a:effectLst/>
-                <a:latin typeface="+mn-lt"/>
-                <a:ea typeface="+mn-ea"/>
-                <a:cs typeface="+mn-cs"/>
-              </a:rPr>
-            </a:br>
-            <a:r>
-              <a:rPr lang="en-US" sz="1200" b="0" kern="1200" dirty="0">
-                <a:solidFill>
-                  <a:schemeClr val="tx1"/>
-                </a:solidFill>
-                <a:effectLst/>
-                <a:latin typeface="+mn-lt"/>
-                <a:ea typeface="+mn-ea"/>
-                <a:cs typeface="+mn-cs"/>
-              </a:rPr>
-              <a:t>void </a:t>
-            </a:r>
-            <a:r>
-              <a:rPr lang="en-US" sz="1200" b="0" kern="1200" dirty="0" err="1">
-                <a:solidFill>
-                  <a:schemeClr val="tx1"/>
-                </a:solidFill>
-                <a:effectLst/>
-                <a:latin typeface="+mn-lt"/>
-                <a:ea typeface="+mn-ea"/>
-                <a:cs typeface="+mn-cs"/>
-              </a:rPr>
-              <a:t>target_panic</a:t>
-            </a:r>
-            <a:r>
-              <a:rPr lang="en-US" sz="1200" b="0" kern="1200" dirty="0">
-                <a:solidFill>
-                  <a:schemeClr val="tx1"/>
-                </a:solidFill>
-                <a:effectLst/>
-                <a:latin typeface="+mn-lt"/>
-                <a:ea typeface="+mn-ea"/>
-                <a:cs typeface="+mn-cs"/>
-              </a:rPr>
-              <a:t>(</a:t>
-            </a:r>
-            <a:r>
-              <a:rPr lang="en-US" sz="1200" b="0" kern="1200" dirty="0" err="1">
-                <a:solidFill>
-                  <a:schemeClr val="tx1"/>
-                </a:solidFill>
-                <a:effectLst/>
-                <a:latin typeface="+mn-lt"/>
-                <a:ea typeface="+mn-ea"/>
-                <a:cs typeface="+mn-cs"/>
-              </a:rPr>
-              <a:t>int</a:t>
-            </a:r>
-            <a:r>
-              <a:rPr lang="en-US" sz="1200" b="0" kern="1200" dirty="0">
-                <a:solidFill>
-                  <a:schemeClr val="tx1"/>
-                </a:solidFill>
-                <a:effectLst/>
-                <a:latin typeface="+mn-lt"/>
-                <a:ea typeface="+mn-ea"/>
-                <a:cs typeface="+mn-cs"/>
-              </a:rPr>
-              <a:t> </a:t>
-            </a:r>
-            <a:r>
-              <a:rPr lang="en-US" sz="1200" b="0" kern="1200" dirty="0" err="1">
-                <a:solidFill>
-                  <a:schemeClr val="tx1"/>
-                </a:solidFill>
-                <a:effectLst/>
-                <a:latin typeface="+mn-lt"/>
-                <a:ea typeface="+mn-ea"/>
-                <a:cs typeface="+mn-cs"/>
-              </a:rPr>
-              <a:t>statusCode</a:t>
-            </a:r>
-            <a:r>
-              <a:rPr lang="en-US" sz="1200" b="0" kern="1200" dirty="0">
-                <a:solidFill>
-                  <a:schemeClr val="tx1"/>
-                </a:solidFill>
-                <a:effectLst/>
-                <a:latin typeface="+mn-lt"/>
-                <a:ea typeface="+mn-ea"/>
-                <a:cs typeface="+mn-cs"/>
-              </a:rPr>
-              <a:t>);</a:t>
-            </a:r>
-          </a:p>
-          <a:p>
-            <a:r>
-              <a:rPr lang="en-US" sz="1200" b="0" kern="1200" dirty="0">
-                <a:solidFill>
-                  <a:schemeClr val="tx1"/>
-                </a:solidFill>
-                <a:effectLst/>
-                <a:latin typeface="+mn-lt"/>
-                <a:ea typeface="+mn-ea"/>
-                <a:cs typeface="+mn-cs"/>
-              </a:rPr>
-              <a:t>}</a:t>
+              <a:rPr lang="en-US" dirty="0"/>
+              <a:t>https://github.com/lancaster-university/codal-adafruit-cplay </a:t>
             </a:r>
           </a:p>
           <a:p>
@@ -7720,7 +7353,7 @@
         </p:nvSpPr>
         <p:spPr>
           <a:xfrm>
-            <a:off x="1178379" y="1973322"/>
+            <a:off x="1456937" y="1342404"/>
             <a:ext cx="2212622" cy="733778"/>
           </a:xfrm>
           <a:prstGeom prst="rect">
@@ -7728,19 +7361,17 @@
           </a:prstGeom>
         </p:spPr>
         <p:style>
-          <a:lnRef idx="2">
-            <a:schemeClr val="accent1">
-              <a:shade val="50000"/>
-            </a:schemeClr>
+          <a:lnRef idx="1">
+            <a:schemeClr val="accent5"/>
           </a:lnRef>
-          <a:fillRef idx="1">
-            <a:schemeClr val="accent1"/>
+          <a:fillRef idx="2">
+            <a:schemeClr val="accent5"/>
           </a:fillRef>
-          <a:effectRef idx="0">
-            <a:schemeClr val="accent1"/>
+          <a:effectRef idx="1">
+            <a:schemeClr val="accent5"/>
           </a:effectRef>
           <a:fontRef idx="minor">
-            <a:schemeClr val="lt1"/>
+            <a:schemeClr val="dk1"/>
           </a:fontRef>
         </p:style>
         <p:txBody>
@@ -7749,11 +7380,11 @@
           <a:p>
             <a:pPr algn="ctr"/>
             <a:r>
-              <a:rPr lang="en-US" dirty="0" err="1"/>
+              <a:rPr lang="en-US" b="1" dirty="0" err="1"/>
               <a:t>codal</a:t>
             </a:r>
             <a:r>
-              <a:rPr lang="en-US" dirty="0"/>
+              <a:rPr lang="en-US" b="1" dirty="0"/>
               <a:t>-core</a:t>
             </a:r>
           </a:p>
@@ -7773,27 +7404,30 @@
         </p:nvSpPr>
         <p:spPr>
           <a:xfrm>
-            <a:off x="5062844" y="1969343"/>
+            <a:off x="5062844" y="1664537"/>
             <a:ext cx="2212622" cy="733778"/>
           </a:xfrm>
           <a:prstGeom prst="rect">
             <a:avLst/>
           </a:prstGeom>
+          <a:ln>
+            <a:solidFill>
+              <a:schemeClr val="tx1"/>
+            </a:solidFill>
+          </a:ln>
         </p:spPr>
         <p:style>
-          <a:lnRef idx="2">
-            <a:schemeClr val="accent1">
-              <a:shade val="50000"/>
-            </a:schemeClr>
+          <a:lnRef idx="1">
+            <a:schemeClr val="accent4"/>
           </a:lnRef>
-          <a:fillRef idx="1">
-            <a:schemeClr val="accent1"/>
+          <a:fillRef idx="2">
+            <a:schemeClr val="accent4"/>
           </a:fillRef>
-          <a:effectRef idx="0">
-            <a:schemeClr val="accent1"/>
+          <a:effectRef idx="1">
+            <a:schemeClr val="accent4"/>
           </a:effectRef>
           <a:fontRef idx="minor">
-            <a:schemeClr val="lt1"/>
+            <a:schemeClr val="dk1"/>
           </a:fontRef>
         </p:style>
         <p:txBody>
@@ -7802,11 +7436,11 @@
           <a:p>
             <a:pPr algn="ctr"/>
             <a:r>
-              <a:rPr lang="en-US" dirty="0" err="1"/>
+              <a:rPr lang="en-US" b="1" dirty="0" err="1"/>
               <a:t>pxt</a:t>
             </a:r>
             <a:r>
-              <a:rPr lang="en-US" dirty="0"/>
+              <a:rPr lang="en-US" b="1" dirty="0"/>
               <a:t>-common-packages</a:t>
             </a:r>
           </a:p>
@@ -7826,7 +7460,7 @@
         </p:nvSpPr>
         <p:spPr>
           <a:xfrm>
-            <a:off x="1535665" y="5022887"/>
+            <a:off x="1456937" y="4718081"/>
             <a:ext cx="2212622" cy="733778"/>
           </a:xfrm>
           <a:prstGeom prst="rect">
@@ -7834,19 +7468,17 @@
           </a:prstGeom>
         </p:spPr>
         <p:style>
-          <a:lnRef idx="2">
-            <a:schemeClr val="accent1">
-              <a:shade val="50000"/>
-            </a:schemeClr>
+          <a:lnRef idx="1">
+            <a:schemeClr val="accent5"/>
           </a:lnRef>
-          <a:fillRef idx="1">
-            <a:schemeClr val="accent1"/>
+          <a:fillRef idx="2">
+            <a:schemeClr val="accent5"/>
           </a:fillRef>
-          <a:effectRef idx="0">
-            <a:schemeClr val="accent1"/>
+          <a:effectRef idx="1">
+            <a:schemeClr val="accent5"/>
           </a:effectRef>
           <a:fontRef idx="minor">
-            <a:schemeClr val="lt1"/>
+            <a:schemeClr val="dk1"/>
           </a:fontRef>
         </p:style>
         <p:txBody>
@@ -7855,9 +7487,17 @@
           <a:p>
             <a:pPr algn="ctr"/>
             <a:r>
-              <a:rPr lang="en-US" dirty="0"/>
-              <a:t>codal-samd21-mbed</a:t>
-            </a:r>
+              <a:rPr lang="en-US" b="1" dirty="0"/>
+              <a:t>codal-samd21-mbed,</a:t>
+            </a:r>
+          </a:p>
+          <a:p>
+            <a:pPr algn="ctr"/>
+            <a:r>
+              <a:rPr lang="en-US" b="1" dirty="0" err="1"/>
+              <a:t>codal-mbed</a:t>
+            </a:r>
+            <a:endParaRPr lang="en-US" b="1" dirty="0"/>
           </a:p>
         </p:txBody>
       </p:sp>
@@ -7875,7 +7515,7 @@
         </p:nvSpPr>
         <p:spPr>
           <a:xfrm>
-            <a:off x="1535665" y="3427403"/>
+            <a:off x="1456937" y="3122597"/>
             <a:ext cx="2212622" cy="733778"/>
           </a:xfrm>
           <a:prstGeom prst="rect">
@@ -7883,19 +7523,17 @@
           </a:prstGeom>
         </p:spPr>
         <p:style>
-          <a:lnRef idx="2">
-            <a:schemeClr val="accent1">
-              <a:shade val="50000"/>
-            </a:schemeClr>
+          <a:lnRef idx="1">
+            <a:schemeClr val="accent5"/>
           </a:lnRef>
-          <a:fillRef idx="1">
-            <a:schemeClr val="accent1"/>
+          <a:fillRef idx="2">
+            <a:schemeClr val="accent5"/>
           </a:fillRef>
-          <a:effectRef idx="0">
-            <a:schemeClr val="accent1"/>
+          <a:effectRef idx="1">
+            <a:schemeClr val="accent5"/>
           </a:effectRef>
           <a:fontRef idx="minor">
-            <a:schemeClr val="lt1"/>
+            <a:schemeClr val="dk1"/>
           </a:fontRef>
         </p:style>
         <p:txBody>
@@ -7904,7 +7542,7 @@
           <a:p>
             <a:pPr algn="ctr"/>
             <a:r>
-              <a:rPr lang="en-US" dirty="0"/>
+              <a:rPr lang="en-US" b="1" dirty="0"/>
               <a:t>codal-atmega328p</a:t>
             </a:r>
           </a:p>
@@ -7924,7 +7562,7 @@
         </p:nvSpPr>
         <p:spPr>
           <a:xfrm>
-            <a:off x="5062844" y="4124608"/>
+            <a:off x="5062844" y="3819802"/>
             <a:ext cx="2212622" cy="733778"/>
           </a:xfrm>
           <a:prstGeom prst="rect">
@@ -7932,19 +7570,17 @@
           </a:prstGeom>
         </p:spPr>
         <p:style>
-          <a:lnRef idx="2">
-            <a:schemeClr val="accent1">
-              <a:shade val="50000"/>
-            </a:schemeClr>
+          <a:lnRef idx="1">
+            <a:schemeClr val="accent5"/>
           </a:lnRef>
-          <a:fillRef idx="1">
-            <a:schemeClr val="accent1"/>
+          <a:fillRef idx="2">
+            <a:schemeClr val="accent5"/>
           </a:fillRef>
-          <a:effectRef idx="0">
-            <a:schemeClr val="accent1"/>
+          <a:effectRef idx="1">
+            <a:schemeClr val="accent5"/>
           </a:effectRef>
           <a:fontRef idx="minor">
-            <a:schemeClr val="lt1"/>
+            <a:schemeClr val="dk1"/>
           </a:fontRef>
         </p:style>
         <p:txBody>
@@ -7953,15 +7589,15 @@
           <a:p>
             <a:pPr algn="ctr"/>
             <a:r>
-              <a:rPr lang="en-US" dirty="0" err="1"/>
+              <a:rPr lang="en-US" b="1" dirty="0" err="1"/>
               <a:t>codal</a:t>
             </a:r>
-            <a:endParaRPr lang="en-US" dirty="0"/>
+            <a:endParaRPr lang="en-US" b="1" dirty="0"/>
           </a:p>
           <a:p>
             <a:pPr algn="ctr"/>
             <a:r>
-              <a:rPr lang="en-US" dirty="0"/>
+              <a:rPr lang="en-US" b="1" dirty="0"/>
               <a:t>(build shell)</a:t>
             </a:r>
           </a:p>
@@ -7981,8 +7617,8 @@
         </p:nvSpPr>
         <p:spPr>
           <a:xfrm>
-            <a:off x="1136386" y="2745264"/>
-            <a:ext cx="1725159" cy="369332"/>
+            <a:off x="1362182" y="1005072"/>
+            <a:ext cx="1725159" cy="307777"/>
           </a:xfrm>
           <a:prstGeom prst="rect">
             <a:avLst/>
@@ -7995,7 +7631,7 @@
           <a:lstStyle/>
           <a:p>
             <a:r>
-              <a:rPr lang="en-US" dirty="0">
+              <a:rPr lang="en-US" sz="1400" b="1" dirty="0">
                 <a:solidFill>
                   <a:srgbClr val="569CD6"/>
                 </a:solidFill>
@@ -8004,7 +7640,7 @@
               <a:t>class</a:t>
             </a:r>
             <a:r>
-              <a:rPr lang="en-US" dirty="0">
+              <a:rPr lang="en-US" sz="1400" b="1" dirty="0">
                 <a:solidFill>
                   <a:srgbClr val="D4D4D4"/>
                 </a:solidFill>
@@ -8013,7 +7649,7 @@
               <a:t> </a:t>
             </a:r>
             <a:r>
-              <a:rPr lang="en-US" dirty="0">
+              <a:rPr lang="en-US" sz="1400" b="1" dirty="0">
                 <a:solidFill>
                   <a:srgbClr val="4EC9B0"/>
                 </a:solidFill>
@@ -8021,7 +7657,7 @@
               </a:rPr>
               <a:t>Timer</a:t>
             </a:r>
-            <a:endParaRPr lang="en-US" b="0" dirty="0">
+            <a:endParaRPr lang="en-US" sz="1400" b="1" dirty="0">
               <a:solidFill>
                 <a:srgbClr val="D4D4D4"/>
               </a:solidFill>
@@ -8045,8 +7681,8 @@
         </p:nvSpPr>
         <p:spPr>
           <a:xfrm>
-            <a:off x="1521911" y="4199345"/>
-            <a:ext cx="2590774" cy="646331"/>
+            <a:off x="1402364" y="2771725"/>
+            <a:ext cx="2569934" cy="307777"/>
           </a:xfrm>
           <a:prstGeom prst="rect">
             <a:avLst/>
@@ -8059,7 +7695,7 @@
           <a:lstStyle/>
           <a:p>
             <a:r>
-              <a:rPr lang="en-US" dirty="0">
+              <a:rPr lang="en-US" sz="1400" b="1" dirty="0">
                 <a:solidFill>
                   <a:srgbClr val="569CD6"/>
                 </a:solidFill>
@@ -8068,7 +7704,7 @@
               <a:t>class</a:t>
             </a:r>
             <a:r>
-              <a:rPr lang="en-US" dirty="0">
+              <a:rPr lang="en-US" sz="1400" b="1" dirty="0">
                 <a:solidFill>
                   <a:srgbClr val="D4D4D4"/>
                 </a:solidFill>
@@ -8077,7 +7713,7 @@
               <a:t> </a:t>
             </a:r>
             <a:r>
-              <a:rPr lang="en-US" dirty="0" err="1">
+              <a:rPr lang="en-US" sz="1400" b="1" dirty="0" err="1">
                 <a:solidFill>
                   <a:srgbClr val="4EC9B0"/>
                 </a:solidFill>
@@ -8086,7 +7722,7 @@
               <a:t>ATMegaTimer</a:t>
             </a:r>
             <a:r>
-              <a:rPr lang="en-US" dirty="0">
+              <a:rPr lang="en-US" sz="1400" b="1" dirty="0">
                 <a:solidFill>
                   <a:srgbClr val="D4D4D4"/>
                 </a:solidFill>
@@ -8094,37 +7730,8 @@
               </a:rPr>
               <a:t>: </a:t>
             </a:r>
-          </a:p>
-          <a:p>
-            <a:r>
-              <a:rPr lang="en-US" dirty="0">
-                <a:solidFill>
-                  <a:srgbClr val="D4D4D4"/>
-                </a:solidFill>
-                <a:latin typeface="Consolas" panose="020B0609020204030204" pitchFamily="49" charset="0"/>
-              </a:rPr>
-              <a:t>   </a:t>
-            </a:r>
-            <a:r>
-              <a:rPr lang="en-US" dirty="0">
-                <a:solidFill>
-                  <a:srgbClr val="569CD6"/>
-                </a:solidFill>
-                <a:latin typeface="Consolas" panose="020B0609020204030204" pitchFamily="49" charset="0"/>
-              </a:rPr>
-              <a:t>public</a:t>
-            </a:r>
-            <a:r>
-              <a:rPr lang="en-US" dirty="0">
-                <a:solidFill>
-                  <a:srgbClr val="D4D4D4"/>
-                </a:solidFill>
-                <a:latin typeface="Consolas" panose="020B0609020204030204" pitchFamily="49" charset="0"/>
-              </a:rPr>
-              <a:t> </a:t>
-            </a:r>
-            <a:r>
-              <a:rPr lang="en-US" dirty="0">
+            <a:r>
+              <a:rPr lang="en-US" sz="1400" b="1" dirty="0">
                 <a:solidFill>
                   <a:srgbClr val="4EC9B0"/>
                 </a:solidFill>
@@ -8132,7 +7739,7 @@
               </a:rPr>
               <a:t>Timer</a:t>
             </a:r>
-            <a:endParaRPr lang="en-US" b="0" dirty="0">
+            <a:endParaRPr lang="en-US" sz="1400" b="1" dirty="0">
               <a:solidFill>
                 <a:srgbClr val="D4D4D4"/>
               </a:solidFill>
@@ -8158,16 +7765,16 @@
           <p:nvPr/>
         </p:nvCxnSpPr>
         <p:spPr>
-          <a:xfrm rot="10800000" flipH="1" flipV="1">
-            <a:off x="1178379" y="2340210"/>
-            <a:ext cx="357286" cy="1454081"/>
+          <a:xfrm rot="10800000" flipV="1">
+            <a:off x="1456937" y="1709292"/>
+            <a:ext cx="12700" cy="1780193"/>
           </a:xfrm>
           <a:prstGeom prst="bentConnector3">
             <a:avLst>
-              <a:gd name="adj1" fmla="val -63982"/>
+              <a:gd name="adj1" fmla="val 1800000"/>
             </a:avLst>
           </a:prstGeom>
-          <a:ln>
+          <a:ln w="28575">
             <a:headEnd type="triangle" w="lg" len="lg"/>
             <a:tailEnd type="none"/>
           </a:ln>
@@ -8204,16 +7811,16 @@
           <p:nvPr/>
         </p:nvCxnSpPr>
         <p:spPr>
-          <a:xfrm rot="10800000" flipH="1" flipV="1">
-            <a:off x="1178379" y="2340210"/>
-            <a:ext cx="357286" cy="3049565"/>
+          <a:xfrm rot="10800000" flipV="1">
+            <a:off x="1456937" y="1709292"/>
+            <a:ext cx="12700" cy="3375677"/>
           </a:xfrm>
           <a:prstGeom prst="bentConnector3">
             <a:avLst>
-              <a:gd name="adj1" fmla="val -63982"/>
+              <a:gd name="adj1" fmla="val 1800000"/>
             </a:avLst>
           </a:prstGeom>
-          <a:ln>
+          <a:ln w="28575">
             <a:headEnd type="triangle" w="lg" len="lg"/>
             <a:tailEnd type="none"/>
           </a:ln>
@@ -8247,27 +7854,30 @@
         </p:nvSpPr>
         <p:spPr>
           <a:xfrm>
-            <a:off x="8443713" y="3024706"/>
+            <a:off x="8443713" y="2719900"/>
             <a:ext cx="2212622" cy="733778"/>
           </a:xfrm>
           <a:prstGeom prst="rect">
             <a:avLst/>
           </a:prstGeom>
+          <a:ln w="38100">
+            <a:solidFill>
+              <a:schemeClr val="tx1"/>
+            </a:solidFill>
+          </a:ln>
         </p:spPr>
         <p:style>
-          <a:lnRef idx="2">
-            <a:schemeClr val="accent1">
-              <a:shade val="50000"/>
-            </a:schemeClr>
+          <a:lnRef idx="1">
+            <a:schemeClr val="accent4"/>
           </a:lnRef>
-          <a:fillRef idx="1">
-            <a:schemeClr val="accent1"/>
+          <a:fillRef idx="2">
+            <a:schemeClr val="accent4"/>
           </a:fillRef>
-          <a:effectRef idx="0">
-            <a:schemeClr val="accent1"/>
+          <a:effectRef idx="1">
+            <a:schemeClr val="accent4"/>
           </a:effectRef>
           <a:fontRef idx="minor">
-            <a:schemeClr val="lt1"/>
+            <a:schemeClr val="dk1"/>
           </a:fontRef>
         </p:style>
         <p:txBody>
@@ -8276,11 +7886,11 @@
           <a:p>
             <a:pPr algn="ctr"/>
             <a:r>
-              <a:rPr lang="en-US" dirty="0" err="1"/>
+              <a:rPr lang="en-US" b="1" dirty="0" err="1"/>
               <a:t>pxt</a:t>
             </a:r>
             <a:r>
-              <a:rPr lang="en-US" dirty="0"/>
+              <a:rPr lang="en-US" b="1" dirty="0"/>
               <a:t>-target</a:t>
             </a:r>
           </a:p>
@@ -8300,7 +7910,7 @@
         </p:nvSpPr>
         <p:spPr>
           <a:xfrm>
-            <a:off x="296364" y="5410193"/>
+            <a:off x="171396" y="4853982"/>
             <a:ext cx="1298241" cy="646331"/>
           </a:xfrm>
           <a:prstGeom prst="rect">
@@ -8341,7 +7951,7 @@
         </p:nvSpPr>
         <p:spPr>
           <a:xfrm>
-            <a:off x="4216420" y="3759093"/>
+            <a:off x="4216420" y="3454287"/>
             <a:ext cx="613533" cy="1657518"/>
           </a:xfrm>
           <a:prstGeom prst="rightBrace">
@@ -8387,14 +7997,15 @@
           <p:nvPr/>
         </p:nvCxnSpPr>
         <p:spPr>
-          <a:xfrm flipH="1">
-            <a:off x="3391001" y="2336232"/>
-            <a:ext cx="1671843" cy="3979"/>
+          <a:xfrm flipH="1" flipV="1">
+            <a:off x="3669559" y="1709293"/>
+            <a:ext cx="1393285" cy="322133"/>
           </a:xfrm>
           <a:prstGeom prst="straightConnector1">
             <a:avLst/>
           </a:prstGeom>
-          <a:ln>
+          <a:ln w="9525">
+            <a:prstDash val="lgDash"/>
             <a:headEnd w="lg" len="lg"/>
             <a:tailEnd type="triangle" w="lg" len="lg"/>
           </a:ln>
@@ -8427,8 +8038,8 @@
           <p:nvPr/>
         </p:nvSpPr>
         <p:spPr>
-          <a:xfrm>
-            <a:off x="3748287" y="1969255"/>
+          <a:xfrm rot="710667">
+            <a:off x="3803221" y="1904701"/>
             <a:ext cx="1172693" cy="369332"/>
           </a:xfrm>
           <a:prstGeom prst="rect">
@@ -8467,7 +8078,7 @@
         </p:nvCxnSpPr>
         <p:spPr>
           <a:xfrm rot="16200000" flipV="1">
-            <a:off x="8068508" y="1543190"/>
+            <a:off x="8068508" y="1238384"/>
             <a:ext cx="688474" cy="2274558"/>
           </a:xfrm>
           <a:prstGeom prst="bentConnector2">
@@ -8510,7 +8121,7 @@
         </p:nvCxnSpPr>
         <p:spPr>
           <a:xfrm rot="5400000">
-            <a:off x="8046239" y="2987711"/>
+            <a:off x="8046239" y="2682905"/>
             <a:ext cx="733013" cy="2274558"/>
           </a:xfrm>
           <a:prstGeom prst="bentConnector2">
@@ -8549,7 +8160,7 @@
         </p:nvSpPr>
         <p:spPr>
           <a:xfrm>
-            <a:off x="7508558" y="2375932"/>
+            <a:off x="7508558" y="2071126"/>
             <a:ext cx="601447" cy="369332"/>
           </a:xfrm>
           <a:prstGeom prst="rect">
@@ -8584,7 +8195,7 @@
         </p:nvSpPr>
         <p:spPr>
           <a:xfrm>
-            <a:off x="5353036" y="2745264"/>
+            <a:off x="5353036" y="2440458"/>
             <a:ext cx="1634422" cy="646331"/>
           </a:xfrm>
           <a:prstGeom prst="rect">
@@ -8625,7 +8236,7 @@
         </p:nvSpPr>
         <p:spPr>
           <a:xfrm>
-            <a:off x="7508557" y="4547357"/>
+            <a:off x="7508557" y="4242551"/>
             <a:ext cx="601447" cy="369332"/>
           </a:xfrm>
           <a:prstGeom prst="rect">
@@ -8660,7 +8271,7 @@
         </p:nvSpPr>
         <p:spPr>
           <a:xfrm>
-            <a:off x="4633737" y="5066071"/>
+            <a:off x="4633737" y="4761265"/>
             <a:ext cx="1328697" cy="369332"/>
           </a:xfrm>
           <a:prstGeom prst="rect">
@@ -8695,8 +8306,8 @@
         </p:nvSpPr>
         <p:spPr>
           <a:xfrm>
-            <a:off x="1535665" y="5935142"/>
-            <a:ext cx="2210862" cy="646331"/>
+            <a:off x="1362182" y="4393037"/>
+            <a:ext cx="2371162" cy="307777"/>
           </a:xfrm>
           <a:prstGeom prst="rect">
             <a:avLst/>
@@ -8709,16 +8320,25 @@
           <a:lstStyle/>
           <a:p>
             <a:r>
-              <a:rPr lang="en-US" dirty="0">
+              <a:rPr lang="en-US" sz="1400" b="1" dirty="0">
+                <a:solidFill>
+                  <a:srgbClr val="569CD6"/>
+                </a:solidFill>
+                <a:latin typeface="Consolas" panose="020B0609020204030204" pitchFamily="49" charset="0"/>
+              </a:rPr>
+              <a:t>class</a:t>
+            </a:r>
+            <a:r>
+              <a:rPr lang="en-US" sz="1400" b="1" dirty="0">
                 <a:solidFill>
                   <a:srgbClr val="4EC9B0"/>
                 </a:solidFill>
                 <a:latin typeface="Consolas" panose="020B0609020204030204" pitchFamily="49" charset="0"/>
               </a:rPr>
-              <a:t>class </a:t>
-            </a:r>
-            <a:r>
-              <a:rPr lang="en-US" dirty="0" err="1">
+              <a:t> </a:t>
+            </a:r>
+            <a:r>
+              <a:rPr lang="en-US" sz="1400" b="1" dirty="0" err="1">
                 <a:solidFill>
                   <a:srgbClr val="4EC9B0"/>
                 </a:solidFill>
@@ -8727,7 +8347,7 @@
               <a:t>mbedTimer</a:t>
             </a:r>
             <a:r>
-              <a:rPr lang="en-US" dirty="0">
+              <a:rPr lang="en-US" sz="1400" b="1" dirty="0">
                 <a:solidFill>
                   <a:srgbClr val="4EC9B0"/>
                 </a:solidFill>
@@ -8735,29 +8355,8 @@
               </a:rPr>
               <a:t>:</a:t>
             </a:r>
-          </a:p>
-          <a:p>
-            <a:r>
-              <a:rPr lang="en-US" b="0" dirty="0">
-                <a:solidFill>
-                  <a:srgbClr val="4EC9B0"/>
-                </a:solidFill>
-                <a:effectLst/>
-                <a:latin typeface="Consolas" panose="020B0609020204030204" pitchFamily="49" charset="0"/>
-              </a:rPr>
-              <a:t>   </a:t>
-            </a:r>
-            <a:r>
-              <a:rPr lang="en-US" dirty="0">
-                <a:solidFill>
-                  <a:srgbClr val="569CD6"/>
-                </a:solidFill>
-                <a:latin typeface="Consolas" panose="020B0609020204030204" pitchFamily="49" charset="0"/>
-              </a:rPr>
-              <a:t>public</a:t>
-            </a:r>
-            <a:r>
-              <a:rPr lang="en-US" dirty="0">
+            <a:r>
+              <a:rPr lang="en-US" sz="1400" b="1" dirty="0">
                 <a:solidFill>
                   <a:srgbClr val="D4D4D4"/>
                 </a:solidFill>
@@ -8766,7 +8365,7 @@
               <a:t> </a:t>
             </a:r>
             <a:r>
-              <a:rPr lang="en-US" dirty="0">
+              <a:rPr lang="en-US" sz="1400" b="1" dirty="0">
                 <a:solidFill>
                   <a:srgbClr val="4EC9B0"/>
                 </a:solidFill>
@@ -8774,7 +8373,7 @@
               </a:rPr>
               <a:t>Timer</a:t>
             </a:r>
-            <a:endParaRPr lang="en-US" b="0" dirty="0">
+            <a:endParaRPr lang="en-US" sz="1400" b="1" dirty="0">
               <a:solidFill>
                 <a:srgbClr val="D4D4D4"/>
               </a:solidFill>
@@ -8798,27 +8397,30 @@
         </p:nvSpPr>
         <p:spPr>
           <a:xfrm>
-            <a:off x="8412745" y="551502"/>
+            <a:off x="8412745" y="246696"/>
             <a:ext cx="2212622" cy="733778"/>
           </a:xfrm>
           <a:prstGeom prst="rect">
             <a:avLst/>
           </a:prstGeom>
+          <a:ln>
+            <a:solidFill>
+              <a:schemeClr val="tx1"/>
+            </a:solidFill>
+          </a:ln>
         </p:spPr>
         <p:style>
-          <a:lnRef idx="2">
-            <a:schemeClr val="accent1">
-              <a:shade val="50000"/>
-            </a:schemeClr>
+          <a:lnRef idx="1">
+            <a:schemeClr val="accent4"/>
           </a:lnRef>
-          <a:fillRef idx="1">
-            <a:schemeClr val="accent1"/>
+          <a:fillRef idx="2">
+            <a:schemeClr val="accent4"/>
           </a:fillRef>
-          <a:effectRef idx="0">
-            <a:schemeClr val="accent1"/>
+          <a:effectRef idx="1">
+            <a:schemeClr val="accent4"/>
           </a:effectRef>
           <a:fontRef idx="minor">
-            <a:schemeClr val="lt1"/>
+            <a:schemeClr val="dk1"/>
           </a:fontRef>
         </p:style>
         <p:txBody>
@@ -8827,10 +8429,10 @@
           <a:p>
             <a:pPr algn="ctr"/>
             <a:r>
-              <a:rPr lang="en-US" dirty="0" err="1"/>
+              <a:rPr lang="en-US" b="1" dirty="0" err="1"/>
               <a:t>pxt</a:t>
             </a:r>
-            <a:endParaRPr lang="en-US" dirty="0"/>
+            <a:endParaRPr lang="en-US" b="1" dirty="0"/>
           </a:p>
         </p:txBody>
       </p:sp>
@@ -8852,7 +8454,7 @@
         </p:nvCxnSpPr>
         <p:spPr>
           <a:xfrm flipH="1" flipV="1">
-            <a:off x="10625367" y="918391"/>
+            <a:off x="10625367" y="613585"/>
             <a:ext cx="30968" cy="2473204"/>
           </a:xfrm>
           <a:prstGeom prst="bentConnector3">
@@ -8860,7 +8462,7 @@
               <a:gd name="adj1" fmla="val -738181"/>
             </a:avLst>
           </a:prstGeom>
-          <a:ln>
+          <a:ln w="28575">
             <a:tailEnd type="triangle" w="lg" len="lg"/>
           </a:ln>
         </p:spPr>
@@ -8893,7 +8495,7 @@
         </p:nvSpPr>
         <p:spPr>
           <a:xfrm>
-            <a:off x="10895222" y="2929930"/>
+            <a:off x="10895222" y="2625124"/>
             <a:ext cx="1298241" cy="646331"/>
           </a:xfrm>
           <a:prstGeom prst="rect">
@@ -8934,7 +8536,7 @@
         </p:nvSpPr>
         <p:spPr>
           <a:xfrm>
-            <a:off x="5093812" y="552279"/>
+            <a:off x="5093812" y="247473"/>
             <a:ext cx="2212622" cy="733778"/>
           </a:xfrm>
           <a:prstGeom prst="rect">
@@ -8942,17 +8544,17 @@
           </a:prstGeom>
         </p:spPr>
         <p:style>
-          <a:lnRef idx="3">
-            <a:schemeClr val="lt1"/>
+          <a:lnRef idx="1">
+            <a:schemeClr val="accent6"/>
           </a:lnRef>
-          <a:fillRef idx="1">
+          <a:fillRef idx="2">
             <a:schemeClr val="accent6"/>
           </a:fillRef>
           <a:effectRef idx="1">
             <a:schemeClr val="accent6"/>
           </a:effectRef>
           <a:fontRef idx="minor">
-            <a:schemeClr val="lt1"/>
+            <a:schemeClr val="dk1"/>
           </a:fontRef>
         </p:style>
         <p:txBody>
@@ -8996,7 +8598,7 @@
         </p:nvCxnSpPr>
         <p:spPr>
           <a:xfrm flipH="1">
-            <a:off x="7306434" y="918391"/>
+            <a:off x="7306434" y="613585"/>
             <a:ext cx="1106311" cy="777"/>
           </a:xfrm>
           <a:prstGeom prst="straightConnector1">
@@ -9036,7 +8638,7 @@
         </p:nvSpPr>
         <p:spPr>
           <a:xfrm>
-            <a:off x="7508558" y="946140"/>
+            <a:off x="7508558" y="641334"/>
             <a:ext cx="601447" cy="369332"/>
           </a:xfrm>
           <a:prstGeom prst="rect">
@@ -9075,7 +8677,7 @@
         </p:nvCxnSpPr>
         <p:spPr>
           <a:xfrm rot="5400000" flipH="1" flipV="1">
-            <a:off x="7502074" y="-47638"/>
+            <a:off x="7502074" y="-352444"/>
             <a:ext cx="684063" cy="3349901"/>
           </a:xfrm>
           <a:prstGeom prst="bentConnector3">
@@ -9083,7 +8685,8 @@
               <a:gd name="adj1" fmla="val 50000"/>
             </a:avLst>
           </a:prstGeom>
-          <a:ln>
+          <a:ln w="9525">
+            <a:prstDash val="lgDash"/>
             <a:tailEnd type="triangle" w="lg" len="lg"/>
           </a:ln>
         </p:spPr>
@@ -9116,7 +8719,7 @@
         </p:nvSpPr>
         <p:spPr>
           <a:xfrm>
-            <a:off x="8361343" y="1651392"/>
+            <a:off x="7991950" y="1319615"/>
             <a:ext cx="1172693" cy="369332"/>
           </a:xfrm>
           <a:prstGeom prst="rect">
@@ -9133,6 +8736,220 @@
             <a:r>
               <a:rPr lang="en-US" dirty="0"/>
               <a:t>references</a:t>
+            </a:r>
+          </a:p>
+        </p:txBody>
+      </p:sp>
+      <p:sp>
+        <p:nvSpPr>
+          <p:cNvPr id="72" name="Rectangle 71">
+            <a:extLst>
+              <a:ext uri="{FF2B5EF4-FFF2-40B4-BE49-F238E27FC236}">
+                <a16:creationId xmlns:a16="http://schemas.microsoft.com/office/drawing/2014/main" id="{CE4B91A5-1A73-4778-B6AC-6F8065AEF0F7}"/>
+              </a:ext>
+            </a:extLst>
+          </p:cNvPr>
+          <p:cNvSpPr/>
+          <p:nvPr/>
+        </p:nvSpPr>
+        <p:spPr>
+          <a:xfrm>
+            <a:off x="3065176" y="5653482"/>
+            <a:ext cx="2212622" cy="733778"/>
+          </a:xfrm>
+          <a:prstGeom prst="rect">
+            <a:avLst/>
+          </a:prstGeom>
+        </p:spPr>
+        <p:style>
+          <a:lnRef idx="1">
+            <a:schemeClr val="accent6"/>
+          </a:lnRef>
+          <a:fillRef idx="2">
+            <a:schemeClr val="accent6"/>
+          </a:fillRef>
+          <a:effectRef idx="1">
+            <a:schemeClr val="accent6"/>
+          </a:effectRef>
+          <a:fontRef idx="minor">
+            <a:schemeClr val="dk1"/>
+          </a:fontRef>
+        </p:style>
+        <p:txBody>
+          <a:bodyPr rtlCol="0" anchor="ctr"/>
+          <a:lstStyle/>
+          <a:p>
+            <a:pPr algn="ctr"/>
+            <a:r>
+              <a:rPr lang="en-US" dirty="0" err="1"/>
+              <a:t>mbed</a:t>
+            </a:r>
+            <a:r>
+              <a:rPr lang="en-US" dirty="0"/>
+              <a:t>-classic</a:t>
+            </a:r>
+          </a:p>
+        </p:txBody>
+      </p:sp>
+      <p:cxnSp>
+        <p:nvCxnSpPr>
+          <p:cNvPr id="73" name="Connector: Elbow 72">
+            <a:extLst>
+              <a:ext uri="{FF2B5EF4-FFF2-40B4-BE49-F238E27FC236}">
+                <a16:creationId xmlns:a16="http://schemas.microsoft.com/office/drawing/2014/main" id="{AC387350-1949-41DA-9EC5-AC955BC4D970}"/>
+              </a:ext>
+            </a:extLst>
+          </p:cNvPr>
+          <p:cNvCxnSpPr>
+            <a:cxnSpLocks/>
+            <a:stCxn id="72" idx="1"/>
+            <a:endCxn id="6" idx="2"/>
+          </p:cNvCxnSpPr>
+          <p:nvPr/>
+        </p:nvCxnSpPr>
+        <p:spPr>
+          <a:xfrm rot="10800000">
+            <a:off x="2563248" y="5451859"/>
+            <a:ext cx="501928" cy="568512"/>
+          </a:xfrm>
+          <a:prstGeom prst="bentConnector2">
+            <a:avLst/>
+          </a:prstGeom>
+          <a:ln>
+            <a:headEnd type="triangle" w="lg" len="lg"/>
+            <a:tailEnd type="none"/>
+          </a:ln>
+        </p:spPr>
+        <p:style>
+          <a:lnRef idx="1">
+            <a:schemeClr val="accent1"/>
+          </a:lnRef>
+          <a:fillRef idx="0">
+            <a:schemeClr val="accent1"/>
+          </a:fillRef>
+          <a:effectRef idx="0">
+            <a:schemeClr val="accent1"/>
+          </a:effectRef>
+          <a:fontRef idx="minor">
+            <a:schemeClr val="tx1"/>
+          </a:fontRef>
+        </p:style>
+      </p:cxnSp>
+      <p:sp>
+        <p:nvSpPr>
+          <p:cNvPr id="77" name="TextBox 76">
+            <a:extLst>
+              <a:ext uri="{FF2B5EF4-FFF2-40B4-BE49-F238E27FC236}">
+                <a16:creationId xmlns:a16="http://schemas.microsoft.com/office/drawing/2014/main" id="{3E34F299-018C-4F47-8306-FE15C66CC333}"/>
+              </a:ext>
+            </a:extLst>
+          </p:cNvPr>
+          <p:cNvSpPr txBox="1"/>
+          <p:nvPr/>
+        </p:nvSpPr>
+        <p:spPr>
+          <a:xfrm>
+            <a:off x="1924037" y="5668262"/>
+            <a:ext cx="601447" cy="369332"/>
+          </a:xfrm>
+          <a:prstGeom prst="rect">
+            <a:avLst/>
+          </a:prstGeom>
+          <a:noFill/>
+        </p:spPr>
+        <p:txBody>
+          <a:bodyPr wrap="none" rtlCol="0">
+            <a:spAutoFit/>
+          </a:bodyPr>
+          <a:lstStyle/>
+          <a:p>
+            <a:r>
+              <a:rPr lang="en-US" dirty="0"/>
+              <a:t>uses</a:t>
+            </a:r>
+          </a:p>
+        </p:txBody>
+      </p:sp>
+      <p:sp>
+        <p:nvSpPr>
+          <p:cNvPr id="84" name="Arrow: Right 83">
+            <a:extLst>
+              <a:ext uri="{FF2B5EF4-FFF2-40B4-BE49-F238E27FC236}">
+                <a16:creationId xmlns:a16="http://schemas.microsoft.com/office/drawing/2014/main" id="{FD9B5306-DCDF-4314-AFD1-058BC3BE2246}"/>
+              </a:ext>
+            </a:extLst>
+          </p:cNvPr>
+          <p:cNvSpPr/>
+          <p:nvPr/>
+        </p:nvSpPr>
+        <p:spPr>
+          <a:xfrm rot="14175193">
+            <a:off x="10342896" y="3836518"/>
+            <a:ext cx="891423" cy="305361"/>
+          </a:xfrm>
+          <a:prstGeom prst="rightArrow">
+            <a:avLst/>
+          </a:prstGeom>
+          <a:ln w="28575"/>
+        </p:spPr>
+        <p:style>
+          <a:lnRef idx="2">
+            <a:schemeClr val="dk1"/>
+          </a:lnRef>
+          <a:fillRef idx="1">
+            <a:schemeClr val="lt1"/>
+          </a:fillRef>
+          <a:effectRef idx="0">
+            <a:schemeClr val="dk1"/>
+          </a:effectRef>
+          <a:fontRef idx="minor">
+            <a:schemeClr val="dk1"/>
+          </a:fontRef>
+        </p:style>
+        <p:txBody>
+          <a:bodyPr rtlCol="0" anchor="ctr"/>
+          <a:lstStyle/>
+          <a:p>
+            <a:pPr algn="ctr"/>
+            <a:endParaRPr lang="en-US" dirty="0"/>
+          </a:p>
+        </p:txBody>
+      </p:sp>
+      <p:sp>
+        <p:nvSpPr>
+          <p:cNvPr id="85" name="TextBox 84">
+            <a:extLst>
+              <a:ext uri="{FF2B5EF4-FFF2-40B4-BE49-F238E27FC236}">
+                <a16:creationId xmlns:a16="http://schemas.microsoft.com/office/drawing/2014/main" id="{724A1DC2-31CF-4E96-B996-C14597AF95C5}"/>
+              </a:ext>
+            </a:extLst>
+          </p:cNvPr>
+          <p:cNvSpPr txBox="1"/>
+          <p:nvPr/>
+        </p:nvSpPr>
+        <p:spPr>
+          <a:xfrm>
+            <a:off x="9954070" y="4356086"/>
+            <a:ext cx="2079352" cy="369332"/>
+          </a:xfrm>
+          <a:prstGeom prst="rect">
+            <a:avLst/>
+          </a:prstGeom>
+          <a:noFill/>
+        </p:spPr>
+        <p:txBody>
+          <a:bodyPr wrap="none" rtlCol="0">
+            <a:spAutoFit/>
+          </a:bodyPr>
+          <a:lstStyle/>
+          <a:p>
+            <a:r>
+              <a:rPr lang="en-US" b="1" dirty="0" err="1"/>
+              <a:t>MakeCode</a:t>
+            </a:r>
+            <a:r>
+              <a:rPr lang="en-US" b="1" dirty="0"/>
+              <a:t> web app</a:t>
             </a:r>
           </a:p>
         </p:txBody>

</xml_diff>

<commit_message>
added screen snapshot of makecode web app
</commit_message>
<xml_diff>
--- a/papers/tr2017/diagrams.pptx
+++ b/papers/tr2017/diagrams.pptx
@@ -10,7 +10,7 @@
   <p:sldIdLst>
     <p:sldId id="257" r:id="rId2"/>
     <p:sldId id="258" r:id="rId3"/>
-    <p:sldId id="259" r:id="rId4"/>
+    <p:sldId id="260" r:id="rId4"/>
   </p:sldIdLst>
   <p:sldSz cx="12192000" cy="6858000"/>
   <p:notesSz cx="6858000" cy="9144000"/>
@@ -8949,20 +8949,20 @@
       </p:grpSpPr>
       <p:pic>
         <p:nvPicPr>
-          <p:cNvPr id="2049" name="Picture 1">
-            <a:extLst>
-              <a:ext uri="{FF2B5EF4-FFF2-40B4-BE49-F238E27FC236}">
-                <a16:creationId xmlns:a16="http://schemas.microsoft.com/office/drawing/2014/main" id="{3F382DFB-AFF4-4EDA-BA6D-DE23FA1F1F4C}"/>
+          <p:cNvPr id="2" name="Picture 1">
+            <a:extLst>
+              <a:ext uri="{FF2B5EF4-FFF2-40B4-BE49-F238E27FC236}">
+                <a16:creationId xmlns:a16="http://schemas.microsoft.com/office/drawing/2014/main" id="{A1D3969D-3A4E-432A-8D97-1198D0592C67}"/>
               </a:ext>
             </a:extLst>
           </p:cNvPr>
           <p:cNvPicPr>
-            <a:picLocks noChangeAspect="1" noChangeArrowheads="1"/>
+            <a:picLocks noChangeAspect="1"/>
           </p:cNvPicPr>
           <p:nvPr/>
         </p:nvPicPr>
         <p:blipFill>
-          <a:blip r:embed="rId2">
+          <a:blip r:embed="rId2" cstate="print">
             <a:extLst>
               <a:ext uri="{28A0092B-C50C-407E-A947-70E740481C1C}">
                 <a14:useLocalDpi xmlns:a14="http://schemas.microsoft.com/office/drawing/2010/main" val="0"/>
@@ -8976,186 +8976,19 @@
         </p:blipFill>
         <p:spPr bwMode="auto">
           <a:xfrm>
-            <a:off x="587857" y="341902"/>
-            <a:ext cx="8582132" cy="6174196"/>
+            <a:off x="838200" y="113488"/>
+            <a:ext cx="10515600" cy="6421161"/>
           </a:xfrm>
           <a:prstGeom prst="rect">
             <a:avLst/>
           </a:prstGeom>
           <a:noFill/>
-          <a:extLst>
-            <a:ext uri="{909E8E84-426E-40DD-AFC4-6F175D3DCCD1}">
-              <a14:hiddenFill xmlns:a14="http://schemas.microsoft.com/office/drawing/2010/main">
-                <a:solidFill>
-                  <a:srgbClr val="FFFFFF"/>
-                </a:solidFill>
-              </a14:hiddenFill>
-            </a:ext>
-          </a:extLst>
         </p:spPr>
       </p:pic>
-      <p:sp>
-        <p:nvSpPr>
-          <p:cNvPr id="3" name="Rectangle 4">
-            <a:extLst>
-              <a:ext uri="{FF2B5EF4-FFF2-40B4-BE49-F238E27FC236}">
-                <a16:creationId xmlns:a16="http://schemas.microsoft.com/office/drawing/2014/main" id="{C81BA7FF-E806-4AB3-812C-28A4F6D97DA5}"/>
-              </a:ext>
-            </a:extLst>
-          </p:cNvPr>
-          <p:cNvSpPr>
-            <a:spLocks noChangeArrowheads="1"/>
-          </p:cNvSpPr>
-          <p:nvPr/>
-        </p:nvSpPr>
-        <p:spPr bwMode="auto">
-          <a:xfrm>
-            <a:off x="3176588" y="3621088"/>
-            <a:ext cx="12192000" cy="457200"/>
-          </a:xfrm>
-          <a:prstGeom prst="rect">
-            <a:avLst/>
-          </a:prstGeom>
-          <a:noFill/>
-          <a:ln>
-            <a:noFill/>
-          </a:ln>
-          <a:effectLst/>
-          <a:extLst>
-            <a:ext uri="{909E8E84-426E-40DD-AFC4-6F175D3DCCD1}">
-              <a14:hiddenFill xmlns:a14="http://schemas.microsoft.com/office/drawing/2010/main">
-                <a:solidFill>
-                  <a:schemeClr val="accent1"/>
-                </a:solidFill>
-              </a14:hiddenFill>
-            </a:ext>
-            <a:ext uri="{91240B29-F687-4F45-9708-019B960494DF}">
-              <a14:hiddenLine xmlns:a14="http://schemas.microsoft.com/office/drawing/2010/main" w="9525">
-                <a:solidFill>
-                  <a:schemeClr val="tx1"/>
-                </a:solidFill>
-                <a:miter lim="800000"/>
-                <a:headEnd/>
-                <a:tailEnd/>
-              </a14:hiddenLine>
-            </a:ext>
-            <a:ext uri="{AF507438-7753-43E0-B8FC-AC1667EBCBE1}">
-              <a14:hiddenEffects xmlns:a14="http://schemas.microsoft.com/office/drawing/2010/main">
-                <a:effectLst>
-                  <a:outerShdw dist="35921" dir="2700000" algn="ctr" rotWithShape="0">
-                    <a:schemeClr val="bg2"/>
-                  </a:outerShdw>
-                </a:effectLst>
-              </a14:hiddenEffects>
-            </a:ext>
-          </a:extLst>
-        </p:spPr>
-        <p:txBody>
-          <a:bodyPr vert="horz" wrap="none" lIns="91440" tIns="45720" rIns="91440" bIns="45720" numCol="1" anchor="ctr" anchorCtr="0" compatLnSpc="1">
-            <a:prstTxWarp prst="textNoShape">
-              <a:avLst/>
-            </a:prstTxWarp>
-            <a:spAutoFit/>
-          </a:bodyPr>
-          <a:lstStyle/>
-          <a:p>
-            <a:endParaRPr lang="en-US"/>
-          </a:p>
-        </p:txBody>
-      </p:sp>
-      <p:cxnSp>
-        <p:nvCxnSpPr>
-          <p:cNvPr id="12" name="Straight Arrow Connector 11">
-            <a:extLst>
-              <a:ext uri="{FF2B5EF4-FFF2-40B4-BE49-F238E27FC236}">
-                <a16:creationId xmlns:a16="http://schemas.microsoft.com/office/drawing/2014/main" id="{B74E78EC-12D9-42E1-8800-517C3F7C4F0D}"/>
-              </a:ext>
-            </a:extLst>
-          </p:cNvPr>
-          <p:cNvCxnSpPr>
-            <a:cxnSpLocks/>
-            <a:stCxn id="10" idx="2"/>
-          </p:cNvCxnSpPr>
-          <p:nvPr/>
-        </p:nvCxnSpPr>
-        <p:spPr>
-          <a:xfrm flipH="1">
-            <a:off x="4946754" y="3552669"/>
-            <a:ext cx="3122036" cy="1154242"/>
-          </a:xfrm>
-          <a:prstGeom prst="straightConnector1">
-            <a:avLst/>
-          </a:prstGeom>
-          <a:ln w="146050">
-            <a:tailEnd type="triangle"/>
-          </a:ln>
-        </p:spPr>
-        <p:style>
-          <a:lnRef idx="3">
-            <a:schemeClr val="dk1"/>
-          </a:lnRef>
-          <a:fillRef idx="0">
-            <a:schemeClr val="dk1"/>
-          </a:fillRef>
-          <a:effectRef idx="2">
-            <a:schemeClr val="dk1"/>
-          </a:effectRef>
-          <a:fontRef idx="minor">
-            <a:schemeClr val="tx1"/>
-          </a:fontRef>
-        </p:style>
-      </p:cxnSp>
-      <p:sp>
-        <p:nvSpPr>
-          <p:cNvPr id="10" name="Rectangle 9">
-            <a:extLst>
-              <a:ext uri="{FF2B5EF4-FFF2-40B4-BE49-F238E27FC236}">
-                <a16:creationId xmlns:a16="http://schemas.microsoft.com/office/drawing/2014/main" id="{24C06137-6E89-4CDD-9CB8-117799E1C99F}"/>
-              </a:ext>
-            </a:extLst>
-          </p:cNvPr>
-          <p:cNvSpPr/>
-          <p:nvPr/>
-        </p:nvSpPr>
-        <p:spPr>
-          <a:xfrm>
-            <a:off x="5382136" y="1977041"/>
-            <a:ext cx="5373307" cy="1575628"/>
-          </a:xfrm>
-          <a:prstGeom prst="rect">
-            <a:avLst/>
-          </a:prstGeom>
-        </p:spPr>
-        <p:style>
-          <a:lnRef idx="2">
-            <a:schemeClr val="dk1"/>
-          </a:lnRef>
-          <a:fillRef idx="1">
-            <a:schemeClr val="lt1"/>
-          </a:fillRef>
-          <a:effectRef idx="0">
-            <a:schemeClr val="dk1"/>
-          </a:effectRef>
-          <a:fontRef idx="minor">
-            <a:schemeClr val="dk1"/>
-          </a:fontRef>
-        </p:style>
-        <p:txBody>
-          <a:bodyPr rtlCol="0" anchor="ctr"/>
-          <a:lstStyle/>
-          <a:p>
-            <a:pPr algn="ctr"/>
-            <a:r>
-              <a:rPr lang="en-US" sz="4400" dirty="0"/>
-              <a:t>Visual appearance</a:t>
-            </a:r>
-          </a:p>
-        </p:txBody>
-      </p:sp>
     </p:spTree>
     <p:extLst>
       <p:ext uri="{BB962C8B-B14F-4D97-AF65-F5344CB8AC3E}">
-        <p14:creationId xmlns:p14="http://schemas.microsoft.com/office/powerpoint/2010/main" val="610374068"/>
+        <p14:creationId xmlns:p14="http://schemas.microsoft.com/office/powerpoint/2010/main" val="3735347647"/>
       </p:ext>
     </p:extLst>
   </p:cSld>

</xml_diff>

<commit_message>
start getting STS in shape
</commit_message>
<xml_diff>
--- a/papers/tr2017/diagrams.pptx
+++ b/papers/tr2017/diagrams.pptx
@@ -215,7 +215,7 @@
           <a:p>
             <a:fld id="{C0237B04-0BFF-4188-AE10-E77C3C5257C8}" type="datetimeFigureOut">
               <a:rPr lang="en-US" smtClean="0"/>
-              <a:t>9/25/2017</a:t>
+              <a:t>10/10/2017</a:t>
             </a:fld>
             <a:endParaRPr lang="en-US"/>
           </a:p>
@@ -803,7 +803,7 @@
           <a:p>
             <a:fld id="{E504D85E-2087-4C48-BE7E-1A197735EA07}" type="datetimeFigureOut">
               <a:rPr lang="en-US" smtClean="0"/>
-              <a:t>9/25/2017</a:t>
+              <a:t>10/10/2017</a:t>
             </a:fld>
             <a:endParaRPr lang="en-US"/>
           </a:p>
@@ -1001,7 +1001,7 @@
           <a:p>
             <a:fld id="{E504D85E-2087-4C48-BE7E-1A197735EA07}" type="datetimeFigureOut">
               <a:rPr lang="en-US" smtClean="0"/>
-              <a:t>9/25/2017</a:t>
+              <a:t>10/10/2017</a:t>
             </a:fld>
             <a:endParaRPr lang="en-US"/>
           </a:p>
@@ -1209,7 +1209,7 @@
           <a:p>
             <a:fld id="{E504D85E-2087-4C48-BE7E-1A197735EA07}" type="datetimeFigureOut">
               <a:rPr lang="en-US" smtClean="0"/>
-              <a:t>9/25/2017</a:t>
+              <a:t>10/10/2017</a:t>
             </a:fld>
             <a:endParaRPr lang="en-US"/>
           </a:p>
@@ -1407,7 +1407,7 @@
           <a:p>
             <a:fld id="{E504D85E-2087-4C48-BE7E-1A197735EA07}" type="datetimeFigureOut">
               <a:rPr lang="en-US" smtClean="0"/>
-              <a:t>9/25/2017</a:t>
+              <a:t>10/10/2017</a:t>
             </a:fld>
             <a:endParaRPr lang="en-US"/>
           </a:p>
@@ -1682,7 +1682,7 @@
           <a:p>
             <a:fld id="{E504D85E-2087-4C48-BE7E-1A197735EA07}" type="datetimeFigureOut">
               <a:rPr lang="en-US" smtClean="0"/>
-              <a:t>9/25/2017</a:t>
+              <a:t>10/10/2017</a:t>
             </a:fld>
             <a:endParaRPr lang="en-US"/>
           </a:p>
@@ -1947,7 +1947,7 @@
           <a:p>
             <a:fld id="{E504D85E-2087-4C48-BE7E-1A197735EA07}" type="datetimeFigureOut">
               <a:rPr lang="en-US" smtClean="0"/>
-              <a:t>9/25/2017</a:t>
+              <a:t>10/10/2017</a:t>
             </a:fld>
             <a:endParaRPr lang="en-US"/>
           </a:p>
@@ -2359,7 +2359,7 @@
           <a:p>
             <a:fld id="{E504D85E-2087-4C48-BE7E-1A197735EA07}" type="datetimeFigureOut">
               <a:rPr lang="en-US" smtClean="0"/>
-              <a:t>9/25/2017</a:t>
+              <a:t>10/10/2017</a:t>
             </a:fld>
             <a:endParaRPr lang="en-US"/>
           </a:p>
@@ -2500,7 +2500,7 @@
           <a:p>
             <a:fld id="{E504D85E-2087-4C48-BE7E-1A197735EA07}" type="datetimeFigureOut">
               <a:rPr lang="en-US" smtClean="0"/>
-              <a:t>9/25/2017</a:t>
+              <a:t>10/10/2017</a:t>
             </a:fld>
             <a:endParaRPr lang="en-US"/>
           </a:p>
@@ -2613,7 +2613,7 @@
           <a:p>
             <a:fld id="{E504D85E-2087-4C48-BE7E-1A197735EA07}" type="datetimeFigureOut">
               <a:rPr lang="en-US" smtClean="0"/>
-              <a:t>9/25/2017</a:t>
+              <a:t>10/10/2017</a:t>
             </a:fld>
             <a:endParaRPr lang="en-US"/>
           </a:p>
@@ -2924,7 +2924,7 @@
           <a:p>
             <a:fld id="{E504D85E-2087-4C48-BE7E-1A197735EA07}" type="datetimeFigureOut">
               <a:rPr lang="en-US" smtClean="0"/>
-              <a:t>9/25/2017</a:t>
+              <a:t>10/10/2017</a:t>
             </a:fld>
             <a:endParaRPr lang="en-US"/>
           </a:p>
@@ -3212,7 +3212,7 @@
           <a:p>
             <a:fld id="{E504D85E-2087-4C48-BE7E-1A197735EA07}" type="datetimeFigureOut">
               <a:rPr lang="en-US" smtClean="0"/>
-              <a:t>9/25/2017</a:t>
+              <a:t>10/10/2017</a:t>
             </a:fld>
             <a:endParaRPr lang="en-US"/>
           </a:p>
@@ -3453,7 +3453,7 @@
           <a:p>
             <a:fld id="{E504D85E-2087-4C48-BE7E-1A197735EA07}" type="datetimeFigureOut">
               <a:rPr lang="en-US" smtClean="0"/>
-              <a:t>9/25/2017</a:t>
+              <a:t>10/10/2017</a:t>
             </a:fld>
             <a:endParaRPr lang="en-US"/>
           </a:p>
@@ -7489,7 +7489,7 @@
             <a:pPr algn="ctr"/>
             <a:r>
               <a:rPr lang="en-US" b="1" dirty="0"/>
-              <a:t>codal-samd21-mbed,</a:t>
+              <a:t>codal-samd21,</a:t>
             </a:r>
           </a:p>
           <a:p>

</xml_diff>

<commit_message>
update with changes to codal
</commit_message>
<xml_diff>
--- a/papers/tr2017/diagrams.pptx
+++ b/papers/tr2017/diagrams.pptx
@@ -215,7 +215,7 @@
           <a:p>
             <a:fld id="{C0237B04-0BFF-4188-AE10-E77C3C5257C8}" type="datetimeFigureOut">
               <a:rPr lang="en-US" smtClean="0"/>
-              <a:t>10/10/2017</a:t>
+              <a:t>10/13/2017</a:t>
             </a:fld>
             <a:endParaRPr lang="en-US"/>
           </a:p>
@@ -803,7 +803,7 @@
           <a:p>
             <a:fld id="{E504D85E-2087-4C48-BE7E-1A197735EA07}" type="datetimeFigureOut">
               <a:rPr lang="en-US" smtClean="0"/>
-              <a:t>10/10/2017</a:t>
+              <a:t>10/13/2017</a:t>
             </a:fld>
             <a:endParaRPr lang="en-US"/>
           </a:p>
@@ -1001,7 +1001,7 @@
           <a:p>
             <a:fld id="{E504D85E-2087-4C48-BE7E-1A197735EA07}" type="datetimeFigureOut">
               <a:rPr lang="en-US" smtClean="0"/>
-              <a:t>10/10/2017</a:t>
+              <a:t>10/13/2017</a:t>
             </a:fld>
             <a:endParaRPr lang="en-US"/>
           </a:p>
@@ -1209,7 +1209,7 @@
           <a:p>
             <a:fld id="{E504D85E-2087-4C48-BE7E-1A197735EA07}" type="datetimeFigureOut">
               <a:rPr lang="en-US" smtClean="0"/>
-              <a:t>10/10/2017</a:t>
+              <a:t>10/13/2017</a:t>
             </a:fld>
             <a:endParaRPr lang="en-US"/>
           </a:p>
@@ -1407,7 +1407,7 @@
           <a:p>
             <a:fld id="{E504D85E-2087-4C48-BE7E-1A197735EA07}" type="datetimeFigureOut">
               <a:rPr lang="en-US" smtClean="0"/>
-              <a:t>10/10/2017</a:t>
+              <a:t>10/13/2017</a:t>
             </a:fld>
             <a:endParaRPr lang="en-US"/>
           </a:p>
@@ -1682,7 +1682,7 @@
           <a:p>
             <a:fld id="{E504D85E-2087-4C48-BE7E-1A197735EA07}" type="datetimeFigureOut">
               <a:rPr lang="en-US" smtClean="0"/>
-              <a:t>10/10/2017</a:t>
+              <a:t>10/13/2017</a:t>
             </a:fld>
             <a:endParaRPr lang="en-US"/>
           </a:p>
@@ -1947,7 +1947,7 @@
           <a:p>
             <a:fld id="{E504D85E-2087-4C48-BE7E-1A197735EA07}" type="datetimeFigureOut">
               <a:rPr lang="en-US" smtClean="0"/>
-              <a:t>10/10/2017</a:t>
+              <a:t>10/13/2017</a:t>
             </a:fld>
             <a:endParaRPr lang="en-US"/>
           </a:p>
@@ -2359,7 +2359,7 @@
           <a:p>
             <a:fld id="{E504D85E-2087-4C48-BE7E-1A197735EA07}" type="datetimeFigureOut">
               <a:rPr lang="en-US" smtClean="0"/>
-              <a:t>10/10/2017</a:t>
+              <a:t>10/13/2017</a:t>
             </a:fld>
             <a:endParaRPr lang="en-US"/>
           </a:p>
@@ -2500,7 +2500,7 @@
           <a:p>
             <a:fld id="{E504D85E-2087-4C48-BE7E-1A197735EA07}" type="datetimeFigureOut">
               <a:rPr lang="en-US" smtClean="0"/>
-              <a:t>10/10/2017</a:t>
+              <a:t>10/13/2017</a:t>
             </a:fld>
             <a:endParaRPr lang="en-US"/>
           </a:p>
@@ -2613,7 +2613,7 @@
           <a:p>
             <a:fld id="{E504D85E-2087-4C48-BE7E-1A197735EA07}" type="datetimeFigureOut">
               <a:rPr lang="en-US" smtClean="0"/>
-              <a:t>10/10/2017</a:t>
+              <a:t>10/13/2017</a:t>
             </a:fld>
             <a:endParaRPr lang="en-US"/>
           </a:p>
@@ -2924,7 +2924,7 @@
           <a:p>
             <a:fld id="{E504D85E-2087-4C48-BE7E-1A197735EA07}" type="datetimeFigureOut">
               <a:rPr lang="en-US" smtClean="0"/>
-              <a:t>10/10/2017</a:t>
+              <a:t>10/13/2017</a:t>
             </a:fld>
             <a:endParaRPr lang="en-US"/>
           </a:p>
@@ -3212,7 +3212,7 @@
           <a:p>
             <a:fld id="{E504D85E-2087-4C48-BE7E-1A197735EA07}" type="datetimeFigureOut">
               <a:rPr lang="en-US" smtClean="0"/>
-              <a:t>10/10/2017</a:t>
+              <a:t>10/13/2017</a:t>
             </a:fld>
             <a:endParaRPr lang="en-US"/>
           </a:p>
@@ -3453,7 +3453,7 @@
           <a:p>
             <a:fld id="{E504D85E-2087-4C48-BE7E-1A197735EA07}" type="datetimeFigureOut">
               <a:rPr lang="en-US" smtClean="0"/>
-              <a:t>10/10/2017</a:t>
+              <a:t>10/13/2017</a:t>
             </a:fld>
             <a:endParaRPr lang="en-US"/>
           </a:p>
@@ -7354,7 +7354,7 @@
         </p:nvSpPr>
         <p:spPr>
           <a:xfrm>
-            <a:off x="1456937" y="1452168"/>
+            <a:off x="1718190" y="480842"/>
             <a:ext cx="2212622" cy="733778"/>
           </a:xfrm>
           <a:prstGeom prst="rect">
@@ -7461,7 +7461,7 @@
         </p:nvSpPr>
         <p:spPr>
           <a:xfrm>
-            <a:off x="1456937" y="4718081"/>
+            <a:off x="1650720" y="4526746"/>
             <a:ext cx="2212622" cy="733778"/>
           </a:xfrm>
           <a:prstGeom prst="rect">
@@ -7489,16 +7489,8 @@
             <a:pPr algn="ctr"/>
             <a:r>
               <a:rPr lang="en-US" b="1" dirty="0"/>
-              <a:t>codal-samd21,</a:t>
-            </a:r>
-          </a:p>
-          <a:p>
-            <a:pPr algn="ctr"/>
-            <a:r>
-              <a:rPr lang="en-US" b="1" dirty="0" err="1"/>
-              <a:t>codal-mbed</a:t>
-            </a:r>
-            <a:endParaRPr lang="en-US" b="1" dirty="0"/>
+              <a:t>codal-samd21</a:t>
+            </a:r>
           </a:p>
         </p:txBody>
       </p:sp>
@@ -7516,7 +7508,7 @@
         </p:nvSpPr>
         <p:spPr>
           <a:xfrm>
-            <a:off x="1456937" y="3122597"/>
+            <a:off x="1650722" y="1899696"/>
             <a:ext cx="2212622" cy="733778"/>
           </a:xfrm>
           <a:prstGeom prst="rect">
@@ -7604,152 +7596,6 @@
           </a:p>
         </p:txBody>
       </p:sp>
-      <p:sp>
-        <p:nvSpPr>
-          <p:cNvPr id="11" name="Rectangle 10">
-            <a:extLst>
-              <a:ext uri="{FF2B5EF4-FFF2-40B4-BE49-F238E27FC236}">
-                <a16:creationId xmlns:a16="http://schemas.microsoft.com/office/drawing/2014/main" id="{0492EEF9-28D2-4D81-AEFD-DF99049E3AF3}"/>
-              </a:ext>
-            </a:extLst>
-          </p:cNvPr>
-          <p:cNvSpPr/>
-          <p:nvPr/>
-        </p:nvSpPr>
-        <p:spPr>
-          <a:xfrm>
-            <a:off x="1362182" y="1114836"/>
-            <a:ext cx="1725159" cy="307777"/>
-          </a:xfrm>
-          <a:prstGeom prst="rect">
-            <a:avLst/>
-          </a:prstGeom>
-        </p:spPr>
-        <p:txBody>
-          <a:bodyPr wrap="square">
-            <a:spAutoFit/>
-          </a:bodyPr>
-          <a:lstStyle/>
-          <a:p>
-            <a:r>
-              <a:rPr lang="en-US" sz="1400" b="1" dirty="0">
-                <a:solidFill>
-                  <a:srgbClr val="569CD6"/>
-                </a:solidFill>
-                <a:latin typeface="Consolas" panose="020B0609020204030204" pitchFamily="49" charset="0"/>
-              </a:rPr>
-              <a:t>class</a:t>
-            </a:r>
-            <a:r>
-              <a:rPr lang="en-US" sz="1400" b="1" dirty="0">
-                <a:solidFill>
-                  <a:srgbClr val="D4D4D4"/>
-                </a:solidFill>
-                <a:latin typeface="Consolas" panose="020B0609020204030204" pitchFamily="49" charset="0"/>
-              </a:rPr>
-              <a:t> </a:t>
-            </a:r>
-            <a:r>
-              <a:rPr lang="en-US" sz="1400" b="1" dirty="0">
-                <a:solidFill>
-                  <a:srgbClr val="4EC9B0"/>
-                </a:solidFill>
-                <a:latin typeface="Consolas" panose="020B0609020204030204" pitchFamily="49" charset="0"/>
-              </a:rPr>
-              <a:t>Timer</a:t>
-            </a:r>
-            <a:endParaRPr lang="en-US" sz="1400" b="1" dirty="0">
-              <a:solidFill>
-                <a:srgbClr val="D4D4D4"/>
-              </a:solidFill>
-              <a:effectLst/>
-              <a:latin typeface="Consolas" panose="020B0609020204030204" pitchFamily="49" charset="0"/>
-            </a:endParaRPr>
-          </a:p>
-        </p:txBody>
-      </p:sp>
-      <p:sp>
-        <p:nvSpPr>
-          <p:cNvPr id="13" name="Rectangle 12">
-            <a:extLst>
-              <a:ext uri="{FF2B5EF4-FFF2-40B4-BE49-F238E27FC236}">
-                <a16:creationId xmlns:a16="http://schemas.microsoft.com/office/drawing/2014/main" id="{FFBBAEC1-D792-4AFA-BA32-503008434834}"/>
-              </a:ext>
-            </a:extLst>
-          </p:cNvPr>
-          <p:cNvSpPr/>
-          <p:nvPr/>
-        </p:nvSpPr>
-        <p:spPr>
-          <a:xfrm>
-            <a:off x="1362182" y="2741092"/>
-            <a:ext cx="2569934" cy="307777"/>
-          </a:xfrm>
-          <a:prstGeom prst="rect">
-            <a:avLst/>
-          </a:prstGeom>
-        </p:spPr>
-        <p:txBody>
-          <a:bodyPr wrap="none">
-            <a:spAutoFit/>
-          </a:bodyPr>
-          <a:lstStyle/>
-          <a:p>
-            <a:r>
-              <a:rPr lang="en-US" sz="1400" b="1" dirty="0">
-                <a:solidFill>
-                  <a:srgbClr val="569CD6"/>
-                </a:solidFill>
-                <a:latin typeface="Consolas" panose="020B0609020204030204" pitchFamily="49" charset="0"/>
-              </a:rPr>
-              <a:t>class</a:t>
-            </a:r>
-            <a:r>
-              <a:rPr lang="en-US" sz="1400" b="1" dirty="0">
-                <a:solidFill>
-                  <a:srgbClr val="D4D4D4"/>
-                </a:solidFill>
-                <a:latin typeface="Consolas" panose="020B0609020204030204" pitchFamily="49" charset="0"/>
-              </a:rPr>
-              <a:t> </a:t>
-            </a:r>
-            <a:r>
-              <a:rPr lang="en-US" sz="1400" b="1" dirty="0" err="1">
-                <a:solidFill>
-                  <a:srgbClr val="4EC9B0"/>
-                </a:solidFill>
-                <a:latin typeface="Consolas" panose="020B0609020204030204" pitchFamily="49" charset="0"/>
-              </a:rPr>
-              <a:t>ATMegaTimer</a:t>
-            </a:r>
-            <a:r>
-              <a:rPr lang="en-US" sz="1400" b="1" dirty="0">
-                <a:solidFill>
-                  <a:srgbClr val="D4D4D4"/>
-                </a:solidFill>
-                <a:latin typeface="Consolas" panose="020B0609020204030204" pitchFamily="49" charset="0"/>
-              </a:rPr>
-              <a:t>: </a:t>
-            </a:r>
-            <a:r>
-              <a:rPr lang="en-US" sz="1400" b="1" dirty="0">
-                <a:solidFill>
-                  <a:srgbClr val="4EC9B0"/>
-                </a:solidFill>
-                <a:latin typeface="Consolas" panose="020B0609020204030204" pitchFamily="49" charset="0"/>
-              </a:rPr>
-              <a:t>Timer</a:t>
-            </a:r>
-            <a:endParaRPr lang="en-US" sz="1400" b="1" dirty="0">
-              <a:solidFill>
-                <a:srgbClr val="D4D4D4"/>
-              </a:solidFill>
-              <a:effectLst/>
-              <a:latin typeface="Consolas" panose="020B0609020204030204" pitchFamily="49" charset="0"/>
-            </a:endParaRPr>
-          </a:p>
-        </p:txBody>
-      </p:sp>
       <p:cxnSp>
         <p:nvCxnSpPr>
           <p:cNvPr id="16" name="Connector: Elbow 15">
@@ -7767,12 +7613,12 @@
         </p:nvCxnSpPr>
         <p:spPr>
           <a:xfrm rot="10800000" flipV="1">
-            <a:off x="1456937" y="1819056"/>
-            <a:ext cx="12700" cy="1670429"/>
+            <a:off x="1650722" y="847731"/>
+            <a:ext cx="67468" cy="1418854"/>
           </a:xfrm>
           <a:prstGeom prst="bentConnector3">
             <a:avLst>
-              <a:gd name="adj1" fmla="val 3857142"/>
+              <a:gd name="adj1" fmla="val 438827"/>
             </a:avLst>
           </a:prstGeom>
           <a:ln w="28575">
@@ -7813,12 +7659,12 @@
         </p:nvCxnSpPr>
         <p:spPr>
           <a:xfrm rot="10800000" flipV="1">
-            <a:off x="1456937" y="1819056"/>
-            <a:ext cx="12700" cy="3265913"/>
+            <a:off x="1650720" y="847731"/>
+            <a:ext cx="67470" cy="4045904"/>
           </a:xfrm>
           <a:prstGeom prst="bentConnector3">
             <a:avLst>
-              <a:gd name="adj1" fmla="val 3857142"/>
+              <a:gd name="adj1" fmla="val 438817"/>
             </a:avLst>
           </a:prstGeom>
           <a:ln w="28575">
@@ -7911,7 +7757,7 @@
         </p:nvSpPr>
         <p:spPr>
           <a:xfrm>
-            <a:off x="131409" y="5096046"/>
+            <a:off x="63351" y="1987143"/>
             <a:ext cx="1298241" cy="646331"/>
           </a:xfrm>
           <a:prstGeom prst="rect">
@@ -7925,12 +7771,14 @@
           </a:bodyPr>
           <a:lstStyle/>
           <a:p>
+            <a:pPr algn="r"/>
             <a:r>
               <a:rPr lang="en-US" dirty="0"/>
               <a:t>extends,</a:t>
             </a:r>
           </a:p>
           <a:p>
+            <a:pPr algn="r"/>
             <a:r>
               <a:rPr lang="en-US" dirty="0"/>
               <a:t>implements</a:t>
@@ -7952,8 +7800,8 @@
         </p:nvSpPr>
         <p:spPr>
           <a:xfrm>
-            <a:off x="4216420" y="3454287"/>
-            <a:ext cx="613533" cy="1657518"/>
+            <a:off x="4409980" y="3166665"/>
+            <a:ext cx="613533" cy="3145933"/>
           </a:xfrm>
           <a:prstGeom prst="rightBrace">
             <a:avLst/>
@@ -8066,7 +7914,7 @@
         </p:nvSpPr>
         <p:spPr>
           <a:xfrm>
-            <a:off x="4668346" y="4708969"/>
+            <a:off x="4871426" y="4746982"/>
             <a:ext cx="1328697" cy="369332"/>
           </a:xfrm>
           <a:prstGeom prst="rect">
@@ -8089,10 +7937,10 @@
       </p:sp>
       <p:sp>
         <p:nvSpPr>
-          <p:cNvPr id="47" name="Rectangle 46">
-            <a:extLst>
-              <a:ext uri="{FF2B5EF4-FFF2-40B4-BE49-F238E27FC236}">
-                <a16:creationId xmlns:a16="http://schemas.microsoft.com/office/drawing/2014/main" id="{DF064F12-C257-4D6E-8195-E4C3CE3A3528}"/>
+          <p:cNvPr id="50" name="Rectangle 49">
+            <a:extLst>
+              <a:ext uri="{FF2B5EF4-FFF2-40B4-BE49-F238E27FC236}">
+                <a16:creationId xmlns:a16="http://schemas.microsoft.com/office/drawing/2014/main" id="{A9163D93-520B-4E65-A557-35D98D084B8A}"/>
               </a:ext>
             </a:extLst>
           </p:cNvPr>
@@ -8101,98 +7949,7 @@
         </p:nvSpPr>
         <p:spPr>
           <a:xfrm>
-            <a:off x="1362182" y="4346340"/>
-            <a:ext cx="2371162" cy="307777"/>
-          </a:xfrm>
-          <a:prstGeom prst="rect">
-            <a:avLst/>
-          </a:prstGeom>
-        </p:spPr>
-        <p:txBody>
-          <a:bodyPr wrap="none">
-            <a:spAutoFit/>
-          </a:bodyPr>
-          <a:lstStyle/>
-          <a:p>
-            <a:r>
-              <a:rPr lang="en-US" sz="1400" b="1" dirty="0">
-                <a:solidFill>
-                  <a:srgbClr val="569CD6"/>
-                </a:solidFill>
-                <a:latin typeface="Consolas" panose="020B0609020204030204" pitchFamily="49" charset="0"/>
-              </a:rPr>
-              <a:t>class</a:t>
-            </a:r>
-            <a:r>
-              <a:rPr lang="en-US" sz="1400" b="1" dirty="0">
-                <a:solidFill>
-                  <a:srgbClr val="4EC9B0"/>
-                </a:solidFill>
-                <a:latin typeface="Consolas" panose="020B0609020204030204" pitchFamily="49" charset="0"/>
-              </a:rPr>
-              <a:t> </a:t>
-            </a:r>
-            <a:r>
-              <a:rPr lang="en-US" sz="1400" b="1" dirty="0" err="1">
-                <a:solidFill>
-                  <a:srgbClr val="4EC9B0"/>
-                </a:solidFill>
-                <a:latin typeface="Consolas" panose="020B0609020204030204" pitchFamily="49" charset="0"/>
-              </a:rPr>
-              <a:t>mbedTimer</a:t>
-            </a:r>
-            <a:r>
-              <a:rPr lang="en-US" sz="1400" b="1" dirty="0">
-                <a:solidFill>
-                  <a:srgbClr val="4EC9B0"/>
-                </a:solidFill>
-                <a:latin typeface="Consolas" panose="020B0609020204030204" pitchFamily="49" charset="0"/>
-              </a:rPr>
-              <a:t>:</a:t>
-            </a:r>
-            <a:r>
-              <a:rPr lang="en-US" sz="1400" b="1" dirty="0">
-                <a:solidFill>
-                  <a:srgbClr val="D4D4D4"/>
-                </a:solidFill>
-                <a:latin typeface="Consolas" panose="020B0609020204030204" pitchFamily="49" charset="0"/>
-              </a:rPr>
-              <a:t> </a:t>
-            </a:r>
-            <a:r>
-              <a:rPr lang="en-US" sz="1400" b="1" dirty="0">
-                <a:solidFill>
-                  <a:srgbClr val="4EC9B0"/>
-                </a:solidFill>
-                <a:latin typeface="Consolas" panose="020B0609020204030204" pitchFamily="49" charset="0"/>
-              </a:rPr>
-              <a:t>Timer</a:t>
-            </a:r>
-            <a:endParaRPr lang="en-US" sz="1400" b="1" dirty="0">
-              <a:solidFill>
-                <a:srgbClr val="D4D4D4"/>
-              </a:solidFill>
-              <a:effectLst/>
-              <a:latin typeface="Consolas" panose="020B0609020204030204" pitchFamily="49" charset="0"/>
-            </a:endParaRPr>
-          </a:p>
-        </p:txBody>
-      </p:sp>
-      <p:sp>
-        <p:nvSpPr>
-          <p:cNvPr id="50" name="Rectangle 49">
-            <a:extLst>
-              <a:ext uri="{FF2B5EF4-FFF2-40B4-BE49-F238E27FC236}">
-                <a16:creationId xmlns:a16="http://schemas.microsoft.com/office/drawing/2014/main" id="{A9163D93-520B-4E65-A557-35D98D084B8A}"/>
-              </a:ext>
-            </a:extLst>
-          </p:cNvPr>
-          <p:cNvSpPr/>
-          <p:nvPr/>
-        </p:nvSpPr>
-        <p:spPr>
-          <a:xfrm>
-            <a:off x="8408130" y="246696"/>
+            <a:off x="8420830" y="482735"/>
             <a:ext cx="2212622" cy="733778"/>
           </a:xfrm>
           <a:prstGeom prst="rect">
@@ -8249,12 +8006,12 @@
         </p:nvCxnSpPr>
         <p:spPr>
           <a:xfrm flipV="1">
-            <a:off x="10620752" y="613585"/>
-            <a:ext cx="12700" cy="3573106"/>
+            <a:off x="10620752" y="849624"/>
+            <a:ext cx="12700" cy="3337067"/>
           </a:xfrm>
           <a:prstGeom prst="bentConnector3">
             <a:avLst>
-              <a:gd name="adj1" fmla="val 3778024"/>
+              <a:gd name="adj1" fmla="val 1900000"/>
             </a:avLst>
           </a:prstGeom>
           <a:ln w="28575">
@@ -8331,7 +8088,7 @@
         </p:nvSpPr>
         <p:spPr>
           <a:xfrm>
-            <a:off x="5093812" y="247473"/>
+            <a:off x="5106512" y="483512"/>
             <a:ext cx="2212622" cy="733778"/>
           </a:xfrm>
           <a:prstGeom prst="rect">
@@ -8393,7 +8150,7 @@
         </p:nvCxnSpPr>
         <p:spPr>
           <a:xfrm flipH="1">
-            <a:off x="7306434" y="613585"/>
+            <a:off x="7319134" y="849624"/>
             <a:ext cx="1101696" cy="777"/>
           </a:xfrm>
           <a:prstGeom prst="straightConnector1">
@@ -8433,7 +8190,7 @@
         </p:nvSpPr>
         <p:spPr>
           <a:xfrm>
-            <a:off x="7508558" y="641334"/>
+            <a:off x="7521258" y="877373"/>
             <a:ext cx="601447" cy="369332"/>
           </a:xfrm>
           <a:prstGeom prst="rect">
@@ -8485,136 +8242,6 @@
             <a:r>
               <a:rPr lang="en-US" dirty="0"/>
               <a:t>references</a:t>
-            </a:r>
-          </a:p>
-        </p:txBody>
-      </p:sp>
-      <p:sp>
-        <p:nvSpPr>
-          <p:cNvPr id="72" name="Rectangle 71">
-            <a:extLst>
-              <a:ext uri="{FF2B5EF4-FFF2-40B4-BE49-F238E27FC236}">
-                <a16:creationId xmlns:a16="http://schemas.microsoft.com/office/drawing/2014/main" id="{CE4B91A5-1A73-4778-B6AC-6F8065AEF0F7}"/>
-              </a:ext>
-            </a:extLst>
-          </p:cNvPr>
-          <p:cNvSpPr/>
-          <p:nvPr/>
-        </p:nvSpPr>
-        <p:spPr>
-          <a:xfrm>
-            <a:off x="5062844" y="5703797"/>
-            <a:ext cx="2212622" cy="733778"/>
-          </a:xfrm>
-          <a:prstGeom prst="rect">
-            <a:avLst/>
-          </a:prstGeom>
-        </p:spPr>
-        <p:style>
-          <a:lnRef idx="1">
-            <a:schemeClr val="accent6"/>
-          </a:lnRef>
-          <a:fillRef idx="2">
-            <a:schemeClr val="accent6"/>
-          </a:fillRef>
-          <a:effectRef idx="1">
-            <a:schemeClr val="accent6"/>
-          </a:effectRef>
-          <a:fontRef idx="minor">
-            <a:schemeClr val="dk1"/>
-          </a:fontRef>
-        </p:style>
-        <p:txBody>
-          <a:bodyPr rtlCol="0" anchor="ctr"/>
-          <a:lstStyle/>
-          <a:p>
-            <a:pPr algn="ctr"/>
-            <a:r>
-              <a:rPr lang="en-US" dirty="0" err="1"/>
-              <a:t>mbed</a:t>
-            </a:r>
-            <a:r>
-              <a:rPr lang="en-US" dirty="0"/>
-              <a:t>-classic</a:t>
-            </a:r>
-          </a:p>
-        </p:txBody>
-      </p:sp>
-      <p:cxnSp>
-        <p:nvCxnSpPr>
-          <p:cNvPr id="73" name="Connector: Elbow 72">
-            <a:extLst>
-              <a:ext uri="{FF2B5EF4-FFF2-40B4-BE49-F238E27FC236}">
-                <a16:creationId xmlns:a16="http://schemas.microsoft.com/office/drawing/2014/main" id="{AC387350-1949-41DA-9EC5-AC955BC4D970}"/>
-              </a:ext>
-            </a:extLst>
-          </p:cNvPr>
-          <p:cNvCxnSpPr>
-            <a:cxnSpLocks/>
-            <a:stCxn id="72" idx="1"/>
-            <a:endCxn id="6" idx="2"/>
-          </p:cNvCxnSpPr>
-          <p:nvPr/>
-        </p:nvCxnSpPr>
-        <p:spPr>
-          <a:xfrm rot="10800000">
-            <a:off x="2563248" y="5451860"/>
-            <a:ext cx="2499596" cy="618827"/>
-          </a:xfrm>
-          <a:prstGeom prst="bentConnector2">
-            <a:avLst/>
-          </a:prstGeom>
-          <a:ln>
-            <a:headEnd type="triangle" w="lg" len="lg"/>
-            <a:tailEnd type="none"/>
-          </a:ln>
-        </p:spPr>
-        <p:style>
-          <a:lnRef idx="1">
-            <a:schemeClr val="accent1"/>
-          </a:lnRef>
-          <a:fillRef idx="0">
-            <a:schemeClr val="accent1"/>
-          </a:fillRef>
-          <a:effectRef idx="0">
-            <a:schemeClr val="accent1"/>
-          </a:effectRef>
-          <a:fontRef idx="minor">
-            <a:schemeClr val="tx1"/>
-          </a:fontRef>
-        </p:style>
-      </p:cxnSp>
-      <p:sp>
-        <p:nvSpPr>
-          <p:cNvPr id="77" name="TextBox 76">
-            <a:extLst>
-              <a:ext uri="{FF2B5EF4-FFF2-40B4-BE49-F238E27FC236}">
-                <a16:creationId xmlns:a16="http://schemas.microsoft.com/office/drawing/2014/main" id="{3E34F299-018C-4F47-8306-FE15C66CC333}"/>
-              </a:ext>
-            </a:extLst>
-          </p:cNvPr>
-          <p:cNvSpPr txBox="1"/>
-          <p:nvPr/>
-        </p:nvSpPr>
-        <p:spPr>
-          <a:xfrm>
-            <a:off x="3432620" y="6069466"/>
-            <a:ext cx="601447" cy="369332"/>
-          </a:xfrm>
-          <a:prstGeom prst="rect">
-            <a:avLst/>
-          </a:prstGeom>
-          <a:noFill/>
-        </p:spPr>
-        <p:txBody>
-          <a:bodyPr wrap="none" rtlCol="0">
-            <a:spAutoFit/>
-          </a:bodyPr>
-          <a:lstStyle/>
-          <a:p>
-            <a:r>
-              <a:rPr lang="en-US" dirty="0"/>
-              <a:t>uses</a:t>
             </a:r>
           </a:p>
         </p:txBody>
@@ -8765,8 +8392,8 @@
         </p:nvCxnSpPr>
         <p:spPr>
           <a:xfrm flipV="1">
-            <a:off x="9514441" y="980474"/>
-            <a:ext cx="0" cy="1154046"/>
+            <a:off x="9514441" y="1216513"/>
+            <a:ext cx="12700" cy="918007"/>
           </a:xfrm>
           <a:prstGeom prst="straightConnector1">
             <a:avLst/>
@@ -8854,12 +8481,12 @@
         </p:nvCxnSpPr>
         <p:spPr>
           <a:xfrm rot="10800000">
-            <a:off x="3669560" y="1819057"/>
-            <a:ext cx="4738571" cy="682352"/>
+            <a:off x="3930812" y="847731"/>
+            <a:ext cx="4477318" cy="1653678"/>
           </a:xfrm>
           <a:prstGeom prst="bentConnector3">
             <a:avLst>
-              <a:gd name="adj1" fmla="val 50000"/>
+              <a:gd name="adj1" fmla="val 84083"/>
             </a:avLst>
           </a:prstGeom>
           <a:ln w="3175">
@@ -8896,7 +8523,7 @@
         </p:nvSpPr>
         <p:spPr>
           <a:xfrm>
-            <a:off x="8341748" y="1346586"/>
+            <a:off x="8293457" y="1542226"/>
             <a:ext cx="1172693" cy="369332"/>
           </a:xfrm>
           <a:prstGeom prst="rect">
@@ -8913,6 +8540,263 @@
             <a:r>
               <a:rPr lang="en-US" dirty="0"/>
               <a:t>references</a:t>
+            </a:r>
+          </a:p>
+        </p:txBody>
+      </p:sp>
+      <p:sp>
+        <p:nvSpPr>
+          <p:cNvPr id="37" name="Rectangle 36">
+            <a:extLst>
+              <a:ext uri="{FF2B5EF4-FFF2-40B4-BE49-F238E27FC236}">
+                <a16:creationId xmlns:a16="http://schemas.microsoft.com/office/drawing/2014/main" id="{41463EDA-EAE6-4ED6-BAE2-7D20C34584DA}"/>
+              </a:ext>
+            </a:extLst>
+          </p:cNvPr>
+          <p:cNvSpPr/>
+          <p:nvPr/>
+        </p:nvSpPr>
+        <p:spPr>
+          <a:xfrm>
+            <a:off x="1644203" y="3120678"/>
+            <a:ext cx="2212622" cy="655730"/>
+          </a:xfrm>
+          <a:prstGeom prst="rect">
+            <a:avLst/>
+          </a:prstGeom>
+        </p:spPr>
+        <p:style>
+          <a:lnRef idx="1">
+            <a:schemeClr val="accent5"/>
+          </a:lnRef>
+          <a:fillRef idx="2">
+            <a:schemeClr val="accent5"/>
+          </a:fillRef>
+          <a:effectRef idx="1">
+            <a:schemeClr val="accent5"/>
+          </a:effectRef>
+          <a:fontRef idx="minor">
+            <a:schemeClr val="dk1"/>
+          </a:fontRef>
+        </p:style>
+        <p:txBody>
+          <a:bodyPr rtlCol="0" anchor="ctr"/>
+          <a:lstStyle/>
+          <a:p>
+            <a:pPr algn="ctr"/>
+            <a:r>
+              <a:rPr lang="en-US" b="1" dirty="0" err="1"/>
+              <a:t>codal-arduino-uno</a:t>
+            </a:r>
+            <a:endParaRPr lang="en-US" b="1" dirty="0"/>
+          </a:p>
+        </p:txBody>
+      </p:sp>
+      <p:sp>
+        <p:nvSpPr>
+          <p:cNvPr id="38" name="Rectangle 37">
+            <a:extLst>
+              <a:ext uri="{FF2B5EF4-FFF2-40B4-BE49-F238E27FC236}">
+                <a16:creationId xmlns:a16="http://schemas.microsoft.com/office/drawing/2014/main" id="{FE4F45C9-3D84-4BA5-8A52-382514D6080D}"/>
+              </a:ext>
+            </a:extLst>
+          </p:cNvPr>
+          <p:cNvSpPr/>
+          <p:nvPr/>
+        </p:nvSpPr>
+        <p:spPr>
+          <a:xfrm>
+            <a:off x="1644203" y="5707938"/>
+            <a:ext cx="2212621" cy="604661"/>
+          </a:xfrm>
+          <a:prstGeom prst="rect">
+            <a:avLst/>
+          </a:prstGeom>
+        </p:spPr>
+        <p:style>
+          <a:lnRef idx="1">
+            <a:schemeClr val="accent5"/>
+          </a:lnRef>
+          <a:fillRef idx="2">
+            <a:schemeClr val="accent5"/>
+          </a:fillRef>
+          <a:effectRef idx="1">
+            <a:schemeClr val="accent5"/>
+          </a:effectRef>
+          <a:fontRef idx="minor">
+            <a:schemeClr val="dk1"/>
+          </a:fontRef>
+        </p:style>
+        <p:txBody>
+          <a:bodyPr rtlCol="0" anchor="ctr"/>
+          <a:lstStyle/>
+          <a:p>
+            <a:pPr algn="ctr"/>
+            <a:r>
+              <a:rPr lang="en-US" b="1" dirty="0" err="1"/>
+              <a:t>codal</a:t>
+            </a:r>
+            <a:r>
+              <a:rPr lang="en-US" b="1" dirty="0"/>
+              <a:t>-circuit-playground</a:t>
+            </a:r>
+          </a:p>
+        </p:txBody>
+      </p:sp>
+      <p:cxnSp>
+        <p:nvCxnSpPr>
+          <p:cNvPr id="54" name="Straight Arrow Connector 53">
+            <a:extLst>
+              <a:ext uri="{FF2B5EF4-FFF2-40B4-BE49-F238E27FC236}">
+                <a16:creationId xmlns:a16="http://schemas.microsoft.com/office/drawing/2014/main" id="{B4E8CEBB-BF80-4D42-91F3-781CDD370EEF}"/>
+              </a:ext>
+            </a:extLst>
+          </p:cNvPr>
+          <p:cNvCxnSpPr>
+            <a:cxnSpLocks/>
+            <a:stCxn id="37" idx="0"/>
+            <a:endCxn id="7" idx="2"/>
+          </p:cNvCxnSpPr>
+          <p:nvPr/>
+        </p:nvCxnSpPr>
+        <p:spPr>
+          <a:xfrm flipV="1">
+            <a:off x="2750514" y="2633474"/>
+            <a:ext cx="6519" cy="487204"/>
+          </a:xfrm>
+          <a:prstGeom prst="straightConnector1">
+            <a:avLst/>
+          </a:prstGeom>
+          <a:ln>
+            <a:headEnd w="lg" len="lg"/>
+            <a:tailEnd type="triangle" w="lg" len="lg"/>
+          </a:ln>
+        </p:spPr>
+        <p:style>
+          <a:lnRef idx="1">
+            <a:schemeClr val="accent1"/>
+          </a:lnRef>
+          <a:fillRef idx="0">
+            <a:schemeClr val="accent1"/>
+          </a:fillRef>
+          <a:effectRef idx="0">
+            <a:schemeClr val="accent1"/>
+          </a:effectRef>
+          <a:fontRef idx="minor">
+            <a:schemeClr val="tx1"/>
+          </a:fontRef>
+        </p:style>
+      </p:cxnSp>
+      <p:cxnSp>
+        <p:nvCxnSpPr>
+          <p:cNvPr id="60" name="Straight Arrow Connector 59">
+            <a:extLst>
+              <a:ext uri="{FF2B5EF4-FFF2-40B4-BE49-F238E27FC236}">
+                <a16:creationId xmlns:a16="http://schemas.microsoft.com/office/drawing/2014/main" id="{1124F173-25BC-47F6-B4D4-175D55CDD154}"/>
+              </a:ext>
+            </a:extLst>
+          </p:cNvPr>
+          <p:cNvCxnSpPr>
+            <a:cxnSpLocks/>
+            <a:stCxn id="38" idx="0"/>
+            <a:endCxn id="6" idx="2"/>
+          </p:cNvCxnSpPr>
+          <p:nvPr/>
+        </p:nvCxnSpPr>
+        <p:spPr>
+          <a:xfrm flipV="1">
+            <a:off x="2750514" y="5260524"/>
+            <a:ext cx="6517" cy="447414"/>
+          </a:xfrm>
+          <a:prstGeom prst="straightConnector1">
+            <a:avLst/>
+          </a:prstGeom>
+          <a:ln>
+            <a:headEnd w="lg" len="lg"/>
+            <a:tailEnd type="triangle" w="lg" len="lg"/>
+          </a:ln>
+        </p:spPr>
+        <p:style>
+          <a:lnRef idx="1">
+            <a:schemeClr val="accent1"/>
+          </a:lnRef>
+          <a:fillRef idx="0">
+            <a:schemeClr val="accent1"/>
+          </a:fillRef>
+          <a:effectRef idx="0">
+            <a:schemeClr val="accent1"/>
+          </a:effectRef>
+          <a:fontRef idx="minor">
+            <a:schemeClr val="tx1"/>
+          </a:fontRef>
+        </p:style>
+      </p:cxnSp>
+      <p:sp>
+        <p:nvSpPr>
+          <p:cNvPr id="64" name="TextBox 63">
+            <a:extLst>
+              <a:ext uri="{FF2B5EF4-FFF2-40B4-BE49-F238E27FC236}">
+                <a16:creationId xmlns:a16="http://schemas.microsoft.com/office/drawing/2014/main" id="{DB9284FD-C58A-4AD6-8A2C-32A75264A8C8}"/>
+              </a:ext>
+            </a:extLst>
+          </p:cNvPr>
+          <p:cNvSpPr txBox="1"/>
+          <p:nvPr/>
+        </p:nvSpPr>
+        <p:spPr>
+          <a:xfrm>
+            <a:off x="2828732" y="5300348"/>
+            <a:ext cx="601447" cy="369332"/>
+          </a:xfrm>
+          <a:prstGeom prst="rect">
+            <a:avLst/>
+          </a:prstGeom>
+          <a:noFill/>
+        </p:spPr>
+        <p:txBody>
+          <a:bodyPr wrap="none" rtlCol="0">
+            <a:spAutoFit/>
+          </a:bodyPr>
+          <a:lstStyle/>
+          <a:p>
+            <a:r>
+              <a:rPr lang="en-US" dirty="0"/>
+              <a:t>uses</a:t>
+            </a:r>
+          </a:p>
+        </p:txBody>
+      </p:sp>
+      <p:sp>
+        <p:nvSpPr>
+          <p:cNvPr id="65" name="TextBox 64">
+            <a:extLst>
+              <a:ext uri="{FF2B5EF4-FFF2-40B4-BE49-F238E27FC236}">
+                <a16:creationId xmlns:a16="http://schemas.microsoft.com/office/drawing/2014/main" id="{47FA08B7-1F99-449B-BA71-170418030C03}"/>
+              </a:ext>
+            </a:extLst>
+          </p:cNvPr>
+          <p:cNvSpPr txBox="1"/>
+          <p:nvPr/>
+        </p:nvSpPr>
+        <p:spPr>
+          <a:xfrm>
+            <a:off x="2809146" y="2709185"/>
+            <a:ext cx="601447" cy="369332"/>
+          </a:xfrm>
+          <a:prstGeom prst="rect">
+            <a:avLst/>
+          </a:prstGeom>
+          <a:noFill/>
+        </p:spPr>
+        <p:txBody>
+          <a:bodyPr wrap="none" rtlCol="0">
+            <a:spAutoFit/>
+          </a:bodyPr>
+          <a:lstStyle/>
+          <a:p>
+            <a:r>
+              <a:rPr lang="en-US" dirty="0"/>
+              <a:t>uses</a:t>
             </a:r>
           </a:p>
         </p:txBody>

</xml_diff>

<commit_message>
added codal arch diagram.
</commit_message>
<xml_diff>
--- a/papers/tr2017/diagrams.pptx
+++ b/papers/tr2017/diagrams.pptx
@@ -5,12 +5,13 @@
     <p:sldMasterId id="2147483648" r:id="rId1"/>
   </p:sldMasterIdLst>
   <p:notesMasterIdLst>
-    <p:notesMasterId r:id="rId5"/>
+    <p:notesMasterId r:id="rId6"/>
   </p:notesMasterIdLst>
   <p:sldIdLst>
     <p:sldId id="257" r:id="rId2"/>
     <p:sldId id="258" r:id="rId3"/>
     <p:sldId id="260" r:id="rId4"/>
+    <p:sldId id="261" r:id="rId5"/>
   </p:sldIdLst>
   <p:sldSz cx="12192000" cy="6858000"/>
   <p:notesSz cx="6858000" cy="9144000"/>
@@ -120,11 +121,7 @@
 <file path=ppt/commentAuthors.xml><?xml version="1.0" encoding="utf-8"?>
 <p:cmAuthorLst xmlns:a="http://schemas.openxmlformats.org/drawingml/2006/main" xmlns:r="http://schemas.openxmlformats.org/officeDocument/2006/relationships" xmlns:p="http://schemas.openxmlformats.org/presentationml/2006/main">
   <p:cmAuthor id="1" name="Tom Ball (MSR)" initials="TB(" lastIdx="2" clrIdx="0">
-    <p:extLst>
-      <p:ext uri="{19B8F6BF-5375-455C-9EA6-DF929625EA0E}">
-        <p15:presenceInfo xmlns:p15="http://schemas.microsoft.com/office/powerpoint/2012/main" userId="S-1-5-21-2127521184-1604012920-1887927527-108383" providerId="AD"/>
-      </p:ext>
-    </p:extLst>
+    <p:extLst/>
   </p:cmAuthor>
 </p:cmAuthorLst>
 </file>
@@ -215,7 +212,7 @@
           <a:p>
             <a:fld id="{C0237B04-0BFF-4188-AE10-E77C3C5257C8}" type="datetimeFigureOut">
               <a:rPr lang="en-US" smtClean="0"/>
-              <a:t>10/13/2017</a:t>
+              <a:t>10/17/17</a:t>
             </a:fld>
             <a:endParaRPr lang="en-US"/>
           </a:p>
@@ -678,7 +675,7 @@
           <p:cNvPr id="2" name="Title 1">
             <a:extLst>
               <a:ext uri="{FF2B5EF4-FFF2-40B4-BE49-F238E27FC236}">
-                <a16:creationId xmlns:a16="http://schemas.microsoft.com/office/drawing/2014/main" id="{23D0BEB7-8CF9-4802-8B61-E9A110EC28D8}"/>
+                <a16:creationId xmlns:a16="http://schemas.microsoft.com/office/drawing/2014/main" xmlns="" id="{23D0BEB7-8CF9-4802-8B61-E9A110EC28D8}"/>
               </a:ext>
             </a:extLst>
           </p:cNvPr>
@@ -715,7 +712,7 @@
           <p:cNvPr id="3" name="Subtitle 2">
             <a:extLst>
               <a:ext uri="{FF2B5EF4-FFF2-40B4-BE49-F238E27FC236}">
-                <a16:creationId xmlns:a16="http://schemas.microsoft.com/office/drawing/2014/main" id="{1C55B20C-1B18-4CCD-9202-C795758DBF52}"/>
+                <a16:creationId xmlns:a16="http://schemas.microsoft.com/office/drawing/2014/main" xmlns="" id="{1C55B20C-1B18-4CCD-9202-C795758DBF52}"/>
               </a:ext>
             </a:extLst>
           </p:cNvPr>
@@ -785,7 +782,7 @@
           <p:cNvPr id="4" name="Date Placeholder 3">
             <a:extLst>
               <a:ext uri="{FF2B5EF4-FFF2-40B4-BE49-F238E27FC236}">
-                <a16:creationId xmlns:a16="http://schemas.microsoft.com/office/drawing/2014/main" id="{97B533EE-975A-4E34-AE96-2FFFFAC7A66A}"/>
+                <a16:creationId xmlns:a16="http://schemas.microsoft.com/office/drawing/2014/main" xmlns="" id="{97B533EE-975A-4E34-AE96-2FFFFAC7A66A}"/>
               </a:ext>
             </a:extLst>
           </p:cNvPr>
@@ -803,7 +800,7 @@
           <a:p>
             <a:fld id="{E504D85E-2087-4C48-BE7E-1A197735EA07}" type="datetimeFigureOut">
               <a:rPr lang="en-US" smtClean="0"/>
-              <a:t>10/13/2017</a:t>
+              <a:t>10/17/17</a:t>
             </a:fld>
             <a:endParaRPr lang="en-US"/>
           </a:p>
@@ -814,7 +811,7 @@
           <p:cNvPr id="5" name="Footer Placeholder 4">
             <a:extLst>
               <a:ext uri="{FF2B5EF4-FFF2-40B4-BE49-F238E27FC236}">
-                <a16:creationId xmlns:a16="http://schemas.microsoft.com/office/drawing/2014/main" id="{E852E278-0797-4196-9C6C-1ADF74F7B3DE}"/>
+                <a16:creationId xmlns:a16="http://schemas.microsoft.com/office/drawing/2014/main" xmlns="" id="{E852E278-0797-4196-9C6C-1ADF74F7B3DE}"/>
               </a:ext>
             </a:extLst>
           </p:cNvPr>
@@ -839,7 +836,7 @@
           <p:cNvPr id="6" name="Slide Number Placeholder 5">
             <a:extLst>
               <a:ext uri="{FF2B5EF4-FFF2-40B4-BE49-F238E27FC236}">
-                <a16:creationId xmlns:a16="http://schemas.microsoft.com/office/drawing/2014/main" id="{0D16E2FB-340F-4261-8251-B97F29FE4561}"/>
+                <a16:creationId xmlns:a16="http://schemas.microsoft.com/office/drawing/2014/main" xmlns="" id="{0D16E2FB-340F-4261-8251-B97F29FE4561}"/>
               </a:ext>
             </a:extLst>
           </p:cNvPr>
@@ -898,7 +895,7 @@
           <p:cNvPr id="2" name="Title 1">
             <a:extLst>
               <a:ext uri="{FF2B5EF4-FFF2-40B4-BE49-F238E27FC236}">
-                <a16:creationId xmlns:a16="http://schemas.microsoft.com/office/drawing/2014/main" id="{2FC0AA46-59BE-4974-A29B-3C46043FA077}"/>
+                <a16:creationId xmlns:a16="http://schemas.microsoft.com/office/drawing/2014/main" xmlns="" id="{2FC0AA46-59BE-4974-A29B-3C46043FA077}"/>
               </a:ext>
             </a:extLst>
           </p:cNvPr>
@@ -926,7 +923,7 @@
           <p:cNvPr id="3" name="Vertical Text Placeholder 2">
             <a:extLst>
               <a:ext uri="{FF2B5EF4-FFF2-40B4-BE49-F238E27FC236}">
-                <a16:creationId xmlns:a16="http://schemas.microsoft.com/office/drawing/2014/main" id="{BE1D6E24-09D8-4127-82EC-8623CB4092A8}"/>
+                <a16:creationId xmlns:a16="http://schemas.microsoft.com/office/drawing/2014/main" xmlns="" id="{BE1D6E24-09D8-4127-82EC-8623CB4092A8}"/>
               </a:ext>
             </a:extLst>
           </p:cNvPr>
@@ -983,7 +980,7 @@
           <p:cNvPr id="4" name="Date Placeholder 3">
             <a:extLst>
               <a:ext uri="{FF2B5EF4-FFF2-40B4-BE49-F238E27FC236}">
-                <a16:creationId xmlns:a16="http://schemas.microsoft.com/office/drawing/2014/main" id="{D5CA2D32-6F27-4491-BA90-2988604EB9D2}"/>
+                <a16:creationId xmlns:a16="http://schemas.microsoft.com/office/drawing/2014/main" xmlns="" id="{D5CA2D32-6F27-4491-BA90-2988604EB9D2}"/>
               </a:ext>
             </a:extLst>
           </p:cNvPr>
@@ -1001,7 +998,7 @@
           <a:p>
             <a:fld id="{E504D85E-2087-4C48-BE7E-1A197735EA07}" type="datetimeFigureOut">
               <a:rPr lang="en-US" smtClean="0"/>
-              <a:t>10/13/2017</a:t>
+              <a:t>10/17/17</a:t>
             </a:fld>
             <a:endParaRPr lang="en-US"/>
           </a:p>
@@ -1012,7 +1009,7 @@
           <p:cNvPr id="5" name="Footer Placeholder 4">
             <a:extLst>
               <a:ext uri="{FF2B5EF4-FFF2-40B4-BE49-F238E27FC236}">
-                <a16:creationId xmlns:a16="http://schemas.microsoft.com/office/drawing/2014/main" id="{1B88E3C2-28E4-4FD0-AEF1-962A00BEF504}"/>
+                <a16:creationId xmlns:a16="http://schemas.microsoft.com/office/drawing/2014/main" xmlns="" id="{1B88E3C2-28E4-4FD0-AEF1-962A00BEF504}"/>
               </a:ext>
             </a:extLst>
           </p:cNvPr>
@@ -1037,7 +1034,7 @@
           <p:cNvPr id="6" name="Slide Number Placeholder 5">
             <a:extLst>
               <a:ext uri="{FF2B5EF4-FFF2-40B4-BE49-F238E27FC236}">
-                <a16:creationId xmlns:a16="http://schemas.microsoft.com/office/drawing/2014/main" id="{770F7BA1-D02F-4AA3-805D-0444F0C4E796}"/>
+                <a16:creationId xmlns:a16="http://schemas.microsoft.com/office/drawing/2014/main" xmlns="" id="{770F7BA1-D02F-4AA3-805D-0444F0C4E796}"/>
               </a:ext>
             </a:extLst>
           </p:cNvPr>
@@ -1096,7 +1093,7 @@
           <p:cNvPr id="2" name="Vertical Title 1">
             <a:extLst>
               <a:ext uri="{FF2B5EF4-FFF2-40B4-BE49-F238E27FC236}">
-                <a16:creationId xmlns:a16="http://schemas.microsoft.com/office/drawing/2014/main" id="{7C51B641-989E-460C-B0CE-859FEB83C74E}"/>
+                <a16:creationId xmlns:a16="http://schemas.microsoft.com/office/drawing/2014/main" xmlns="" id="{7C51B641-989E-460C-B0CE-859FEB83C74E}"/>
               </a:ext>
             </a:extLst>
           </p:cNvPr>
@@ -1129,7 +1126,7 @@
           <p:cNvPr id="3" name="Vertical Text Placeholder 2">
             <a:extLst>
               <a:ext uri="{FF2B5EF4-FFF2-40B4-BE49-F238E27FC236}">
-                <a16:creationId xmlns:a16="http://schemas.microsoft.com/office/drawing/2014/main" id="{C45AA5C6-CDD0-463C-AA85-95014CB173BB}"/>
+                <a16:creationId xmlns:a16="http://schemas.microsoft.com/office/drawing/2014/main" xmlns="" id="{C45AA5C6-CDD0-463C-AA85-95014CB173BB}"/>
               </a:ext>
             </a:extLst>
           </p:cNvPr>
@@ -1191,7 +1188,7 @@
           <p:cNvPr id="4" name="Date Placeholder 3">
             <a:extLst>
               <a:ext uri="{FF2B5EF4-FFF2-40B4-BE49-F238E27FC236}">
-                <a16:creationId xmlns:a16="http://schemas.microsoft.com/office/drawing/2014/main" id="{A50820FC-6AB1-49F5-B83C-FFD68439C792}"/>
+                <a16:creationId xmlns:a16="http://schemas.microsoft.com/office/drawing/2014/main" xmlns="" id="{A50820FC-6AB1-49F5-B83C-FFD68439C792}"/>
               </a:ext>
             </a:extLst>
           </p:cNvPr>
@@ -1209,7 +1206,7 @@
           <a:p>
             <a:fld id="{E504D85E-2087-4C48-BE7E-1A197735EA07}" type="datetimeFigureOut">
               <a:rPr lang="en-US" smtClean="0"/>
-              <a:t>10/13/2017</a:t>
+              <a:t>10/17/17</a:t>
             </a:fld>
             <a:endParaRPr lang="en-US"/>
           </a:p>
@@ -1220,7 +1217,7 @@
           <p:cNvPr id="5" name="Footer Placeholder 4">
             <a:extLst>
               <a:ext uri="{FF2B5EF4-FFF2-40B4-BE49-F238E27FC236}">
-                <a16:creationId xmlns:a16="http://schemas.microsoft.com/office/drawing/2014/main" id="{28633CB9-FA56-4CF6-9670-BED206E4E7D2}"/>
+                <a16:creationId xmlns:a16="http://schemas.microsoft.com/office/drawing/2014/main" xmlns="" id="{28633CB9-FA56-4CF6-9670-BED206E4E7D2}"/>
               </a:ext>
             </a:extLst>
           </p:cNvPr>
@@ -1245,7 +1242,7 @@
           <p:cNvPr id="6" name="Slide Number Placeholder 5">
             <a:extLst>
               <a:ext uri="{FF2B5EF4-FFF2-40B4-BE49-F238E27FC236}">
-                <a16:creationId xmlns:a16="http://schemas.microsoft.com/office/drawing/2014/main" id="{45E0F2E7-33F8-4632-90F2-5FD37C6C09CA}"/>
+                <a16:creationId xmlns:a16="http://schemas.microsoft.com/office/drawing/2014/main" xmlns="" id="{45E0F2E7-33F8-4632-90F2-5FD37C6C09CA}"/>
               </a:ext>
             </a:extLst>
           </p:cNvPr>
@@ -1304,7 +1301,7 @@
           <p:cNvPr id="2" name="Title 1">
             <a:extLst>
               <a:ext uri="{FF2B5EF4-FFF2-40B4-BE49-F238E27FC236}">
-                <a16:creationId xmlns:a16="http://schemas.microsoft.com/office/drawing/2014/main" id="{377EBB54-1C03-4BBB-9E7E-F45FEBB0CD25}"/>
+                <a16:creationId xmlns:a16="http://schemas.microsoft.com/office/drawing/2014/main" xmlns="" id="{377EBB54-1C03-4BBB-9E7E-F45FEBB0CD25}"/>
               </a:ext>
             </a:extLst>
           </p:cNvPr>
@@ -1332,7 +1329,7 @@
           <p:cNvPr id="3" name="Content Placeholder 2">
             <a:extLst>
               <a:ext uri="{FF2B5EF4-FFF2-40B4-BE49-F238E27FC236}">
-                <a16:creationId xmlns:a16="http://schemas.microsoft.com/office/drawing/2014/main" id="{3B6B35E2-931D-4454-BD21-DA98C5CC3581}"/>
+                <a16:creationId xmlns:a16="http://schemas.microsoft.com/office/drawing/2014/main" xmlns="" id="{3B6B35E2-931D-4454-BD21-DA98C5CC3581}"/>
               </a:ext>
             </a:extLst>
           </p:cNvPr>
@@ -1389,7 +1386,7 @@
           <p:cNvPr id="4" name="Date Placeholder 3">
             <a:extLst>
               <a:ext uri="{FF2B5EF4-FFF2-40B4-BE49-F238E27FC236}">
-                <a16:creationId xmlns:a16="http://schemas.microsoft.com/office/drawing/2014/main" id="{718F7D7B-2607-49B6-937D-9A1CBF59792F}"/>
+                <a16:creationId xmlns:a16="http://schemas.microsoft.com/office/drawing/2014/main" xmlns="" id="{718F7D7B-2607-49B6-937D-9A1CBF59792F}"/>
               </a:ext>
             </a:extLst>
           </p:cNvPr>
@@ -1407,7 +1404,7 @@
           <a:p>
             <a:fld id="{E504D85E-2087-4C48-BE7E-1A197735EA07}" type="datetimeFigureOut">
               <a:rPr lang="en-US" smtClean="0"/>
-              <a:t>10/13/2017</a:t>
+              <a:t>10/17/17</a:t>
             </a:fld>
             <a:endParaRPr lang="en-US"/>
           </a:p>
@@ -1418,7 +1415,7 @@
           <p:cNvPr id="5" name="Footer Placeholder 4">
             <a:extLst>
               <a:ext uri="{FF2B5EF4-FFF2-40B4-BE49-F238E27FC236}">
-                <a16:creationId xmlns:a16="http://schemas.microsoft.com/office/drawing/2014/main" id="{D22566CC-34AF-44EC-BE42-C85CCDA34ACA}"/>
+                <a16:creationId xmlns:a16="http://schemas.microsoft.com/office/drawing/2014/main" xmlns="" id="{D22566CC-34AF-44EC-BE42-C85CCDA34ACA}"/>
               </a:ext>
             </a:extLst>
           </p:cNvPr>
@@ -1443,7 +1440,7 @@
           <p:cNvPr id="6" name="Slide Number Placeholder 5">
             <a:extLst>
               <a:ext uri="{FF2B5EF4-FFF2-40B4-BE49-F238E27FC236}">
-                <a16:creationId xmlns:a16="http://schemas.microsoft.com/office/drawing/2014/main" id="{F85C06A6-F661-4A7D-84DB-D2EE104A4ED3}"/>
+                <a16:creationId xmlns:a16="http://schemas.microsoft.com/office/drawing/2014/main" xmlns="" id="{F85C06A6-F661-4A7D-84DB-D2EE104A4ED3}"/>
               </a:ext>
             </a:extLst>
           </p:cNvPr>
@@ -1502,7 +1499,7 @@
           <p:cNvPr id="2" name="Title 1">
             <a:extLst>
               <a:ext uri="{FF2B5EF4-FFF2-40B4-BE49-F238E27FC236}">
-                <a16:creationId xmlns:a16="http://schemas.microsoft.com/office/drawing/2014/main" id="{E698CAD9-E449-4969-AE0B-C61E7941C60F}"/>
+                <a16:creationId xmlns:a16="http://schemas.microsoft.com/office/drawing/2014/main" xmlns="" id="{E698CAD9-E449-4969-AE0B-C61E7941C60F}"/>
               </a:ext>
             </a:extLst>
           </p:cNvPr>
@@ -1539,7 +1536,7 @@
           <p:cNvPr id="3" name="Text Placeholder 2">
             <a:extLst>
               <a:ext uri="{FF2B5EF4-FFF2-40B4-BE49-F238E27FC236}">
-                <a16:creationId xmlns:a16="http://schemas.microsoft.com/office/drawing/2014/main" id="{8A808526-2D4D-49F8-8437-A0C896C07DE1}"/>
+                <a16:creationId xmlns:a16="http://schemas.microsoft.com/office/drawing/2014/main" xmlns="" id="{8A808526-2D4D-49F8-8437-A0C896C07DE1}"/>
               </a:ext>
             </a:extLst>
           </p:cNvPr>
@@ -1664,7 +1661,7 @@
           <p:cNvPr id="4" name="Date Placeholder 3">
             <a:extLst>
               <a:ext uri="{FF2B5EF4-FFF2-40B4-BE49-F238E27FC236}">
-                <a16:creationId xmlns:a16="http://schemas.microsoft.com/office/drawing/2014/main" id="{74A9A9B4-C59B-411D-974F-456D48A46C4C}"/>
+                <a16:creationId xmlns:a16="http://schemas.microsoft.com/office/drawing/2014/main" xmlns="" id="{74A9A9B4-C59B-411D-974F-456D48A46C4C}"/>
               </a:ext>
             </a:extLst>
           </p:cNvPr>
@@ -1682,7 +1679,7 @@
           <a:p>
             <a:fld id="{E504D85E-2087-4C48-BE7E-1A197735EA07}" type="datetimeFigureOut">
               <a:rPr lang="en-US" smtClean="0"/>
-              <a:t>10/13/2017</a:t>
+              <a:t>10/17/17</a:t>
             </a:fld>
             <a:endParaRPr lang="en-US"/>
           </a:p>
@@ -1693,7 +1690,7 @@
           <p:cNvPr id="5" name="Footer Placeholder 4">
             <a:extLst>
               <a:ext uri="{FF2B5EF4-FFF2-40B4-BE49-F238E27FC236}">
-                <a16:creationId xmlns:a16="http://schemas.microsoft.com/office/drawing/2014/main" id="{D739FF0E-AAD2-4096-8BB3-78F076940CF3}"/>
+                <a16:creationId xmlns:a16="http://schemas.microsoft.com/office/drawing/2014/main" xmlns="" id="{D739FF0E-AAD2-4096-8BB3-78F076940CF3}"/>
               </a:ext>
             </a:extLst>
           </p:cNvPr>
@@ -1718,7 +1715,7 @@
           <p:cNvPr id="6" name="Slide Number Placeholder 5">
             <a:extLst>
               <a:ext uri="{FF2B5EF4-FFF2-40B4-BE49-F238E27FC236}">
-                <a16:creationId xmlns:a16="http://schemas.microsoft.com/office/drawing/2014/main" id="{A183E807-AB18-4EA7-A83E-104FCCAAEF96}"/>
+                <a16:creationId xmlns:a16="http://schemas.microsoft.com/office/drawing/2014/main" xmlns="" id="{A183E807-AB18-4EA7-A83E-104FCCAAEF96}"/>
               </a:ext>
             </a:extLst>
           </p:cNvPr>
@@ -1777,7 +1774,7 @@
           <p:cNvPr id="2" name="Title 1">
             <a:extLst>
               <a:ext uri="{FF2B5EF4-FFF2-40B4-BE49-F238E27FC236}">
-                <a16:creationId xmlns:a16="http://schemas.microsoft.com/office/drawing/2014/main" id="{69270677-DAE7-4B76-9B43-4783FAFDFB2B}"/>
+                <a16:creationId xmlns:a16="http://schemas.microsoft.com/office/drawing/2014/main" xmlns="" id="{69270677-DAE7-4B76-9B43-4783FAFDFB2B}"/>
               </a:ext>
             </a:extLst>
           </p:cNvPr>
@@ -1805,7 +1802,7 @@
           <p:cNvPr id="3" name="Content Placeholder 2">
             <a:extLst>
               <a:ext uri="{FF2B5EF4-FFF2-40B4-BE49-F238E27FC236}">
-                <a16:creationId xmlns:a16="http://schemas.microsoft.com/office/drawing/2014/main" id="{71BFFEA3-624E-4A1E-BF5B-3DBA244EA0A2}"/>
+                <a16:creationId xmlns:a16="http://schemas.microsoft.com/office/drawing/2014/main" xmlns="" id="{71BFFEA3-624E-4A1E-BF5B-3DBA244EA0A2}"/>
               </a:ext>
             </a:extLst>
           </p:cNvPr>
@@ -1867,7 +1864,7 @@
           <p:cNvPr id="4" name="Content Placeholder 3">
             <a:extLst>
               <a:ext uri="{FF2B5EF4-FFF2-40B4-BE49-F238E27FC236}">
-                <a16:creationId xmlns:a16="http://schemas.microsoft.com/office/drawing/2014/main" id="{3CB8BF91-539B-426A-979B-EFE45BA6D990}"/>
+                <a16:creationId xmlns:a16="http://schemas.microsoft.com/office/drawing/2014/main" xmlns="" id="{3CB8BF91-539B-426A-979B-EFE45BA6D990}"/>
               </a:ext>
             </a:extLst>
           </p:cNvPr>
@@ -1929,7 +1926,7 @@
           <p:cNvPr id="5" name="Date Placeholder 4">
             <a:extLst>
               <a:ext uri="{FF2B5EF4-FFF2-40B4-BE49-F238E27FC236}">
-                <a16:creationId xmlns:a16="http://schemas.microsoft.com/office/drawing/2014/main" id="{D66E5997-F732-45A5-94C9-D1B83BE42D56}"/>
+                <a16:creationId xmlns:a16="http://schemas.microsoft.com/office/drawing/2014/main" xmlns="" id="{D66E5997-F732-45A5-94C9-D1B83BE42D56}"/>
               </a:ext>
             </a:extLst>
           </p:cNvPr>
@@ -1947,7 +1944,7 @@
           <a:p>
             <a:fld id="{E504D85E-2087-4C48-BE7E-1A197735EA07}" type="datetimeFigureOut">
               <a:rPr lang="en-US" smtClean="0"/>
-              <a:t>10/13/2017</a:t>
+              <a:t>10/17/17</a:t>
             </a:fld>
             <a:endParaRPr lang="en-US"/>
           </a:p>
@@ -1958,7 +1955,7 @@
           <p:cNvPr id="6" name="Footer Placeholder 5">
             <a:extLst>
               <a:ext uri="{FF2B5EF4-FFF2-40B4-BE49-F238E27FC236}">
-                <a16:creationId xmlns:a16="http://schemas.microsoft.com/office/drawing/2014/main" id="{EFB86B6E-BD83-4E60-A361-646334DFE354}"/>
+                <a16:creationId xmlns:a16="http://schemas.microsoft.com/office/drawing/2014/main" xmlns="" id="{EFB86B6E-BD83-4E60-A361-646334DFE354}"/>
               </a:ext>
             </a:extLst>
           </p:cNvPr>
@@ -1983,7 +1980,7 @@
           <p:cNvPr id="7" name="Slide Number Placeholder 6">
             <a:extLst>
               <a:ext uri="{FF2B5EF4-FFF2-40B4-BE49-F238E27FC236}">
-                <a16:creationId xmlns:a16="http://schemas.microsoft.com/office/drawing/2014/main" id="{DE11BF21-4152-43D2-A12B-0A60E6ECDF9B}"/>
+                <a16:creationId xmlns:a16="http://schemas.microsoft.com/office/drawing/2014/main" xmlns="" id="{DE11BF21-4152-43D2-A12B-0A60E6ECDF9B}"/>
               </a:ext>
             </a:extLst>
           </p:cNvPr>
@@ -2042,7 +2039,7 @@
           <p:cNvPr id="2" name="Title 1">
             <a:extLst>
               <a:ext uri="{FF2B5EF4-FFF2-40B4-BE49-F238E27FC236}">
-                <a16:creationId xmlns:a16="http://schemas.microsoft.com/office/drawing/2014/main" id="{CB39C7ED-3EB6-4E69-80EC-BB9C174638C4}"/>
+                <a16:creationId xmlns:a16="http://schemas.microsoft.com/office/drawing/2014/main" xmlns="" id="{CB39C7ED-3EB6-4E69-80EC-BB9C174638C4}"/>
               </a:ext>
             </a:extLst>
           </p:cNvPr>
@@ -2075,7 +2072,7 @@
           <p:cNvPr id="3" name="Text Placeholder 2">
             <a:extLst>
               <a:ext uri="{FF2B5EF4-FFF2-40B4-BE49-F238E27FC236}">
-                <a16:creationId xmlns:a16="http://schemas.microsoft.com/office/drawing/2014/main" id="{E08CD743-4269-451C-B9CD-16E35FD3EB1B}"/>
+                <a16:creationId xmlns:a16="http://schemas.microsoft.com/office/drawing/2014/main" xmlns="" id="{E08CD743-4269-451C-B9CD-16E35FD3EB1B}"/>
               </a:ext>
             </a:extLst>
           </p:cNvPr>
@@ -2146,7 +2143,7 @@
           <p:cNvPr id="4" name="Content Placeholder 3">
             <a:extLst>
               <a:ext uri="{FF2B5EF4-FFF2-40B4-BE49-F238E27FC236}">
-                <a16:creationId xmlns:a16="http://schemas.microsoft.com/office/drawing/2014/main" id="{EC9149B0-A069-4B2E-9E12-C9C8EE5F9609}"/>
+                <a16:creationId xmlns:a16="http://schemas.microsoft.com/office/drawing/2014/main" xmlns="" id="{EC9149B0-A069-4B2E-9E12-C9C8EE5F9609}"/>
               </a:ext>
             </a:extLst>
           </p:cNvPr>
@@ -2208,7 +2205,7 @@
           <p:cNvPr id="5" name="Text Placeholder 4">
             <a:extLst>
               <a:ext uri="{FF2B5EF4-FFF2-40B4-BE49-F238E27FC236}">
-                <a16:creationId xmlns:a16="http://schemas.microsoft.com/office/drawing/2014/main" id="{22F99CBE-5D3C-4404-95CC-A00A1E431E9B}"/>
+                <a16:creationId xmlns:a16="http://schemas.microsoft.com/office/drawing/2014/main" xmlns="" id="{22F99CBE-5D3C-4404-95CC-A00A1E431E9B}"/>
               </a:ext>
             </a:extLst>
           </p:cNvPr>
@@ -2279,7 +2276,7 @@
           <p:cNvPr id="6" name="Content Placeholder 5">
             <a:extLst>
               <a:ext uri="{FF2B5EF4-FFF2-40B4-BE49-F238E27FC236}">
-                <a16:creationId xmlns:a16="http://schemas.microsoft.com/office/drawing/2014/main" id="{81C3F09A-4DB3-47AB-A047-9DD3E710DB3A}"/>
+                <a16:creationId xmlns:a16="http://schemas.microsoft.com/office/drawing/2014/main" xmlns="" id="{81C3F09A-4DB3-47AB-A047-9DD3E710DB3A}"/>
               </a:ext>
             </a:extLst>
           </p:cNvPr>
@@ -2341,7 +2338,7 @@
           <p:cNvPr id="7" name="Date Placeholder 6">
             <a:extLst>
               <a:ext uri="{FF2B5EF4-FFF2-40B4-BE49-F238E27FC236}">
-                <a16:creationId xmlns:a16="http://schemas.microsoft.com/office/drawing/2014/main" id="{A3E2BB69-348B-473C-8527-C70D705B909B}"/>
+                <a16:creationId xmlns:a16="http://schemas.microsoft.com/office/drawing/2014/main" xmlns="" id="{A3E2BB69-348B-473C-8527-C70D705B909B}"/>
               </a:ext>
             </a:extLst>
           </p:cNvPr>
@@ -2359,7 +2356,7 @@
           <a:p>
             <a:fld id="{E504D85E-2087-4C48-BE7E-1A197735EA07}" type="datetimeFigureOut">
               <a:rPr lang="en-US" smtClean="0"/>
-              <a:t>10/13/2017</a:t>
+              <a:t>10/17/17</a:t>
             </a:fld>
             <a:endParaRPr lang="en-US"/>
           </a:p>
@@ -2370,7 +2367,7 @@
           <p:cNvPr id="8" name="Footer Placeholder 7">
             <a:extLst>
               <a:ext uri="{FF2B5EF4-FFF2-40B4-BE49-F238E27FC236}">
-                <a16:creationId xmlns:a16="http://schemas.microsoft.com/office/drawing/2014/main" id="{F8612FB8-DAE0-4192-9564-4DCD5247E820}"/>
+                <a16:creationId xmlns:a16="http://schemas.microsoft.com/office/drawing/2014/main" xmlns="" id="{F8612FB8-DAE0-4192-9564-4DCD5247E820}"/>
               </a:ext>
             </a:extLst>
           </p:cNvPr>
@@ -2395,7 +2392,7 @@
           <p:cNvPr id="9" name="Slide Number Placeholder 8">
             <a:extLst>
               <a:ext uri="{FF2B5EF4-FFF2-40B4-BE49-F238E27FC236}">
-                <a16:creationId xmlns:a16="http://schemas.microsoft.com/office/drawing/2014/main" id="{BB9FE832-04C3-4EB2-ABC8-FB13FECA0340}"/>
+                <a16:creationId xmlns:a16="http://schemas.microsoft.com/office/drawing/2014/main" xmlns="" id="{BB9FE832-04C3-4EB2-ABC8-FB13FECA0340}"/>
               </a:ext>
             </a:extLst>
           </p:cNvPr>
@@ -2454,7 +2451,7 @@
           <p:cNvPr id="2" name="Title 1">
             <a:extLst>
               <a:ext uri="{FF2B5EF4-FFF2-40B4-BE49-F238E27FC236}">
-                <a16:creationId xmlns:a16="http://schemas.microsoft.com/office/drawing/2014/main" id="{8A13168A-7D14-4F14-AE16-E746613A1150}"/>
+                <a16:creationId xmlns:a16="http://schemas.microsoft.com/office/drawing/2014/main" xmlns="" id="{8A13168A-7D14-4F14-AE16-E746613A1150}"/>
               </a:ext>
             </a:extLst>
           </p:cNvPr>
@@ -2482,7 +2479,7 @@
           <p:cNvPr id="3" name="Date Placeholder 2">
             <a:extLst>
               <a:ext uri="{FF2B5EF4-FFF2-40B4-BE49-F238E27FC236}">
-                <a16:creationId xmlns:a16="http://schemas.microsoft.com/office/drawing/2014/main" id="{633B17D2-F9E1-402B-8C92-91D437963D47}"/>
+                <a16:creationId xmlns:a16="http://schemas.microsoft.com/office/drawing/2014/main" xmlns="" id="{633B17D2-F9E1-402B-8C92-91D437963D47}"/>
               </a:ext>
             </a:extLst>
           </p:cNvPr>
@@ -2500,7 +2497,7 @@
           <a:p>
             <a:fld id="{E504D85E-2087-4C48-BE7E-1A197735EA07}" type="datetimeFigureOut">
               <a:rPr lang="en-US" smtClean="0"/>
-              <a:t>10/13/2017</a:t>
+              <a:t>10/17/17</a:t>
             </a:fld>
             <a:endParaRPr lang="en-US"/>
           </a:p>
@@ -2511,7 +2508,7 @@
           <p:cNvPr id="4" name="Footer Placeholder 3">
             <a:extLst>
               <a:ext uri="{FF2B5EF4-FFF2-40B4-BE49-F238E27FC236}">
-                <a16:creationId xmlns:a16="http://schemas.microsoft.com/office/drawing/2014/main" id="{8FF5FC7E-65D2-4796-B9CA-CAE31FDCB997}"/>
+                <a16:creationId xmlns:a16="http://schemas.microsoft.com/office/drawing/2014/main" xmlns="" id="{8FF5FC7E-65D2-4796-B9CA-CAE31FDCB997}"/>
               </a:ext>
             </a:extLst>
           </p:cNvPr>
@@ -2536,7 +2533,7 @@
           <p:cNvPr id="5" name="Slide Number Placeholder 4">
             <a:extLst>
               <a:ext uri="{FF2B5EF4-FFF2-40B4-BE49-F238E27FC236}">
-                <a16:creationId xmlns:a16="http://schemas.microsoft.com/office/drawing/2014/main" id="{0032B014-16BE-4EC5-8EC6-96C9AF4536A0}"/>
+                <a16:creationId xmlns:a16="http://schemas.microsoft.com/office/drawing/2014/main" xmlns="" id="{0032B014-16BE-4EC5-8EC6-96C9AF4536A0}"/>
               </a:ext>
             </a:extLst>
           </p:cNvPr>
@@ -2595,7 +2592,7 @@
           <p:cNvPr id="2" name="Date Placeholder 1">
             <a:extLst>
               <a:ext uri="{FF2B5EF4-FFF2-40B4-BE49-F238E27FC236}">
-                <a16:creationId xmlns:a16="http://schemas.microsoft.com/office/drawing/2014/main" id="{7D21218E-8C68-452C-83C1-A99488812DB7}"/>
+                <a16:creationId xmlns:a16="http://schemas.microsoft.com/office/drawing/2014/main" xmlns="" id="{7D21218E-8C68-452C-83C1-A99488812DB7}"/>
               </a:ext>
             </a:extLst>
           </p:cNvPr>
@@ -2613,7 +2610,7 @@
           <a:p>
             <a:fld id="{E504D85E-2087-4C48-BE7E-1A197735EA07}" type="datetimeFigureOut">
               <a:rPr lang="en-US" smtClean="0"/>
-              <a:t>10/13/2017</a:t>
+              <a:t>10/17/17</a:t>
             </a:fld>
             <a:endParaRPr lang="en-US"/>
           </a:p>
@@ -2624,7 +2621,7 @@
           <p:cNvPr id="3" name="Footer Placeholder 2">
             <a:extLst>
               <a:ext uri="{FF2B5EF4-FFF2-40B4-BE49-F238E27FC236}">
-                <a16:creationId xmlns:a16="http://schemas.microsoft.com/office/drawing/2014/main" id="{F5C6C226-7F42-4FCE-A1C4-56BD7B4E2EAD}"/>
+                <a16:creationId xmlns:a16="http://schemas.microsoft.com/office/drawing/2014/main" xmlns="" id="{F5C6C226-7F42-4FCE-A1C4-56BD7B4E2EAD}"/>
               </a:ext>
             </a:extLst>
           </p:cNvPr>
@@ -2649,7 +2646,7 @@
           <p:cNvPr id="4" name="Slide Number Placeholder 3">
             <a:extLst>
               <a:ext uri="{FF2B5EF4-FFF2-40B4-BE49-F238E27FC236}">
-                <a16:creationId xmlns:a16="http://schemas.microsoft.com/office/drawing/2014/main" id="{E25E37D2-D1C1-4AA3-8D9A-0F5C2286EDA0}"/>
+                <a16:creationId xmlns:a16="http://schemas.microsoft.com/office/drawing/2014/main" xmlns="" id="{E25E37D2-D1C1-4AA3-8D9A-0F5C2286EDA0}"/>
               </a:ext>
             </a:extLst>
           </p:cNvPr>
@@ -2708,7 +2705,7 @@
           <p:cNvPr id="2" name="Title 1">
             <a:extLst>
               <a:ext uri="{FF2B5EF4-FFF2-40B4-BE49-F238E27FC236}">
-                <a16:creationId xmlns:a16="http://schemas.microsoft.com/office/drawing/2014/main" id="{58039D85-9651-451C-8B6D-7C2FA443A17E}"/>
+                <a16:creationId xmlns:a16="http://schemas.microsoft.com/office/drawing/2014/main" xmlns="" id="{58039D85-9651-451C-8B6D-7C2FA443A17E}"/>
               </a:ext>
             </a:extLst>
           </p:cNvPr>
@@ -2745,7 +2742,7 @@
           <p:cNvPr id="3" name="Content Placeholder 2">
             <a:extLst>
               <a:ext uri="{FF2B5EF4-FFF2-40B4-BE49-F238E27FC236}">
-                <a16:creationId xmlns:a16="http://schemas.microsoft.com/office/drawing/2014/main" id="{77FD276E-926F-4CF2-B611-725B86BC9BDD}"/>
+                <a16:creationId xmlns:a16="http://schemas.microsoft.com/office/drawing/2014/main" xmlns="" id="{77FD276E-926F-4CF2-B611-725B86BC9BDD}"/>
               </a:ext>
             </a:extLst>
           </p:cNvPr>
@@ -2835,7 +2832,7 @@
           <p:cNvPr id="4" name="Text Placeholder 3">
             <a:extLst>
               <a:ext uri="{FF2B5EF4-FFF2-40B4-BE49-F238E27FC236}">
-                <a16:creationId xmlns:a16="http://schemas.microsoft.com/office/drawing/2014/main" id="{05CD7173-3E62-4554-895F-8D553B0F09EB}"/>
+                <a16:creationId xmlns:a16="http://schemas.microsoft.com/office/drawing/2014/main" xmlns="" id="{05CD7173-3E62-4554-895F-8D553B0F09EB}"/>
               </a:ext>
             </a:extLst>
           </p:cNvPr>
@@ -2906,7 +2903,7 @@
           <p:cNvPr id="5" name="Date Placeholder 4">
             <a:extLst>
               <a:ext uri="{FF2B5EF4-FFF2-40B4-BE49-F238E27FC236}">
-                <a16:creationId xmlns:a16="http://schemas.microsoft.com/office/drawing/2014/main" id="{E8F7D56F-DD9A-4284-84B4-03D0B4026A7C}"/>
+                <a16:creationId xmlns:a16="http://schemas.microsoft.com/office/drawing/2014/main" xmlns="" id="{E8F7D56F-DD9A-4284-84B4-03D0B4026A7C}"/>
               </a:ext>
             </a:extLst>
           </p:cNvPr>
@@ -2924,7 +2921,7 @@
           <a:p>
             <a:fld id="{E504D85E-2087-4C48-BE7E-1A197735EA07}" type="datetimeFigureOut">
               <a:rPr lang="en-US" smtClean="0"/>
-              <a:t>10/13/2017</a:t>
+              <a:t>10/17/17</a:t>
             </a:fld>
             <a:endParaRPr lang="en-US"/>
           </a:p>
@@ -2935,7 +2932,7 @@
           <p:cNvPr id="6" name="Footer Placeholder 5">
             <a:extLst>
               <a:ext uri="{FF2B5EF4-FFF2-40B4-BE49-F238E27FC236}">
-                <a16:creationId xmlns:a16="http://schemas.microsoft.com/office/drawing/2014/main" id="{EB92307F-646E-4FB6-96D2-A7C119A6E593}"/>
+                <a16:creationId xmlns:a16="http://schemas.microsoft.com/office/drawing/2014/main" xmlns="" id="{EB92307F-646E-4FB6-96D2-A7C119A6E593}"/>
               </a:ext>
             </a:extLst>
           </p:cNvPr>
@@ -2960,7 +2957,7 @@
           <p:cNvPr id="7" name="Slide Number Placeholder 6">
             <a:extLst>
               <a:ext uri="{FF2B5EF4-FFF2-40B4-BE49-F238E27FC236}">
-                <a16:creationId xmlns:a16="http://schemas.microsoft.com/office/drawing/2014/main" id="{6AD9A54E-1FF9-4FB4-BAB9-8260DEA3C707}"/>
+                <a16:creationId xmlns:a16="http://schemas.microsoft.com/office/drawing/2014/main" xmlns="" id="{6AD9A54E-1FF9-4FB4-BAB9-8260DEA3C707}"/>
               </a:ext>
             </a:extLst>
           </p:cNvPr>
@@ -3019,7 +3016,7 @@
           <p:cNvPr id="2" name="Title 1">
             <a:extLst>
               <a:ext uri="{FF2B5EF4-FFF2-40B4-BE49-F238E27FC236}">
-                <a16:creationId xmlns:a16="http://schemas.microsoft.com/office/drawing/2014/main" id="{70195D08-965F-4696-9456-D77F35386D74}"/>
+                <a16:creationId xmlns:a16="http://schemas.microsoft.com/office/drawing/2014/main" xmlns="" id="{70195D08-965F-4696-9456-D77F35386D74}"/>
               </a:ext>
             </a:extLst>
           </p:cNvPr>
@@ -3056,7 +3053,7 @@
           <p:cNvPr id="3" name="Picture Placeholder 2">
             <a:extLst>
               <a:ext uri="{FF2B5EF4-FFF2-40B4-BE49-F238E27FC236}">
-                <a16:creationId xmlns:a16="http://schemas.microsoft.com/office/drawing/2014/main" id="{1EE8B75E-E26E-42EE-957B-57CC0469CE15}"/>
+                <a16:creationId xmlns:a16="http://schemas.microsoft.com/office/drawing/2014/main" xmlns="" id="{1EE8B75E-E26E-42EE-957B-57CC0469CE15}"/>
               </a:ext>
             </a:extLst>
           </p:cNvPr>
@@ -3123,7 +3120,7 @@
           <p:cNvPr id="4" name="Text Placeholder 3">
             <a:extLst>
               <a:ext uri="{FF2B5EF4-FFF2-40B4-BE49-F238E27FC236}">
-                <a16:creationId xmlns:a16="http://schemas.microsoft.com/office/drawing/2014/main" id="{56CCE71D-F248-4325-8C34-530D22889174}"/>
+                <a16:creationId xmlns:a16="http://schemas.microsoft.com/office/drawing/2014/main" xmlns="" id="{56CCE71D-F248-4325-8C34-530D22889174}"/>
               </a:ext>
             </a:extLst>
           </p:cNvPr>
@@ -3194,7 +3191,7 @@
           <p:cNvPr id="5" name="Date Placeholder 4">
             <a:extLst>
               <a:ext uri="{FF2B5EF4-FFF2-40B4-BE49-F238E27FC236}">
-                <a16:creationId xmlns:a16="http://schemas.microsoft.com/office/drawing/2014/main" id="{168A1A2B-F4ED-40B4-A680-CDCADDAD8EC7}"/>
+                <a16:creationId xmlns:a16="http://schemas.microsoft.com/office/drawing/2014/main" xmlns="" id="{168A1A2B-F4ED-40B4-A680-CDCADDAD8EC7}"/>
               </a:ext>
             </a:extLst>
           </p:cNvPr>
@@ -3212,7 +3209,7 @@
           <a:p>
             <a:fld id="{E504D85E-2087-4C48-BE7E-1A197735EA07}" type="datetimeFigureOut">
               <a:rPr lang="en-US" smtClean="0"/>
-              <a:t>10/13/2017</a:t>
+              <a:t>10/17/17</a:t>
             </a:fld>
             <a:endParaRPr lang="en-US"/>
           </a:p>
@@ -3223,7 +3220,7 @@
           <p:cNvPr id="6" name="Footer Placeholder 5">
             <a:extLst>
               <a:ext uri="{FF2B5EF4-FFF2-40B4-BE49-F238E27FC236}">
-                <a16:creationId xmlns:a16="http://schemas.microsoft.com/office/drawing/2014/main" id="{BB0968A0-6029-4DE5-8082-7F38E336C933}"/>
+                <a16:creationId xmlns:a16="http://schemas.microsoft.com/office/drawing/2014/main" xmlns="" id="{BB0968A0-6029-4DE5-8082-7F38E336C933}"/>
               </a:ext>
             </a:extLst>
           </p:cNvPr>
@@ -3248,7 +3245,7 @@
           <p:cNvPr id="7" name="Slide Number Placeholder 6">
             <a:extLst>
               <a:ext uri="{FF2B5EF4-FFF2-40B4-BE49-F238E27FC236}">
-                <a16:creationId xmlns:a16="http://schemas.microsoft.com/office/drawing/2014/main" id="{77FD032A-15B0-423D-A4DE-FB7B4013789A}"/>
+                <a16:creationId xmlns:a16="http://schemas.microsoft.com/office/drawing/2014/main" xmlns="" id="{77FD032A-15B0-423D-A4DE-FB7B4013789A}"/>
               </a:ext>
             </a:extLst>
           </p:cNvPr>
@@ -3312,7 +3309,7 @@
           <p:cNvPr id="2" name="Title Placeholder 1">
             <a:extLst>
               <a:ext uri="{FF2B5EF4-FFF2-40B4-BE49-F238E27FC236}">
-                <a16:creationId xmlns:a16="http://schemas.microsoft.com/office/drawing/2014/main" id="{F273EE1C-2FE9-4362-A928-62B5302D0D0A}"/>
+                <a16:creationId xmlns:a16="http://schemas.microsoft.com/office/drawing/2014/main" xmlns="" id="{F273EE1C-2FE9-4362-A928-62B5302D0D0A}"/>
               </a:ext>
             </a:extLst>
           </p:cNvPr>
@@ -3350,7 +3347,7 @@
           <p:cNvPr id="3" name="Text Placeholder 2">
             <a:extLst>
               <a:ext uri="{FF2B5EF4-FFF2-40B4-BE49-F238E27FC236}">
-                <a16:creationId xmlns:a16="http://schemas.microsoft.com/office/drawing/2014/main" id="{3C126E43-984A-4919-BD76-4348EF164C32}"/>
+                <a16:creationId xmlns:a16="http://schemas.microsoft.com/office/drawing/2014/main" xmlns="" id="{3C126E43-984A-4919-BD76-4348EF164C32}"/>
               </a:ext>
             </a:extLst>
           </p:cNvPr>
@@ -3417,7 +3414,7 @@
           <p:cNvPr id="4" name="Date Placeholder 3">
             <a:extLst>
               <a:ext uri="{FF2B5EF4-FFF2-40B4-BE49-F238E27FC236}">
-                <a16:creationId xmlns:a16="http://schemas.microsoft.com/office/drawing/2014/main" id="{6BDDA5CC-265D-445D-B1A6-E3A5682AAEAD}"/>
+                <a16:creationId xmlns:a16="http://schemas.microsoft.com/office/drawing/2014/main" xmlns="" id="{6BDDA5CC-265D-445D-B1A6-E3A5682AAEAD}"/>
               </a:ext>
             </a:extLst>
           </p:cNvPr>
@@ -3453,7 +3450,7 @@
           <a:p>
             <a:fld id="{E504D85E-2087-4C48-BE7E-1A197735EA07}" type="datetimeFigureOut">
               <a:rPr lang="en-US" smtClean="0"/>
-              <a:t>10/13/2017</a:t>
+              <a:t>10/17/17</a:t>
             </a:fld>
             <a:endParaRPr lang="en-US"/>
           </a:p>
@@ -3464,7 +3461,7 @@
           <p:cNvPr id="5" name="Footer Placeholder 4">
             <a:extLst>
               <a:ext uri="{FF2B5EF4-FFF2-40B4-BE49-F238E27FC236}">
-                <a16:creationId xmlns:a16="http://schemas.microsoft.com/office/drawing/2014/main" id="{D4481185-15CE-4B64-A758-B9FE608C2281}"/>
+                <a16:creationId xmlns:a16="http://schemas.microsoft.com/office/drawing/2014/main" xmlns="" id="{D4481185-15CE-4B64-A758-B9FE608C2281}"/>
               </a:ext>
             </a:extLst>
           </p:cNvPr>
@@ -3507,7 +3504,7 @@
           <p:cNvPr id="6" name="Slide Number Placeholder 5">
             <a:extLst>
               <a:ext uri="{FF2B5EF4-FFF2-40B4-BE49-F238E27FC236}">
-                <a16:creationId xmlns:a16="http://schemas.microsoft.com/office/drawing/2014/main" id="{15BF00A6-F44F-4C9F-8A50-3821A62DF191}"/>
+                <a16:creationId xmlns:a16="http://schemas.microsoft.com/office/drawing/2014/main" xmlns="" id="{15BF00A6-F44F-4C9F-8A50-3821A62DF191}"/>
               </a:ext>
             </a:extLst>
           </p:cNvPr>
@@ -4082,7 +4079,7 @@
           <p:cNvPr id="51" name="Rectangle: Rounded Corners 50">
             <a:extLst>
               <a:ext uri="{FF2B5EF4-FFF2-40B4-BE49-F238E27FC236}">
-                <a16:creationId xmlns:a16="http://schemas.microsoft.com/office/drawing/2014/main" id="{F2751B1E-2C25-4F29-841B-3D94FDE58553}"/>
+                <a16:creationId xmlns:a16="http://schemas.microsoft.com/office/drawing/2014/main" xmlns="" id="{F2751B1E-2C25-4F29-841B-3D94FDE58553}"/>
               </a:ext>
             </a:extLst>
           </p:cNvPr>
@@ -5320,7 +5317,7 @@
           <p:cNvPr id="16" name="Group 15">
             <a:extLst>
               <a:ext uri="{FF2B5EF4-FFF2-40B4-BE49-F238E27FC236}">
-                <a16:creationId xmlns:a16="http://schemas.microsoft.com/office/drawing/2014/main" id="{4DB90944-56B9-457C-8D1A-9476F39CB40B}"/>
+                <a16:creationId xmlns:a16="http://schemas.microsoft.com/office/drawing/2014/main" xmlns="" id="{4DB90944-56B9-457C-8D1A-9476F39CB40B}"/>
               </a:ext>
             </a:extLst>
           </p:cNvPr>
@@ -5816,7 +5813,7 @@
           <p:cNvPr id="47" name="Rectangle 46">
             <a:extLst>
               <a:ext uri="{FF2B5EF4-FFF2-40B4-BE49-F238E27FC236}">
-                <a16:creationId xmlns:a16="http://schemas.microsoft.com/office/drawing/2014/main" id="{322B680D-8661-4B52-AAAE-521F25F0B3F6}"/>
+                <a16:creationId xmlns:a16="http://schemas.microsoft.com/office/drawing/2014/main" xmlns="" id="{322B680D-8661-4B52-AAAE-521F25F0B3F6}"/>
               </a:ext>
             </a:extLst>
           </p:cNvPr>
@@ -5865,7 +5862,7 @@
           <p:cNvPr id="48" name="Rectangle 47">
             <a:extLst>
               <a:ext uri="{FF2B5EF4-FFF2-40B4-BE49-F238E27FC236}">
-                <a16:creationId xmlns:a16="http://schemas.microsoft.com/office/drawing/2014/main" id="{5CED1D2E-B933-4AB1-A87F-EB9D42C873A1}"/>
+                <a16:creationId xmlns:a16="http://schemas.microsoft.com/office/drawing/2014/main" xmlns="" id="{5CED1D2E-B933-4AB1-A87F-EB9D42C873A1}"/>
               </a:ext>
             </a:extLst>
           </p:cNvPr>
@@ -5900,7 +5897,7 @@
           <p:cNvPr id="58" name="TextBox 57">
             <a:extLst>
               <a:ext uri="{FF2B5EF4-FFF2-40B4-BE49-F238E27FC236}">
-                <a16:creationId xmlns:a16="http://schemas.microsoft.com/office/drawing/2014/main" id="{1C6AFE97-ED99-401F-921E-B86B599A200A}"/>
+                <a16:creationId xmlns:a16="http://schemas.microsoft.com/office/drawing/2014/main" xmlns="" id="{1C6AFE97-ED99-401F-921E-B86B599A200A}"/>
               </a:ext>
             </a:extLst>
           </p:cNvPr>
@@ -5935,7 +5932,7 @@
           <p:cNvPr id="59" name="Connector: Curved 58">
             <a:extLst>
               <a:ext uri="{FF2B5EF4-FFF2-40B4-BE49-F238E27FC236}">
-                <a16:creationId xmlns:a16="http://schemas.microsoft.com/office/drawing/2014/main" id="{6DA4F012-3B0E-4B76-B575-7C068408FD0C}"/>
+                <a16:creationId xmlns:a16="http://schemas.microsoft.com/office/drawing/2014/main" xmlns="" id="{6DA4F012-3B0E-4B76-B575-7C068408FD0C}"/>
               </a:ext>
             </a:extLst>
           </p:cNvPr>
@@ -7345,7 +7342,7 @@
           <p:cNvPr id="4" name="Rectangle 3">
             <a:extLst>
               <a:ext uri="{FF2B5EF4-FFF2-40B4-BE49-F238E27FC236}">
-                <a16:creationId xmlns:a16="http://schemas.microsoft.com/office/drawing/2014/main" id="{0C2BA48E-758E-4035-B49C-4F47EB965891}"/>
+                <a16:creationId xmlns:a16="http://schemas.microsoft.com/office/drawing/2014/main" xmlns="" id="{0C2BA48E-758E-4035-B49C-4F47EB965891}"/>
               </a:ext>
             </a:extLst>
           </p:cNvPr>
@@ -7396,7 +7393,7 @@
           <p:cNvPr id="5" name="Rectangle 4">
             <a:extLst>
               <a:ext uri="{FF2B5EF4-FFF2-40B4-BE49-F238E27FC236}">
-                <a16:creationId xmlns:a16="http://schemas.microsoft.com/office/drawing/2014/main" id="{122F637B-D055-4A89-AEBF-4E10439C9FF0}"/>
+                <a16:creationId xmlns:a16="http://schemas.microsoft.com/office/drawing/2014/main" xmlns="" id="{122F637B-D055-4A89-AEBF-4E10439C9FF0}"/>
               </a:ext>
             </a:extLst>
           </p:cNvPr>
@@ -7452,7 +7449,7 @@
           <p:cNvPr id="6" name="Rectangle 5">
             <a:extLst>
               <a:ext uri="{FF2B5EF4-FFF2-40B4-BE49-F238E27FC236}">
-                <a16:creationId xmlns:a16="http://schemas.microsoft.com/office/drawing/2014/main" id="{F6A74462-8F47-4B8F-BE38-FAEA0C91AD42}"/>
+                <a16:creationId xmlns:a16="http://schemas.microsoft.com/office/drawing/2014/main" xmlns="" id="{F6A74462-8F47-4B8F-BE38-FAEA0C91AD42}"/>
               </a:ext>
             </a:extLst>
           </p:cNvPr>
@@ -7499,7 +7496,7 @@
           <p:cNvPr id="7" name="Rectangle 6">
             <a:extLst>
               <a:ext uri="{FF2B5EF4-FFF2-40B4-BE49-F238E27FC236}">
-                <a16:creationId xmlns:a16="http://schemas.microsoft.com/office/drawing/2014/main" id="{B31A5C86-C059-4E4F-A36D-7C43FC1208A0}"/>
+                <a16:creationId xmlns:a16="http://schemas.microsoft.com/office/drawing/2014/main" xmlns="" id="{B31A5C86-C059-4E4F-A36D-7C43FC1208A0}"/>
               </a:ext>
             </a:extLst>
           </p:cNvPr>
@@ -7546,7 +7543,7 @@
           <p:cNvPr id="8" name="Rectangle 7">
             <a:extLst>
               <a:ext uri="{FF2B5EF4-FFF2-40B4-BE49-F238E27FC236}">
-                <a16:creationId xmlns:a16="http://schemas.microsoft.com/office/drawing/2014/main" id="{3B5562F6-BD36-484D-B513-EA4AFBF6A46D}"/>
+                <a16:creationId xmlns:a16="http://schemas.microsoft.com/office/drawing/2014/main" xmlns="" id="{3B5562F6-BD36-484D-B513-EA4AFBF6A46D}"/>
               </a:ext>
             </a:extLst>
           </p:cNvPr>
@@ -7601,7 +7598,7 @@
           <p:cNvPr id="16" name="Connector: Elbow 15">
             <a:extLst>
               <a:ext uri="{FF2B5EF4-FFF2-40B4-BE49-F238E27FC236}">
-                <a16:creationId xmlns:a16="http://schemas.microsoft.com/office/drawing/2014/main" id="{8311314B-2261-48F7-8392-22D61FC10F4C}"/>
+                <a16:creationId xmlns:a16="http://schemas.microsoft.com/office/drawing/2014/main" xmlns="" id="{8311314B-2261-48F7-8392-22D61FC10F4C}"/>
               </a:ext>
             </a:extLst>
           </p:cNvPr>
@@ -7646,7 +7643,7 @@
           <p:cNvPr id="17" name="Connector: Elbow 16">
             <a:extLst>
               <a:ext uri="{FF2B5EF4-FFF2-40B4-BE49-F238E27FC236}">
-                <a16:creationId xmlns:a16="http://schemas.microsoft.com/office/drawing/2014/main" id="{433064AB-FEF6-4A7D-AAAE-AB72F5F2430F}"/>
+                <a16:creationId xmlns:a16="http://schemas.microsoft.com/office/drawing/2014/main" xmlns="" id="{433064AB-FEF6-4A7D-AAAE-AB72F5F2430F}"/>
               </a:ext>
             </a:extLst>
           </p:cNvPr>
@@ -7692,7 +7689,7 @@
           <p:cNvPr id="22" name="Rectangle 21">
             <a:extLst>
               <a:ext uri="{FF2B5EF4-FFF2-40B4-BE49-F238E27FC236}">
-                <a16:creationId xmlns:a16="http://schemas.microsoft.com/office/drawing/2014/main" id="{EB56C870-F1D4-4FF7-A9CD-127DA5AA0C10}"/>
+                <a16:creationId xmlns:a16="http://schemas.microsoft.com/office/drawing/2014/main" xmlns="" id="{EB56C870-F1D4-4FF7-A9CD-127DA5AA0C10}"/>
               </a:ext>
             </a:extLst>
           </p:cNvPr>
@@ -7748,7 +7745,7 @@
           <p:cNvPr id="25" name="TextBox 24">
             <a:extLst>
               <a:ext uri="{FF2B5EF4-FFF2-40B4-BE49-F238E27FC236}">
-                <a16:creationId xmlns:a16="http://schemas.microsoft.com/office/drawing/2014/main" id="{37047921-7782-4EE5-9840-B18851900A7C}"/>
+                <a16:creationId xmlns:a16="http://schemas.microsoft.com/office/drawing/2014/main" xmlns="" id="{37047921-7782-4EE5-9840-B18851900A7C}"/>
               </a:ext>
             </a:extLst>
           </p:cNvPr>
@@ -7791,7 +7788,7 @@
           <p:cNvPr id="27" name="Right Brace 26">
             <a:extLst>
               <a:ext uri="{FF2B5EF4-FFF2-40B4-BE49-F238E27FC236}">
-                <a16:creationId xmlns:a16="http://schemas.microsoft.com/office/drawing/2014/main" id="{C30BEFF4-A930-4D26-BC0A-2B7945E3A077}"/>
+                <a16:creationId xmlns:a16="http://schemas.microsoft.com/office/drawing/2014/main" xmlns="" id="{C30BEFF4-A930-4D26-BC0A-2B7945E3A077}"/>
               </a:ext>
             </a:extLst>
           </p:cNvPr>
@@ -7835,7 +7832,7 @@
           <p:cNvPr id="41" name="TextBox 40">
             <a:extLst>
               <a:ext uri="{FF2B5EF4-FFF2-40B4-BE49-F238E27FC236}">
-                <a16:creationId xmlns:a16="http://schemas.microsoft.com/office/drawing/2014/main" id="{067D5DB3-C55C-4D8A-89FD-2A4CD21598C5}"/>
+                <a16:creationId xmlns:a16="http://schemas.microsoft.com/office/drawing/2014/main" xmlns="" id="{067D5DB3-C55C-4D8A-89FD-2A4CD21598C5}"/>
               </a:ext>
             </a:extLst>
           </p:cNvPr>
@@ -7870,7 +7867,7 @@
           <p:cNvPr id="45" name="TextBox 44">
             <a:extLst>
               <a:ext uri="{FF2B5EF4-FFF2-40B4-BE49-F238E27FC236}">
-                <a16:creationId xmlns:a16="http://schemas.microsoft.com/office/drawing/2014/main" id="{312BB9C3-B601-4D3C-8456-0F41916C7D26}"/>
+                <a16:creationId xmlns:a16="http://schemas.microsoft.com/office/drawing/2014/main" xmlns="" id="{312BB9C3-B601-4D3C-8456-0F41916C7D26}"/>
               </a:ext>
             </a:extLst>
           </p:cNvPr>
@@ -7905,7 +7902,7 @@
           <p:cNvPr id="46" name="TextBox 45">
             <a:extLst>
               <a:ext uri="{FF2B5EF4-FFF2-40B4-BE49-F238E27FC236}">
-                <a16:creationId xmlns:a16="http://schemas.microsoft.com/office/drawing/2014/main" id="{86FD97B9-49E3-42B7-AB21-6850CF4B2081}"/>
+                <a16:creationId xmlns:a16="http://schemas.microsoft.com/office/drawing/2014/main" xmlns="" id="{86FD97B9-49E3-42B7-AB21-6850CF4B2081}"/>
               </a:ext>
             </a:extLst>
           </p:cNvPr>
@@ -7940,7 +7937,7 @@
           <p:cNvPr id="50" name="Rectangle 49">
             <a:extLst>
               <a:ext uri="{FF2B5EF4-FFF2-40B4-BE49-F238E27FC236}">
-                <a16:creationId xmlns:a16="http://schemas.microsoft.com/office/drawing/2014/main" id="{A9163D93-520B-4E65-A557-35D98D084B8A}"/>
+                <a16:creationId xmlns:a16="http://schemas.microsoft.com/office/drawing/2014/main" xmlns="" id="{A9163D93-520B-4E65-A557-35D98D084B8A}"/>
               </a:ext>
             </a:extLst>
           </p:cNvPr>
@@ -7993,7 +7990,7 @@
           <p:cNvPr id="51" name="Connector: Elbow 50">
             <a:extLst>
               <a:ext uri="{FF2B5EF4-FFF2-40B4-BE49-F238E27FC236}">
-                <a16:creationId xmlns:a16="http://schemas.microsoft.com/office/drawing/2014/main" id="{F3D8DFA2-C1E2-4373-A2F9-2122211B7CAB}"/>
+                <a16:creationId xmlns:a16="http://schemas.microsoft.com/office/drawing/2014/main" xmlns="" id="{F3D8DFA2-C1E2-4373-A2F9-2122211B7CAB}"/>
               </a:ext>
             </a:extLst>
           </p:cNvPr>
@@ -8038,7 +8035,7 @@
           <p:cNvPr id="55" name="TextBox 54">
             <a:extLst>
               <a:ext uri="{FF2B5EF4-FFF2-40B4-BE49-F238E27FC236}">
-                <a16:creationId xmlns:a16="http://schemas.microsoft.com/office/drawing/2014/main" id="{30A842BA-3F1C-4DE9-86F9-282669FBEE29}"/>
+                <a16:creationId xmlns:a16="http://schemas.microsoft.com/office/drawing/2014/main" xmlns="" id="{30A842BA-3F1C-4DE9-86F9-282669FBEE29}"/>
               </a:ext>
             </a:extLst>
           </p:cNvPr>
@@ -8079,7 +8076,7 @@
           <p:cNvPr id="56" name="Rectangle 55">
             <a:extLst>
               <a:ext uri="{FF2B5EF4-FFF2-40B4-BE49-F238E27FC236}">
-                <a16:creationId xmlns:a16="http://schemas.microsoft.com/office/drawing/2014/main" id="{6D75D475-06B9-44A3-92FE-ED96EA1E4978}"/>
+                <a16:creationId xmlns:a16="http://schemas.microsoft.com/office/drawing/2014/main" xmlns="" id="{6D75D475-06B9-44A3-92FE-ED96EA1E4978}"/>
               </a:ext>
             </a:extLst>
           </p:cNvPr>
@@ -8137,7 +8134,7 @@
           <p:cNvPr id="63" name="Straight Arrow Connector 62">
             <a:extLst>
               <a:ext uri="{FF2B5EF4-FFF2-40B4-BE49-F238E27FC236}">
-                <a16:creationId xmlns:a16="http://schemas.microsoft.com/office/drawing/2014/main" id="{E7100880-5040-4C7F-9262-C2CEA4F51398}"/>
+                <a16:creationId xmlns:a16="http://schemas.microsoft.com/office/drawing/2014/main" xmlns="" id="{E7100880-5040-4C7F-9262-C2CEA4F51398}"/>
               </a:ext>
             </a:extLst>
           </p:cNvPr>
@@ -8181,7 +8178,7 @@
           <p:cNvPr id="67" name="TextBox 66">
             <a:extLst>
               <a:ext uri="{FF2B5EF4-FFF2-40B4-BE49-F238E27FC236}">
-                <a16:creationId xmlns:a16="http://schemas.microsoft.com/office/drawing/2014/main" id="{1EA0612B-38D3-44A7-AA9B-7E50E02E7D7F}"/>
+                <a16:creationId xmlns:a16="http://schemas.microsoft.com/office/drawing/2014/main" xmlns="" id="{1EA0612B-38D3-44A7-AA9B-7E50E02E7D7F}"/>
               </a:ext>
             </a:extLst>
           </p:cNvPr>
@@ -8216,7 +8213,7 @@
           <p:cNvPr id="71" name="TextBox 70">
             <a:extLst>
               <a:ext uri="{FF2B5EF4-FFF2-40B4-BE49-F238E27FC236}">
-                <a16:creationId xmlns:a16="http://schemas.microsoft.com/office/drawing/2014/main" id="{51E6A0BF-B978-415A-8FE1-547ACFB66EE3}"/>
+                <a16:creationId xmlns:a16="http://schemas.microsoft.com/office/drawing/2014/main" xmlns="" id="{51E6A0BF-B978-415A-8FE1-547ACFB66EE3}"/>
               </a:ext>
             </a:extLst>
           </p:cNvPr>
@@ -8251,7 +8248,7 @@
           <p:cNvPr id="84" name="Arrow: Right 83">
             <a:extLst>
               <a:ext uri="{FF2B5EF4-FFF2-40B4-BE49-F238E27FC236}">
-                <a16:creationId xmlns:a16="http://schemas.microsoft.com/office/drawing/2014/main" id="{FD9B5306-DCDF-4314-AFD1-058BC3BE2246}"/>
+                <a16:creationId xmlns:a16="http://schemas.microsoft.com/office/drawing/2014/main" xmlns="" id="{FD9B5306-DCDF-4314-AFD1-058BC3BE2246}"/>
               </a:ext>
             </a:extLst>
           </p:cNvPr>
@@ -8296,7 +8293,7 @@
           <p:cNvPr id="85" name="TextBox 84">
             <a:extLst>
               <a:ext uri="{FF2B5EF4-FFF2-40B4-BE49-F238E27FC236}">
-                <a16:creationId xmlns:a16="http://schemas.microsoft.com/office/drawing/2014/main" id="{724A1DC2-31CF-4E96-B996-C14597AF95C5}"/>
+                <a16:creationId xmlns:a16="http://schemas.microsoft.com/office/drawing/2014/main" xmlns="" id="{724A1DC2-31CF-4E96-B996-C14597AF95C5}"/>
               </a:ext>
             </a:extLst>
           </p:cNvPr>
@@ -8335,7 +8332,7 @@
           <p:cNvPr id="52" name="Straight Arrow Connector 51">
             <a:extLst>
               <a:ext uri="{FF2B5EF4-FFF2-40B4-BE49-F238E27FC236}">
-                <a16:creationId xmlns:a16="http://schemas.microsoft.com/office/drawing/2014/main" id="{BE01E8DC-2BED-41DF-B0BA-E188871FFE5C}"/>
+                <a16:creationId xmlns:a16="http://schemas.microsoft.com/office/drawing/2014/main" xmlns="" id="{BE01E8DC-2BED-41DF-B0BA-E188871FFE5C}"/>
               </a:ext>
             </a:extLst>
           </p:cNvPr>
@@ -8379,7 +8376,7 @@
           <p:cNvPr id="53" name="Straight Arrow Connector 52">
             <a:extLst>
               <a:ext uri="{FF2B5EF4-FFF2-40B4-BE49-F238E27FC236}">
-                <a16:creationId xmlns:a16="http://schemas.microsoft.com/office/drawing/2014/main" id="{EAA24497-0FA2-42C5-A7FB-8AD8047B3277}"/>
+                <a16:creationId xmlns:a16="http://schemas.microsoft.com/office/drawing/2014/main" xmlns="" id="{EAA24497-0FA2-42C5-A7FB-8AD8047B3277}"/>
               </a:ext>
             </a:extLst>
           </p:cNvPr>
@@ -8424,7 +8421,7 @@
           <p:cNvPr id="59" name="Straight Arrow Connector 58">
             <a:extLst>
               <a:ext uri="{FF2B5EF4-FFF2-40B4-BE49-F238E27FC236}">
-                <a16:creationId xmlns:a16="http://schemas.microsoft.com/office/drawing/2014/main" id="{1D187BC3-0578-4FE7-868C-BE0528891B6D}"/>
+                <a16:creationId xmlns:a16="http://schemas.microsoft.com/office/drawing/2014/main" xmlns="" id="{1D187BC3-0578-4FE7-868C-BE0528891B6D}"/>
               </a:ext>
             </a:extLst>
           </p:cNvPr>
@@ -8468,7 +8465,7 @@
           <p:cNvPr id="69" name="Connector: Elbow 68">
             <a:extLst>
               <a:ext uri="{FF2B5EF4-FFF2-40B4-BE49-F238E27FC236}">
-                <a16:creationId xmlns:a16="http://schemas.microsoft.com/office/drawing/2014/main" id="{19C36ADA-8B83-4190-BF2D-7776696199EF}"/>
+                <a16:creationId xmlns:a16="http://schemas.microsoft.com/office/drawing/2014/main" xmlns="" id="{19C36ADA-8B83-4190-BF2D-7776696199EF}"/>
               </a:ext>
             </a:extLst>
           </p:cNvPr>
@@ -8514,7 +8511,7 @@
           <p:cNvPr id="74" name="TextBox 73">
             <a:extLst>
               <a:ext uri="{FF2B5EF4-FFF2-40B4-BE49-F238E27FC236}">
-                <a16:creationId xmlns:a16="http://schemas.microsoft.com/office/drawing/2014/main" id="{1CBD3C37-190F-4E45-9C00-A714AD23595B}"/>
+                <a16:creationId xmlns:a16="http://schemas.microsoft.com/office/drawing/2014/main" xmlns="" id="{1CBD3C37-190F-4E45-9C00-A714AD23595B}"/>
               </a:ext>
             </a:extLst>
           </p:cNvPr>
@@ -8549,7 +8546,7 @@
           <p:cNvPr id="37" name="Rectangle 36">
             <a:extLst>
               <a:ext uri="{FF2B5EF4-FFF2-40B4-BE49-F238E27FC236}">
-                <a16:creationId xmlns:a16="http://schemas.microsoft.com/office/drawing/2014/main" id="{41463EDA-EAE6-4ED6-BAE2-7D20C34584DA}"/>
+                <a16:creationId xmlns:a16="http://schemas.microsoft.com/office/drawing/2014/main" xmlns="" id="{41463EDA-EAE6-4ED6-BAE2-7D20C34584DA}"/>
               </a:ext>
             </a:extLst>
           </p:cNvPr>
@@ -8597,7 +8594,7 @@
           <p:cNvPr id="38" name="Rectangle 37">
             <a:extLst>
               <a:ext uri="{FF2B5EF4-FFF2-40B4-BE49-F238E27FC236}">
-                <a16:creationId xmlns:a16="http://schemas.microsoft.com/office/drawing/2014/main" id="{FE4F45C9-3D84-4BA5-8A52-382514D6080D}"/>
+                <a16:creationId xmlns:a16="http://schemas.microsoft.com/office/drawing/2014/main" xmlns="" id="{FE4F45C9-3D84-4BA5-8A52-382514D6080D}"/>
               </a:ext>
             </a:extLst>
           </p:cNvPr>
@@ -8648,7 +8645,7 @@
           <p:cNvPr id="54" name="Straight Arrow Connector 53">
             <a:extLst>
               <a:ext uri="{FF2B5EF4-FFF2-40B4-BE49-F238E27FC236}">
-                <a16:creationId xmlns:a16="http://schemas.microsoft.com/office/drawing/2014/main" id="{B4E8CEBB-BF80-4D42-91F3-781CDD370EEF}"/>
+                <a16:creationId xmlns:a16="http://schemas.microsoft.com/office/drawing/2014/main" xmlns="" id="{B4E8CEBB-BF80-4D42-91F3-781CDD370EEF}"/>
               </a:ext>
             </a:extLst>
           </p:cNvPr>
@@ -8692,7 +8689,7 @@
           <p:cNvPr id="60" name="Straight Arrow Connector 59">
             <a:extLst>
               <a:ext uri="{FF2B5EF4-FFF2-40B4-BE49-F238E27FC236}">
-                <a16:creationId xmlns:a16="http://schemas.microsoft.com/office/drawing/2014/main" id="{1124F173-25BC-47F6-B4D4-175D55CDD154}"/>
+                <a16:creationId xmlns:a16="http://schemas.microsoft.com/office/drawing/2014/main" xmlns="" id="{1124F173-25BC-47F6-B4D4-175D55CDD154}"/>
               </a:ext>
             </a:extLst>
           </p:cNvPr>
@@ -8736,7 +8733,7 @@
           <p:cNvPr id="64" name="TextBox 63">
             <a:extLst>
               <a:ext uri="{FF2B5EF4-FFF2-40B4-BE49-F238E27FC236}">
-                <a16:creationId xmlns:a16="http://schemas.microsoft.com/office/drawing/2014/main" id="{DB9284FD-C58A-4AD6-8A2C-32A75264A8C8}"/>
+                <a16:creationId xmlns:a16="http://schemas.microsoft.com/office/drawing/2014/main" xmlns="" id="{DB9284FD-C58A-4AD6-8A2C-32A75264A8C8}"/>
               </a:ext>
             </a:extLst>
           </p:cNvPr>
@@ -8771,7 +8768,7 @@
           <p:cNvPr id="65" name="TextBox 64">
             <a:extLst>
               <a:ext uri="{FF2B5EF4-FFF2-40B4-BE49-F238E27FC236}">
-                <a16:creationId xmlns:a16="http://schemas.microsoft.com/office/drawing/2014/main" id="{47FA08B7-1F99-449B-BA71-170418030C03}"/>
+                <a16:creationId xmlns:a16="http://schemas.microsoft.com/office/drawing/2014/main" xmlns="" id="{47FA08B7-1F99-449B-BA71-170418030C03}"/>
               </a:ext>
             </a:extLst>
           </p:cNvPr>
@@ -8836,7 +8833,7 @@
           <p:cNvPr id="2" name="Picture 1">
             <a:extLst>
               <a:ext uri="{FF2B5EF4-FFF2-40B4-BE49-F238E27FC236}">
-                <a16:creationId xmlns:a16="http://schemas.microsoft.com/office/drawing/2014/main" id="{A1D3969D-3A4E-432A-8D97-1198D0592C67}"/>
+                <a16:creationId xmlns:a16="http://schemas.microsoft.com/office/drawing/2014/main" xmlns="" id="{A1D3969D-3A4E-432A-8D97-1198D0592C67}"/>
               </a:ext>
             </a:extLst>
           </p:cNvPr>
@@ -8873,6 +8870,805 @@
     <p:extLst>
       <p:ext uri="{BB962C8B-B14F-4D97-AF65-F5344CB8AC3E}">
         <p14:creationId xmlns:p14="http://schemas.microsoft.com/office/powerpoint/2010/main" val="3735347647"/>
+      </p:ext>
+    </p:extLst>
+  </p:cSld>
+  <p:clrMapOvr>
+    <a:masterClrMapping/>
+  </p:clrMapOvr>
+</p:sld>
+</file>
+
+<file path=ppt/slides/slide4.xml><?xml version="1.0" encoding="utf-8"?>
+<p:sld xmlns:a="http://schemas.openxmlformats.org/drawingml/2006/main" xmlns:r="http://schemas.openxmlformats.org/officeDocument/2006/relationships" xmlns:p="http://schemas.openxmlformats.org/presentationml/2006/main">
+  <p:cSld>
+    <p:spTree>
+      <p:nvGrpSpPr>
+        <p:cNvPr id="1" name=""/>
+        <p:cNvGrpSpPr/>
+        <p:nvPr/>
+      </p:nvGrpSpPr>
+      <p:grpSpPr>
+        <a:xfrm>
+          <a:off x="0" y="0"/>
+          <a:ext cx="0" cy="0"/>
+          <a:chOff x="0" y="0"/>
+          <a:chExt cx="0" cy="0"/>
+        </a:xfrm>
+      </p:grpSpPr>
+      <p:sp>
+        <p:nvSpPr>
+          <p:cNvPr id="2" name="Rectangle 1">
+            <a:extLst>
+              <a:ext uri="{FF2B5EF4-FFF2-40B4-BE49-F238E27FC236}">
+                <a16:creationId xmlns:a16="http://schemas.microsoft.com/office/drawing/2014/main" xmlns="" id="{F6A74462-8F47-4B8F-BE38-FAEA0C91AD42}"/>
+              </a:ext>
+            </a:extLst>
+          </p:cNvPr>
+          <p:cNvSpPr/>
+          <p:nvPr/>
+        </p:nvSpPr>
+        <p:spPr>
+          <a:xfrm>
+            <a:off x="7116519" y="2780730"/>
+            <a:ext cx="2212622" cy="733778"/>
+          </a:xfrm>
+          <a:prstGeom prst="rect">
+            <a:avLst/>
+          </a:prstGeom>
+        </p:spPr>
+        <p:style>
+          <a:lnRef idx="1">
+            <a:schemeClr val="accent5"/>
+          </a:lnRef>
+          <a:fillRef idx="2">
+            <a:schemeClr val="accent5"/>
+          </a:fillRef>
+          <a:effectRef idx="1">
+            <a:schemeClr val="accent5"/>
+          </a:effectRef>
+          <a:fontRef idx="minor">
+            <a:schemeClr val="dk1"/>
+          </a:fontRef>
+        </p:style>
+        <p:txBody>
+          <a:bodyPr rtlCol="0" anchor="ctr"/>
+          <a:lstStyle/>
+          <a:p>
+            <a:pPr algn="ctr"/>
+            <a:r>
+              <a:rPr lang="en-US" b="1" dirty="0"/>
+              <a:t>codal-samd21</a:t>
+            </a:r>
+          </a:p>
+        </p:txBody>
+      </p:sp>
+      <p:sp>
+        <p:nvSpPr>
+          <p:cNvPr id="3" name="Rectangle 2">
+            <a:extLst>
+              <a:ext uri="{FF2B5EF4-FFF2-40B4-BE49-F238E27FC236}">
+                <a16:creationId xmlns:a16="http://schemas.microsoft.com/office/drawing/2014/main" xmlns="" id="{B31A5C86-C059-4E4F-A36D-7C43FC1208A0}"/>
+              </a:ext>
+            </a:extLst>
+          </p:cNvPr>
+          <p:cNvSpPr/>
+          <p:nvPr/>
+        </p:nvSpPr>
+        <p:spPr>
+          <a:xfrm>
+            <a:off x="3064921" y="2546563"/>
+            <a:ext cx="2227612" cy="807156"/>
+          </a:xfrm>
+          <a:prstGeom prst="rect">
+            <a:avLst/>
+          </a:prstGeom>
+        </p:spPr>
+        <p:style>
+          <a:lnRef idx="1">
+            <a:schemeClr val="accent5"/>
+          </a:lnRef>
+          <a:fillRef idx="2">
+            <a:schemeClr val="accent5"/>
+          </a:fillRef>
+          <a:effectRef idx="1">
+            <a:schemeClr val="accent5"/>
+          </a:effectRef>
+          <a:fontRef idx="minor">
+            <a:schemeClr val="dk1"/>
+          </a:fontRef>
+        </p:style>
+        <p:txBody>
+          <a:bodyPr rtlCol="0" anchor="ctr"/>
+          <a:lstStyle/>
+          <a:p>
+            <a:pPr algn="ctr"/>
+            <a:r>
+              <a:rPr lang="en-US" b="1" dirty="0"/>
+              <a:t>codal-atmega328p</a:t>
+            </a:r>
+          </a:p>
+        </p:txBody>
+      </p:sp>
+      <p:sp>
+        <p:nvSpPr>
+          <p:cNvPr id="4" name="Rectangle 3">
+            <a:extLst>
+              <a:ext uri="{FF2B5EF4-FFF2-40B4-BE49-F238E27FC236}">
+                <a16:creationId xmlns:a16="http://schemas.microsoft.com/office/drawing/2014/main" xmlns="" id="{3B5562F6-BD36-484D-B513-EA4AFBF6A46D}"/>
+              </a:ext>
+            </a:extLst>
+          </p:cNvPr>
+          <p:cNvSpPr/>
+          <p:nvPr/>
+        </p:nvSpPr>
+        <p:spPr>
+          <a:xfrm>
+            <a:off x="4645383" y="185275"/>
+            <a:ext cx="2212622" cy="733778"/>
+          </a:xfrm>
+          <a:prstGeom prst="rect">
+            <a:avLst/>
+          </a:prstGeom>
+        </p:spPr>
+        <p:style>
+          <a:lnRef idx="1">
+            <a:schemeClr val="accent5"/>
+          </a:lnRef>
+          <a:fillRef idx="2">
+            <a:schemeClr val="accent5"/>
+          </a:fillRef>
+          <a:effectRef idx="1">
+            <a:schemeClr val="accent5"/>
+          </a:effectRef>
+          <a:fontRef idx="minor">
+            <a:schemeClr val="dk1"/>
+          </a:fontRef>
+        </p:style>
+        <p:txBody>
+          <a:bodyPr rtlCol="0" anchor="ctr"/>
+          <a:lstStyle/>
+          <a:p>
+            <a:pPr algn="ctr"/>
+            <a:r>
+              <a:rPr lang="en-US" b="1" dirty="0" err="1"/>
+              <a:t>codal</a:t>
+            </a:r>
+            <a:endParaRPr lang="en-US" b="1" dirty="0"/>
+          </a:p>
+          <a:p>
+            <a:pPr algn="ctr"/>
+            <a:r>
+              <a:rPr lang="en-US" b="1" dirty="0"/>
+              <a:t>(build shell)</a:t>
+            </a:r>
+          </a:p>
+        </p:txBody>
+      </p:sp>
+      <p:cxnSp>
+        <p:nvCxnSpPr>
+          <p:cNvPr id="5" name="Connector: Elbow 15">
+            <a:extLst>
+              <a:ext uri="{FF2B5EF4-FFF2-40B4-BE49-F238E27FC236}">
+                <a16:creationId xmlns:a16="http://schemas.microsoft.com/office/drawing/2014/main" xmlns="" id="{8311314B-2261-48F7-8392-22D61FC10F4C}"/>
+              </a:ext>
+            </a:extLst>
+          </p:cNvPr>
+          <p:cNvCxnSpPr>
+            <a:stCxn id="23" idx="2"/>
+            <a:endCxn id="16" idx="0"/>
+          </p:cNvCxnSpPr>
+          <p:nvPr/>
+        </p:nvCxnSpPr>
+        <p:spPr>
+          <a:xfrm rot="16200000" flipH="1">
+            <a:off x="8347114" y="4752587"/>
+            <a:ext cx="939079" cy="1187647"/>
+          </a:xfrm>
+          <a:prstGeom prst="bentConnector3">
+            <a:avLst>
+              <a:gd name="adj1" fmla="val 50000"/>
+            </a:avLst>
+          </a:prstGeom>
+          <a:ln w="28575">
+            <a:headEnd type="triangle" w="lg" len="lg"/>
+            <a:tailEnd type="none"/>
+          </a:ln>
+        </p:spPr>
+        <p:style>
+          <a:lnRef idx="1">
+            <a:schemeClr val="accent1"/>
+          </a:lnRef>
+          <a:fillRef idx="0">
+            <a:schemeClr val="accent1"/>
+          </a:fillRef>
+          <a:effectRef idx="0">
+            <a:schemeClr val="accent1"/>
+          </a:effectRef>
+          <a:fontRef idx="minor">
+            <a:schemeClr val="tx1"/>
+          </a:fontRef>
+        </p:style>
+      </p:cxnSp>
+      <p:cxnSp>
+        <p:nvCxnSpPr>
+          <p:cNvPr id="6" name="Connector: Elbow 16">
+            <a:extLst>
+              <a:ext uri="{FF2B5EF4-FFF2-40B4-BE49-F238E27FC236}">
+                <a16:creationId xmlns:a16="http://schemas.microsoft.com/office/drawing/2014/main" xmlns="" id="{433064AB-FEF6-4A7D-AAAE-AB72F5F2430F}"/>
+              </a:ext>
+            </a:extLst>
+          </p:cNvPr>
+          <p:cNvCxnSpPr>
+            <a:cxnSpLocks/>
+            <a:stCxn id="23" idx="2"/>
+            <a:endCxn id="24" idx="0"/>
+          </p:cNvCxnSpPr>
+          <p:nvPr/>
+        </p:nvCxnSpPr>
+        <p:spPr>
+          <a:xfrm rot="5400000">
+            <a:off x="7070879" y="4663999"/>
+            <a:ext cx="939079" cy="1364825"/>
+          </a:xfrm>
+          <a:prstGeom prst="bentConnector3">
+            <a:avLst>
+              <a:gd name="adj1" fmla="val 50000"/>
+            </a:avLst>
+          </a:prstGeom>
+          <a:ln w="28575">
+            <a:headEnd type="triangle" w="lg" len="lg"/>
+            <a:tailEnd type="none"/>
+          </a:ln>
+        </p:spPr>
+        <p:style>
+          <a:lnRef idx="1">
+            <a:schemeClr val="accent1"/>
+          </a:lnRef>
+          <a:fillRef idx="0">
+            <a:schemeClr val="accent1"/>
+          </a:fillRef>
+          <a:effectRef idx="0">
+            <a:schemeClr val="accent1"/>
+          </a:effectRef>
+          <a:fontRef idx="minor">
+            <a:schemeClr val="tx1"/>
+          </a:fontRef>
+        </p:style>
+      </p:cxnSp>
+      <p:sp>
+        <p:nvSpPr>
+          <p:cNvPr id="7" name="Right Brace 6">
+            <a:extLst>
+              <a:ext uri="{FF2B5EF4-FFF2-40B4-BE49-F238E27FC236}">
+                <a16:creationId xmlns:a16="http://schemas.microsoft.com/office/drawing/2014/main" xmlns="" id="{C30BEFF4-A930-4D26-BC0A-2B7945E3A077}"/>
+              </a:ext>
+            </a:extLst>
+          </p:cNvPr>
+          <p:cNvSpPr/>
+          <p:nvPr/>
+        </p:nvSpPr>
+        <p:spPr>
+          <a:xfrm rot="16200000">
+            <a:off x="5934680" y="-805703"/>
+            <a:ext cx="613533" cy="4125439"/>
+          </a:xfrm>
+          <a:prstGeom prst="rightBrace">
+            <a:avLst/>
+          </a:prstGeom>
+        </p:spPr>
+        <p:style>
+          <a:lnRef idx="1">
+            <a:schemeClr val="accent1"/>
+          </a:lnRef>
+          <a:fillRef idx="0">
+            <a:schemeClr val="accent1"/>
+          </a:fillRef>
+          <a:effectRef idx="0">
+            <a:schemeClr val="accent1"/>
+          </a:effectRef>
+          <a:fontRef idx="minor">
+            <a:schemeClr val="tx1"/>
+          </a:fontRef>
+        </p:style>
+        <p:txBody>
+          <a:bodyPr rtlCol="0" anchor="ctr"/>
+          <a:lstStyle/>
+          <a:p>
+            <a:pPr algn="ctr"/>
+            <a:endParaRPr lang="en-US"/>
+          </a:p>
+        </p:txBody>
+      </p:sp>
+      <p:sp>
+        <p:nvSpPr>
+          <p:cNvPr id="10" name="Rectangle 9">
+            <a:extLst>
+              <a:ext uri="{FF2B5EF4-FFF2-40B4-BE49-F238E27FC236}">
+                <a16:creationId xmlns:a16="http://schemas.microsoft.com/office/drawing/2014/main" xmlns="" id="{41463EDA-EAE6-4ED6-BAE2-7D20C34584DA}"/>
+              </a:ext>
+            </a:extLst>
+          </p:cNvPr>
+          <p:cNvSpPr/>
+          <p:nvPr/>
+        </p:nvSpPr>
+        <p:spPr>
+          <a:xfrm>
+            <a:off x="3064921" y="1484920"/>
+            <a:ext cx="2227612" cy="655730"/>
+          </a:xfrm>
+          <a:prstGeom prst="rect">
+            <a:avLst/>
+          </a:prstGeom>
+        </p:spPr>
+        <p:style>
+          <a:lnRef idx="1">
+            <a:schemeClr val="accent5"/>
+          </a:lnRef>
+          <a:fillRef idx="2">
+            <a:schemeClr val="accent5"/>
+          </a:fillRef>
+          <a:effectRef idx="1">
+            <a:schemeClr val="accent5"/>
+          </a:effectRef>
+          <a:fontRef idx="minor">
+            <a:schemeClr val="dk1"/>
+          </a:fontRef>
+        </p:style>
+        <p:txBody>
+          <a:bodyPr rtlCol="0" anchor="ctr"/>
+          <a:lstStyle/>
+          <a:p>
+            <a:pPr algn="ctr"/>
+            <a:r>
+              <a:rPr lang="en-US" b="1" dirty="0" err="1"/>
+              <a:t>codal-arduino-uno</a:t>
+            </a:r>
+            <a:endParaRPr lang="en-US" b="1" dirty="0"/>
+          </a:p>
+        </p:txBody>
+      </p:sp>
+      <p:sp>
+        <p:nvSpPr>
+          <p:cNvPr id="11" name="Rectangle 10">
+            <a:extLst>
+              <a:ext uri="{FF2B5EF4-FFF2-40B4-BE49-F238E27FC236}">
+                <a16:creationId xmlns:a16="http://schemas.microsoft.com/office/drawing/2014/main" xmlns="" id="{FE4F45C9-3D84-4BA5-8A52-382514D6080D}"/>
+              </a:ext>
+            </a:extLst>
+          </p:cNvPr>
+          <p:cNvSpPr/>
+          <p:nvPr/>
+        </p:nvSpPr>
+        <p:spPr>
+          <a:xfrm>
+            <a:off x="7116520" y="1484920"/>
+            <a:ext cx="2212621" cy="669219"/>
+          </a:xfrm>
+          <a:prstGeom prst="rect">
+            <a:avLst/>
+          </a:prstGeom>
+        </p:spPr>
+        <p:style>
+          <a:lnRef idx="1">
+            <a:schemeClr val="accent5"/>
+          </a:lnRef>
+          <a:fillRef idx="2">
+            <a:schemeClr val="accent5"/>
+          </a:fillRef>
+          <a:effectRef idx="1">
+            <a:schemeClr val="accent5"/>
+          </a:effectRef>
+          <a:fontRef idx="minor">
+            <a:schemeClr val="dk1"/>
+          </a:fontRef>
+        </p:style>
+        <p:txBody>
+          <a:bodyPr rtlCol="0" anchor="ctr"/>
+          <a:lstStyle/>
+          <a:p>
+            <a:pPr algn="ctr"/>
+            <a:r>
+              <a:rPr lang="en-US" b="1" dirty="0" err="1"/>
+              <a:t>codal</a:t>
+            </a:r>
+            <a:r>
+              <a:rPr lang="en-US" b="1" dirty="0"/>
+              <a:t>-circuit-playground</a:t>
+            </a:r>
+          </a:p>
+        </p:txBody>
+      </p:sp>
+      <p:sp>
+        <p:nvSpPr>
+          <p:cNvPr id="16" name="Rectangle 15">
+            <a:extLst>
+              <a:ext uri="{FF2B5EF4-FFF2-40B4-BE49-F238E27FC236}">
+                <a16:creationId xmlns:a16="http://schemas.microsoft.com/office/drawing/2014/main" xmlns="" id="{0C2BA48E-758E-4035-B49C-4F47EB965891}"/>
+              </a:ext>
+            </a:extLst>
+          </p:cNvPr>
+          <p:cNvSpPr/>
+          <p:nvPr/>
+        </p:nvSpPr>
+        <p:spPr>
+          <a:xfrm>
+            <a:off x="8304166" y="5815951"/>
+            <a:ext cx="2212622" cy="733778"/>
+          </a:xfrm>
+          <a:prstGeom prst="rect">
+            <a:avLst/>
+          </a:prstGeom>
+        </p:spPr>
+        <p:style>
+          <a:lnRef idx="1">
+            <a:schemeClr val="accent5"/>
+          </a:lnRef>
+          <a:fillRef idx="2">
+            <a:schemeClr val="accent5"/>
+          </a:fillRef>
+          <a:effectRef idx="1">
+            <a:schemeClr val="accent5"/>
+          </a:effectRef>
+          <a:fontRef idx="minor">
+            <a:schemeClr val="dk1"/>
+          </a:fontRef>
+        </p:style>
+        <p:txBody>
+          <a:bodyPr rtlCol="0" anchor="ctr"/>
+          <a:lstStyle/>
+          <a:p>
+            <a:pPr algn="ctr"/>
+            <a:r>
+              <a:rPr lang="en-US" b="1" dirty="0" err="1"/>
+              <a:t>m</a:t>
+            </a:r>
+            <a:r>
+              <a:rPr lang="en-US" b="1" dirty="0" err="1" smtClean="0"/>
+              <a:t>bed</a:t>
+            </a:r>
+            <a:r>
+              <a:rPr lang="en-US" b="1" dirty="0" smtClean="0"/>
+              <a:t>-classic</a:t>
+            </a:r>
+            <a:endParaRPr lang="en-US" b="1" dirty="0"/>
+          </a:p>
+        </p:txBody>
+      </p:sp>
+      <p:sp>
+        <p:nvSpPr>
+          <p:cNvPr id="23" name="Rectangle 22">
+            <a:extLst>
+              <a:ext uri="{FF2B5EF4-FFF2-40B4-BE49-F238E27FC236}">
+                <a16:creationId xmlns:a16="http://schemas.microsoft.com/office/drawing/2014/main" xmlns="" id="{F6A74462-8F47-4B8F-BE38-FAEA0C91AD42}"/>
+              </a:ext>
+            </a:extLst>
+          </p:cNvPr>
+          <p:cNvSpPr/>
+          <p:nvPr/>
+        </p:nvSpPr>
+        <p:spPr>
+          <a:xfrm>
+            <a:off x="7116519" y="4143094"/>
+            <a:ext cx="2212622" cy="733778"/>
+          </a:xfrm>
+          <a:prstGeom prst="rect">
+            <a:avLst/>
+          </a:prstGeom>
+        </p:spPr>
+        <p:style>
+          <a:lnRef idx="1">
+            <a:schemeClr val="accent5"/>
+          </a:lnRef>
+          <a:fillRef idx="2">
+            <a:schemeClr val="accent5"/>
+          </a:fillRef>
+          <a:effectRef idx="1">
+            <a:schemeClr val="accent5"/>
+          </a:effectRef>
+          <a:fontRef idx="minor">
+            <a:schemeClr val="dk1"/>
+          </a:fontRef>
+        </p:style>
+        <p:txBody>
+          <a:bodyPr rtlCol="0" anchor="ctr"/>
+          <a:lstStyle/>
+          <a:p>
+            <a:pPr algn="ctr"/>
+            <a:r>
+              <a:rPr lang="en-US" b="1" dirty="0" err="1" smtClean="0"/>
+              <a:t>codal-mbed</a:t>
+            </a:r>
+            <a:endParaRPr lang="en-US" b="1" dirty="0"/>
+          </a:p>
+        </p:txBody>
+      </p:sp>
+      <p:sp>
+        <p:nvSpPr>
+          <p:cNvPr id="24" name="Rectangle 23">
+            <a:extLst>
+              <a:ext uri="{FF2B5EF4-FFF2-40B4-BE49-F238E27FC236}">
+                <a16:creationId xmlns:a16="http://schemas.microsoft.com/office/drawing/2014/main" xmlns="" id="{0C2BA48E-758E-4035-B49C-4F47EB965891}"/>
+              </a:ext>
+            </a:extLst>
+          </p:cNvPr>
+          <p:cNvSpPr/>
+          <p:nvPr/>
+        </p:nvSpPr>
+        <p:spPr>
+          <a:xfrm>
+            <a:off x="5751694" y="5815951"/>
+            <a:ext cx="2212622" cy="733778"/>
+          </a:xfrm>
+          <a:prstGeom prst="rect">
+            <a:avLst/>
+          </a:prstGeom>
+        </p:spPr>
+        <p:style>
+          <a:lnRef idx="1">
+            <a:schemeClr val="accent5"/>
+          </a:lnRef>
+          <a:fillRef idx="2">
+            <a:schemeClr val="accent5"/>
+          </a:fillRef>
+          <a:effectRef idx="1">
+            <a:schemeClr val="accent5"/>
+          </a:effectRef>
+          <a:fontRef idx="minor">
+            <a:schemeClr val="dk1"/>
+          </a:fontRef>
+        </p:style>
+        <p:txBody>
+          <a:bodyPr rtlCol="0" anchor="ctr"/>
+          <a:lstStyle/>
+          <a:p>
+            <a:pPr algn="ctr"/>
+            <a:r>
+              <a:rPr lang="en-US" b="1" dirty="0" err="1"/>
+              <a:t>codal</a:t>
+            </a:r>
+            <a:r>
+              <a:rPr lang="en-US" b="1" dirty="0"/>
+              <a:t>-core</a:t>
+            </a:r>
+          </a:p>
+        </p:txBody>
+      </p:sp>
+      <p:cxnSp>
+        <p:nvCxnSpPr>
+          <p:cNvPr id="198" name="Connector: Elbow 15">
+            <a:extLst>
+              <a:ext uri="{FF2B5EF4-FFF2-40B4-BE49-F238E27FC236}">
+                <a16:creationId xmlns:a16="http://schemas.microsoft.com/office/drawing/2014/main" xmlns="" id="{8311314B-2261-48F7-8392-22D61FC10F4C}"/>
+              </a:ext>
+            </a:extLst>
+          </p:cNvPr>
+          <p:cNvCxnSpPr>
+            <a:stCxn id="2" idx="2"/>
+            <a:endCxn id="23" idx="0"/>
+          </p:cNvCxnSpPr>
+          <p:nvPr/>
+        </p:nvCxnSpPr>
+        <p:spPr>
+          <a:xfrm rot="5400000">
+            <a:off x="7908537" y="3828801"/>
+            <a:ext cx="628586" cy="12700"/>
+          </a:xfrm>
+          <a:prstGeom prst="bentConnector3">
+            <a:avLst>
+              <a:gd name="adj1" fmla="val 50000"/>
+            </a:avLst>
+          </a:prstGeom>
+          <a:ln w="28575">
+            <a:headEnd type="triangle" w="lg" len="lg"/>
+            <a:tailEnd type="none"/>
+          </a:ln>
+        </p:spPr>
+        <p:style>
+          <a:lnRef idx="1">
+            <a:schemeClr val="accent1"/>
+          </a:lnRef>
+          <a:fillRef idx="0">
+            <a:schemeClr val="accent1"/>
+          </a:fillRef>
+          <a:effectRef idx="0">
+            <a:schemeClr val="accent1"/>
+          </a:effectRef>
+          <a:fontRef idx="minor">
+            <a:schemeClr val="tx1"/>
+          </a:fontRef>
+        </p:style>
+      </p:cxnSp>
+      <p:cxnSp>
+        <p:nvCxnSpPr>
+          <p:cNvPr id="201" name="Connector: Elbow 15">
+            <a:extLst>
+              <a:ext uri="{FF2B5EF4-FFF2-40B4-BE49-F238E27FC236}">
+                <a16:creationId xmlns:a16="http://schemas.microsoft.com/office/drawing/2014/main" xmlns="" id="{8311314B-2261-48F7-8392-22D61FC10F4C}"/>
+              </a:ext>
+            </a:extLst>
+          </p:cNvPr>
+          <p:cNvCxnSpPr>
+            <a:stCxn id="11" idx="2"/>
+            <a:endCxn id="2" idx="0"/>
+          </p:cNvCxnSpPr>
+          <p:nvPr/>
+        </p:nvCxnSpPr>
+        <p:spPr>
+          <a:xfrm rot="5400000">
+            <a:off x="7909536" y="2467434"/>
+            <a:ext cx="626591" cy="1"/>
+          </a:xfrm>
+          <a:prstGeom prst="bentConnector3">
+            <a:avLst>
+              <a:gd name="adj1" fmla="val 50000"/>
+            </a:avLst>
+          </a:prstGeom>
+          <a:ln w="28575">
+            <a:headEnd type="triangle" w="lg" len="lg"/>
+            <a:tailEnd type="none"/>
+          </a:ln>
+        </p:spPr>
+        <p:style>
+          <a:lnRef idx="1">
+            <a:schemeClr val="accent1"/>
+          </a:lnRef>
+          <a:fillRef idx="0">
+            <a:schemeClr val="accent1"/>
+          </a:fillRef>
+          <a:effectRef idx="0">
+            <a:schemeClr val="accent1"/>
+          </a:effectRef>
+          <a:fontRef idx="minor">
+            <a:schemeClr val="tx1"/>
+          </a:fontRef>
+        </p:style>
+      </p:cxnSp>
+      <p:sp>
+        <p:nvSpPr>
+          <p:cNvPr id="208" name="Rectangle 207">
+            <a:extLst>
+              <a:ext uri="{FF2B5EF4-FFF2-40B4-BE49-F238E27FC236}">
+                <a16:creationId xmlns:a16="http://schemas.microsoft.com/office/drawing/2014/main" xmlns="" id="{0C2BA48E-758E-4035-B49C-4F47EB965891}"/>
+              </a:ext>
+            </a:extLst>
+          </p:cNvPr>
+          <p:cNvSpPr/>
+          <p:nvPr/>
+        </p:nvSpPr>
+        <p:spPr>
+          <a:xfrm>
+            <a:off x="3064921" y="3864694"/>
+            <a:ext cx="2227612" cy="733778"/>
+          </a:xfrm>
+          <a:prstGeom prst="rect">
+            <a:avLst/>
+          </a:prstGeom>
+        </p:spPr>
+        <p:style>
+          <a:lnRef idx="1">
+            <a:schemeClr val="accent5"/>
+          </a:lnRef>
+          <a:fillRef idx="2">
+            <a:schemeClr val="accent5"/>
+          </a:fillRef>
+          <a:effectRef idx="1">
+            <a:schemeClr val="accent5"/>
+          </a:effectRef>
+          <a:fontRef idx="minor">
+            <a:schemeClr val="dk1"/>
+          </a:fontRef>
+        </p:style>
+        <p:txBody>
+          <a:bodyPr rtlCol="0" anchor="ctr"/>
+          <a:lstStyle/>
+          <a:p>
+            <a:pPr algn="ctr"/>
+            <a:r>
+              <a:rPr lang="en-US" b="1" dirty="0" err="1"/>
+              <a:t>codal</a:t>
+            </a:r>
+            <a:r>
+              <a:rPr lang="en-US" b="1" dirty="0"/>
+              <a:t>-core</a:t>
+            </a:r>
+          </a:p>
+        </p:txBody>
+      </p:sp>
+      <p:cxnSp>
+        <p:nvCxnSpPr>
+          <p:cNvPr id="220" name="Connector: Elbow 15">
+            <a:extLst>
+              <a:ext uri="{FF2B5EF4-FFF2-40B4-BE49-F238E27FC236}">
+                <a16:creationId xmlns:a16="http://schemas.microsoft.com/office/drawing/2014/main" xmlns="" id="{8311314B-2261-48F7-8392-22D61FC10F4C}"/>
+              </a:ext>
+            </a:extLst>
+          </p:cNvPr>
+          <p:cNvCxnSpPr>
+            <a:stCxn id="10" idx="2"/>
+            <a:endCxn id="3" idx="0"/>
+          </p:cNvCxnSpPr>
+          <p:nvPr/>
+        </p:nvCxnSpPr>
+        <p:spPr>
+          <a:xfrm rot="5400000">
+            <a:off x="3975771" y="2343606"/>
+            <a:ext cx="405913" cy="12700"/>
+          </a:xfrm>
+          <a:prstGeom prst="bentConnector3">
+            <a:avLst>
+              <a:gd name="adj1" fmla="val 50000"/>
+            </a:avLst>
+          </a:prstGeom>
+          <a:ln w="28575">
+            <a:headEnd type="triangle" w="lg" len="lg"/>
+            <a:tailEnd type="none"/>
+          </a:ln>
+        </p:spPr>
+        <p:style>
+          <a:lnRef idx="1">
+            <a:schemeClr val="accent1"/>
+          </a:lnRef>
+          <a:fillRef idx="0">
+            <a:schemeClr val="accent1"/>
+          </a:fillRef>
+          <a:effectRef idx="0">
+            <a:schemeClr val="accent1"/>
+          </a:effectRef>
+          <a:fontRef idx="minor">
+            <a:schemeClr val="tx1"/>
+          </a:fontRef>
+        </p:style>
+      </p:cxnSp>
+      <p:cxnSp>
+        <p:nvCxnSpPr>
+          <p:cNvPr id="229" name="Connector: Elbow 15">
+            <a:extLst>
+              <a:ext uri="{FF2B5EF4-FFF2-40B4-BE49-F238E27FC236}">
+                <a16:creationId xmlns:a16="http://schemas.microsoft.com/office/drawing/2014/main" xmlns="" id="{8311314B-2261-48F7-8392-22D61FC10F4C}"/>
+              </a:ext>
+            </a:extLst>
+          </p:cNvPr>
+          <p:cNvCxnSpPr>
+            <a:stCxn id="3" idx="2"/>
+            <a:endCxn id="208" idx="0"/>
+          </p:cNvCxnSpPr>
+          <p:nvPr/>
+        </p:nvCxnSpPr>
+        <p:spPr>
+          <a:xfrm rot="5400000">
+            <a:off x="3923240" y="3609206"/>
+            <a:ext cx="510975" cy="12700"/>
+          </a:xfrm>
+          <a:prstGeom prst="bentConnector3">
+            <a:avLst>
+              <a:gd name="adj1" fmla="val 50000"/>
+            </a:avLst>
+          </a:prstGeom>
+          <a:ln w="28575">
+            <a:headEnd type="triangle" w="lg" len="lg"/>
+            <a:tailEnd type="none"/>
+          </a:ln>
+        </p:spPr>
+        <p:style>
+          <a:lnRef idx="1">
+            <a:schemeClr val="accent1"/>
+          </a:lnRef>
+          <a:fillRef idx="0">
+            <a:schemeClr val="accent1"/>
+          </a:fillRef>
+          <a:effectRef idx="0">
+            <a:schemeClr val="accent1"/>
+          </a:effectRef>
+          <a:fontRef idx="minor">
+            <a:schemeClr val="tx1"/>
+          </a:fontRef>
+        </p:style>
+      </p:cxnSp>
+    </p:spTree>
+    <p:extLst>
+      <p:ext uri="{BB962C8B-B14F-4D97-AF65-F5344CB8AC3E}">
+        <p14:creationId xmlns:p14="http://schemas.microsoft.com/office/powerpoint/2010/main" val="721992502"/>
       </p:ext>
     </p:extLst>
   </p:cSld>

</xml_diff>

<commit_message>
fix up codal picture
</commit_message>
<xml_diff>
--- a/papers/tr2017/diagrams.pptx
+++ b/papers/tr2017/diagrams.pptx
@@ -212,7 +212,7 @@
           <a:p>
             <a:fld id="{C0237B04-0BFF-4188-AE10-E77C3C5257C8}" type="datetimeFigureOut">
               <a:rPr lang="en-US" smtClean="0"/>
-              <a:t>10/17/17</a:t>
+              <a:t>10/18/2017</a:t>
             </a:fld>
             <a:endParaRPr lang="en-US"/>
           </a:p>
@@ -675,7 +675,7 @@
           <p:cNvPr id="2" name="Title 1">
             <a:extLst>
               <a:ext uri="{FF2B5EF4-FFF2-40B4-BE49-F238E27FC236}">
-                <a16:creationId xmlns:a16="http://schemas.microsoft.com/office/drawing/2014/main" xmlns="" id="{23D0BEB7-8CF9-4802-8B61-E9A110EC28D8}"/>
+                <a16:creationId xmlns:a16="http://schemas.microsoft.com/office/drawing/2014/main" id="{23D0BEB7-8CF9-4802-8B61-E9A110EC28D8}"/>
               </a:ext>
             </a:extLst>
           </p:cNvPr>
@@ -712,7 +712,7 @@
           <p:cNvPr id="3" name="Subtitle 2">
             <a:extLst>
               <a:ext uri="{FF2B5EF4-FFF2-40B4-BE49-F238E27FC236}">
-                <a16:creationId xmlns:a16="http://schemas.microsoft.com/office/drawing/2014/main" xmlns="" id="{1C55B20C-1B18-4CCD-9202-C795758DBF52}"/>
+                <a16:creationId xmlns:a16="http://schemas.microsoft.com/office/drawing/2014/main" id="{1C55B20C-1B18-4CCD-9202-C795758DBF52}"/>
               </a:ext>
             </a:extLst>
           </p:cNvPr>
@@ -782,7 +782,7 @@
           <p:cNvPr id="4" name="Date Placeholder 3">
             <a:extLst>
               <a:ext uri="{FF2B5EF4-FFF2-40B4-BE49-F238E27FC236}">
-                <a16:creationId xmlns:a16="http://schemas.microsoft.com/office/drawing/2014/main" xmlns="" id="{97B533EE-975A-4E34-AE96-2FFFFAC7A66A}"/>
+                <a16:creationId xmlns:a16="http://schemas.microsoft.com/office/drawing/2014/main" id="{97B533EE-975A-4E34-AE96-2FFFFAC7A66A}"/>
               </a:ext>
             </a:extLst>
           </p:cNvPr>
@@ -800,7 +800,7 @@
           <a:p>
             <a:fld id="{E504D85E-2087-4C48-BE7E-1A197735EA07}" type="datetimeFigureOut">
               <a:rPr lang="en-US" smtClean="0"/>
-              <a:t>10/17/17</a:t>
+              <a:t>10/18/2017</a:t>
             </a:fld>
             <a:endParaRPr lang="en-US"/>
           </a:p>
@@ -811,7 +811,7 @@
           <p:cNvPr id="5" name="Footer Placeholder 4">
             <a:extLst>
               <a:ext uri="{FF2B5EF4-FFF2-40B4-BE49-F238E27FC236}">
-                <a16:creationId xmlns:a16="http://schemas.microsoft.com/office/drawing/2014/main" xmlns="" id="{E852E278-0797-4196-9C6C-1ADF74F7B3DE}"/>
+                <a16:creationId xmlns:a16="http://schemas.microsoft.com/office/drawing/2014/main" id="{E852E278-0797-4196-9C6C-1ADF74F7B3DE}"/>
               </a:ext>
             </a:extLst>
           </p:cNvPr>
@@ -836,7 +836,7 @@
           <p:cNvPr id="6" name="Slide Number Placeholder 5">
             <a:extLst>
               <a:ext uri="{FF2B5EF4-FFF2-40B4-BE49-F238E27FC236}">
-                <a16:creationId xmlns:a16="http://schemas.microsoft.com/office/drawing/2014/main" xmlns="" id="{0D16E2FB-340F-4261-8251-B97F29FE4561}"/>
+                <a16:creationId xmlns:a16="http://schemas.microsoft.com/office/drawing/2014/main" id="{0D16E2FB-340F-4261-8251-B97F29FE4561}"/>
               </a:ext>
             </a:extLst>
           </p:cNvPr>
@@ -895,7 +895,7 @@
           <p:cNvPr id="2" name="Title 1">
             <a:extLst>
               <a:ext uri="{FF2B5EF4-FFF2-40B4-BE49-F238E27FC236}">
-                <a16:creationId xmlns:a16="http://schemas.microsoft.com/office/drawing/2014/main" xmlns="" id="{2FC0AA46-59BE-4974-A29B-3C46043FA077}"/>
+                <a16:creationId xmlns:a16="http://schemas.microsoft.com/office/drawing/2014/main" id="{2FC0AA46-59BE-4974-A29B-3C46043FA077}"/>
               </a:ext>
             </a:extLst>
           </p:cNvPr>
@@ -923,7 +923,7 @@
           <p:cNvPr id="3" name="Vertical Text Placeholder 2">
             <a:extLst>
               <a:ext uri="{FF2B5EF4-FFF2-40B4-BE49-F238E27FC236}">
-                <a16:creationId xmlns:a16="http://schemas.microsoft.com/office/drawing/2014/main" xmlns="" id="{BE1D6E24-09D8-4127-82EC-8623CB4092A8}"/>
+                <a16:creationId xmlns:a16="http://schemas.microsoft.com/office/drawing/2014/main" id="{BE1D6E24-09D8-4127-82EC-8623CB4092A8}"/>
               </a:ext>
             </a:extLst>
           </p:cNvPr>
@@ -980,7 +980,7 @@
           <p:cNvPr id="4" name="Date Placeholder 3">
             <a:extLst>
               <a:ext uri="{FF2B5EF4-FFF2-40B4-BE49-F238E27FC236}">
-                <a16:creationId xmlns:a16="http://schemas.microsoft.com/office/drawing/2014/main" xmlns="" id="{D5CA2D32-6F27-4491-BA90-2988604EB9D2}"/>
+                <a16:creationId xmlns:a16="http://schemas.microsoft.com/office/drawing/2014/main" id="{D5CA2D32-6F27-4491-BA90-2988604EB9D2}"/>
               </a:ext>
             </a:extLst>
           </p:cNvPr>
@@ -998,7 +998,7 @@
           <a:p>
             <a:fld id="{E504D85E-2087-4C48-BE7E-1A197735EA07}" type="datetimeFigureOut">
               <a:rPr lang="en-US" smtClean="0"/>
-              <a:t>10/17/17</a:t>
+              <a:t>10/18/2017</a:t>
             </a:fld>
             <a:endParaRPr lang="en-US"/>
           </a:p>
@@ -1009,7 +1009,7 @@
           <p:cNvPr id="5" name="Footer Placeholder 4">
             <a:extLst>
               <a:ext uri="{FF2B5EF4-FFF2-40B4-BE49-F238E27FC236}">
-                <a16:creationId xmlns:a16="http://schemas.microsoft.com/office/drawing/2014/main" xmlns="" id="{1B88E3C2-28E4-4FD0-AEF1-962A00BEF504}"/>
+                <a16:creationId xmlns:a16="http://schemas.microsoft.com/office/drawing/2014/main" id="{1B88E3C2-28E4-4FD0-AEF1-962A00BEF504}"/>
               </a:ext>
             </a:extLst>
           </p:cNvPr>
@@ -1034,7 +1034,7 @@
           <p:cNvPr id="6" name="Slide Number Placeholder 5">
             <a:extLst>
               <a:ext uri="{FF2B5EF4-FFF2-40B4-BE49-F238E27FC236}">
-                <a16:creationId xmlns:a16="http://schemas.microsoft.com/office/drawing/2014/main" xmlns="" id="{770F7BA1-D02F-4AA3-805D-0444F0C4E796}"/>
+                <a16:creationId xmlns:a16="http://schemas.microsoft.com/office/drawing/2014/main" id="{770F7BA1-D02F-4AA3-805D-0444F0C4E796}"/>
               </a:ext>
             </a:extLst>
           </p:cNvPr>
@@ -1093,7 +1093,7 @@
           <p:cNvPr id="2" name="Vertical Title 1">
             <a:extLst>
               <a:ext uri="{FF2B5EF4-FFF2-40B4-BE49-F238E27FC236}">
-                <a16:creationId xmlns:a16="http://schemas.microsoft.com/office/drawing/2014/main" xmlns="" id="{7C51B641-989E-460C-B0CE-859FEB83C74E}"/>
+                <a16:creationId xmlns:a16="http://schemas.microsoft.com/office/drawing/2014/main" id="{7C51B641-989E-460C-B0CE-859FEB83C74E}"/>
               </a:ext>
             </a:extLst>
           </p:cNvPr>
@@ -1126,7 +1126,7 @@
           <p:cNvPr id="3" name="Vertical Text Placeholder 2">
             <a:extLst>
               <a:ext uri="{FF2B5EF4-FFF2-40B4-BE49-F238E27FC236}">
-                <a16:creationId xmlns:a16="http://schemas.microsoft.com/office/drawing/2014/main" xmlns="" id="{C45AA5C6-CDD0-463C-AA85-95014CB173BB}"/>
+                <a16:creationId xmlns:a16="http://schemas.microsoft.com/office/drawing/2014/main" id="{C45AA5C6-CDD0-463C-AA85-95014CB173BB}"/>
               </a:ext>
             </a:extLst>
           </p:cNvPr>
@@ -1188,7 +1188,7 @@
           <p:cNvPr id="4" name="Date Placeholder 3">
             <a:extLst>
               <a:ext uri="{FF2B5EF4-FFF2-40B4-BE49-F238E27FC236}">
-                <a16:creationId xmlns:a16="http://schemas.microsoft.com/office/drawing/2014/main" xmlns="" id="{A50820FC-6AB1-49F5-B83C-FFD68439C792}"/>
+                <a16:creationId xmlns:a16="http://schemas.microsoft.com/office/drawing/2014/main" id="{A50820FC-6AB1-49F5-B83C-FFD68439C792}"/>
               </a:ext>
             </a:extLst>
           </p:cNvPr>
@@ -1206,7 +1206,7 @@
           <a:p>
             <a:fld id="{E504D85E-2087-4C48-BE7E-1A197735EA07}" type="datetimeFigureOut">
               <a:rPr lang="en-US" smtClean="0"/>
-              <a:t>10/17/17</a:t>
+              <a:t>10/18/2017</a:t>
             </a:fld>
             <a:endParaRPr lang="en-US"/>
           </a:p>
@@ -1217,7 +1217,7 @@
           <p:cNvPr id="5" name="Footer Placeholder 4">
             <a:extLst>
               <a:ext uri="{FF2B5EF4-FFF2-40B4-BE49-F238E27FC236}">
-                <a16:creationId xmlns:a16="http://schemas.microsoft.com/office/drawing/2014/main" xmlns="" id="{28633CB9-FA56-4CF6-9670-BED206E4E7D2}"/>
+                <a16:creationId xmlns:a16="http://schemas.microsoft.com/office/drawing/2014/main" id="{28633CB9-FA56-4CF6-9670-BED206E4E7D2}"/>
               </a:ext>
             </a:extLst>
           </p:cNvPr>
@@ -1242,7 +1242,7 @@
           <p:cNvPr id="6" name="Slide Number Placeholder 5">
             <a:extLst>
               <a:ext uri="{FF2B5EF4-FFF2-40B4-BE49-F238E27FC236}">
-                <a16:creationId xmlns:a16="http://schemas.microsoft.com/office/drawing/2014/main" xmlns="" id="{45E0F2E7-33F8-4632-90F2-5FD37C6C09CA}"/>
+                <a16:creationId xmlns:a16="http://schemas.microsoft.com/office/drawing/2014/main" id="{45E0F2E7-33F8-4632-90F2-5FD37C6C09CA}"/>
               </a:ext>
             </a:extLst>
           </p:cNvPr>
@@ -1301,7 +1301,7 @@
           <p:cNvPr id="2" name="Title 1">
             <a:extLst>
               <a:ext uri="{FF2B5EF4-FFF2-40B4-BE49-F238E27FC236}">
-                <a16:creationId xmlns:a16="http://schemas.microsoft.com/office/drawing/2014/main" xmlns="" id="{377EBB54-1C03-4BBB-9E7E-F45FEBB0CD25}"/>
+                <a16:creationId xmlns:a16="http://schemas.microsoft.com/office/drawing/2014/main" id="{377EBB54-1C03-4BBB-9E7E-F45FEBB0CD25}"/>
               </a:ext>
             </a:extLst>
           </p:cNvPr>
@@ -1329,7 +1329,7 @@
           <p:cNvPr id="3" name="Content Placeholder 2">
             <a:extLst>
               <a:ext uri="{FF2B5EF4-FFF2-40B4-BE49-F238E27FC236}">
-                <a16:creationId xmlns:a16="http://schemas.microsoft.com/office/drawing/2014/main" xmlns="" id="{3B6B35E2-931D-4454-BD21-DA98C5CC3581}"/>
+                <a16:creationId xmlns:a16="http://schemas.microsoft.com/office/drawing/2014/main" id="{3B6B35E2-931D-4454-BD21-DA98C5CC3581}"/>
               </a:ext>
             </a:extLst>
           </p:cNvPr>
@@ -1386,7 +1386,7 @@
           <p:cNvPr id="4" name="Date Placeholder 3">
             <a:extLst>
               <a:ext uri="{FF2B5EF4-FFF2-40B4-BE49-F238E27FC236}">
-                <a16:creationId xmlns:a16="http://schemas.microsoft.com/office/drawing/2014/main" xmlns="" id="{718F7D7B-2607-49B6-937D-9A1CBF59792F}"/>
+                <a16:creationId xmlns:a16="http://schemas.microsoft.com/office/drawing/2014/main" id="{718F7D7B-2607-49B6-937D-9A1CBF59792F}"/>
               </a:ext>
             </a:extLst>
           </p:cNvPr>
@@ -1404,7 +1404,7 @@
           <a:p>
             <a:fld id="{E504D85E-2087-4C48-BE7E-1A197735EA07}" type="datetimeFigureOut">
               <a:rPr lang="en-US" smtClean="0"/>
-              <a:t>10/17/17</a:t>
+              <a:t>10/18/2017</a:t>
             </a:fld>
             <a:endParaRPr lang="en-US"/>
           </a:p>
@@ -1415,7 +1415,7 @@
           <p:cNvPr id="5" name="Footer Placeholder 4">
             <a:extLst>
               <a:ext uri="{FF2B5EF4-FFF2-40B4-BE49-F238E27FC236}">
-                <a16:creationId xmlns:a16="http://schemas.microsoft.com/office/drawing/2014/main" xmlns="" id="{D22566CC-34AF-44EC-BE42-C85CCDA34ACA}"/>
+                <a16:creationId xmlns:a16="http://schemas.microsoft.com/office/drawing/2014/main" id="{D22566CC-34AF-44EC-BE42-C85CCDA34ACA}"/>
               </a:ext>
             </a:extLst>
           </p:cNvPr>
@@ -1440,7 +1440,7 @@
           <p:cNvPr id="6" name="Slide Number Placeholder 5">
             <a:extLst>
               <a:ext uri="{FF2B5EF4-FFF2-40B4-BE49-F238E27FC236}">
-                <a16:creationId xmlns:a16="http://schemas.microsoft.com/office/drawing/2014/main" xmlns="" id="{F85C06A6-F661-4A7D-84DB-D2EE104A4ED3}"/>
+                <a16:creationId xmlns:a16="http://schemas.microsoft.com/office/drawing/2014/main" id="{F85C06A6-F661-4A7D-84DB-D2EE104A4ED3}"/>
               </a:ext>
             </a:extLst>
           </p:cNvPr>
@@ -1499,7 +1499,7 @@
           <p:cNvPr id="2" name="Title 1">
             <a:extLst>
               <a:ext uri="{FF2B5EF4-FFF2-40B4-BE49-F238E27FC236}">
-                <a16:creationId xmlns:a16="http://schemas.microsoft.com/office/drawing/2014/main" xmlns="" id="{E698CAD9-E449-4969-AE0B-C61E7941C60F}"/>
+                <a16:creationId xmlns:a16="http://schemas.microsoft.com/office/drawing/2014/main" id="{E698CAD9-E449-4969-AE0B-C61E7941C60F}"/>
               </a:ext>
             </a:extLst>
           </p:cNvPr>
@@ -1536,7 +1536,7 @@
           <p:cNvPr id="3" name="Text Placeholder 2">
             <a:extLst>
               <a:ext uri="{FF2B5EF4-FFF2-40B4-BE49-F238E27FC236}">
-                <a16:creationId xmlns:a16="http://schemas.microsoft.com/office/drawing/2014/main" xmlns="" id="{8A808526-2D4D-49F8-8437-A0C896C07DE1}"/>
+                <a16:creationId xmlns:a16="http://schemas.microsoft.com/office/drawing/2014/main" id="{8A808526-2D4D-49F8-8437-A0C896C07DE1}"/>
               </a:ext>
             </a:extLst>
           </p:cNvPr>
@@ -1661,7 +1661,7 @@
           <p:cNvPr id="4" name="Date Placeholder 3">
             <a:extLst>
               <a:ext uri="{FF2B5EF4-FFF2-40B4-BE49-F238E27FC236}">
-                <a16:creationId xmlns:a16="http://schemas.microsoft.com/office/drawing/2014/main" xmlns="" id="{74A9A9B4-C59B-411D-974F-456D48A46C4C}"/>
+                <a16:creationId xmlns:a16="http://schemas.microsoft.com/office/drawing/2014/main" id="{74A9A9B4-C59B-411D-974F-456D48A46C4C}"/>
               </a:ext>
             </a:extLst>
           </p:cNvPr>
@@ -1679,7 +1679,7 @@
           <a:p>
             <a:fld id="{E504D85E-2087-4C48-BE7E-1A197735EA07}" type="datetimeFigureOut">
               <a:rPr lang="en-US" smtClean="0"/>
-              <a:t>10/17/17</a:t>
+              <a:t>10/18/2017</a:t>
             </a:fld>
             <a:endParaRPr lang="en-US"/>
           </a:p>
@@ -1690,7 +1690,7 @@
           <p:cNvPr id="5" name="Footer Placeholder 4">
             <a:extLst>
               <a:ext uri="{FF2B5EF4-FFF2-40B4-BE49-F238E27FC236}">
-                <a16:creationId xmlns:a16="http://schemas.microsoft.com/office/drawing/2014/main" xmlns="" id="{D739FF0E-AAD2-4096-8BB3-78F076940CF3}"/>
+                <a16:creationId xmlns:a16="http://schemas.microsoft.com/office/drawing/2014/main" id="{D739FF0E-AAD2-4096-8BB3-78F076940CF3}"/>
               </a:ext>
             </a:extLst>
           </p:cNvPr>
@@ -1715,7 +1715,7 @@
           <p:cNvPr id="6" name="Slide Number Placeholder 5">
             <a:extLst>
               <a:ext uri="{FF2B5EF4-FFF2-40B4-BE49-F238E27FC236}">
-                <a16:creationId xmlns:a16="http://schemas.microsoft.com/office/drawing/2014/main" xmlns="" id="{A183E807-AB18-4EA7-A83E-104FCCAAEF96}"/>
+                <a16:creationId xmlns:a16="http://schemas.microsoft.com/office/drawing/2014/main" id="{A183E807-AB18-4EA7-A83E-104FCCAAEF96}"/>
               </a:ext>
             </a:extLst>
           </p:cNvPr>
@@ -1774,7 +1774,7 @@
           <p:cNvPr id="2" name="Title 1">
             <a:extLst>
               <a:ext uri="{FF2B5EF4-FFF2-40B4-BE49-F238E27FC236}">
-                <a16:creationId xmlns:a16="http://schemas.microsoft.com/office/drawing/2014/main" xmlns="" id="{69270677-DAE7-4B76-9B43-4783FAFDFB2B}"/>
+                <a16:creationId xmlns:a16="http://schemas.microsoft.com/office/drawing/2014/main" id="{69270677-DAE7-4B76-9B43-4783FAFDFB2B}"/>
               </a:ext>
             </a:extLst>
           </p:cNvPr>
@@ -1802,7 +1802,7 @@
           <p:cNvPr id="3" name="Content Placeholder 2">
             <a:extLst>
               <a:ext uri="{FF2B5EF4-FFF2-40B4-BE49-F238E27FC236}">
-                <a16:creationId xmlns:a16="http://schemas.microsoft.com/office/drawing/2014/main" xmlns="" id="{71BFFEA3-624E-4A1E-BF5B-3DBA244EA0A2}"/>
+                <a16:creationId xmlns:a16="http://schemas.microsoft.com/office/drawing/2014/main" id="{71BFFEA3-624E-4A1E-BF5B-3DBA244EA0A2}"/>
               </a:ext>
             </a:extLst>
           </p:cNvPr>
@@ -1864,7 +1864,7 @@
           <p:cNvPr id="4" name="Content Placeholder 3">
             <a:extLst>
               <a:ext uri="{FF2B5EF4-FFF2-40B4-BE49-F238E27FC236}">
-                <a16:creationId xmlns:a16="http://schemas.microsoft.com/office/drawing/2014/main" xmlns="" id="{3CB8BF91-539B-426A-979B-EFE45BA6D990}"/>
+                <a16:creationId xmlns:a16="http://schemas.microsoft.com/office/drawing/2014/main" id="{3CB8BF91-539B-426A-979B-EFE45BA6D990}"/>
               </a:ext>
             </a:extLst>
           </p:cNvPr>
@@ -1926,7 +1926,7 @@
           <p:cNvPr id="5" name="Date Placeholder 4">
             <a:extLst>
               <a:ext uri="{FF2B5EF4-FFF2-40B4-BE49-F238E27FC236}">
-                <a16:creationId xmlns:a16="http://schemas.microsoft.com/office/drawing/2014/main" xmlns="" id="{D66E5997-F732-45A5-94C9-D1B83BE42D56}"/>
+                <a16:creationId xmlns:a16="http://schemas.microsoft.com/office/drawing/2014/main" id="{D66E5997-F732-45A5-94C9-D1B83BE42D56}"/>
               </a:ext>
             </a:extLst>
           </p:cNvPr>
@@ -1944,7 +1944,7 @@
           <a:p>
             <a:fld id="{E504D85E-2087-4C48-BE7E-1A197735EA07}" type="datetimeFigureOut">
               <a:rPr lang="en-US" smtClean="0"/>
-              <a:t>10/17/17</a:t>
+              <a:t>10/18/2017</a:t>
             </a:fld>
             <a:endParaRPr lang="en-US"/>
           </a:p>
@@ -1955,7 +1955,7 @@
           <p:cNvPr id="6" name="Footer Placeholder 5">
             <a:extLst>
               <a:ext uri="{FF2B5EF4-FFF2-40B4-BE49-F238E27FC236}">
-                <a16:creationId xmlns:a16="http://schemas.microsoft.com/office/drawing/2014/main" xmlns="" id="{EFB86B6E-BD83-4E60-A361-646334DFE354}"/>
+                <a16:creationId xmlns:a16="http://schemas.microsoft.com/office/drawing/2014/main" id="{EFB86B6E-BD83-4E60-A361-646334DFE354}"/>
               </a:ext>
             </a:extLst>
           </p:cNvPr>
@@ -1980,7 +1980,7 @@
           <p:cNvPr id="7" name="Slide Number Placeholder 6">
             <a:extLst>
               <a:ext uri="{FF2B5EF4-FFF2-40B4-BE49-F238E27FC236}">
-                <a16:creationId xmlns:a16="http://schemas.microsoft.com/office/drawing/2014/main" xmlns="" id="{DE11BF21-4152-43D2-A12B-0A60E6ECDF9B}"/>
+                <a16:creationId xmlns:a16="http://schemas.microsoft.com/office/drawing/2014/main" id="{DE11BF21-4152-43D2-A12B-0A60E6ECDF9B}"/>
               </a:ext>
             </a:extLst>
           </p:cNvPr>
@@ -2039,7 +2039,7 @@
           <p:cNvPr id="2" name="Title 1">
             <a:extLst>
               <a:ext uri="{FF2B5EF4-FFF2-40B4-BE49-F238E27FC236}">
-                <a16:creationId xmlns:a16="http://schemas.microsoft.com/office/drawing/2014/main" xmlns="" id="{CB39C7ED-3EB6-4E69-80EC-BB9C174638C4}"/>
+                <a16:creationId xmlns:a16="http://schemas.microsoft.com/office/drawing/2014/main" id="{CB39C7ED-3EB6-4E69-80EC-BB9C174638C4}"/>
               </a:ext>
             </a:extLst>
           </p:cNvPr>
@@ -2072,7 +2072,7 @@
           <p:cNvPr id="3" name="Text Placeholder 2">
             <a:extLst>
               <a:ext uri="{FF2B5EF4-FFF2-40B4-BE49-F238E27FC236}">
-                <a16:creationId xmlns:a16="http://schemas.microsoft.com/office/drawing/2014/main" xmlns="" id="{E08CD743-4269-451C-B9CD-16E35FD3EB1B}"/>
+                <a16:creationId xmlns:a16="http://schemas.microsoft.com/office/drawing/2014/main" id="{E08CD743-4269-451C-B9CD-16E35FD3EB1B}"/>
               </a:ext>
             </a:extLst>
           </p:cNvPr>
@@ -2143,7 +2143,7 @@
           <p:cNvPr id="4" name="Content Placeholder 3">
             <a:extLst>
               <a:ext uri="{FF2B5EF4-FFF2-40B4-BE49-F238E27FC236}">
-                <a16:creationId xmlns:a16="http://schemas.microsoft.com/office/drawing/2014/main" xmlns="" id="{EC9149B0-A069-4B2E-9E12-C9C8EE5F9609}"/>
+                <a16:creationId xmlns:a16="http://schemas.microsoft.com/office/drawing/2014/main" id="{EC9149B0-A069-4B2E-9E12-C9C8EE5F9609}"/>
               </a:ext>
             </a:extLst>
           </p:cNvPr>
@@ -2205,7 +2205,7 @@
           <p:cNvPr id="5" name="Text Placeholder 4">
             <a:extLst>
               <a:ext uri="{FF2B5EF4-FFF2-40B4-BE49-F238E27FC236}">
-                <a16:creationId xmlns:a16="http://schemas.microsoft.com/office/drawing/2014/main" xmlns="" id="{22F99CBE-5D3C-4404-95CC-A00A1E431E9B}"/>
+                <a16:creationId xmlns:a16="http://schemas.microsoft.com/office/drawing/2014/main" id="{22F99CBE-5D3C-4404-95CC-A00A1E431E9B}"/>
               </a:ext>
             </a:extLst>
           </p:cNvPr>
@@ -2276,7 +2276,7 @@
           <p:cNvPr id="6" name="Content Placeholder 5">
             <a:extLst>
               <a:ext uri="{FF2B5EF4-FFF2-40B4-BE49-F238E27FC236}">
-                <a16:creationId xmlns:a16="http://schemas.microsoft.com/office/drawing/2014/main" xmlns="" id="{81C3F09A-4DB3-47AB-A047-9DD3E710DB3A}"/>
+                <a16:creationId xmlns:a16="http://schemas.microsoft.com/office/drawing/2014/main" id="{81C3F09A-4DB3-47AB-A047-9DD3E710DB3A}"/>
               </a:ext>
             </a:extLst>
           </p:cNvPr>
@@ -2338,7 +2338,7 @@
           <p:cNvPr id="7" name="Date Placeholder 6">
             <a:extLst>
               <a:ext uri="{FF2B5EF4-FFF2-40B4-BE49-F238E27FC236}">
-                <a16:creationId xmlns:a16="http://schemas.microsoft.com/office/drawing/2014/main" xmlns="" id="{A3E2BB69-348B-473C-8527-C70D705B909B}"/>
+                <a16:creationId xmlns:a16="http://schemas.microsoft.com/office/drawing/2014/main" id="{A3E2BB69-348B-473C-8527-C70D705B909B}"/>
               </a:ext>
             </a:extLst>
           </p:cNvPr>
@@ -2356,7 +2356,7 @@
           <a:p>
             <a:fld id="{E504D85E-2087-4C48-BE7E-1A197735EA07}" type="datetimeFigureOut">
               <a:rPr lang="en-US" smtClean="0"/>
-              <a:t>10/17/17</a:t>
+              <a:t>10/18/2017</a:t>
             </a:fld>
             <a:endParaRPr lang="en-US"/>
           </a:p>
@@ -2367,7 +2367,7 @@
           <p:cNvPr id="8" name="Footer Placeholder 7">
             <a:extLst>
               <a:ext uri="{FF2B5EF4-FFF2-40B4-BE49-F238E27FC236}">
-                <a16:creationId xmlns:a16="http://schemas.microsoft.com/office/drawing/2014/main" xmlns="" id="{F8612FB8-DAE0-4192-9564-4DCD5247E820}"/>
+                <a16:creationId xmlns:a16="http://schemas.microsoft.com/office/drawing/2014/main" id="{F8612FB8-DAE0-4192-9564-4DCD5247E820}"/>
               </a:ext>
             </a:extLst>
           </p:cNvPr>
@@ -2392,7 +2392,7 @@
           <p:cNvPr id="9" name="Slide Number Placeholder 8">
             <a:extLst>
               <a:ext uri="{FF2B5EF4-FFF2-40B4-BE49-F238E27FC236}">
-                <a16:creationId xmlns:a16="http://schemas.microsoft.com/office/drawing/2014/main" xmlns="" id="{BB9FE832-04C3-4EB2-ABC8-FB13FECA0340}"/>
+                <a16:creationId xmlns:a16="http://schemas.microsoft.com/office/drawing/2014/main" id="{BB9FE832-04C3-4EB2-ABC8-FB13FECA0340}"/>
               </a:ext>
             </a:extLst>
           </p:cNvPr>
@@ -2451,7 +2451,7 @@
           <p:cNvPr id="2" name="Title 1">
             <a:extLst>
               <a:ext uri="{FF2B5EF4-FFF2-40B4-BE49-F238E27FC236}">
-                <a16:creationId xmlns:a16="http://schemas.microsoft.com/office/drawing/2014/main" xmlns="" id="{8A13168A-7D14-4F14-AE16-E746613A1150}"/>
+                <a16:creationId xmlns:a16="http://schemas.microsoft.com/office/drawing/2014/main" id="{8A13168A-7D14-4F14-AE16-E746613A1150}"/>
               </a:ext>
             </a:extLst>
           </p:cNvPr>
@@ -2479,7 +2479,7 @@
           <p:cNvPr id="3" name="Date Placeholder 2">
             <a:extLst>
               <a:ext uri="{FF2B5EF4-FFF2-40B4-BE49-F238E27FC236}">
-                <a16:creationId xmlns:a16="http://schemas.microsoft.com/office/drawing/2014/main" xmlns="" id="{633B17D2-F9E1-402B-8C92-91D437963D47}"/>
+                <a16:creationId xmlns:a16="http://schemas.microsoft.com/office/drawing/2014/main" id="{633B17D2-F9E1-402B-8C92-91D437963D47}"/>
               </a:ext>
             </a:extLst>
           </p:cNvPr>
@@ -2497,7 +2497,7 @@
           <a:p>
             <a:fld id="{E504D85E-2087-4C48-BE7E-1A197735EA07}" type="datetimeFigureOut">
               <a:rPr lang="en-US" smtClean="0"/>
-              <a:t>10/17/17</a:t>
+              <a:t>10/18/2017</a:t>
             </a:fld>
             <a:endParaRPr lang="en-US"/>
           </a:p>
@@ -2508,7 +2508,7 @@
           <p:cNvPr id="4" name="Footer Placeholder 3">
             <a:extLst>
               <a:ext uri="{FF2B5EF4-FFF2-40B4-BE49-F238E27FC236}">
-                <a16:creationId xmlns:a16="http://schemas.microsoft.com/office/drawing/2014/main" xmlns="" id="{8FF5FC7E-65D2-4796-B9CA-CAE31FDCB997}"/>
+                <a16:creationId xmlns:a16="http://schemas.microsoft.com/office/drawing/2014/main" id="{8FF5FC7E-65D2-4796-B9CA-CAE31FDCB997}"/>
               </a:ext>
             </a:extLst>
           </p:cNvPr>
@@ -2533,7 +2533,7 @@
           <p:cNvPr id="5" name="Slide Number Placeholder 4">
             <a:extLst>
               <a:ext uri="{FF2B5EF4-FFF2-40B4-BE49-F238E27FC236}">
-                <a16:creationId xmlns:a16="http://schemas.microsoft.com/office/drawing/2014/main" xmlns="" id="{0032B014-16BE-4EC5-8EC6-96C9AF4536A0}"/>
+                <a16:creationId xmlns:a16="http://schemas.microsoft.com/office/drawing/2014/main" id="{0032B014-16BE-4EC5-8EC6-96C9AF4536A0}"/>
               </a:ext>
             </a:extLst>
           </p:cNvPr>
@@ -2592,7 +2592,7 @@
           <p:cNvPr id="2" name="Date Placeholder 1">
             <a:extLst>
               <a:ext uri="{FF2B5EF4-FFF2-40B4-BE49-F238E27FC236}">
-                <a16:creationId xmlns:a16="http://schemas.microsoft.com/office/drawing/2014/main" xmlns="" id="{7D21218E-8C68-452C-83C1-A99488812DB7}"/>
+                <a16:creationId xmlns:a16="http://schemas.microsoft.com/office/drawing/2014/main" id="{7D21218E-8C68-452C-83C1-A99488812DB7}"/>
               </a:ext>
             </a:extLst>
           </p:cNvPr>
@@ -2610,7 +2610,7 @@
           <a:p>
             <a:fld id="{E504D85E-2087-4C48-BE7E-1A197735EA07}" type="datetimeFigureOut">
               <a:rPr lang="en-US" smtClean="0"/>
-              <a:t>10/17/17</a:t>
+              <a:t>10/18/2017</a:t>
             </a:fld>
             <a:endParaRPr lang="en-US"/>
           </a:p>
@@ -2621,7 +2621,7 @@
           <p:cNvPr id="3" name="Footer Placeholder 2">
             <a:extLst>
               <a:ext uri="{FF2B5EF4-FFF2-40B4-BE49-F238E27FC236}">
-                <a16:creationId xmlns:a16="http://schemas.microsoft.com/office/drawing/2014/main" xmlns="" id="{F5C6C226-7F42-4FCE-A1C4-56BD7B4E2EAD}"/>
+                <a16:creationId xmlns:a16="http://schemas.microsoft.com/office/drawing/2014/main" id="{F5C6C226-7F42-4FCE-A1C4-56BD7B4E2EAD}"/>
               </a:ext>
             </a:extLst>
           </p:cNvPr>
@@ -2646,7 +2646,7 @@
           <p:cNvPr id="4" name="Slide Number Placeholder 3">
             <a:extLst>
               <a:ext uri="{FF2B5EF4-FFF2-40B4-BE49-F238E27FC236}">
-                <a16:creationId xmlns:a16="http://schemas.microsoft.com/office/drawing/2014/main" xmlns="" id="{E25E37D2-D1C1-4AA3-8D9A-0F5C2286EDA0}"/>
+                <a16:creationId xmlns:a16="http://schemas.microsoft.com/office/drawing/2014/main" id="{E25E37D2-D1C1-4AA3-8D9A-0F5C2286EDA0}"/>
               </a:ext>
             </a:extLst>
           </p:cNvPr>
@@ -2705,7 +2705,7 @@
           <p:cNvPr id="2" name="Title 1">
             <a:extLst>
               <a:ext uri="{FF2B5EF4-FFF2-40B4-BE49-F238E27FC236}">
-                <a16:creationId xmlns:a16="http://schemas.microsoft.com/office/drawing/2014/main" xmlns="" id="{58039D85-9651-451C-8B6D-7C2FA443A17E}"/>
+                <a16:creationId xmlns:a16="http://schemas.microsoft.com/office/drawing/2014/main" id="{58039D85-9651-451C-8B6D-7C2FA443A17E}"/>
               </a:ext>
             </a:extLst>
           </p:cNvPr>
@@ -2742,7 +2742,7 @@
           <p:cNvPr id="3" name="Content Placeholder 2">
             <a:extLst>
               <a:ext uri="{FF2B5EF4-FFF2-40B4-BE49-F238E27FC236}">
-                <a16:creationId xmlns:a16="http://schemas.microsoft.com/office/drawing/2014/main" xmlns="" id="{77FD276E-926F-4CF2-B611-725B86BC9BDD}"/>
+                <a16:creationId xmlns:a16="http://schemas.microsoft.com/office/drawing/2014/main" id="{77FD276E-926F-4CF2-B611-725B86BC9BDD}"/>
               </a:ext>
             </a:extLst>
           </p:cNvPr>
@@ -2832,7 +2832,7 @@
           <p:cNvPr id="4" name="Text Placeholder 3">
             <a:extLst>
               <a:ext uri="{FF2B5EF4-FFF2-40B4-BE49-F238E27FC236}">
-                <a16:creationId xmlns:a16="http://schemas.microsoft.com/office/drawing/2014/main" xmlns="" id="{05CD7173-3E62-4554-895F-8D553B0F09EB}"/>
+                <a16:creationId xmlns:a16="http://schemas.microsoft.com/office/drawing/2014/main" id="{05CD7173-3E62-4554-895F-8D553B0F09EB}"/>
               </a:ext>
             </a:extLst>
           </p:cNvPr>
@@ -2903,7 +2903,7 @@
           <p:cNvPr id="5" name="Date Placeholder 4">
             <a:extLst>
               <a:ext uri="{FF2B5EF4-FFF2-40B4-BE49-F238E27FC236}">
-                <a16:creationId xmlns:a16="http://schemas.microsoft.com/office/drawing/2014/main" xmlns="" id="{E8F7D56F-DD9A-4284-84B4-03D0B4026A7C}"/>
+                <a16:creationId xmlns:a16="http://schemas.microsoft.com/office/drawing/2014/main" id="{E8F7D56F-DD9A-4284-84B4-03D0B4026A7C}"/>
               </a:ext>
             </a:extLst>
           </p:cNvPr>
@@ -2921,7 +2921,7 @@
           <a:p>
             <a:fld id="{E504D85E-2087-4C48-BE7E-1A197735EA07}" type="datetimeFigureOut">
               <a:rPr lang="en-US" smtClean="0"/>
-              <a:t>10/17/17</a:t>
+              <a:t>10/18/2017</a:t>
             </a:fld>
             <a:endParaRPr lang="en-US"/>
           </a:p>
@@ -2932,7 +2932,7 @@
           <p:cNvPr id="6" name="Footer Placeholder 5">
             <a:extLst>
               <a:ext uri="{FF2B5EF4-FFF2-40B4-BE49-F238E27FC236}">
-                <a16:creationId xmlns:a16="http://schemas.microsoft.com/office/drawing/2014/main" xmlns="" id="{EB92307F-646E-4FB6-96D2-A7C119A6E593}"/>
+                <a16:creationId xmlns:a16="http://schemas.microsoft.com/office/drawing/2014/main" id="{EB92307F-646E-4FB6-96D2-A7C119A6E593}"/>
               </a:ext>
             </a:extLst>
           </p:cNvPr>
@@ -2957,7 +2957,7 @@
           <p:cNvPr id="7" name="Slide Number Placeholder 6">
             <a:extLst>
               <a:ext uri="{FF2B5EF4-FFF2-40B4-BE49-F238E27FC236}">
-                <a16:creationId xmlns:a16="http://schemas.microsoft.com/office/drawing/2014/main" xmlns="" id="{6AD9A54E-1FF9-4FB4-BAB9-8260DEA3C707}"/>
+                <a16:creationId xmlns:a16="http://schemas.microsoft.com/office/drawing/2014/main" id="{6AD9A54E-1FF9-4FB4-BAB9-8260DEA3C707}"/>
               </a:ext>
             </a:extLst>
           </p:cNvPr>
@@ -3016,7 +3016,7 @@
           <p:cNvPr id="2" name="Title 1">
             <a:extLst>
               <a:ext uri="{FF2B5EF4-FFF2-40B4-BE49-F238E27FC236}">
-                <a16:creationId xmlns:a16="http://schemas.microsoft.com/office/drawing/2014/main" xmlns="" id="{70195D08-965F-4696-9456-D77F35386D74}"/>
+                <a16:creationId xmlns:a16="http://schemas.microsoft.com/office/drawing/2014/main" id="{70195D08-965F-4696-9456-D77F35386D74}"/>
               </a:ext>
             </a:extLst>
           </p:cNvPr>
@@ -3053,7 +3053,7 @@
           <p:cNvPr id="3" name="Picture Placeholder 2">
             <a:extLst>
               <a:ext uri="{FF2B5EF4-FFF2-40B4-BE49-F238E27FC236}">
-                <a16:creationId xmlns:a16="http://schemas.microsoft.com/office/drawing/2014/main" xmlns="" id="{1EE8B75E-E26E-42EE-957B-57CC0469CE15}"/>
+                <a16:creationId xmlns:a16="http://schemas.microsoft.com/office/drawing/2014/main" id="{1EE8B75E-E26E-42EE-957B-57CC0469CE15}"/>
               </a:ext>
             </a:extLst>
           </p:cNvPr>
@@ -3120,7 +3120,7 @@
           <p:cNvPr id="4" name="Text Placeholder 3">
             <a:extLst>
               <a:ext uri="{FF2B5EF4-FFF2-40B4-BE49-F238E27FC236}">
-                <a16:creationId xmlns:a16="http://schemas.microsoft.com/office/drawing/2014/main" xmlns="" id="{56CCE71D-F248-4325-8C34-530D22889174}"/>
+                <a16:creationId xmlns:a16="http://schemas.microsoft.com/office/drawing/2014/main" id="{56CCE71D-F248-4325-8C34-530D22889174}"/>
               </a:ext>
             </a:extLst>
           </p:cNvPr>
@@ -3191,7 +3191,7 @@
           <p:cNvPr id="5" name="Date Placeholder 4">
             <a:extLst>
               <a:ext uri="{FF2B5EF4-FFF2-40B4-BE49-F238E27FC236}">
-                <a16:creationId xmlns:a16="http://schemas.microsoft.com/office/drawing/2014/main" xmlns="" id="{168A1A2B-F4ED-40B4-A680-CDCADDAD8EC7}"/>
+                <a16:creationId xmlns:a16="http://schemas.microsoft.com/office/drawing/2014/main" id="{168A1A2B-F4ED-40B4-A680-CDCADDAD8EC7}"/>
               </a:ext>
             </a:extLst>
           </p:cNvPr>
@@ -3209,7 +3209,7 @@
           <a:p>
             <a:fld id="{E504D85E-2087-4C48-BE7E-1A197735EA07}" type="datetimeFigureOut">
               <a:rPr lang="en-US" smtClean="0"/>
-              <a:t>10/17/17</a:t>
+              <a:t>10/18/2017</a:t>
             </a:fld>
             <a:endParaRPr lang="en-US"/>
           </a:p>
@@ -3220,7 +3220,7 @@
           <p:cNvPr id="6" name="Footer Placeholder 5">
             <a:extLst>
               <a:ext uri="{FF2B5EF4-FFF2-40B4-BE49-F238E27FC236}">
-                <a16:creationId xmlns:a16="http://schemas.microsoft.com/office/drawing/2014/main" xmlns="" id="{BB0968A0-6029-4DE5-8082-7F38E336C933}"/>
+                <a16:creationId xmlns:a16="http://schemas.microsoft.com/office/drawing/2014/main" id="{BB0968A0-6029-4DE5-8082-7F38E336C933}"/>
               </a:ext>
             </a:extLst>
           </p:cNvPr>
@@ -3245,7 +3245,7 @@
           <p:cNvPr id="7" name="Slide Number Placeholder 6">
             <a:extLst>
               <a:ext uri="{FF2B5EF4-FFF2-40B4-BE49-F238E27FC236}">
-                <a16:creationId xmlns:a16="http://schemas.microsoft.com/office/drawing/2014/main" xmlns="" id="{77FD032A-15B0-423D-A4DE-FB7B4013789A}"/>
+                <a16:creationId xmlns:a16="http://schemas.microsoft.com/office/drawing/2014/main" id="{77FD032A-15B0-423D-A4DE-FB7B4013789A}"/>
               </a:ext>
             </a:extLst>
           </p:cNvPr>
@@ -3309,7 +3309,7 @@
           <p:cNvPr id="2" name="Title Placeholder 1">
             <a:extLst>
               <a:ext uri="{FF2B5EF4-FFF2-40B4-BE49-F238E27FC236}">
-                <a16:creationId xmlns:a16="http://schemas.microsoft.com/office/drawing/2014/main" xmlns="" id="{F273EE1C-2FE9-4362-A928-62B5302D0D0A}"/>
+                <a16:creationId xmlns:a16="http://schemas.microsoft.com/office/drawing/2014/main" id="{F273EE1C-2FE9-4362-A928-62B5302D0D0A}"/>
               </a:ext>
             </a:extLst>
           </p:cNvPr>
@@ -3347,7 +3347,7 @@
           <p:cNvPr id="3" name="Text Placeholder 2">
             <a:extLst>
               <a:ext uri="{FF2B5EF4-FFF2-40B4-BE49-F238E27FC236}">
-                <a16:creationId xmlns:a16="http://schemas.microsoft.com/office/drawing/2014/main" xmlns="" id="{3C126E43-984A-4919-BD76-4348EF164C32}"/>
+                <a16:creationId xmlns:a16="http://schemas.microsoft.com/office/drawing/2014/main" id="{3C126E43-984A-4919-BD76-4348EF164C32}"/>
               </a:ext>
             </a:extLst>
           </p:cNvPr>
@@ -3414,7 +3414,7 @@
           <p:cNvPr id="4" name="Date Placeholder 3">
             <a:extLst>
               <a:ext uri="{FF2B5EF4-FFF2-40B4-BE49-F238E27FC236}">
-                <a16:creationId xmlns:a16="http://schemas.microsoft.com/office/drawing/2014/main" xmlns="" id="{6BDDA5CC-265D-445D-B1A6-E3A5682AAEAD}"/>
+                <a16:creationId xmlns:a16="http://schemas.microsoft.com/office/drawing/2014/main" id="{6BDDA5CC-265D-445D-B1A6-E3A5682AAEAD}"/>
               </a:ext>
             </a:extLst>
           </p:cNvPr>
@@ -3450,7 +3450,7 @@
           <a:p>
             <a:fld id="{E504D85E-2087-4C48-BE7E-1A197735EA07}" type="datetimeFigureOut">
               <a:rPr lang="en-US" smtClean="0"/>
-              <a:t>10/17/17</a:t>
+              <a:t>10/18/2017</a:t>
             </a:fld>
             <a:endParaRPr lang="en-US"/>
           </a:p>
@@ -3461,7 +3461,7 @@
           <p:cNvPr id="5" name="Footer Placeholder 4">
             <a:extLst>
               <a:ext uri="{FF2B5EF4-FFF2-40B4-BE49-F238E27FC236}">
-                <a16:creationId xmlns:a16="http://schemas.microsoft.com/office/drawing/2014/main" xmlns="" id="{D4481185-15CE-4B64-A758-B9FE608C2281}"/>
+                <a16:creationId xmlns:a16="http://schemas.microsoft.com/office/drawing/2014/main" id="{D4481185-15CE-4B64-A758-B9FE608C2281}"/>
               </a:ext>
             </a:extLst>
           </p:cNvPr>
@@ -3504,7 +3504,7 @@
           <p:cNvPr id="6" name="Slide Number Placeholder 5">
             <a:extLst>
               <a:ext uri="{FF2B5EF4-FFF2-40B4-BE49-F238E27FC236}">
-                <a16:creationId xmlns:a16="http://schemas.microsoft.com/office/drawing/2014/main" xmlns="" id="{15BF00A6-F44F-4C9F-8A50-3821A62DF191}"/>
+                <a16:creationId xmlns:a16="http://schemas.microsoft.com/office/drawing/2014/main" id="{15BF00A6-F44F-4C9F-8A50-3821A62DF191}"/>
               </a:ext>
             </a:extLst>
           </p:cNvPr>
@@ -4079,7 +4079,7 @@
           <p:cNvPr id="51" name="Rectangle: Rounded Corners 50">
             <a:extLst>
               <a:ext uri="{FF2B5EF4-FFF2-40B4-BE49-F238E27FC236}">
-                <a16:creationId xmlns:a16="http://schemas.microsoft.com/office/drawing/2014/main" xmlns="" id="{F2751B1E-2C25-4F29-841B-3D94FDE58553}"/>
+                <a16:creationId xmlns:a16="http://schemas.microsoft.com/office/drawing/2014/main" id="{F2751B1E-2C25-4F29-841B-3D94FDE58553}"/>
               </a:ext>
             </a:extLst>
           </p:cNvPr>
@@ -5317,7 +5317,7 @@
           <p:cNvPr id="16" name="Group 15">
             <a:extLst>
               <a:ext uri="{FF2B5EF4-FFF2-40B4-BE49-F238E27FC236}">
-                <a16:creationId xmlns:a16="http://schemas.microsoft.com/office/drawing/2014/main" xmlns="" id="{4DB90944-56B9-457C-8D1A-9476F39CB40B}"/>
+                <a16:creationId xmlns:a16="http://schemas.microsoft.com/office/drawing/2014/main" id="{4DB90944-56B9-457C-8D1A-9476F39CB40B}"/>
               </a:ext>
             </a:extLst>
           </p:cNvPr>
@@ -5813,7 +5813,7 @@
           <p:cNvPr id="47" name="Rectangle 46">
             <a:extLst>
               <a:ext uri="{FF2B5EF4-FFF2-40B4-BE49-F238E27FC236}">
-                <a16:creationId xmlns:a16="http://schemas.microsoft.com/office/drawing/2014/main" xmlns="" id="{322B680D-8661-4B52-AAAE-521F25F0B3F6}"/>
+                <a16:creationId xmlns:a16="http://schemas.microsoft.com/office/drawing/2014/main" id="{322B680D-8661-4B52-AAAE-521F25F0B3F6}"/>
               </a:ext>
             </a:extLst>
           </p:cNvPr>
@@ -5862,7 +5862,7 @@
           <p:cNvPr id="48" name="Rectangle 47">
             <a:extLst>
               <a:ext uri="{FF2B5EF4-FFF2-40B4-BE49-F238E27FC236}">
-                <a16:creationId xmlns:a16="http://schemas.microsoft.com/office/drawing/2014/main" xmlns="" id="{5CED1D2E-B933-4AB1-A87F-EB9D42C873A1}"/>
+                <a16:creationId xmlns:a16="http://schemas.microsoft.com/office/drawing/2014/main" id="{5CED1D2E-B933-4AB1-A87F-EB9D42C873A1}"/>
               </a:ext>
             </a:extLst>
           </p:cNvPr>
@@ -5897,7 +5897,7 @@
           <p:cNvPr id="58" name="TextBox 57">
             <a:extLst>
               <a:ext uri="{FF2B5EF4-FFF2-40B4-BE49-F238E27FC236}">
-                <a16:creationId xmlns:a16="http://schemas.microsoft.com/office/drawing/2014/main" xmlns="" id="{1C6AFE97-ED99-401F-921E-B86B599A200A}"/>
+                <a16:creationId xmlns:a16="http://schemas.microsoft.com/office/drawing/2014/main" id="{1C6AFE97-ED99-401F-921E-B86B599A200A}"/>
               </a:ext>
             </a:extLst>
           </p:cNvPr>
@@ -5932,7 +5932,7 @@
           <p:cNvPr id="59" name="Connector: Curved 58">
             <a:extLst>
               <a:ext uri="{FF2B5EF4-FFF2-40B4-BE49-F238E27FC236}">
-                <a16:creationId xmlns:a16="http://schemas.microsoft.com/office/drawing/2014/main" xmlns="" id="{6DA4F012-3B0E-4B76-B575-7C068408FD0C}"/>
+                <a16:creationId xmlns:a16="http://schemas.microsoft.com/office/drawing/2014/main" id="{6DA4F012-3B0E-4B76-B575-7C068408FD0C}"/>
               </a:ext>
             </a:extLst>
           </p:cNvPr>
@@ -7342,7 +7342,7 @@
           <p:cNvPr id="4" name="Rectangle 3">
             <a:extLst>
               <a:ext uri="{FF2B5EF4-FFF2-40B4-BE49-F238E27FC236}">
-                <a16:creationId xmlns:a16="http://schemas.microsoft.com/office/drawing/2014/main" xmlns="" id="{0C2BA48E-758E-4035-B49C-4F47EB965891}"/>
+                <a16:creationId xmlns:a16="http://schemas.microsoft.com/office/drawing/2014/main" id="{0C2BA48E-758E-4035-B49C-4F47EB965891}"/>
               </a:ext>
             </a:extLst>
           </p:cNvPr>
@@ -7393,7 +7393,7 @@
           <p:cNvPr id="5" name="Rectangle 4">
             <a:extLst>
               <a:ext uri="{FF2B5EF4-FFF2-40B4-BE49-F238E27FC236}">
-                <a16:creationId xmlns:a16="http://schemas.microsoft.com/office/drawing/2014/main" xmlns="" id="{122F637B-D055-4A89-AEBF-4E10439C9FF0}"/>
+                <a16:creationId xmlns:a16="http://schemas.microsoft.com/office/drawing/2014/main" id="{122F637B-D055-4A89-AEBF-4E10439C9FF0}"/>
               </a:ext>
             </a:extLst>
           </p:cNvPr>
@@ -7449,7 +7449,7 @@
           <p:cNvPr id="6" name="Rectangle 5">
             <a:extLst>
               <a:ext uri="{FF2B5EF4-FFF2-40B4-BE49-F238E27FC236}">
-                <a16:creationId xmlns:a16="http://schemas.microsoft.com/office/drawing/2014/main" xmlns="" id="{F6A74462-8F47-4B8F-BE38-FAEA0C91AD42}"/>
+                <a16:creationId xmlns:a16="http://schemas.microsoft.com/office/drawing/2014/main" id="{F6A74462-8F47-4B8F-BE38-FAEA0C91AD42}"/>
               </a:ext>
             </a:extLst>
           </p:cNvPr>
@@ -7496,7 +7496,7 @@
           <p:cNvPr id="7" name="Rectangle 6">
             <a:extLst>
               <a:ext uri="{FF2B5EF4-FFF2-40B4-BE49-F238E27FC236}">
-                <a16:creationId xmlns:a16="http://schemas.microsoft.com/office/drawing/2014/main" xmlns="" id="{B31A5C86-C059-4E4F-A36D-7C43FC1208A0}"/>
+                <a16:creationId xmlns:a16="http://schemas.microsoft.com/office/drawing/2014/main" id="{B31A5C86-C059-4E4F-A36D-7C43FC1208A0}"/>
               </a:ext>
             </a:extLst>
           </p:cNvPr>
@@ -7543,7 +7543,7 @@
           <p:cNvPr id="8" name="Rectangle 7">
             <a:extLst>
               <a:ext uri="{FF2B5EF4-FFF2-40B4-BE49-F238E27FC236}">
-                <a16:creationId xmlns:a16="http://schemas.microsoft.com/office/drawing/2014/main" xmlns="" id="{3B5562F6-BD36-484D-B513-EA4AFBF6A46D}"/>
+                <a16:creationId xmlns:a16="http://schemas.microsoft.com/office/drawing/2014/main" id="{3B5562F6-BD36-484D-B513-EA4AFBF6A46D}"/>
               </a:ext>
             </a:extLst>
           </p:cNvPr>
@@ -7598,7 +7598,7 @@
           <p:cNvPr id="16" name="Connector: Elbow 15">
             <a:extLst>
               <a:ext uri="{FF2B5EF4-FFF2-40B4-BE49-F238E27FC236}">
-                <a16:creationId xmlns:a16="http://schemas.microsoft.com/office/drawing/2014/main" xmlns="" id="{8311314B-2261-48F7-8392-22D61FC10F4C}"/>
+                <a16:creationId xmlns:a16="http://schemas.microsoft.com/office/drawing/2014/main" id="{8311314B-2261-48F7-8392-22D61FC10F4C}"/>
               </a:ext>
             </a:extLst>
           </p:cNvPr>
@@ -7643,7 +7643,7 @@
           <p:cNvPr id="17" name="Connector: Elbow 16">
             <a:extLst>
               <a:ext uri="{FF2B5EF4-FFF2-40B4-BE49-F238E27FC236}">
-                <a16:creationId xmlns:a16="http://schemas.microsoft.com/office/drawing/2014/main" xmlns="" id="{433064AB-FEF6-4A7D-AAAE-AB72F5F2430F}"/>
+                <a16:creationId xmlns:a16="http://schemas.microsoft.com/office/drawing/2014/main" id="{433064AB-FEF6-4A7D-AAAE-AB72F5F2430F}"/>
               </a:ext>
             </a:extLst>
           </p:cNvPr>
@@ -7689,7 +7689,7 @@
           <p:cNvPr id="22" name="Rectangle 21">
             <a:extLst>
               <a:ext uri="{FF2B5EF4-FFF2-40B4-BE49-F238E27FC236}">
-                <a16:creationId xmlns:a16="http://schemas.microsoft.com/office/drawing/2014/main" xmlns="" id="{EB56C870-F1D4-4FF7-A9CD-127DA5AA0C10}"/>
+                <a16:creationId xmlns:a16="http://schemas.microsoft.com/office/drawing/2014/main" id="{EB56C870-F1D4-4FF7-A9CD-127DA5AA0C10}"/>
               </a:ext>
             </a:extLst>
           </p:cNvPr>
@@ -7745,7 +7745,7 @@
           <p:cNvPr id="25" name="TextBox 24">
             <a:extLst>
               <a:ext uri="{FF2B5EF4-FFF2-40B4-BE49-F238E27FC236}">
-                <a16:creationId xmlns:a16="http://schemas.microsoft.com/office/drawing/2014/main" xmlns="" id="{37047921-7782-4EE5-9840-B18851900A7C}"/>
+                <a16:creationId xmlns:a16="http://schemas.microsoft.com/office/drawing/2014/main" id="{37047921-7782-4EE5-9840-B18851900A7C}"/>
               </a:ext>
             </a:extLst>
           </p:cNvPr>
@@ -7788,7 +7788,7 @@
           <p:cNvPr id="27" name="Right Brace 26">
             <a:extLst>
               <a:ext uri="{FF2B5EF4-FFF2-40B4-BE49-F238E27FC236}">
-                <a16:creationId xmlns:a16="http://schemas.microsoft.com/office/drawing/2014/main" xmlns="" id="{C30BEFF4-A930-4D26-BC0A-2B7945E3A077}"/>
+                <a16:creationId xmlns:a16="http://schemas.microsoft.com/office/drawing/2014/main" id="{C30BEFF4-A930-4D26-BC0A-2B7945E3A077}"/>
               </a:ext>
             </a:extLst>
           </p:cNvPr>
@@ -7832,7 +7832,7 @@
           <p:cNvPr id="41" name="TextBox 40">
             <a:extLst>
               <a:ext uri="{FF2B5EF4-FFF2-40B4-BE49-F238E27FC236}">
-                <a16:creationId xmlns:a16="http://schemas.microsoft.com/office/drawing/2014/main" xmlns="" id="{067D5DB3-C55C-4D8A-89FD-2A4CD21598C5}"/>
+                <a16:creationId xmlns:a16="http://schemas.microsoft.com/office/drawing/2014/main" id="{067D5DB3-C55C-4D8A-89FD-2A4CD21598C5}"/>
               </a:ext>
             </a:extLst>
           </p:cNvPr>
@@ -7867,7 +7867,7 @@
           <p:cNvPr id="45" name="TextBox 44">
             <a:extLst>
               <a:ext uri="{FF2B5EF4-FFF2-40B4-BE49-F238E27FC236}">
-                <a16:creationId xmlns:a16="http://schemas.microsoft.com/office/drawing/2014/main" xmlns="" id="{312BB9C3-B601-4D3C-8456-0F41916C7D26}"/>
+                <a16:creationId xmlns:a16="http://schemas.microsoft.com/office/drawing/2014/main" id="{312BB9C3-B601-4D3C-8456-0F41916C7D26}"/>
               </a:ext>
             </a:extLst>
           </p:cNvPr>
@@ -7902,7 +7902,7 @@
           <p:cNvPr id="46" name="TextBox 45">
             <a:extLst>
               <a:ext uri="{FF2B5EF4-FFF2-40B4-BE49-F238E27FC236}">
-                <a16:creationId xmlns:a16="http://schemas.microsoft.com/office/drawing/2014/main" xmlns="" id="{86FD97B9-49E3-42B7-AB21-6850CF4B2081}"/>
+                <a16:creationId xmlns:a16="http://schemas.microsoft.com/office/drawing/2014/main" id="{86FD97B9-49E3-42B7-AB21-6850CF4B2081}"/>
               </a:ext>
             </a:extLst>
           </p:cNvPr>
@@ -7937,7 +7937,7 @@
           <p:cNvPr id="50" name="Rectangle 49">
             <a:extLst>
               <a:ext uri="{FF2B5EF4-FFF2-40B4-BE49-F238E27FC236}">
-                <a16:creationId xmlns:a16="http://schemas.microsoft.com/office/drawing/2014/main" xmlns="" id="{A9163D93-520B-4E65-A557-35D98D084B8A}"/>
+                <a16:creationId xmlns:a16="http://schemas.microsoft.com/office/drawing/2014/main" id="{A9163D93-520B-4E65-A557-35D98D084B8A}"/>
               </a:ext>
             </a:extLst>
           </p:cNvPr>
@@ -7990,7 +7990,7 @@
           <p:cNvPr id="51" name="Connector: Elbow 50">
             <a:extLst>
               <a:ext uri="{FF2B5EF4-FFF2-40B4-BE49-F238E27FC236}">
-                <a16:creationId xmlns:a16="http://schemas.microsoft.com/office/drawing/2014/main" xmlns="" id="{F3D8DFA2-C1E2-4373-A2F9-2122211B7CAB}"/>
+                <a16:creationId xmlns:a16="http://schemas.microsoft.com/office/drawing/2014/main" id="{F3D8DFA2-C1E2-4373-A2F9-2122211B7CAB}"/>
               </a:ext>
             </a:extLst>
           </p:cNvPr>
@@ -8035,7 +8035,7 @@
           <p:cNvPr id="55" name="TextBox 54">
             <a:extLst>
               <a:ext uri="{FF2B5EF4-FFF2-40B4-BE49-F238E27FC236}">
-                <a16:creationId xmlns:a16="http://schemas.microsoft.com/office/drawing/2014/main" xmlns="" id="{30A842BA-3F1C-4DE9-86F9-282669FBEE29}"/>
+                <a16:creationId xmlns:a16="http://schemas.microsoft.com/office/drawing/2014/main" id="{30A842BA-3F1C-4DE9-86F9-282669FBEE29}"/>
               </a:ext>
             </a:extLst>
           </p:cNvPr>
@@ -8076,7 +8076,7 @@
           <p:cNvPr id="56" name="Rectangle 55">
             <a:extLst>
               <a:ext uri="{FF2B5EF4-FFF2-40B4-BE49-F238E27FC236}">
-                <a16:creationId xmlns:a16="http://schemas.microsoft.com/office/drawing/2014/main" xmlns="" id="{6D75D475-06B9-44A3-92FE-ED96EA1E4978}"/>
+                <a16:creationId xmlns:a16="http://schemas.microsoft.com/office/drawing/2014/main" id="{6D75D475-06B9-44A3-92FE-ED96EA1E4978}"/>
               </a:ext>
             </a:extLst>
           </p:cNvPr>
@@ -8134,7 +8134,7 @@
           <p:cNvPr id="63" name="Straight Arrow Connector 62">
             <a:extLst>
               <a:ext uri="{FF2B5EF4-FFF2-40B4-BE49-F238E27FC236}">
-                <a16:creationId xmlns:a16="http://schemas.microsoft.com/office/drawing/2014/main" xmlns="" id="{E7100880-5040-4C7F-9262-C2CEA4F51398}"/>
+                <a16:creationId xmlns:a16="http://schemas.microsoft.com/office/drawing/2014/main" id="{E7100880-5040-4C7F-9262-C2CEA4F51398}"/>
               </a:ext>
             </a:extLst>
           </p:cNvPr>
@@ -8178,7 +8178,7 @@
           <p:cNvPr id="67" name="TextBox 66">
             <a:extLst>
               <a:ext uri="{FF2B5EF4-FFF2-40B4-BE49-F238E27FC236}">
-                <a16:creationId xmlns:a16="http://schemas.microsoft.com/office/drawing/2014/main" xmlns="" id="{1EA0612B-38D3-44A7-AA9B-7E50E02E7D7F}"/>
+                <a16:creationId xmlns:a16="http://schemas.microsoft.com/office/drawing/2014/main" id="{1EA0612B-38D3-44A7-AA9B-7E50E02E7D7F}"/>
               </a:ext>
             </a:extLst>
           </p:cNvPr>
@@ -8213,7 +8213,7 @@
           <p:cNvPr id="71" name="TextBox 70">
             <a:extLst>
               <a:ext uri="{FF2B5EF4-FFF2-40B4-BE49-F238E27FC236}">
-                <a16:creationId xmlns:a16="http://schemas.microsoft.com/office/drawing/2014/main" xmlns="" id="{51E6A0BF-B978-415A-8FE1-547ACFB66EE3}"/>
+                <a16:creationId xmlns:a16="http://schemas.microsoft.com/office/drawing/2014/main" id="{51E6A0BF-B978-415A-8FE1-547ACFB66EE3}"/>
               </a:ext>
             </a:extLst>
           </p:cNvPr>
@@ -8248,7 +8248,7 @@
           <p:cNvPr id="84" name="Arrow: Right 83">
             <a:extLst>
               <a:ext uri="{FF2B5EF4-FFF2-40B4-BE49-F238E27FC236}">
-                <a16:creationId xmlns:a16="http://schemas.microsoft.com/office/drawing/2014/main" xmlns="" id="{FD9B5306-DCDF-4314-AFD1-058BC3BE2246}"/>
+                <a16:creationId xmlns:a16="http://schemas.microsoft.com/office/drawing/2014/main" id="{FD9B5306-DCDF-4314-AFD1-058BC3BE2246}"/>
               </a:ext>
             </a:extLst>
           </p:cNvPr>
@@ -8293,7 +8293,7 @@
           <p:cNvPr id="85" name="TextBox 84">
             <a:extLst>
               <a:ext uri="{FF2B5EF4-FFF2-40B4-BE49-F238E27FC236}">
-                <a16:creationId xmlns:a16="http://schemas.microsoft.com/office/drawing/2014/main" xmlns="" id="{724A1DC2-31CF-4E96-B996-C14597AF95C5}"/>
+                <a16:creationId xmlns:a16="http://schemas.microsoft.com/office/drawing/2014/main" id="{724A1DC2-31CF-4E96-B996-C14597AF95C5}"/>
               </a:ext>
             </a:extLst>
           </p:cNvPr>
@@ -8332,7 +8332,7 @@
           <p:cNvPr id="52" name="Straight Arrow Connector 51">
             <a:extLst>
               <a:ext uri="{FF2B5EF4-FFF2-40B4-BE49-F238E27FC236}">
-                <a16:creationId xmlns:a16="http://schemas.microsoft.com/office/drawing/2014/main" xmlns="" id="{BE01E8DC-2BED-41DF-B0BA-E188871FFE5C}"/>
+                <a16:creationId xmlns:a16="http://schemas.microsoft.com/office/drawing/2014/main" id="{BE01E8DC-2BED-41DF-B0BA-E188871FFE5C}"/>
               </a:ext>
             </a:extLst>
           </p:cNvPr>
@@ -8376,7 +8376,7 @@
           <p:cNvPr id="53" name="Straight Arrow Connector 52">
             <a:extLst>
               <a:ext uri="{FF2B5EF4-FFF2-40B4-BE49-F238E27FC236}">
-                <a16:creationId xmlns:a16="http://schemas.microsoft.com/office/drawing/2014/main" xmlns="" id="{EAA24497-0FA2-42C5-A7FB-8AD8047B3277}"/>
+                <a16:creationId xmlns:a16="http://schemas.microsoft.com/office/drawing/2014/main" id="{EAA24497-0FA2-42C5-A7FB-8AD8047B3277}"/>
               </a:ext>
             </a:extLst>
           </p:cNvPr>
@@ -8421,7 +8421,7 @@
           <p:cNvPr id="59" name="Straight Arrow Connector 58">
             <a:extLst>
               <a:ext uri="{FF2B5EF4-FFF2-40B4-BE49-F238E27FC236}">
-                <a16:creationId xmlns:a16="http://schemas.microsoft.com/office/drawing/2014/main" xmlns="" id="{1D187BC3-0578-4FE7-868C-BE0528891B6D}"/>
+                <a16:creationId xmlns:a16="http://schemas.microsoft.com/office/drawing/2014/main" id="{1D187BC3-0578-4FE7-868C-BE0528891B6D}"/>
               </a:ext>
             </a:extLst>
           </p:cNvPr>
@@ -8465,7 +8465,7 @@
           <p:cNvPr id="69" name="Connector: Elbow 68">
             <a:extLst>
               <a:ext uri="{FF2B5EF4-FFF2-40B4-BE49-F238E27FC236}">
-                <a16:creationId xmlns:a16="http://schemas.microsoft.com/office/drawing/2014/main" xmlns="" id="{19C36ADA-8B83-4190-BF2D-7776696199EF}"/>
+                <a16:creationId xmlns:a16="http://schemas.microsoft.com/office/drawing/2014/main" id="{19C36ADA-8B83-4190-BF2D-7776696199EF}"/>
               </a:ext>
             </a:extLst>
           </p:cNvPr>
@@ -8511,7 +8511,7 @@
           <p:cNvPr id="74" name="TextBox 73">
             <a:extLst>
               <a:ext uri="{FF2B5EF4-FFF2-40B4-BE49-F238E27FC236}">
-                <a16:creationId xmlns:a16="http://schemas.microsoft.com/office/drawing/2014/main" xmlns="" id="{1CBD3C37-190F-4E45-9C00-A714AD23595B}"/>
+                <a16:creationId xmlns:a16="http://schemas.microsoft.com/office/drawing/2014/main" id="{1CBD3C37-190F-4E45-9C00-A714AD23595B}"/>
               </a:ext>
             </a:extLst>
           </p:cNvPr>
@@ -8546,7 +8546,7 @@
           <p:cNvPr id="37" name="Rectangle 36">
             <a:extLst>
               <a:ext uri="{FF2B5EF4-FFF2-40B4-BE49-F238E27FC236}">
-                <a16:creationId xmlns:a16="http://schemas.microsoft.com/office/drawing/2014/main" xmlns="" id="{41463EDA-EAE6-4ED6-BAE2-7D20C34584DA}"/>
+                <a16:creationId xmlns:a16="http://schemas.microsoft.com/office/drawing/2014/main" id="{41463EDA-EAE6-4ED6-BAE2-7D20C34584DA}"/>
               </a:ext>
             </a:extLst>
           </p:cNvPr>
@@ -8594,7 +8594,7 @@
           <p:cNvPr id="38" name="Rectangle 37">
             <a:extLst>
               <a:ext uri="{FF2B5EF4-FFF2-40B4-BE49-F238E27FC236}">
-                <a16:creationId xmlns:a16="http://schemas.microsoft.com/office/drawing/2014/main" xmlns="" id="{FE4F45C9-3D84-4BA5-8A52-382514D6080D}"/>
+                <a16:creationId xmlns:a16="http://schemas.microsoft.com/office/drawing/2014/main" id="{FE4F45C9-3D84-4BA5-8A52-382514D6080D}"/>
               </a:ext>
             </a:extLst>
           </p:cNvPr>
@@ -8645,7 +8645,7 @@
           <p:cNvPr id="54" name="Straight Arrow Connector 53">
             <a:extLst>
               <a:ext uri="{FF2B5EF4-FFF2-40B4-BE49-F238E27FC236}">
-                <a16:creationId xmlns:a16="http://schemas.microsoft.com/office/drawing/2014/main" xmlns="" id="{B4E8CEBB-BF80-4D42-91F3-781CDD370EEF}"/>
+                <a16:creationId xmlns:a16="http://schemas.microsoft.com/office/drawing/2014/main" id="{B4E8CEBB-BF80-4D42-91F3-781CDD370EEF}"/>
               </a:ext>
             </a:extLst>
           </p:cNvPr>
@@ -8689,7 +8689,7 @@
           <p:cNvPr id="60" name="Straight Arrow Connector 59">
             <a:extLst>
               <a:ext uri="{FF2B5EF4-FFF2-40B4-BE49-F238E27FC236}">
-                <a16:creationId xmlns:a16="http://schemas.microsoft.com/office/drawing/2014/main" xmlns="" id="{1124F173-25BC-47F6-B4D4-175D55CDD154}"/>
+                <a16:creationId xmlns:a16="http://schemas.microsoft.com/office/drawing/2014/main" id="{1124F173-25BC-47F6-B4D4-175D55CDD154}"/>
               </a:ext>
             </a:extLst>
           </p:cNvPr>
@@ -8733,7 +8733,7 @@
           <p:cNvPr id="64" name="TextBox 63">
             <a:extLst>
               <a:ext uri="{FF2B5EF4-FFF2-40B4-BE49-F238E27FC236}">
-                <a16:creationId xmlns:a16="http://schemas.microsoft.com/office/drawing/2014/main" xmlns="" id="{DB9284FD-C58A-4AD6-8A2C-32A75264A8C8}"/>
+                <a16:creationId xmlns:a16="http://schemas.microsoft.com/office/drawing/2014/main" id="{DB9284FD-C58A-4AD6-8A2C-32A75264A8C8}"/>
               </a:ext>
             </a:extLst>
           </p:cNvPr>
@@ -8768,7 +8768,7 @@
           <p:cNvPr id="65" name="TextBox 64">
             <a:extLst>
               <a:ext uri="{FF2B5EF4-FFF2-40B4-BE49-F238E27FC236}">
-                <a16:creationId xmlns:a16="http://schemas.microsoft.com/office/drawing/2014/main" xmlns="" id="{47FA08B7-1F99-449B-BA71-170418030C03}"/>
+                <a16:creationId xmlns:a16="http://schemas.microsoft.com/office/drawing/2014/main" id="{47FA08B7-1F99-449B-BA71-170418030C03}"/>
               </a:ext>
             </a:extLst>
           </p:cNvPr>
@@ -8833,7 +8833,7 @@
           <p:cNvPr id="2" name="Picture 1">
             <a:extLst>
               <a:ext uri="{FF2B5EF4-FFF2-40B4-BE49-F238E27FC236}">
-                <a16:creationId xmlns:a16="http://schemas.microsoft.com/office/drawing/2014/main" xmlns="" id="{A1D3969D-3A4E-432A-8D97-1198D0592C67}"/>
+                <a16:creationId xmlns:a16="http://schemas.microsoft.com/office/drawing/2014/main" id="{A1D3969D-3A4E-432A-8D97-1198D0592C67}"/>
               </a:ext>
             </a:extLst>
           </p:cNvPr>
@@ -8901,7 +8901,7 @@
           <p:cNvPr id="2" name="Rectangle 1">
             <a:extLst>
               <a:ext uri="{FF2B5EF4-FFF2-40B4-BE49-F238E27FC236}">
-                <a16:creationId xmlns:a16="http://schemas.microsoft.com/office/drawing/2014/main" xmlns="" id="{F6A74462-8F47-4B8F-BE38-FAEA0C91AD42}"/>
+                <a16:creationId xmlns:a16="http://schemas.microsoft.com/office/drawing/2014/main" id="{F6A74462-8F47-4B8F-BE38-FAEA0C91AD42}"/>
               </a:ext>
             </a:extLst>
           </p:cNvPr>
@@ -8910,7 +8910,7 @@
         </p:nvSpPr>
         <p:spPr>
           <a:xfrm>
-            <a:off x="7116519" y="2780730"/>
+            <a:off x="7116519" y="2756333"/>
             <a:ext cx="2212622" cy="733778"/>
           </a:xfrm>
           <a:prstGeom prst="rect">
@@ -8948,7 +8948,7 @@
           <p:cNvPr id="3" name="Rectangle 2">
             <a:extLst>
               <a:ext uri="{FF2B5EF4-FFF2-40B4-BE49-F238E27FC236}">
-                <a16:creationId xmlns:a16="http://schemas.microsoft.com/office/drawing/2014/main" xmlns="" id="{B31A5C86-C059-4E4F-A36D-7C43FC1208A0}"/>
+                <a16:creationId xmlns:a16="http://schemas.microsoft.com/office/drawing/2014/main" id="{B31A5C86-C059-4E4F-A36D-7C43FC1208A0}"/>
               </a:ext>
             </a:extLst>
           </p:cNvPr>
@@ -8957,8 +8957,8 @@
         </p:nvSpPr>
         <p:spPr>
           <a:xfrm>
-            <a:off x="3064921" y="2546563"/>
-            <a:ext cx="2227612" cy="807156"/>
+            <a:off x="3064921" y="2756333"/>
+            <a:ext cx="2227612" cy="733778"/>
           </a:xfrm>
           <a:prstGeom prst="rect">
             <a:avLst/>
@@ -8995,7 +8995,7 @@
           <p:cNvPr id="4" name="Rectangle 3">
             <a:extLst>
               <a:ext uri="{FF2B5EF4-FFF2-40B4-BE49-F238E27FC236}">
-                <a16:creationId xmlns:a16="http://schemas.microsoft.com/office/drawing/2014/main" xmlns="" id="{3B5562F6-BD36-484D-B513-EA4AFBF6A46D}"/>
+                <a16:creationId xmlns:a16="http://schemas.microsoft.com/office/drawing/2014/main" id="{3B5562F6-BD36-484D-B513-EA4AFBF6A46D}"/>
               </a:ext>
             </a:extLst>
           </p:cNvPr>
@@ -9004,7 +9004,7 @@
         </p:nvSpPr>
         <p:spPr>
           <a:xfrm>
-            <a:off x="4645383" y="185275"/>
+            <a:off x="5135135" y="142669"/>
             <a:ext cx="2212622" cy="733778"/>
           </a:xfrm>
           <a:prstGeom prst="rect">
@@ -9047,23 +9047,24 @@
       </p:sp>
       <p:cxnSp>
         <p:nvCxnSpPr>
-          <p:cNvPr id="5" name="Connector: Elbow 15">
-            <a:extLst>
-              <a:ext uri="{FF2B5EF4-FFF2-40B4-BE49-F238E27FC236}">
-                <a16:creationId xmlns:a16="http://schemas.microsoft.com/office/drawing/2014/main" xmlns="" id="{8311314B-2261-48F7-8392-22D61FC10F4C}"/>
+          <p:cNvPr id="6" name="Connector: Elbow 16">
+            <a:extLst>
+              <a:ext uri="{FF2B5EF4-FFF2-40B4-BE49-F238E27FC236}">
+                <a16:creationId xmlns:a16="http://schemas.microsoft.com/office/drawing/2014/main" id="{433064AB-FEF6-4A7D-AAAE-AB72F5F2430F}"/>
               </a:ext>
             </a:extLst>
           </p:cNvPr>
           <p:cNvCxnSpPr>
+            <a:cxnSpLocks/>
             <a:stCxn id="23" idx="2"/>
-            <a:endCxn id="16" idx="0"/>
+            <a:endCxn id="24" idx="0"/>
           </p:cNvCxnSpPr>
           <p:nvPr/>
         </p:nvCxnSpPr>
         <p:spPr>
-          <a:xfrm rot="16200000" flipH="1">
-            <a:off x="8347114" y="4752587"/>
-            <a:ext cx="939079" cy="1187647"/>
+          <a:xfrm rot="5400000">
+            <a:off x="6762599" y="4355719"/>
+            <a:ext cx="939079" cy="1981384"/>
           </a:xfrm>
           <a:prstGeom prst="bentConnector3">
             <a:avLst>
@@ -9071,8 +9072,344 @@
             </a:avLst>
           </a:prstGeom>
           <a:ln w="28575">
-            <a:headEnd type="triangle" w="lg" len="lg"/>
-            <a:tailEnd type="none"/>
+            <a:headEnd type="none" w="lg" len="lg"/>
+            <a:tailEnd type="triangle"/>
+          </a:ln>
+        </p:spPr>
+        <p:style>
+          <a:lnRef idx="1">
+            <a:schemeClr val="accent1"/>
+          </a:lnRef>
+          <a:fillRef idx="0">
+            <a:schemeClr val="accent1"/>
+          </a:fillRef>
+          <a:effectRef idx="0">
+            <a:schemeClr val="accent1"/>
+          </a:effectRef>
+          <a:fontRef idx="minor">
+            <a:schemeClr val="tx1"/>
+          </a:fontRef>
+        </p:style>
+      </p:cxnSp>
+      <p:sp>
+        <p:nvSpPr>
+          <p:cNvPr id="7" name="Right Brace 6">
+            <a:extLst>
+              <a:ext uri="{FF2B5EF4-FFF2-40B4-BE49-F238E27FC236}">
+                <a16:creationId xmlns:a16="http://schemas.microsoft.com/office/drawing/2014/main" id="{C30BEFF4-A930-4D26-BC0A-2B7945E3A077}"/>
+              </a:ext>
+            </a:extLst>
+          </p:cNvPr>
+          <p:cNvSpPr/>
+          <p:nvPr/>
+        </p:nvSpPr>
+        <p:spPr>
+          <a:xfrm rot="16200000">
+            <a:off x="5934680" y="-805703"/>
+            <a:ext cx="613533" cy="4125439"/>
+          </a:xfrm>
+          <a:prstGeom prst="rightBrace">
+            <a:avLst/>
+          </a:prstGeom>
+        </p:spPr>
+        <p:style>
+          <a:lnRef idx="1">
+            <a:schemeClr val="accent1"/>
+          </a:lnRef>
+          <a:fillRef idx="0">
+            <a:schemeClr val="accent1"/>
+          </a:fillRef>
+          <a:effectRef idx="0">
+            <a:schemeClr val="accent1"/>
+          </a:effectRef>
+          <a:fontRef idx="minor">
+            <a:schemeClr val="tx1"/>
+          </a:fontRef>
+        </p:style>
+        <p:txBody>
+          <a:bodyPr rtlCol="0" anchor="ctr"/>
+          <a:lstStyle/>
+          <a:p>
+            <a:pPr algn="ctr"/>
+            <a:endParaRPr lang="en-US"/>
+          </a:p>
+        </p:txBody>
+      </p:sp>
+      <p:sp>
+        <p:nvSpPr>
+          <p:cNvPr id="10" name="Rectangle 9">
+            <a:extLst>
+              <a:ext uri="{FF2B5EF4-FFF2-40B4-BE49-F238E27FC236}">
+                <a16:creationId xmlns:a16="http://schemas.microsoft.com/office/drawing/2014/main" id="{41463EDA-EAE6-4ED6-BAE2-7D20C34584DA}"/>
+              </a:ext>
+            </a:extLst>
+          </p:cNvPr>
+          <p:cNvSpPr/>
+          <p:nvPr/>
+        </p:nvSpPr>
+        <p:spPr>
+          <a:xfrm>
+            <a:off x="3064921" y="1484920"/>
+            <a:ext cx="2227612" cy="655730"/>
+          </a:xfrm>
+          <a:prstGeom prst="rect">
+            <a:avLst/>
+          </a:prstGeom>
+        </p:spPr>
+        <p:style>
+          <a:lnRef idx="1">
+            <a:schemeClr val="accent5"/>
+          </a:lnRef>
+          <a:fillRef idx="2">
+            <a:schemeClr val="accent5"/>
+          </a:fillRef>
+          <a:effectRef idx="1">
+            <a:schemeClr val="accent5"/>
+          </a:effectRef>
+          <a:fontRef idx="minor">
+            <a:schemeClr val="dk1"/>
+          </a:fontRef>
+        </p:style>
+        <p:txBody>
+          <a:bodyPr rtlCol="0" anchor="ctr"/>
+          <a:lstStyle/>
+          <a:p>
+            <a:pPr algn="ctr"/>
+            <a:r>
+              <a:rPr lang="en-US" b="1" dirty="0" err="1"/>
+              <a:t>codal-arduino-uno</a:t>
+            </a:r>
+            <a:endParaRPr lang="en-US" b="1" dirty="0"/>
+          </a:p>
+        </p:txBody>
+      </p:sp>
+      <p:sp>
+        <p:nvSpPr>
+          <p:cNvPr id="11" name="Rectangle 10">
+            <a:extLst>
+              <a:ext uri="{FF2B5EF4-FFF2-40B4-BE49-F238E27FC236}">
+                <a16:creationId xmlns:a16="http://schemas.microsoft.com/office/drawing/2014/main" id="{FE4F45C9-3D84-4BA5-8A52-382514D6080D}"/>
+              </a:ext>
+            </a:extLst>
+          </p:cNvPr>
+          <p:cNvSpPr/>
+          <p:nvPr/>
+        </p:nvSpPr>
+        <p:spPr>
+          <a:xfrm>
+            <a:off x="7116520" y="1484920"/>
+            <a:ext cx="2212621" cy="669219"/>
+          </a:xfrm>
+          <a:prstGeom prst="rect">
+            <a:avLst/>
+          </a:prstGeom>
+        </p:spPr>
+        <p:style>
+          <a:lnRef idx="1">
+            <a:schemeClr val="accent5"/>
+          </a:lnRef>
+          <a:fillRef idx="2">
+            <a:schemeClr val="accent5"/>
+          </a:fillRef>
+          <a:effectRef idx="1">
+            <a:schemeClr val="accent5"/>
+          </a:effectRef>
+          <a:fontRef idx="minor">
+            <a:schemeClr val="dk1"/>
+          </a:fontRef>
+        </p:style>
+        <p:txBody>
+          <a:bodyPr rtlCol="0" anchor="ctr"/>
+          <a:lstStyle/>
+          <a:p>
+            <a:pPr algn="ctr"/>
+            <a:r>
+              <a:rPr lang="en-US" b="1" dirty="0" err="1"/>
+              <a:t>codal</a:t>
+            </a:r>
+            <a:r>
+              <a:rPr lang="en-US" b="1" dirty="0"/>
+              <a:t>-circuit-playground</a:t>
+            </a:r>
+          </a:p>
+        </p:txBody>
+      </p:sp>
+      <p:sp>
+        <p:nvSpPr>
+          <p:cNvPr id="16" name="Rectangle 15">
+            <a:extLst>
+              <a:ext uri="{FF2B5EF4-FFF2-40B4-BE49-F238E27FC236}">
+                <a16:creationId xmlns:a16="http://schemas.microsoft.com/office/drawing/2014/main" id="{0C2BA48E-758E-4035-B49C-4F47EB965891}"/>
+              </a:ext>
+            </a:extLst>
+          </p:cNvPr>
+          <p:cNvSpPr/>
+          <p:nvPr/>
+        </p:nvSpPr>
+        <p:spPr>
+          <a:xfrm>
+            <a:off x="9760432" y="4143092"/>
+            <a:ext cx="2212622" cy="733778"/>
+          </a:xfrm>
+          <a:prstGeom prst="rect">
+            <a:avLst/>
+          </a:prstGeom>
+        </p:spPr>
+        <p:style>
+          <a:lnRef idx="1">
+            <a:schemeClr val="accent6"/>
+          </a:lnRef>
+          <a:fillRef idx="2">
+            <a:schemeClr val="accent6"/>
+          </a:fillRef>
+          <a:effectRef idx="1">
+            <a:schemeClr val="accent6"/>
+          </a:effectRef>
+          <a:fontRef idx="minor">
+            <a:schemeClr val="dk1"/>
+          </a:fontRef>
+        </p:style>
+        <p:txBody>
+          <a:bodyPr rtlCol="0" anchor="ctr"/>
+          <a:lstStyle/>
+          <a:p>
+            <a:pPr algn="ctr"/>
+            <a:r>
+              <a:rPr lang="en-US" b="1" dirty="0" err="1"/>
+              <a:t>mbed</a:t>
+            </a:r>
+            <a:r>
+              <a:rPr lang="en-US" b="1" dirty="0"/>
+              <a:t>-classic</a:t>
+            </a:r>
+          </a:p>
+        </p:txBody>
+      </p:sp>
+      <p:sp>
+        <p:nvSpPr>
+          <p:cNvPr id="23" name="Rectangle 22">
+            <a:extLst>
+              <a:ext uri="{FF2B5EF4-FFF2-40B4-BE49-F238E27FC236}">
+                <a16:creationId xmlns:a16="http://schemas.microsoft.com/office/drawing/2014/main" id="{F6A74462-8F47-4B8F-BE38-FAEA0C91AD42}"/>
+              </a:ext>
+            </a:extLst>
+          </p:cNvPr>
+          <p:cNvSpPr/>
+          <p:nvPr/>
+        </p:nvSpPr>
+        <p:spPr>
+          <a:xfrm>
+            <a:off x="7116519" y="4143094"/>
+            <a:ext cx="2212622" cy="733778"/>
+          </a:xfrm>
+          <a:prstGeom prst="rect">
+            <a:avLst/>
+          </a:prstGeom>
+        </p:spPr>
+        <p:style>
+          <a:lnRef idx="1">
+            <a:schemeClr val="accent5"/>
+          </a:lnRef>
+          <a:fillRef idx="2">
+            <a:schemeClr val="accent5"/>
+          </a:fillRef>
+          <a:effectRef idx="1">
+            <a:schemeClr val="accent5"/>
+          </a:effectRef>
+          <a:fontRef idx="minor">
+            <a:schemeClr val="dk1"/>
+          </a:fontRef>
+        </p:style>
+        <p:txBody>
+          <a:bodyPr rtlCol="0" anchor="ctr"/>
+          <a:lstStyle/>
+          <a:p>
+            <a:pPr algn="ctr"/>
+            <a:r>
+              <a:rPr lang="en-US" b="1" dirty="0" err="1"/>
+              <a:t>codal-mbed</a:t>
+            </a:r>
+            <a:endParaRPr lang="en-US" b="1" dirty="0"/>
+          </a:p>
+        </p:txBody>
+      </p:sp>
+      <p:sp>
+        <p:nvSpPr>
+          <p:cNvPr id="24" name="Rectangle 23">
+            <a:extLst>
+              <a:ext uri="{FF2B5EF4-FFF2-40B4-BE49-F238E27FC236}">
+                <a16:creationId xmlns:a16="http://schemas.microsoft.com/office/drawing/2014/main" id="{0C2BA48E-758E-4035-B49C-4F47EB965891}"/>
+              </a:ext>
+            </a:extLst>
+          </p:cNvPr>
+          <p:cNvSpPr/>
+          <p:nvPr/>
+        </p:nvSpPr>
+        <p:spPr>
+          <a:xfrm>
+            <a:off x="5135135" y="5815951"/>
+            <a:ext cx="2212622" cy="733778"/>
+          </a:xfrm>
+          <a:prstGeom prst="rect">
+            <a:avLst/>
+          </a:prstGeom>
+        </p:spPr>
+        <p:style>
+          <a:lnRef idx="1">
+            <a:schemeClr val="accent5"/>
+          </a:lnRef>
+          <a:fillRef idx="2">
+            <a:schemeClr val="accent5"/>
+          </a:fillRef>
+          <a:effectRef idx="1">
+            <a:schemeClr val="accent5"/>
+          </a:effectRef>
+          <a:fontRef idx="minor">
+            <a:schemeClr val="dk1"/>
+          </a:fontRef>
+        </p:style>
+        <p:txBody>
+          <a:bodyPr rtlCol="0" anchor="ctr"/>
+          <a:lstStyle/>
+          <a:p>
+            <a:pPr algn="ctr"/>
+            <a:r>
+              <a:rPr lang="en-US" b="1" dirty="0" err="1"/>
+              <a:t>codal</a:t>
+            </a:r>
+            <a:r>
+              <a:rPr lang="en-US" b="1" dirty="0"/>
+              <a:t>-core</a:t>
+            </a:r>
+          </a:p>
+        </p:txBody>
+      </p:sp>
+      <p:cxnSp>
+        <p:nvCxnSpPr>
+          <p:cNvPr id="36" name="Straight Arrow Connector 35">
+            <a:extLst>
+              <a:ext uri="{FF2B5EF4-FFF2-40B4-BE49-F238E27FC236}">
+                <a16:creationId xmlns:a16="http://schemas.microsoft.com/office/drawing/2014/main" id="{777A8EBD-E41A-4FC4-9959-8595DAB5B9A5}"/>
+              </a:ext>
+            </a:extLst>
+          </p:cNvPr>
+          <p:cNvCxnSpPr>
+            <a:cxnSpLocks/>
+            <a:stCxn id="10" idx="2"/>
+            <a:endCxn id="3" idx="0"/>
+          </p:cNvCxnSpPr>
+          <p:nvPr/>
+        </p:nvCxnSpPr>
+        <p:spPr>
+          <a:xfrm>
+            <a:off x="4178727" y="2140650"/>
+            <a:ext cx="0" cy="615683"/>
+          </a:xfrm>
+          <a:prstGeom prst="straightConnector1">
+            <a:avLst/>
+          </a:prstGeom>
+          <a:ln w="25400">
+            <a:tailEnd type="triangle"/>
           </a:ln>
         </p:spPr>
         <p:style>
@@ -9092,376 +9429,30 @@
       </p:cxnSp>
       <p:cxnSp>
         <p:nvCxnSpPr>
-          <p:cNvPr id="6" name="Connector: Elbow 16">
-            <a:extLst>
-              <a:ext uri="{FF2B5EF4-FFF2-40B4-BE49-F238E27FC236}">
-                <a16:creationId xmlns:a16="http://schemas.microsoft.com/office/drawing/2014/main" xmlns="" id="{433064AB-FEF6-4A7D-AAAE-AB72F5F2430F}"/>
+          <p:cNvPr id="39" name="Straight Arrow Connector 38">
+            <a:extLst>
+              <a:ext uri="{FF2B5EF4-FFF2-40B4-BE49-F238E27FC236}">
+                <a16:creationId xmlns:a16="http://schemas.microsoft.com/office/drawing/2014/main" id="{60E4D5C0-5273-493B-BC64-24D016BE5B44}"/>
               </a:ext>
             </a:extLst>
           </p:cNvPr>
           <p:cNvCxnSpPr>
             <a:cxnSpLocks/>
-            <a:stCxn id="23" idx="2"/>
-            <a:endCxn id="24" idx="0"/>
+            <a:stCxn id="11" idx="2"/>
+            <a:endCxn id="2" idx="0"/>
           </p:cNvCxnSpPr>
           <p:nvPr/>
         </p:nvCxnSpPr>
         <p:spPr>
-          <a:xfrm rot="5400000">
-            <a:off x="7070879" y="4663999"/>
-            <a:ext cx="939079" cy="1364825"/>
-          </a:xfrm>
-          <a:prstGeom prst="bentConnector3">
-            <a:avLst>
-              <a:gd name="adj1" fmla="val 50000"/>
-            </a:avLst>
-          </a:prstGeom>
-          <a:ln w="28575">
-            <a:headEnd type="triangle" w="lg" len="lg"/>
-            <a:tailEnd type="none"/>
-          </a:ln>
-        </p:spPr>
-        <p:style>
-          <a:lnRef idx="1">
-            <a:schemeClr val="accent1"/>
-          </a:lnRef>
-          <a:fillRef idx="0">
-            <a:schemeClr val="accent1"/>
-          </a:fillRef>
-          <a:effectRef idx="0">
-            <a:schemeClr val="accent1"/>
-          </a:effectRef>
-          <a:fontRef idx="minor">
-            <a:schemeClr val="tx1"/>
-          </a:fontRef>
-        </p:style>
-      </p:cxnSp>
-      <p:sp>
-        <p:nvSpPr>
-          <p:cNvPr id="7" name="Right Brace 6">
-            <a:extLst>
-              <a:ext uri="{FF2B5EF4-FFF2-40B4-BE49-F238E27FC236}">
-                <a16:creationId xmlns:a16="http://schemas.microsoft.com/office/drawing/2014/main" xmlns="" id="{C30BEFF4-A930-4D26-BC0A-2B7945E3A077}"/>
-              </a:ext>
-            </a:extLst>
-          </p:cNvPr>
-          <p:cNvSpPr/>
-          <p:nvPr/>
-        </p:nvSpPr>
-        <p:spPr>
-          <a:xfrm rot="16200000">
-            <a:off x="5934680" y="-805703"/>
-            <a:ext cx="613533" cy="4125439"/>
-          </a:xfrm>
-          <a:prstGeom prst="rightBrace">
+          <a:xfrm flipH="1">
+            <a:off x="8222830" y="2154139"/>
+            <a:ext cx="1" cy="602194"/>
+          </a:xfrm>
+          <a:prstGeom prst="straightConnector1">
             <a:avLst/>
           </a:prstGeom>
-        </p:spPr>
-        <p:style>
-          <a:lnRef idx="1">
-            <a:schemeClr val="accent1"/>
-          </a:lnRef>
-          <a:fillRef idx="0">
-            <a:schemeClr val="accent1"/>
-          </a:fillRef>
-          <a:effectRef idx="0">
-            <a:schemeClr val="accent1"/>
-          </a:effectRef>
-          <a:fontRef idx="minor">
-            <a:schemeClr val="tx1"/>
-          </a:fontRef>
-        </p:style>
-        <p:txBody>
-          <a:bodyPr rtlCol="0" anchor="ctr"/>
-          <a:lstStyle/>
-          <a:p>
-            <a:pPr algn="ctr"/>
-            <a:endParaRPr lang="en-US"/>
-          </a:p>
-        </p:txBody>
-      </p:sp>
-      <p:sp>
-        <p:nvSpPr>
-          <p:cNvPr id="10" name="Rectangle 9">
-            <a:extLst>
-              <a:ext uri="{FF2B5EF4-FFF2-40B4-BE49-F238E27FC236}">
-                <a16:creationId xmlns:a16="http://schemas.microsoft.com/office/drawing/2014/main" xmlns="" id="{41463EDA-EAE6-4ED6-BAE2-7D20C34584DA}"/>
-              </a:ext>
-            </a:extLst>
-          </p:cNvPr>
-          <p:cNvSpPr/>
-          <p:nvPr/>
-        </p:nvSpPr>
-        <p:spPr>
-          <a:xfrm>
-            <a:off x="3064921" y="1484920"/>
-            <a:ext cx="2227612" cy="655730"/>
-          </a:xfrm>
-          <a:prstGeom prst="rect">
-            <a:avLst/>
-          </a:prstGeom>
-        </p:spPr>
-        <p:style>
-          <a:lnRef idx="1">
-            <a:schemeClr val="accent5"/>
-          </a:lnRef>
-          <a:fillRef idx="2">
-            <a:schemeClr val="accent5"/>
-          </a:fillRef>
-          <a:effectRef idx="1">
-            <a:schemeClr val="accent5"/>
-          </a:effectRef>
-          <a:fontRef idx="minor">
-            <a:schemeClr val="dk1"/>
-          </a:fontRef>
-        </p:style>
-        <p:txBody>
-          <a:bodyPr rtlCol="0" anchor="ctr"/>
-          <a:lstStyle/>
-          <a:p>
-            <a:pPr algn="ctr"/>
-            <a:r>
-              <a:rPr lang="en-US" b="1" dirty="0" err="1"/>
-              <a:t>codal-arduino-uno</a:t>
-            </a:r>
-            <a:endParaRPr lang="en-US" b="1" dirty="0"/>
-          </a:p>
-        </p:txBody>
-      </p:sp>
-      <p:sp>
-        <p:nvSpPr>
-          <p:cNvPr id="11" name="Rectangle 10">
-            <a:extLst>
-              <a:ext uri="{FF2B5EF4-FFF2-40B4-BE49-F238E27FC236}">
-                <a16:creationId xmlns:a16="http://schemas.microsoft.com/office/drawing/2014/main" xmlns="" id="{FE4F45C9-3D84-4BA5-8A52-382514D6080D}"/>
-              </a:ext>
-            </a:extLst>
-          </p:cNvPr>
-          <p:cNvSpPr/>
-          <p:nvPr/>
-        </p:nvSpPr>
-        <p:spPr>
-          <a:xfrm>
-            <a:off x="7116520" y="1484920"/>
-            <a:ext cx="2212621" cy="669219"/>
-          </a:xfrm>
-          <a:prstGeom prst="rect">
-            <a:avLst/>
-          </a:prstGeom>
-        </p:spPr>
-        <p:style>
-          <a:lnRef idx="1">
-            <a:schemeClr val="accent5"/>
-          </a:lnRef>
-          <a:fillRef idx="2">
-            <a:schemeClr val="accent5"/>
-          </a:fillRef>
-          <a:effectRef idx="1">
-            <a:schemeClr val="accent5"/>
-          </a:effectRef>
-          <a:fontRef idx="minor">
-            <a:schemeClr val="dk1"/>
-          </a:fontRef>
-        </p:style>
-        <p:txBody>
-          <a:bodyPr rtlCol="0" anchor="ctr"/>
-          <a:lstStyle/>
-          <a:p>
-            <a:pPr algn="ctr"/>
-            <a:r>
-              <a:rPr lang="en-US" b="1" dirty="0" err="1"/>
-              <a:t>codal</a:t>
-            </a:r>
-            <a:r>
-              <a:rPr lang="en-US" b="1" dirty="0"/>
-              <a:t>-circuit-playground</a:t>
-            </a:r>
-          </a:p>
-        </p:txBody>
-      </p:sp>
-      <p:sp>
-        <p:nvSpPr>
-          <p:cNvPr id="16" name="Rectangle 15">
-            <a:extLst>
-              <a:ext uri="{FF2B5EF4-FFF2-40B4-BE49-F238E27FC236}">
-                <a16:creationId xmlns:a16="http://schemas.microsoft.com/office/drawing/2014/main" xmlns="" id="{0C2BA48E-758E-4035-B49C-4F47EB965891}"/>
-              </a:ext>
-            </a:extLst>
-          </p:cNvPr>
-          <p:cNvSpPr/>
-          <p:nvPr/>
-        </p:nvSpPr>
-        <p:spPr>
-          <a:xfrm>
-            <a:off x="8304166" y="5815951"/>
-            <a:ext cx="2212622" cy="733778"/>
-          </a:xfrm>
-          <a:prstGeom prst="rect">
-            <a:avLst/>
-          </a:prstGeom>
-        </p:spPr>
-        <p:style>
-          <a:lnRef idx="1">
-            <a:schemeClr val="accent5"/>
-          </a:lnRef>
-          <a:fillRef idx="2">
-            <a:schemeClr val="accent5"/>
-          </a:fillRef>
-          <a:effectRef idx="1">
-            <a:schemeClr val="accent5"/>
-          </a:effectRef>
-          <a:fontRef idx="minor">
-            <a:schemeClr val="dk1"/>
-          </a:fontRef>
-        </p:style>
-        <p:txBody>
-          <a:bodyPr rtlCol="0" anchor="ctr"/>
-          <a:lstStyle/>
-          <a:p>
-            <a:pPr algn="ctr"/>
-            <a:r>
-              <a:rPr lang="en-US" b="1" dirty="0" err="1"/>
-              <a:t>m</a:t>
-            </a:r>
-            <a:r>
-              <a:rPr lang="en-US" b="1" dirty="0" err="1" smtClean="0"/>
-              <a:t>bed</a:t>
-            </a:r>
-            <a:r>
-              <a:rPr lang="en-US" b="1" dirty="0" smtClean="0"/>
-              <a:t>-classic</a:t>
-            </a:r>
-            <a:endParaRPr lang="en-US" b="1" dirty="0"/>
-          </a:p>
-        </p:txBody>
-      </p:sp>
-      <p:sp>
-        <p:nvSpPr>
-          <p:cNvPr id="23" name="Rectangle 22">
-            <a:extLst>
-              <a:ext uri="{FF2B5EF4-FFF2-40B4-BE49-F238E27FC236}">
-                <a16:creationId xmlns:a16="http://schemas.microsoft.com/office/drawing/2014/main" xmlns="" id="{F6A74462-8F47-4B8F-BE38-FAEA0C91AD42}"/>
-              </a:ext>
-            </a:extLst>
-          </p:cNvPr>
-          <p:cNvSpPr/>
-          <p:nvPr/>
-        </p:nvSpPr>
-        <p:spPr>
-          <a:xfrm>
-            <a:off x="7116519" y="4143094"/>
-            <a:ext cx="2212622" cy="733778"/>
-          </a:xfrm>
-          <a:prstGeom prst="rect">
-            <a:avLst/>
-          </a:prstGeom>
-        </p:spPr>
-        <p:style>
-          <a:lnRef idx="1">
-            <a:schemeClr val="accent5"/>
-          </a:lnRef>
-          <a:fillRef idx="2">
-            <a:schemeClr val="accent5"/>
-          </a:fillRef>
-          <a:effectRef idx="1">
-            <a:schemeClr val="accent5"/>
-          </a:effectRef>
-          <a:fontRef idx="minor">
-            <a:schemeClr val="dk1"/>
-          </a:fontRef>
-        </p:style>
-        <p:txBody>
-          <a:bodyPr rtlCol="0" anchor="ctr"/>
-          <a:lstStyle/>
-          <a:p>
-            <a:pPr algn="ctr"/>
-            <a:r>
-              <a:rPr lang="en-US" b="1" dirty="0" err="1" smtClean="0"/>
-              <a:t>codal-mbed</a:t>
-            </a:r>
-            <a:endParaRPr lang="en-US" b="1" dirty="0"/>
-          </a:p>
-        </p:txBody>
-      </p:sp>
-      <p:sp>
-        <p:nvSpPr>
-          <p:cNvPr id="24" name="Rectangle 23">
-            <a:extLst>
-              <a:ext uri="{FF2B5EF4-FFF2-40B4-BE49-F238E27FC236}">
-                <a16:creationId xmlns:a16="http://schemas.microsoft.com/office/drawing/2014/main" xmlns="" id="{0C2BA48E-758E-4035-B49C-4F47EB965891}"/>
-              </a:ext>
-            </a:extLst>
-          </p:cNvPr>
-          <p:cNvSpPr/>
-          <p:nvPr/>
-        </p:nvSpPr>
-        <p:spPr>
-          <a:xfrm>
-            <a:off x="5751694" y="5815951"/>
-            <a:ext cx="2212622" cy="733778"/>
-          </a:xfrm>
-          <a:prstGeom prst="rect">
-            <a:avLst/>
-          </a:prstGeom>
-        </p:spPr>
-        <p:style>
-          <a:lnRef idx="1">
-            <a:schemeClr val="accent5"/>
-          </a:lnRef>
-          <a:fillRef idx="2">
-            <a:schemeClr val="accent5"/>
-          </a:fillRef>
-          <a:effectRef idx="1">
-            <a:schemeClr val="accent5"/>
-          </a:effectRef>
-          <a:fontRef idx="minor">
-            <a:schemeClr val="dk1"/>
-          </a:fontRef>
-        </p:style>
-        <p:txBody>
-          <a:bodyPr rtlCol="0" anchor="ctr"/>
-          <a:lstStyle/>
-          <a:p>
-            <a:pPr algn="ctr"/>
-            <a:r>
-              <a:rPr lang="en-US" b="1" dirty="0" err="1"/>
-              <a:t>codal</a:t>
-            </a:r>
-            <a:r>
-              <a:rPr lang="en-US" b="1" dirty="0"/>
-              <a:t>-core</a:t>
-            </a:r>
-          </a:p>
-        </p:txBody>
-      </p:sp>
-      <p:cxnSp>
-        <p:nvCxnSpPr>
-          <p:cNvPr id="198" name="Connector: Elbow 15">
-            <a:extLst>
-              <a:ext uri="{FF2B5EF4-FFF2-40B4-BE49-F238E27FC236}">
-                <a16:creationId xmlns:a16="http://schemas.microsoft.com/office/drawing/2014/main" xmlns="" id="{8311314B-2261-48F7-8392-22D61FC10F4C}"/>
-              </a:ext>
-            </a:extLst>
-          </p:cNvPr>
-          <p:cNvCxnSpPr>
-            <a:stCxn id="2" idx="2"/>
-            <a:endCxn id="23" idx="0"/>
-          </p:cNvCxnSpPr>
-          <p:nvPr/>
-        </p:nvCxnSpPr>
-        <p:spPr>
-          <a:xfrm rot="5400000">
-            <a:off x="7908537" y="3828801"/>
-            <a:ext cx="628586" cy="12700"/>
-          </a:xfrm>
-          <a:prstGeom prst="bentConnector3">
-            <a:avLst>
-              <a:gd name="adj1" fmla="val 50000"/>
-            </a:avLst>
-          </a:prstGeom>
-          <a:ln w="28575">
-            <a:headEnd type="triangle" w="lg" len="lg"/>
-            <a:tailEnd type="none"/>
+          <a:ln w="25400">
+            <a:tailEnd type="triangle"/>
           </a:ln>
         </p:spPr>
         <p:style>
@@ -9481,128 +9472,33 @@
       </p:cxnSp>
       <p:cxnSp>
         <p:nvCxnSpPr>
-          <p:cNvPr id="201" name="Connector: Elbow 15">
-            <a:extLst>
-              <a:ext uri="{FF2B5EF4-FFF2-40B4-BE49-F238E27FC236}">
-                <a16:creationId xmlns:a16="http://schemas.microsoft.com/office/drawing/2014/main" xmlns="" id="{8311314B-2261-48F7-8392-22D61FC10F4C}"/>
+          <p:cNvPr id="48" name="Connector: Elbow 16">
+            <a:extLst>
+              <a:ext uri="{FF2B5EF4-FFF2-40B4-BE49-F238E27FC236}">
+                <a16:creationId xmlns:a16="http://schemas.microsoft.com/office/drawing/2014/main" id="{B0968FC5-5599-4431-ABF4-4284E892CB08}"/>
               </a:ext>
             </a:extLst>
           </p:cNvPr>
           <p:cNvCxnSpPr>
-            <a:stCxn id="11" idx="2"/>
-            <a:endCxn id="2" idx="0"/>
+            <a:cxnSpLocks/>
+            <a:stCxn id="3" idx="2"/>
+            <a:endCxn id="24" idx="0"/>
           </p:cNvCxnSpPr>
           <p:nvPr/>
         </p:nvCxnSpPr>
         <p:spPr>
-          <a:xfrm rot="5400000">
-            <a:off x="7909536" y="2467434"/>
-            <a:ext cx="626591" cy="1"/>
+          <a:xfrm rot="16200000" flipH="1">
+            <a:off x="4047166" y="3621671"/>
+            <a:ext cx="2325840" cy="2062719"/>
           </a:xfrm>
           <a:prstGeom prst="bentConnector3">
             <a:avLst>
-              <a:gd name="adj1" fmla="val 50000"/>
+              <a:gd name="adj1" fmla="val 79996"/>
             </a:avLst>
           </a:prstGeom>
           <a:ln w="28575">
-            <a:headEnd type="triangle" w="lg" len="lg"/>
-            <a:tailEnd type="none"/>
-          </a:ln>
-        </p:spPr>
-        <p:style>
-          <a:lnRef idx="1">
-            <a:schemeClr val="accent1"/>
-          </a:lnRef>
-          <a:fillRef idx="0">
-            <a:schemeClr val="accent1"/>
-          </a:fillRef>
-          <a:effectRef idx="0">
-            <a:schemeClr val="accent1"/>
-          </a:effectRef>
-          <a:fontRef idx="minor">
-            <a:schemeClr val="tx1"/>
-          </a:fontRef>
-        </p:style>
-      </p:cxnSp>
-      <p:sp>
-        <p:nvSpPr>
-          <p:cNvPr id="208" name="Rectangle 207">
-            <a:extLst>
-              <a:ext uri="{FF2B5EF4-FFF2-40B4-BE49-F238E27FC236}">
-                <a16:creationId xmlns:a16="http://schemas.microsoft.com/office/drawing/2014/main" xmlns="" id="{0C2BA48E-758E-4035-B49C-4F47EB965891}"/>
-              </a:ext>
-            </a:extLst>
-          </p:cNvPr>
-          <p:cNvSpPr/>
-          <p:nvPr/>
-        </p:nvSpPr>
-        <p:spPr>
-          <a:xfrm>
-            <a:off x="3064921" y="3864694"/>
-            <a:ext cx="2227612" cy="733778"/>
-          </a:xfrm>
-          <a:prstGeom prst="rect">
-            <a:avLst/>
-          </a:prstGeom>
-        </p:spPr>
-        <p:style>
-          <a:lnRef idx="1">
-            <a:schemeClr val="accent5"/>
-          </a:lnRef>
-          <a:fillRef idx="2">
-            <a:schemeClr val="accent5"/>
-          </a:fillRef>
-          <a:effectRef idx="1">
-            <a:schemeClr val="accent5"/>
-          </a:effectRef>
-          <a:fontRef idx="minor">
-            <a:schemeClr val="dk1"/>
-          </a:fontRef>
-        </p:style>
-        <p:txBody>
-          <a:bodyPr rtlCol="0" anchor="ctr"/>
-          <a:lstStyle/>
-          <a:p>
-            <a:pPr algn="ctr"/>
-            <a:r>
-              <a:rPr lang="en-US" b="1" dirty="0" err="1"/>
-              <a:t>codal</a:t>
-            </a:r>
-            <a:r>
-              <a:rPr lang="en-US" b="1" dirty="0"/>
-              <a:t>-core</a:t>
-            </a:r>
-          </a:p>
-        </p:txBody>
-      </p:sp>
-      <p:cxnSp>
-        <p:nvCxnSpPr>
-          <p:cNvPr id="220" name="Connector: Elbow 15">
-            <a:extLst>
-              <a:ext uri="{FF2B5EF4-FFF2-40B4-BE49-F238E27FC236}">
-                <a16:creationId xmlns:a16="http://schemas.microsoft.com/office/drawing/2014/main" xmlns="" id="{8311314B-2261-48F7-8392-22D61FC10F4C}"/>
-              </a:ext>
-            </a:extLst>
-          </p:cNvPr>
-          <p:cNvCxnSpPr>
-            <a:stCxn id="10" idx="2"/>
-            <a:endCxn id="3" idx="0"/>
-          </p:cNvCxnSpPr>
-          <p:nvPr/>
-        </p:nvCxnSpPr>
-        <p:spPr>
-          <a:xfrm rot="5400000">
-            <a:off x="3975771" y="2343606"/>
-            <a:ext cx="405913" cy="12700"/>
-          </a:xfrm>
-          <a:prstGeom prst="bentConnector3">
-            <a:avLst>
-              <a:gd name="adj1" fmla="val 50000"/>
-            </a:avLst>
-          </a:prstGeom>
-          <a:ln w="28575">
-            <a:headEnd type="triangle" w="lg" len="lg"/>
-            <a:tailEnd type="none"/>
+            <a:headEnd type="none" w="lg" len="lg"/>
+            <a:tailEnd type="triangle"/>
           </a:ln>
         </p:spPr>
         <p:style>
@@ -9622,32 +9518,73 @@
       </p:cxnSp>
       <p:cxnSp>
         <p:nvCxnSpPr>
-          <p:cNvPr id="229" name="Connector: Elbow 15">
-            <a:extLst>
-              <a:ext uri="{FF2B5EF4-FFF2-40B4-BE49-F238E27FC236}">
-                <a16:creationId xmlns:a16="http://schemas.microsoft.com/office/drawing/2014/main" xmlns="" id="{8311314B-2261-48F7-8392-22D61FC10F4C}"/>
+          <p:cNvPr id="57" name="Straight Arrow Connector 56">
+            <a:extLst>
+              <a:ext uri="{FF2B5EF4-FFF2-40B4-BE49-F238E27FC236}">
+                <a16:creationId xmlns:a16="http://schemas.microsoft.com/office/drawing/2014/main" id="{1A6F820F-60FA-40B9-BFE4-560543DECC06}"/>
               </a:ext>
             </a:extLst>
           </p:cNvPr>
           <p:cNvCxnSpPr>
-            <a:stCxn id="3" idx="2"/>
-            <a:endCxn id="208" idx="0"/>
+            <a:cxnSpLocks/>
+            <a:stCxn id="2" idx="2"/>
+            <a:endCxn id="23" idx="0"/>
           </p:cNvCxnSpPr>
           <p:nvPr/>
         </p:nvCxnSpPr>
         <p:spPr>
-          <a:xfrm rot="5400000">
-            <a:off x="3923240" y="3609206"/>
-            <a:ext cx="510975" cy="12700"/>
-          </a:xfrm>
-          <a:prstGeom prst="bentConnector3">
-            <a:avLst>
-              <a:gd name="adj1" fmla="val 50000"/>
-            </a:avLst>
+          <a:xfrm>
+            <a:off x="8222830" y="3490111"/>
+            <a:ext cx="0" cy="652983"/>
+          </a:xfrm>
+          <a:prstGeom prst="straightConnector1">
+            <a:avLst/>
           </a:prstGeom>
-          <a:ln w="28575">
-            <a:headEnd type="triangle" w="lg" len="lg"/>
-            <a:tailEnd type="none"/>
+          <a:ln w="25400">
+            <a:tailEnd type="triangle"/>
+          </a:ln>
+        </p:spPr>
+        <p:style>
+          <a:lnRef idx="1">
+            <a:schemeClr val="accent1"/>
+          </a:lnRef>
+          <a:fillRef idx="0">
+            <a:schemeClr val="accent1"/>
+          </a:fillRef>
+          <a:effectRef idx="0">
+            <a:schemeClr val="accent1"/>
+          </a:effectRef>
+          <a:fontRef idx="minor">
+            <a:schemeClr val="tx1"/>
+          </a:fontRef>
+        </p:style>
+      </p:cxnSp>
+      <p:cxnSp>
+        <p:nvCxnSpPr>
+          <p:cNvPr id="62" name="Straight Arrow Connector 61">
+            <a:extLst>
+              <a:ext uri="{FF2B5EF4-FFF2-40B4-BE49-F238E27FC236}">
+                <a16:creationId xmlns:a16="http://schemas.microsoft.com/office/drawing/2014/main" id="{2309373A-855A-4919-B80C-DDD38F952C51}"/>
+              </a:ext>
+            </a:extLst>
+          </p:cNvPr>
+          <p:cNvCxnSpPr>
+            <a:cxnSpLocks/>
+            <a:stCxn id="23" idx="3"/>
+            <a:endCxn id="16" idx="1"/>
+          </p:cNvCxnSpPr>
+          <p:nvPr/>
+        </p:nvCxnSpPr>
+        <p:spPr>
+          <a:xfrm flipV="1">
+            <a:off x="9329141" y="4509981"/>
+            <a:ext cx="431291" cy="2"/>
+          </a:xfrm>
+          <a:prstGeom prst="straightConnector1">
+            <a:avLst/>
+          </a:prstGeom>
+          <a:ln w="25400">
+            <a:tailEnd type="triangle"/>
           </a:ln>
         </p:spPr>
         <p:style>

</xml_diff>

<commit_message>
minor change on figure
</commit_message>
<xml_diff>
--- a/papers/tr2017/diagrams.pptx
+++ b/papers/tr2017/diagrams.pptx
@@ -8910,7 +8910,7 @@
         </p:nvSpPr>
         <p:spPr>
           <a:xfrm>
-            <a:off x="4508785" y="2851160"/>
+            <a:off x="5219985" y="2837614"/>
             <a:ext cx="2212622" cy="733778"/>
           </a:xfrm>
           <a:prstGeom prst="rect">
@@ -8957,7 +8957,7 @@
         </p:nvSpPr>
         <p:spPr>
           <a:xfrm>
-            <a:off x="457187" y="2851160"/>
+            <a:off x="1168387" y="2837614"/>
             <a:ext cx="2227612" cy="733778"/>
           </a:xfrm>
           <a:prstGeom prst="rect">
@@ -9004,7 +9004,7 @@
         </p:nvSpPr>
         <p:spPr>
           <a:xfrm>
-            <a:off x="2527401" y="237496"/>
+            <a:off x="3238601" y="223950"/>
             <a:ext cx="2212622" cy="733778"/>
           </a:xfrm>
           <a:prstGeom prst="rect">
@@ -9063,7 +9063,7 @@
         </p:nvCxnSpPr>
         <p:spPr>
           <a:xfrm rot="5400000">
-            <a:off x="4154865" y="4450546"/>
+            <a:off x="4866065" y="4437000"/>
             <a:ext cx="939079" cy="1981384"/>
           </a:xfrm>
           <a:prstGeom prst="bentConnector3">
@@ -9105,7 +9105,7 @@
         </p:nvSpPr>
         <p:spPr>
           <a:xfrm rot="16200000">
-            <a:off x="3397638" y="-781568"/>
+            <a:off x="4108838" y="-795114"/>
             <a:ext cx="472150" cy="4125439"/>
           </a:xfrm>
           <a:prstGeom prst="rightBrace">
@@ -9149,7 +9149,7 @@
         </p:nvSpPr>
         <p:spPr>
           <a:xfrm>
-            <a:off x="457187" y="1579747"/>
+            <a:off x="1168387" y="1566201"/>
             <a:ext cx="2227612" cy="655730"/>
           </a:xfrm>
           <a:prstGeom prst="rect">
@@ -9197,7 +9197,7 @@
         </p:nvSpPr>
         <p:spPr>
           <a:xfrm>
-            <a:off x="4508786" y="1579747"/>
+            <a:off x="5219986" y="1566201"/>
             <a:ext cx="2212621" cy="669219"/>
           </a:xfrm>
           <a:prstGeom prst="rect">
@@ -9248,7 +9248,7 @@
         </p:nvSpPr>
         <p:spPr>
           <a:xfrm>
-            <a:off x="5269711" y="5910778"/>
+            <a:off x="5980911" y="5897232"/>
             <a:ext cx="2212622" cy="733778"/>
           </a:xfrm>
           <a:prstGeom prst="rect">
@@ -9299,7 +9299,7 @@
         </p:nvSpPr>
         <p:spPr>
           <a:xfrm>
-            <a:off x="4508785" y="4237921"/>
+            <a:off x="5219985" y="4224375"/>
             <a:ext cx="2212622" cy="733778"/>
           </a:xfrm>
           <a:prstGeom prst="rect">
@@ -9347,7 +9347,7 @@
         </p:nvSpPr>
         <p:spPr>
           <a:xfrm>
-            <a:off x="2527401" y="5910778"/>
+            <a:off x="3238601" y="5897232"/>
             <a:ext cx="2212622" cy="733778"/>
           </a:xfrm>
           <a:prstGeom prst="rect">
@@ -9402,7 +9402,7 @@
         </p:nvCxnSpPr>
         <p:spPr>
           <a:xfrm>
-            <a:off x="1570993" y="2235477"/>
+            <a:off x="2282193" y="2221931"/>
             <a:ext cx="0" cy="615683"/>
           </a:xfrm>
           <a:prstGeom prst="straightConnector1">
@@ -9445,7 +9445,7 @@
         </p:nvCxnSpPr>
         <p:spPr>
           <a:xfrm flipH="1">
-            <a:off x="5615096" y="2248966"/>
+            <a:off x="6326296" y="2235420"/>
             <a:ext cx="1" cy="602194"/>
           </a:xfrm>
           <a:prstGeom prst="straightConnector1">
@@ -9488,7 +9488,7 @@
         </p:nvCxnSpPr>
         <p:spPr>
           <a:xfrm rot="16200000" flipH="1">
-            <a:off x="1439432" y="3716498"/>
+            <a:off x="2150632" y="3702952"/>
             <a:ext cx="2325840" cy="2062719"/>
           </a:xfrm>
           <a:prstGeom prst="bentConnector3">
@@ -9534,7 +9534,7 @@
         </p:nvCxnSpPr>
         <p:spPr>
           <a:xfrm>
-            <a:off x="5615096" y="3584938"/>
+            <a:off x="6326296" y="3571392"/>
             <a:ext cx="0" cy="652983"/>
           </a:xfrm>
           <a:prstGeom prst="straightConnector1">
@@ -9577,7 +9577,7 @@
         </p:nvCxnSpPr>
         <p:spPr>
           <a:xfrm flipH="1">
-            <a:off x="6376022" y="4604810"/>
+            <a:off x="7087222" y="4591264"/>
             <a:ext cx="345385" cy="1305968"/>
           </a:xfrm>
           <a:prstGeom prst="bentConnector4">

</xml_diff>

<commit_message>
add example to intro and change screen snapshot
</commit_message>
<xml_diff>
--- a/papers/tr2017/diagrams.pptx
+++ b/papers/tr2017/diagrams.pptx
@@ -5,13 +5,14 @@
     <p:sldMasterId id="2147483648" r:id="rId1"/>
   </p:sldMasterIdLst>
   <p:notesMasterIdLst>
-    <p:notesMasterId r:id="rId6"/>
+    <p:notesMasterId r:id="rId7"/>
   </p:notesMasterIdLst>
   <p:sldIdLst>
     <p:sldId id="257" r:id="rId2"/>
     <p:sldId id="258" r:id="rId3"/>
     <p:sldId id="260" r:id="rId4"/>
-    <p:sldId id="261" r:id="rId5"/>
+    <p:sldId id="262" r:id="rId5"/>
+    <p:sldId id="261" r:id="rId6"/>
   </p:sldIdLst>
   <p:sldSz cx="12192000" cy="6858000"/>
   <p:notesSz cx="6858000" cy="9144000"/>
@@ -212,7 +213,7 @@
           <a:p>
             <a:fld id="{C0237B04-0BFF-4188-AE10-E77C3C5257C8}" type="datetimeFigureOut">
               <a:rPr lang="en-US" smtClean="0"/>
-              <a:t>10/25/2017</a:t>
+              <a:t>11/1/2017</a:t>
             </a:fld>
             <a:endParaRPr lang="en-US"/>
           </a:p>
@@ -800,7 +801,7 @@
           <a:p>
             <a:fld id="{E504D85E-2087-4C48-BE7E-1A197735EA07}" type="datetimeFigureOut">
               <a:rPr lang="en-US" smtClean="0"/>
-              <a:t>10/25/2017</a:t>
+              <a:t>11/1/2017</a:t>
             </a:fld>
             <a:endParaRPr lang="en-US"/>
           </a:p>
@@ -998,7 +999,7 @@
           <a:p>
             <a:fld id="{E504D85E-2087-4C48-BE7E-1A197735EA07}" type="datetimeFigureOut">
               <a:rPr lang="en-US" smtClean="0"/>
-              <a:t>10/25/2017</a:t>
+              <a:t>11/1/2017</a:t>
             </a:fld>
             <a:endParaRPr lang="en-US"/>
           </a:p>
@@ -1206,7 +1207,7 @@
           <a:p>
             <a:fld id="{E504D85E-2087-4C48-BE7E-1A197735EA07}" type="datetimeFigureOut">
               <a:rPr lang="en-US" smtClean="0"/>
-              <a:t>10/25/2017</a:t>
+              <a:t>11/1/2017</a:t>
             </a:fld>
             <a:endParaRPr lang="en-US"/>
           </a:p>
@@ -1404,7 +1405,7 @@
           <a:p>
             <a:fld id="{E504D85E-2087-4C48-BE7E-1A197735EA07}" type="datetimeFigureOut">
               <a:rPr lang="en-US" smtClean="0"/>
-              <a:t>10/25/2017</a:t>
+              <a:t>11/1/2017</a:t>
             </a:fld>
             <a:endParaRPr lang="en-US"/>
           </a:p>
@@ -1679,7 +1680,7 @@
           <a:p>
             <a:fld id="{E504D85E-2087-4C48-BE7E-1A197735EA07}" type="datetimeFigureOut">
               <a:rPr lang="en-US" smtClean="0"/>
-              <a:t>10/25/2017</a:t>
+              <a:t>11/1/2017</a:t>
             </a:fld>
             <a:endParaRPr lang="en-US"/>
           </a:p>
@@ -1944,7 +1945,7 @@
           <a:p>
             <a:fld id="{E504D85E-2087-4C48-BE7E-1A197735EA07}" type="datetimeFigureOut">
               <a:rPr lang="en-US" smtClean="0"/>
-              <a:t>10/25/2017</a:t>
+              <a:t>11/1/2017</a:t>
             </a:fld>
             <a:endParaRPr lang="en-US"/>
           </a:p>
@@ -2356,7 +2357,7 @@
           <a:p>
             <a:fld id="{E504D85E-2087-4C48-BE7E-1A197735EA07}" type="datetimeFigureOut">
               <a:rPr lang="en-US" smtClean="0"/>
-              <a:t>10/25/2017</a:t>
+              <a:t>11/1/2017</a:t>
             </a:fld>
             <a:endParaRPr lang="en-US"/>
           </a:p>
@@ -2497,7 +2498,7 @@
           <a:p>
             <a:fld id="{E504D85E-2087-4C48-BE7E-1A197735EA07}" type="datetimeFigureOut">
               <a:rPr lang="en-US" smtClean="0"/>
-              <a:t>10/25/2017</a:t>
+              <a:t>11/1/2017</a:t>
             </a:fld>
             <a:endParaRPr lang="en-US"/>
           </a:p>
@@ -2610,7 +2611,7 @@
           <a:p>
             <a:fld id="{E504D85E-2087-4C48-BE7E-1A197735EA07}" type="datetimeFigureOut">
               <a:rPr lang="en-US" smtClean="0"/>
-              <a:t>10/25/2017</a:t>
+              <a:t>11/1/2017</a:t>
             </a:fld>
             <a:endParaRPr lang="en-US"/>
           </a:p>
@@ -2921,7 +2922,7 @@
           <a:p>
             <a:fld id="{E504D85E-2087-4C48-BE7E-1A197735EA07}" type="datetimeFigureOut">
               <a:rPr lang="en-US" smtClean="0"/>
-              <a:t>10/25/2017</a:t>
+              <a:t>11/1/2017</a:t>
             </a:fld>
             <a:endParaRPr lang="en-US"/>
           </a:p>
@@ -3209,7 +3210,7 @@
           <a:p>
             <a:fld id="{E504D85E-2087-4C48-BE7E-1A197735EA07}" type="datetimeFigureOut">
               <a:rPr lang="en-US" smtClean="0"/>
-              <a:t>10/25/2017</a:t>
+              <a:t>11/1/2017</a:t>
             </a:fld>
             <a:endParaRPr lang="en-US"/>
           </a:p>
@@ -3450,7 +3451,7 @@
           <a:p>
             <a:fld id="{E504D85E-2087-4C48-BE7E-1A197735EA07}" type="datetimeFigureOut">
               <a:rPr lang="en-US" smtClean="0"/>
-              <a:t>10/25/2017</a:t>
+              <a:t>11/1/2017</a:t>
             </a:fld>
             <a:endParaRPr lang="en-US"/>
           </a:p>
@@ -8945,6 +8946,393 @@
           <a:chExt cx="0" cy="0"/>
         </a:xfrm>
       </p:grpSpPr>
+      <p:pic>
+        <p:nvPicPr>
+          <p:cNvPr id="8" name="Picture 7">
+            <a:extLst>
+              <a:ext uri="{FF2B5EF4-FFF2-40B4-BE49-F238E27FC236}">
+                <a16:creationId xmlns:a16="http://schemas.microsoft.com/office/drawing/2014/main" id="{CFB9A329-CA74-446C-9FEF-F6CA5DB03223}"/>
+              </a:ext>
+            </a:extLst>
+          </p:cNvPr>
+          <p:cNvPicPr>
+            <a:picLocks noChangeAspect="1"/>
+          </p:cNvPicPr>
+          <p:nvPr/>
+        </p:nvPicPr>
+        <p:blipFill>
+          <a:blip r:embed="rId2"/>
+          <a:stretch>
+            <a:fillRect/>
+          </a:stretch>
+        </p:blipFill>
+        <p:spPr>
+          <a:xfrm>
+            <a:off x="830646" y="268439"/>
+            <a:ext cx="11105907" cy="6413454"/>
+          </a:xfrm>
+          <a:prstGeom prst="rect">
+            <a:avLst/>
+          </a:prstGeom>
+        </p:spPr>
+      </p:pic>
+      <p:sp>
+        <p:nvSpPr>
+          <p:cNvPr id="3" name="Rectangle 2">
+            <a:extLst>
+              <a:ext uri="{FF2B5EF4-FFF2-40B4-BE49-F238E27FC236}">
+                <a16:creationId xmlns:a16="http://schemas.microsoft.com/office/drawing/2014/main" id="{9B630E78-2906-4FE2-93B7-1530D645EE15}"/>
+              </a:ext>
+            </a:extLst>
+          </p:cNvPr>
+          <p:cNvSpPr/>
+          <p:nvPr/>
+        </p:nvSpPr>
+        <p:spPr>
+          <a:xfrm>
+            <a:off x="76979" y="48028"/>
+            <a:ext cx="604653" cy="923330"/>
+          </a:xfrm>
+          <a:prstGeom prst="rect">
+            <a:avLst/>
+          </a:prstGeom>
+          <a:noFill/>
+        </p:spPr>
+        <p:txBody>
+          <a:bodyPr wrap="none" lIns="91440" tIns="45720" rIns="91440" bIns="45720">
+            <a:spAutoFit/>
+          </a:bodyPr>
+          <a:lstStyle/>
+          <a:p>
+            <a:pPr algn="ctr"/>
+            <a:r>
+              <a:rPr lang="en-US" sz="5400" b="1" cap="none" spc="0" dirty="0">
+                <a:ln w="22225">
+                  <a:solidFill>
+                    <a:schemeClr val="accent2"/>
+                  </a:solidFill>
+                  <a:prstDash val="solid"/>
+                </a:ln>
+                <a:solidFill>
+                  <a:schemeClr val="accent2">
+                    <a:lumMod val="40000"/>
+                    <a:lumOff val="60000"/>
+                  </a:schemeClr>
+                </a:solidFill>
+                <a:effectLst/>
+              </a:rPr>
+              <a:t>A</a:t>
+            </a:r>
+          </a:p>
+        </p:txBody>
+      </p:sp>
+      <p:sp>
+        <p:nvSpPr>
+          <p:cNvPr id="4" name="Rectangle 3">
+            <a:extLst>
+              <a:ext uri="{FF2B5EF4-FFF2-40B4-BE49-F238E27FC236}">
+                <a16:creationId xmlns:a16="http://schemas.microsoft.com/office/drawing/2014/main" id="{0B8C4BC9-083C-49CD-80B2-F5068347C3FB}"/>
+              </a:ext>
+            </a:extLst>
+          </p:cNvPr>
+          <p:cNvSpPr/>
+          <p:nvPr/>
+        </p:nvSpPr>
+        <p:spPr>
+          <a:xfrm>
+            <a:off x="81278" y="1547092"/>
+            <a:ext cx="572593" cy="923330"/>
+          </a:xfrm>
+          <a:prstGeom prst="rect">
+            <a:avLst/>
+          </a:prstGeom>
+          <a:noFill/>
+        </p:spPr>
+        <p:txBody>
+          <a:bodyPr wrap="none" lIns="91440" tIns="45720" rIns="91440" bIns="45720">
+            <a:spAutoFit/>
+          </a:bodyPr>
+          <a:lstStyle/>
+          <a:p>
+            <a:pPr algn="ctr"/>
+            <a:r>
+              <a:rPr lang="en-US" sz="5400" b="1" dirty="0">
+                <a:ln w="22225">
+                  <a:solidFill>
+                    <a:schemeClr val="accent2"/>
+                  </a:solidFill>
+                  <a:prstDash val="solid"/>
+                </a:ln>
+                <a:solidFill>
+                  <a:schemeClr val="accent2">
+                    <a:lumMod val="40000"/>
+                    <a:lumOff val="60000"/>
+                  </a:schemeClr>
+                </a:solidFill>
+              </a:rPr>
+              <a:t>B</a:t>
+            </a:r>
+            <a:endParaRPr lang="en-US" sz="5400" b="1" cap="none" spc="0" dirty="0">
+              <a:ln w="22225">
+                <a:solidFill>
+                  <a:schemeClr val="accent2"/>
+                </a:solidFill>
+                <a:prstDash val="solid"/>
+              </a:ln>
+              <a:solidFill>
+                <a:schemeClr val="accent2">
+                  <a:lumMod val="40000"/>
+                  <a:lumOff val="60000"/>
+                </a:schemeClr>
+              </a:solidFill>
+              <a:effectLst/>
+            </a:endParaRPr>
+          </a:p>
+        </p:txBody>
+      </p:sp>
+      <p:sp>
+        <p:nvSpPr>
+          <p:cNvPr id="5" name="Rectangle 4">
+            <a:extLst>
+              <a:ext uri="{FF2B5EF4-FFF2-40B4-BE49-F238E27FC236}">
+                <a16:creationId xmlns:a16="http://schemas.microsoft.com/office/drawing/2014/main" id="{3C51A502-F94B-452C-860E-E379F8AE475B}"/>
+              </a:ext>
+            </a:extLst>
+          </p:cNvPr>
+          <p:cNvSpPr/>
+          <p:nvPr/>
+        </p:nvSpPr>
+        <p:spPr>
+          <a:xfrm>
+            <a:off x="4468842" y="4399896"/>
+            <a:ext cx="551754" cy="923330"/>
+          </a:xfrm>
+          <a:prstGeom prst="rect">
+            <a:avLst/>
+          </a:prstGeom>
+          <a:noFill/>
+        </p:spPr>
+        <p:txBody>
+          <a:bodyPr wrap="none" lIns="91440" tIns="45720" rIns="91440" bIns="45720">
+            <a:spAutoFit/>
+          </a:bodyPr>
+          <a:lstStyle/>
+          <a:p>
+            <a:pPr algn="ctr"/>
+            <a:r>
+              <a:rPr lang="en-US" sz="5400" b="1" cap="none" spc="0" dirty="0">
+                <a:ln w="22225">
+                  <a:solidFill>
+                    <a:schemeClr val="accent2"/>
+                  </a:solidFill>
+                  <a:prstDash val="solid"/>
+                </a:ln>
+                <a:solidFill>
+                  <a:schemeClr val="accent2">
+                    <a:lumMod val="40000"/>
+                    <a:lumOff val="60000"/>
+                  </a:schemeClr>
+                </a:solidFill>
+                <a:effectLst/>
+              </a:rPr>
+              <a:t>C</a:t>
+            </a:r>
+          </a:p>
+        </p:txBody>
+      </p:sp>
+      <p:sp>
+        <p:nvSpPr>
+          <p:cNvPr id="6" name="Rectangle 5">
+            <a:extLst>
+              <a:ext uri="{FF2B5EF4-FFF2-40B4-BE49-F238E27FC236}">
+                <a16:creationId xmlns:a16="http://schemas.microsoft.com/office/drawing/2014/main" id="{02715763-2A1D-49FB-A0AE-55F573DE0E47}"/>
+              </a:ext>
+            </a:extLst>
+          </p:cNvPr>
+          <p:cNvSpPr/>
+          <p:nvPr/>
+        </p:nvSpPr>
+        <p:spPr>
+          <a:xfrm>
+            <a:off x="10499899" y="2551836"/>
+            <a:ext cx="620683" cy="923330"/>
+          </a:xfrm>
+          <a:prstGeom prst="rect">
+            <a:avLst/>
+          </a:prstGeom>
+          <a:noFill/>
+        </p:spPr>
+        <p:txBody>
+          <a:bodyPr wrap="none" lIns="91440" tIns="45720" rIns="91440" bIns="45720">
+            <a:spAutoFit/>
+          </a:bodyPr>
+          <a:lstStyle/>
+          <a:p>
+            <a:pPr algn="ctr"/>
+            <a:r>
+              <a:rPr lang="en-US" sz="5400" b="1" cap="none" spc="0" dirty="0">
+                <a:ln w="22225">
+                  <a:solidFill>
+                    <a:schemeClr val="accent2"/>
+                  </a:solidFill>
+                  <a:prstDash val="solid"/>
+                </a:ln>
+                <a:solidFill>
+                  <a:schemeClr val="accent2">
+                    <a:lumMod val="40000"/>
+                    <a:lumOff val="60000"/>
+                  </a:schemeClr>
+                </a:solidFill>
+                <a:effectLst/>
+              </a:rPr>
+              <a:t>D</a:t>
+            </a:r>
+          </a:p>
+        </p:txBody>
+      </p:sp>
+      <p:sp>
+        <p:nvSpPr>
+          <p:cNvPr id="7" name="Rectangle 6">
+            <a:extLst>
+              <a:ext uri="{FF2B5EF4-FFF2-40B4-BE49-F238E27FC236}">
+                <a16:creationId xmlns:a16="http://schemas.microsoft.com/office/drawing/2014/main" id="{36FFE0E9-247E-4CF6-B4BA-299B913084B3}"/>
+              </a:ext>
+            </a:extLst>
+          </p:cNvPr>
+          <p:cNvSpPr/>
+          <p:nvPr/>
+        </p:nvSpPr>
+        <p:spPr>
+          <a:xfrm>
+            <a:off x="175910" y="5934670"/>
+            <a:ext cx="522900" cy="923330"/>
+          </a:xfrm>
+          <a:prstGeom prst="rect">
+            <a:avLst/>
+          </a:prstGeom>
+          <a:noFill/>
+        </p:spPr>
+        <p:txBody>
+          <a:bodyPr wrap="none" lIns="91440" tIns="45720" rIns="91440" bIns="45720">
+            <a:spAutoFit/>
+          </a:bodyPr>
+          <a:lstStyle/>
+          <a:p>
+            <a:pPr algn="ctr"/>
+            <a:r>
+              <a:rPr lang="en-US" sz="5400" b="1" dirty="0">
+                <a:ln w="22225">
+                  <a:solidFill>
+                    <a:schemeClr val="accent2"/>
+                  </a:solidFill>
+                  <a:prstDash val="solid"/>
+                </a:ln>
+                <a:solidFill>
+                  <a:schemeClr val="accent2">
+                    <a:lumMod val="40000"/>
+                    <a:lumOff val="60000"/>
+                  </a:schemeClr>
+                </a:solidFill>
+              </a:rPr>
+              <a:t>E</a:t>
+            </a:r>
+            <a:endParaRPr lang="en-US" sz="5400" b="1" cap="none" spc="0" dirty="0">
+              <a:ln w="22225">
+                <a:solidFill>
+                  <a:schemeClr val="accent2"/>
+                </a:solidFill>
+                <a:prstDash val="solid"/>
+              </a:ln>
+              <a:solidFill>
+                <a:schemeClr val="accent2">
+                  <a:lumMod val="40000"/>
+                  <a:lumOff val="60000"/>
+                </a:schemeClr>
+              </a:solidFill>
+              <a:effectLst/>
+            </a:endParaRPr>
+          </a:p>
+        </p:txBody>
+      </p:sp>
+      <p:sp>
+        <p:nvSpPr>
+          <p:cNvPr id="9" name="Rectangle 8">
+            <a:extLst>
+              <a:ext uri="{FF2B5EF4-FFF2-40B4-BE49-F238E27FC236}">
+                <a16:creationId xmlns:a16="http://schemas.microsoft.com/office/drawing/2014/main" id="{83639A7C-74E7-4C26-B89D-CE3C89E3B512}"/>
+              </a:ext>
+            </a:extLst>
+          </p:cNvPr>
+          <p:cNvSpPr/>
+          <p:nvPr/>
+        </p:nvSpPr>
+        <p:spPr>
+          <a:xfrm>
+            <a:off x="10918858" y="289559"/>
+            <a:ext cx="1017695" cy="440267"/>
+          </a:xfrm>
+          <a:prstGeom prst="rect">
+            <a:avLst/>
+          </a:prstGeom>
+          <a:solidFill>
+            <a:srgbClr val="002060"/>
+          </a:solidFill>
+        </p:spPr>
+        <p:style>
+          <a:lnRef idx="2">
+            <a:schemeClr val="accent1">
+              <a:shade val="50000"/>
+            </a:schemeClr>
+          </a:lnRef>
+          <a:fillRef idx="1">
+            <a:schemeClr val="accent1"/>
+          </a:fillRef>
+          <a:effectRef idx="0">
+            <a:schemeClr val="accent1"/>
+          </a:effectRef>
+          <a:fontRef idx="minor">
+            <a:schemeClr val="lt1"/>
+          </a:fontRef>
+        </p:style>
+        <p:txBody>
+          <a:bodyPr rtlCol="0" anchor="ctr"/>
+          <a:lstStyle/>
+          <a:p>
+            <a:pPr algn="ctr"/>
+            <a:endParaRPr lang="en-US"/>
+          </a:p>
+        </p:txBody>
+      </p:sp>
+    </p:spTree>
+    <p:extLst>
+      <p:ext uri="{BB962C8B-B14F-4D97-AF65-F5344CB8AC3E}">
+        <p14:creationId xmlns:p14="http://schemas.microsoft.com/office/powerpoint/2010/main" val="440585049"/>
+      </p:ext>
+    </p:extLst>
+  </p:cSld>
+  <p:clrMapOvr>
+    <a:masterClrMapping/>
+  </p:clrMapOvr>
+</p:sld>
+</file>
+
+<file path=ppt/slides/slide5.xml><?xml version="1.0" encoding="utf-8"?>
+<p:sld xmlns:a="http://schemas.openxmlformats.org/drawingml/2006/main" xmlns:r="http://schemas.openxmlformats.org/officeDocument/2006/relationships" xmlns:p="http://schemas.openxmlformats.org/presentationml/2006/main">
+  <p:cSld>
+    <p:spTree>
+      <p:nvGrpSpPr>
+        <p:cNvPr id="1" name=""/>
+        <p:cNvGrpSpPr/>
+        <p:nvPr/>
+      </p:nvGrpSpPr>
+      <p:grpSpPr>
+        <a:xfrm>
+          <a:off x="0" y="0"/>
+          <a:ext cx="0" cy="0"/>
+          <a:chOff x="0" y="0"/>
+          <a:chExt cx="0" cy="0"/>
+        </a:xfrm>
+      </p:grpSpPr>
       <p:sp>
         <p:nvSpPr>
           <p:cNvPr id="2" name="Rectangle 1">

</xml_diff>

<commit_message>
add references to makecode arch figure in text
</commit_message>
<xml_diff>
--- a/papers/tr2017/diagrams.pptx
+++ b/papers/tr2017/diagrams.pptx
@@ -213,7 +213,7 @@
           <a:p>
             <a:fld id="{C0237B04-0BFF-4188-AE10-E77C3C5257C8}" type="datetimeFigureOut">
               <a:rPr lang="en-US" smtClean="0"/>
-              <a:t>11/1/2017</a:t>
+              <a:t>11/2/2017</a:t>
             </a:fld>
             <a:endParaRPr lang="en-US"/>
           </a:p>
@@ -801,7 +801,7 @@
           <a:p>
             <a:fld id="{E504D85E-2087-4C48-BE7E-1A197735EA07}" type="datetimeFigureOut">
               <a:rPr lang="en-US" smtClean="0"/>
-              <a:t>11/1/2017</a:t>
+              <a:t>11/2/2017</a:t>
             </a:fld>
             <a:endParaRPr lang="en-US"/>
           </a:p>
@@ -999,7 +999,7 @@
           <a:p>
             <a:fld id="{E504D85E-2087-4C48-BE7E-1A197735EA07}" type="datetimeFigureOut">
               <a:rPr lang="en-US" smtClean="0"/>
-              <a:t>11/1/2017</a:t>
+              <a:t>11/2/2017</a:t>
             </a:fld>
             <a:endParaRPr lang="en-US"/>
           </a:p>
@@ -1207,7 +1207,7 @@
           <a:p>
             <a:fld id="{E504D85E-2087-4C48-BE7E-1A197735EA07}" type="datetimeFigureOut">
               <a:rPr lang="en-US" smtClean="0"/>
-              <a:t>11/1/2017</a:t>
+              <a:t>11/2/2017</a:t>
             </a:fld>
             <a:endParaRPr lang="en-US"/>
           </a:p>
@@ -1405,7 +1405,7 @@
           <a:p>
             <a:fld id="{E504D85E-2087-4C48-BE7E-1A197735EA07}" type="datetimeFigureOut">
               <a:rPr lang="en-US" smtClean="0"/>
-              <a:t>11/1/2017</a:t>
+              <a:t>11/2/2017</a:t>
             </a:fld>
             <a:endParaRPr lang="en-US"/>
           </a:p>
@@ -1680,7 +1680,7 @@
           <a:p>
             <a:fld id="{E504D85E-2087-4C48-BE7E-1A197735EA07}" type="datetimeFigureOut">
               <a:rPr lang="en-US" smtClean="0"/>
-              <a:t>11/1/2017</a:t>
+              <a:t>11/2/2017</a:t>
             </a:fld>
             <a:endParaRPr lang="en-US"/>
           </a:p>
@@ -1945,7 +1945,7 @@
           <a:p>
             <a:fld id="{E504D85E-2087-4C48-BE7E-1A197735EA07}" type="datetimeFigureOut">
               <a:rPr lang="en-US" smtClean="0"/>
-              <a:t>11/1/2017</a:t>
+              <a:t>11/2/2017</a:t>
             </a:fld>
             <a:endParaRPr lang="en-US"/>
           </a:p>
@@ -2357,7 +2357,7 @@
           <a:p>
             <a:fld id="{E504D85E-2087-4C48-BE7E-1A197735EA07}" type="datetimeFigureOut">
               <a:rPr lang="en-US" smtClean="0"/>
-              <a:t>11/1/2017</a:t>
+              <a:t>11/2/2017</a:t>
             </a:fld>
             <a:endParaRPr lang="en-US"/>
           </a:p>
@@ -2498,7 +2498,7 @@
           <a:p>
             <a:fld id="{E504D85E-2087-4C48-BE7E-1A197735EA07}" type="datetimeFigureOut">
               <a:rPr lang="en-US" smtClean="0"/>
-              <a:t>11/1/2017</a:t>
+              <a:t>11/2/2017</a:t>
             </a:fld>
             <a:endParaRPr lang="en-US"/>
           </a:p>
@@ -2611,7 +2611,7 @@
           <a:p>
             <a:fld id="{E504D85E-2087-4C48-BE7E-1A197735EA07}" type="datetimeFigureOut">
               <a:rPr lang="en-US" smtClean="0"/>
-              <a:t>11/1/2017</a:t>
+              <a:t>11/2/2017</a:t>
             </a:fld>
             <a:endParaRPr lang="en-US"/>
           </a:p>
@@ -2922,7 +2922,7 @@
           <a:p>
             <a:fld id="{E504D85E-2087-4C48-BE7E-1A197735EA07}" type="datetimeFigureOut">
               <a:rPr lang="en-US" smtClean="0"/>
-              <a:t>11/1/2017</a:t>
+              <a:t>11/2/2017</a:t>
             </a:fld>
             <a:endParaRPr lang="en-US"/>
           </a:p>
@@ -3210,7 +3210,7 @@
           <a:p>
             <a:fld id="{E504D85E-2087-4C48-BE7E-1A197735EA07}" type="datetimeFigureOut">
               <a:rPr lang="en-US" smtClean="0"/>
-              <a:t>11/1/2017</a:t>
+              <a:t>11/2/2017</a:t>
             </a:fld>
             <a:endParaRPr lang="en-US"/>
           </a:p>
@@ -3451,7 +3451,7 @@
           <a:p>
             <a:fld id="{E504D85E-2087-4C48-BE7E-1A197735EA07}" type="datetimeFigureOut">
               <a:rPr lang="en-US" smtClean="0"/>
-              <a:t>11/1/2017</a:t>
+              <a:t>11/2/2017</a:t>
             </a:fld>
             <a:endParaRPr lang="en-US"/>
           </a:p>
@@ -4646,7 +4646,7 @@
           <a:p>
             <a:r>
               <a:rPr lang="en-US" dirty="0"/>
-              <a:t>shim generation</a:t>
+              <a:t>Shim generation</a:t>
             </a:r>
           </a:p>
         </p:txBody>
@@ -5923,7 +5923,7 @@
           <a:p>
             <a:r>
               <a:rPr lang="en-US" dirty="0"/>
-              <a:t>metadata generation</a:t>
+              <a:t>Metadata generation</a:t>
             </a:r>
           </a:p>
         </p:txBody>
@@ -5975,6 +5975,41 @@
           </a:fontRef>
         </p:style>
       </p:cxnSp>
+      <p:sp>
+        <p:nvSpPr>
+          <p:cNvPr id="46" name="TextBox 45">
+            <a:extLst>
+              <a:ext uri="{FF2B5EF4-FFF2-40B4-BE49-F238E27FC236}">
+                <a16:creationId xmlns:a16="http://schemas.microsoft.com/office/drawing/2014/main" id="{FDA5C73E-44F4-41C6-9BA3-09C2F2BFF6D5}"/>
+              </a:ext>
+            </a:extLst>
+          </p:cNvPr>
+          <p:cNvSpPr txBox="1"/>
+          <p:nvPr/>
+        </p:nvSpPr>
+        <p:spPr>
+          <a:xfrm>
+            <a:off x="5105278" y="1949017"/>
+            <a:ext cx="2975240" cy="369332"/>
+          </a:xfrm>
+          <a:prstGeom prst="rect">
+            <a:avLst/>
+          </a:prstGeom>
+          <a:noFill/>
+        </p:spPr>
+        <p:txBody>
+          <a:bodyPr wrap="square" rtlCol="0">
+            <a:spAutoFit/>
+          </a:bodyPr>
+          <a:lstStyle/>
+          <a:p>
+            <a:r>
+              <a:rPr lang="en-US" dirty="0"/>
+              <a:t>Browser compilation</a:t>
+            </a:r>
+          </a:p>
+        </p:txBody>
+      </p:sp>
     </p:spTree>
     <p:extLst>
       <p:ext uri="{BB962C8B-B14F-4D97-AF65-F5344CB8AC3E}">

</xml_diff>

<commit_message>
update to use CPX rather than micro:bit
</commit_message>
<xml_diff>
--- a/papers/tr2017/diagrams.pptx
+++ b/papers/tr2017/diagrams.pptx
@@ -5,15 +5,16 @@
     <p:sldMasterId id="2147483648" r:id="rId1"/>
   </p:sldMasterIdLst>
   <p:notesMasterIdLst>
-    <p:notesMasterId r:id="rId8"/>
+    <p:notesMasterId r:id="rId9"/>
   </p:notesMasterIdLst>
   <p:sldIdLst>
     <p:sldId id="257" r:id="rId2"/>
     <p:sldId id="258" r:id="rId3"/>
     <p:sldId id="260" r:id="rId4"/>
     <p:sldId id="262" r:id="rId5"/>
-    <p:sldId id="261" r:id="rId6"/>
-    <p:sldId id="263" r:id="rId7"/>
+    <p:sldId id="264" r:id="rId6"/>
+    <p:sldId id="261" r:id="rId7"/>
+    <p:sldId id="263" r:id="rId8"/>
   </p:sldIdLst>
   <p:sldSz cx="12192000" cy="6858000"/>
   <p:notesSz cx="6858000" cy="9144000"/>
@@ -214,7 +215,7 @@
           <a:p>
             <a:fld id="{C0237B04-0BFF-4188-AE10-E77C3C5257C8}" type="datetimeFigureOut">
               <a:rPr lang="en-US" smtClean="0"/>
-              <a:t>11/7/2017</a:t>
+              <a:t>11/13/2017</a:t>
             </a:fld>
             <a:endParaRPr lang="en-US"/>
           </a:p>
@@ -802,7 +803,7 @@
           <a:p>
             <a:fld id="{E504D85E-2087-4C48-BE7E-1A197735EA07}" type="datetimeFigureOut">
               <a:rPr lang="en-US" smtClean="0"/>
-              <a:t>11/7/2017</a:t>
+              <a:t>11/13/2017</a:t>
             </a:fld>
             <a:endParaRPr lang="en-US"/>
           </a:p>
@@ -1000,7 +1001,7 @@
           <a:p>
             <a:fld id="{E504D85E-2087-4C48-BE7E-1A197735EA07}" type="datetimeFigureOut">
               <a:rPr lang="en-US" smtClean="0"/>
-              <a:t>11/7/2017</a:t>
+              <a:t>11/13/2017</a:t>
             </a:fld>
             <a:endParaRPr lang="en-US"/>
           </a:p>
@@ -1208,7 +1209,7 @@
           <a:p>
             <a:fld id="{E504D85E-2087-4C48-BE7E-1A197735EA07}" type="datetimeFigureOut">
               <a:rPr lang="en-US" smtClean="0"/>
-              <a:t>11/7/2017</a:t>
+              <a:t>11/13/2017</a:t>
             </a:fld>
             <a:endParaRPr lang="en-US"/>
           </a:p>
@@ -1406,7 +1407,7 @@
           <a:p>
             <a:fld id="{E504D85E-2087-4C48-BE7E-1A197735EA07}" type="datetimeFigureOut">
               <a:rPr lang="en-US" smtClean="0"/>
-              <a:t>11/7/2017</a:t>
+              <a:t>11/13/2017</a:t>
             </a:fld>
             <a:endParaRPr lang="en-US"/>
           </a:p>
@@ -1681,7 +1682,7 @@
           <a:p>
             <a:fld id="{E504D85E-2087-4C48-BE7E-1A197735EA07}" type="datetimeFigureOut">
               <a:rPr lang="en-US" smtClean="0"/>
-              <a:t>11/7/2017</a:t>
+              <a:t>11/13/2017</a:t>
             </a:fld>
             <a:endParaRPr lang="en-US"/>
           </a:p>
@@ -1946,7 +1947,7 @@
           <a:p>
             <a:fld id="{E504D85E-2087-4C48-BE7E-1A197735EA07}" type="datetimeFigureOut">
               <a:rPr lang="en-US" smtClean="0"/>
-              <a:t>11/7/2017</a:t>
+              <a:t>11/13/2017</a:t>
             </a:fld>
             <a:endParaRPr lang="en-US"/>
           </a:p>
@@ -2358,7 +2359,7 @@
           <a:p>
             <a:fld id="{E504D85E-2087-4C48-BE7E-1A197735EA07}" type="datetimeFigureOut">
               <a:rPr lang="en-US" smtClean="0"/>
-              <a:t>11/7/2017</a:t>
+              <a:t>11/13/2017</a:t>
             </a:fld>
             <a:endParaRPr lang="en-US"/>
           </a:p>
@@ -2499,7 +2500,7 @@
           <a:p>
             <a:fld id="{E504D85E-2087-4C48-BE7E-1A197735EA07}" type="datetimeFigureOut">
               <a:rPr lang="en-US" smtClean="0"/>
-              <a:t>11/7/2017</a:t>
+              <a:t>11/13/2017</a:t>
             </a:fld>
             <a:endParaRPr lang="en-US"/>
           </a:p>
@@ -2612,7 +2613,7 @@
           <a:p>
             <a:fld id="{E504D85E-2087-4C48-BE7E-1A197735EA07}" type="datetimeFigureOut">
               <a:rPr lang="en-US" smtClean="0"/>
-              <a:t>11/7/2017</a:t>
+              <a:t>11/13/2017</a:t>
             </a:fld>
             <a:endParaRPr lang="en-US"/>
           </a:p>
@@ -2923,7 +2924,7 @@
           <a:p>
             <a:fld id="{E504D85E-2087-4C48-BE7E-1A197735EA07}" type="datetimeFigureOut">
               <a:rPr lang="en-US" smtClean="0"/>
-              <a:t>11/7/2017</a:t>
+              <a:t>11/13/2017</a:t>
             </a:fld>
             <a:endParaRPr lang="en-US"/>
           </a:p>
@@ -3211,7 +3212,7 @@
           <a:p>
             <a:fld id="{E504D85E-2087-4C48-BE7E-1A197735EA07}" type="datetimeFigureOut">
               <a:rPr lang="en-US" smtClean="0"/>
-              <a:t>11/7/2017</a:t>
+              <a:t>11/13/2017</a:t>
             </a:fld>
             <a:endParaRPr lang="en-US"/>
           </a:p>
@@ -3452,7 +3453,7 @@
           <a:p>
             <a:fld id="{E504D85E-2087-4C48-BE7E-1A197735EA07}" type="datetimeFigureOut">
               <a:rPr lang="en-US" smtClean="0"/>
-              <a:t>11/7/2017</a:t>
+              <a:t>11/13/2017</a:t>
             </a:fld>
             <a:endParaRPr lang="en-US"/>
           </a:p>
@@ -9332,6 +9333,448 @@
           <a:chExt cx="0" cy="0"/>
         </a:xfrm>
       </p:grpSpPr>
+      <p:pic>
+        <p:nvPicPr>
+          <p:cNvPr id="10" name="Picture 9">
+            <a:extLst>
+              <a:ext uri="{FF2B5EF4-FFF2-40B4-BE49-F238E27FC236}">
+                <a16:creationId xmlns:a16="http://schemas.microsoft.com/office/drawing/2014/main" id="{E9406E3A-C470-4972-881A-87B514A2D34A}"/>
+              </a:ext>
+            </a:extLst>
+          </p:cNvPr>
+          <p:cNvPicPr>
+            <a:picLocks noChangeAspect="1"/>
+          </p:cNvPicPr>
+          <p:nvPr/>
+        </p:nvPicPr>
+        <p:blipFill>
+          <a:blip r:embed="rId2"/>
+          <a:stretch>
+            <a:fillRect/>
+          </a:stretch>
+        </p:blipFill>
+        <p:spPr>
+          <a:xfrm>
+            <a:off x="698810" y="196136"/>
+            <a:ext cx="11159161" cy="6393991"/>
+          </a:xfrm>
+          <a:prstGeom prst="rect">
+            <a:avLst/>
+          </a:prstGeom>
+        </p:spPr>
+      </p:pic>
+      <p:sp>
+        <p:nvSpPr>
+          <p:cNvPr id="3" name="Rectangle 2">
+            <a:extLst>
+              <a:ext uri="{FF2B5EF4-FFF2-40B4-BE49-F238E27FC236}">
+                <a16:creationId xmlns:a16="http://schemas.microsoft.com/office/drawing/2014/main" id="{9B630E78-2906-4FE2-93B7-1530D645EE15}"/>
+              </a:ext>
+            </a:extLst>
+          </p:cNvPr>
+          <p:cNvSpPr/>
+          <p:nvPr/>
+        </p:nvSpPr>
+        <p:spPr>
+          <a:xfrm>
+            <a:off x="76979" y="48028"/>
+            <a:ext cx="604653" cy="923330"/>
+          </a:xfrm>
+          <a:prstGeom prst="rect">
+            <a:avLst/>
+          </a:prstGeom>
+          <a:noFill/>
+        </p:spPr>
+        <p:txBody>
+          <a:bodyPr wrap="none" lIns="91440" tIns="45720" rIns="91440" bIns="45720">
+            <a:spAutoFit/>
+          </a:bodyPr>
+          <a:lstStyle/>
+          <a:p>
+            <a:pPr algn="ctr"/>
+            <a:r>
+              <a:rPr lang="en-US" sz="5400" b="1" cap="none" spc="0" dirty="0">
+                <a:ln w="22225">
+                  <a:solidFill>
+                    <a:schemeClr val="accent2"/>
+                  </a:solidFill>
+                  <a:prstDash val="solid"/>
+                </a:ln>
+                <a:solidFill>
+                  <a:schemeClr val="accent2">
+                    <a:lumMod val="40000"/>
+                    <a:lumOff val="60000"/>
+                  </a:schemeClr>
+                </a:solidFill>
+                <a:effectLst/>
+              </a:rPr>
+              <a:t>A</a:t>
+            </a:r>
+          </a:p>
+        </p:txBody>
+      </p:sp>
+      <p:sp>
+        <p:nvSpPr>
+          <p:cNvPr id="4" name="Rectangle 3">
+            <a:extLst>
+              <a:ext uri="{FF2B5EF4-FFF2-40B4-BE49-F238E27FC236}">
+                <a16:creationId xmlns:a16="http://schemas.microsoft.com/office/drawing/2014/main" id="{0B8C4BC9-083C-49CD-80B2-F5068347C3FB}"/>
+              </a:ext>
+            </a:extLst>
+          </p:cNvPr>
+          <p:cNvSpPr/>
+          <p:nvPr/>
+        </p:nvSpPr>
+        <p:spPr>
+          <a:xfrm>
+            <a:off x="81278" y="1547092"/>
+            <a:ext cx="572593" cy="923330"/>
+          </a:xfrm>
+          <a:prstGeom prst="rect">
+            <a:avLst/>
+          </a:prstGeom>
+          <a:noFill/>
+        </p:spPr>
+        <p:txBody>
+          <a:bodyPr wrap="none" lIns="91440" tIns="45720" rIns="91440" bIns="45720">
+            <a:spAutoFit/>
+          </a:bodyPr>
+          <a:lstStyle/>
+          <a:p>
+            <a:pPr algn="ctr"/>
+            <a:r>
+              <a:rPr lang="en-US" sz="5400" b="1" dirty="0">
+                <a:ln w="22225">
+                  <a:solidFill>
+                    <a:schemeClr val="accent2"/>
+                  </a:solidFill>
+                  <a:prstDash val="solid"/>
+                </a:ln>
+                <a:solidFill>
+                  <a:schemeClr val="accent2">
+                    <a:lumMod val="40000"/>
+                    <a:lumOff val="60000"/>
+                  </a:schemeClr>
+                </a:solidFill>
+              </a:rPr>
+              <a:t>B</a:t>
+            </a:r>
+            <a:endParaRPr lang="en-US" sz="5400" b="1" cap="none" spc="0" dirty="0">
+              <a:ln w="22225">
+                <a:solidFill>
+                  <a:schemeClr val="accent2"/>
+                </a:solidFill>
+                <a:prstDash val="solid"/>
+              </a:ln>
+              <a:solidFill>
+                <a:schemeClr val="accent2">
+                  <a:lumMod val="40000"/>
+                  <a:lumOff val="60000"/>
+                </a:schemeClr>
+              </a:solidFill>
+              <a:effectLst/>
+            </a:endParaRPr>
+          </a:p>
+        </p:txBody>
+      </p:sp>
+      <p:sp>
+        <p:nvSpPr>
+          <p:cNvPr id="5" name="Rectangle 4">
+            <a:extLst>
+              <a:ext uri="{FF2B5EF4-FFF2-40B4-BE49-F238E27FC236}">
+                <a16:creationId xmlns:a16="http://schemas.microsoft.com/office/drawing/2014/main" id="{3C51A502-F94B-452C-860E-E379F8AE475B}"/>
+              </a:ext>
+            </a:extLst>
+          </p:cNvPr>
+          <p:cNvSpPr/>
+          <p:nvPr/>
+        </p:nvSpPr>
+        <p:spPr>
+          <a:xfrm>
+            <a:off x="4449446" y="4760727"/>
+            <a:ext cx="551754" cy="923330"/>
+          </a:xfrm>
+          <a:prstGeom prst="rect">
+            <a:avLst/>
+          </a:prstGeom>
+          <a:noFill/>
+        </p:spPr>
+        <p:txBody>
+          <a:bodyPr wrap="none" lIns="91440" tIns="45720" rIns="91440" bIns="45720">
+            <a:spAutoFit/>
+          </a:bodyPr>
+          <a:lstStyle/>
+          <a:p>
+            <a:pPr algn="ctr"/>
+            <a:r>
+              <a:rPr lang="en-US" sz="5400" b="1" cap="none" spc="0" dirty="0">
+                <a:ln w="22225">
+                  <a:solidFill>
+                    <a:schemeClr val="accent2"/>
+                  </a:solidFill>
+                  <a:prstDash val="solid"/>
+                </a:ln>
+                <a:solidFill>
+                  <a:schemeClr val="accent2">
+                    <a:lumMod val="40000"/>
+                    <a:lumOff val="60000"/>
+                  </a:schemeClr>
+                </a:solidFill>
+                <a:effectLst/>
+              </a:rPr>
+              <a:t>C</a:t>
+            </a:r>
+          </a:p>
+        </p:txBody>
+      </p:sp>
+      <p:sp>
+        <p:nvSpPr>
+          <p:cNvPr id="6" name="Rectangle 5">
+            <a:extLst>
+              <a:ext uri="{FF2B5EF4-FFF2-40B4-BE49-F238E27FC236}">
+                <a16:creationId xmlns:a16="http://schemas.microsoft.com/office/drawing/2014/main" id="{02715763-2A1D-49FB-A0AE-55F573DE0E47}"/>
+              </a:ext>
+            </a:extLst>
+          </p:cNvPr>
+          <p:cNvSpPr/>
+          <p:nvPr/>
+        </p:nvSpPr>
+        <p:spPr>
+          <a:xfrm>
+            <a:off x="7038110" y="3214103"/>
+            <a:ext cx="620683" cy="923330"/>
+          </a:xfrm>
+          <a:prstGeom prst="rect">
+            <a:avLst/>
+          </a:prstGeom>
+          <a:noFill/>
+        </p:spPr>
+        <p:txBody>
+          <a:bodyPr wrap="none" lIns="91440" tIns="45720" rIns="91440" bIns="45720">
+            <a:spAutoFit/>
+          </a:bodyPr>
+          <a:lstStyle/>
+          <a:p>
+            <a:pPr algn="ctr"/>
+            <a:r>
+              <a:rPr lang="en-US" sz="5400" b="1" cap="none" spc="0" dirty="0">
+                <a:ln w="22225">
+                  <a:solidFill>
+                    <a:schemeClr val="accent2"/>
+                  </a:solidFill>
+                  <a:prstDash val="solid"/>
+                </a:ln>
+                <a:solidFill>
+                  <a:schemeClr val="accent2">
+                    <a:lumMod val="40000"/>
+                    <a:lumOff val="60000"/>
+                  </a:schemeClr>
+                </a:solidFill>
+                <a:effectLst/>
+              </a:rPr>
+              <a:t>D</a:t>
+            </a:r>
+          </a:p>
+        </p:txBody>
+      </p:sp>
+      <p:sp>
+        <p:nvSpPr>
+          <p:cNvPr id="7" name="Rectangle 6">
+            <a:extLst>
+              <a:ext uri="{FF2B5EF4-FFF2-40B4-BE49-F238E27FC236}">
+                <a16:creationId xmlns:a16="http://schemas.microsoft.com/office/drawing/2014/main" id="{36FFE0E9-247E-4CF6-B4BA-299B913084B3}"/>
+              </a:ext>
+            </a:extLst>
+          </p:cNvPr>
+          <p:cNvSpPr/>
+          <p:nvPr/>
+        </p:nvSpPr>
+        <p:spPr>
+          <a:xfrm>
+            <a:off x="130971" y="5850312"/>
+            <a:ext cx="522900" cy="923330"/>
+          </a:xfrm>
+          <a:prstGeom prst="rect">
+            <a:avLst/>
+          </a:prstGeom>
+          <a:noFill/>
+        </p:spPr>
+        <p:txBody>
+          <a:bodyPr wrap="none" lIns="91440" tIns="45720" rIns="91440" bIns="45720">
+            <a:spAutoFit/>
+          </a:bodyPr>
+          <a:lstStyle/>
+          <a:p>
+            <a:pPr algn="ctr"/>
+            <a:r>
+              <a:rPr lang="en-US" sz="5400" b="1" dirty="0">
+                <a:ln w="22225">
+                  <a:solidFill>
+                    <a:schemeClr val="accent2"/>
+                  </a:solidFill>
+                  <a:prstDash val="solid"/>
+                </a:ln>
+                <a:solidFill>
+                  <a:schemeClr val="accent2">
+                    <a:lumMod val="40000"/>
+                    <a:lumOff val="60000"/>
+                  </a:schemeClr>
+                </a:solidFill>
+              </a:rPr>
+              <a:t>E</a:t>
+            </a:r>
+            <a:endParaRPr lang="en-US" sz="5400" b="1" cap="none" spc="0" dirty="0">
+              <a:ln w="22225">
+                <a:solidFill>
+                  <a:schemeClr val="accent2"/>
+                </a:solidFill>
+                <a:prstDash val="solid"/>
+              </a:ln>
+              <a:solidFill>
+                <a:schemeClr val="accent2">
+                  <a:lumMod val="40000"/>
+                  <a:lumOff val="60000"/>
+                </a:schemeClr>
+              </a:solidFill>
+              <a:effectLst/>
+            </a:endParaRPr>
+          </a:p>
+        </p:txBody>
+      </p:sp>
+      <p:sp>
+        <p:nvSpPr>
+          <p:cNvPr id="12" name="Rectangle 11">
+            <a:extLst>
+              <a:ext uri="{FF2B5EF4-FFF2-40B4-BE49-F238E27FC236}">
+                <a16:creationId xmlns:a16="http://schemas.microsoft.com/office/drawing/2014/main" id="{AB8B626E-B6AC-4C41-A10B-428751E8339F}"/>
+              </a:ext>
+            </a:extLst>
+          </p:cNvPr>
+          <p:cNvSpPr/>
+          <p:nvPr/>
+        </p:nvSpPr>
+        <p:spPr>
+          <a:xfrm>
+            <a:off x="10597935" y="297718"/>
+            <a:ext cx="1260036" cy="423950"/>
+          </a:xfrm>
+          <a:prstGeom prst="rect">
+            <a:avLst/>
+          </a:prstGeom>
+          <a:solidFill>
+            <a:srgbClr val="0083B7"/>
+          </a:solidFill>
+          <a:ln>
+            <a:noFill/>
+          </a:ln>
+        </p:spPr>
+        <p:style>
+          <a:lnRef idx="2">
+            <a:schemeClr val="accent1">
+              <a:shade val="50000"/>
+            </a:schemeClr>
+          </a:lnRef>
+          <a:fillRef idx="1">
+            <a:schemeClr val="accent1"/>
+          </a:fillRef>
+          <a:effectRef idx="0">
+            <a:schemeClr val="accent1"/>
+          </a:effectRef>
+          <a:fontRef idx="minor">
+            <a:schemeClr val="lt1"/>
+          </a:fontRef>
+        </p:style>
+        <p:txBody>
+          <a:bodyPr rtlCol="0" anchor="ctr"/>
+          <a:lstStyle/>
+          <a:p>
+            <a:pPr algn="ctr"/>
+            <a:endParaRPr lang="en-US"/>
+          </a:p>
+        </p:txBody>
+      </p:sp>
+      <p:sp>
+        <p:nvSpPr>
+          <p:cNvPr id="9" name="Rectangle 8">
+            <a:extLst>
+              <a:ext uri="{FF2B5EF4-FFF2-40B4-BE49-F238E27FC236}">
+                <a16:creationId xmlns:a16="http://schemas.microsoft.com/office/drawing/2014/main" id="{0E551871-CEB6-4D5F-98F9-3368399DE9FD}"/>
+              </a:ext>
+            </a:extLst>
+          </p:cNvPr>
+          <p:cNvSpPr/>
+          <p:nvPr/>
+        </p:nvSpPr>
+        <p:spPr>
+          <a:xfrm>
+            <a:off x="788916" y="238931"/>
+            <a:ext cx="908266" cy="423950"/>
+          </a:xfrm>
+          <a:prstGeom prst="rect">
+            <a:avLst/>
+          </a:prstGeom>
+          <a:solidFill>
+            <a:srgbClr val="0083B7"/>
+          </a:solidFill>
+          <a:ln>
+            <a:noFill/>
+          </a:ln>
+        </p:spPr>
+        <p:style>
+          <a:lnRef idx="2">
+            <a:schemeClr val="accent1">
+              <a:shade val="50000"/>
+            </a:schemeClr>
+          </a:lnRef>
+          <a:fillRef idx="1">
+            <a:schemeClr val="accent1"/>
+          </a:fillRef>
+          <a:effectRef idx="0">
+            <a:schemeClr val="accent1"/>
+          </a:effectRef>
+          <a:fontRef idx="minor">
+            <a:schemeClr val="lt1"/>
+          </a:fontRef>
+        </p:style>
+        <p:txBody>
+          <a:bodyPr rtlCol="0" anchor="ctr"/>
+          <a:lstStyle/>
+          <a:p>
+            <a:pPr algn="ctr"/>
+            <a:endParaRPr lang="en-US"/>
+          </a:p>
+        </p:txBody>
+      </p:sp>
+    </p:spTree>
+    <p:extLst>
+      <p:ext uri="{BB962C8B-B14F-4D97-AF65-F5344CB8AC3E}">
+        <p14:creationId xmlns:p14="http://schemas.microsoft.com/office/powerpoint/2010/main" val="2581258031"/>
+      </p:ext>
+    </p:extLst>
+  </p:cSld>
+  <p:clrMapOvr>
+    <a:masterClrMapping/>
+  </p:clrMapOvr>
+</p:sld>
+</file>
+
+<file path=ppt/slides/slide6.xml><?xml version="1.0" encoding="utf-8"?>
+<p:sld xmlns:a="http://schemas.openxmlformats.org/drawingml/2006/main" xmlns:r="http://schemas.openxmlformats.org/officeDocument/2006/relationships" xmlns:p="http://schemas.openxmlformats.org/presentationml/2006/main">
+  <p:cSld>
+    <p:spTree>
+      <p:nvGrpSpPr>
+        <p:cNvPr id="1" name=""/>
+        <p:cNvGrpSpPr/>
+        <p:nvPr/>
+      </p:nvGrpSpPr>
+      <p:grpSpPr>
+        <a:xfrm>
+          <a:off x="0" y="0"/>
+          <a:ext cx="0" cy="0"/>
+          <a:chOff x="0" y="0"/>
+          <a:chExt cx="0" cy="0"/>
+        </a:xfrm>
+      </p:grpSpPr>
       <p:sp>
         <p:nvSpPr>
           <p:cNvPr id="2" name="Rectangle 1">
@@ -10055,7 +10498,7 @@
 </p:sld>
 </file>
 
-<file path=ppt/slides/slide6.xml><?xml version="1.0" encoding="utf-8"?>
+<file path=ppt/slides/slide7.xml><?xml version="1.0" encoding="utf-8"?>
 <p:sld xmlns:a="http://schemas.openxmlformats.org/drawingml/2006/main" xmlns:r="http://schemas.openxmlformats.org/officeDocument/2006/relationships" xmlns:p="http://schemas.openxmlformats.org/presentationml/2006/main">
   <p:cSld>
     <p:spTree>

</xml_diff>

<commit_message>
pass over the intro
</commit_message>
<xml_diff>
--- a/papers/tr2017/diagrams.pptx
+++ b/papers/tr2017/diagrams.pptx
@@ -216,7 +216,7 @@
           <a:p>
             <a:fld id="{C0237B04-0BFF-4188-AE10-E77C3C5257C8}" type="datetimeFigureOut">
               <a:rPr lang="en-US" smtClean="0"/>
-              <a:t>11/14/2017</a:t>
+              <a:t>11/15/2017</a:t>
             </a:fld>
             <a:endParaRPr lang="en-US"/>
           </a:p>
@@ -888,7 +888,7 @@
           <a:p>
             <a:fld id="{E504D85E-2087-4C48-BE7E-1A197735EA07}" type="datetimeFigureOut">
               <a:rPr lang="en-US" smtClean="0"/>
-              <a:t>11/14/2017</a:t>
+              <a:t>11/15/2017</a:t>
             </a:fld>
             <a:endParaRPr lang="en-US"/>
           </a:p>
@@ -1086,7 +1086,7 @@
           <a:p>
             <a:fld id="{E504D85E-2087-4C48-BE7E-1A197735EA07}" type="datetimeFigureOut">
               <a:rPr lang="en-US" smtClean="0"/>
-              <a:t>11/14/2017</a:t>
+              <a:t>11/15/2017</a:t>
             </a:fld>
             <a:endParaRPr lang="en-US"/>
           </a:p>
@@ -1294,7 +1294,7 @@
           <a:p>
             <a:fld id="{E504D85E-2087-4C48-BE7E-1A197735EA07}" type="datetimeFigureOut">
               <a:rPr lang="en-US" smtClean="0"/>
-              <a:t>11/14/2017</a:t>
+              <a:t>11/15/2017</a:t>
             </a:fld>
             <a:endParaRPr lang="en-US"/>
           </a:p>
@@ -1492,7 +1492,7 @@
           <a:p>
             <a:fld id="{E504D85E-2087-4C48-BE7E-1A197735EA07}" type="datetimeFigureOut">
               <a:rPr lang="en-US" smtClean="0"/>
-              <a:t>11/14/2017</a:t>
+              <a:t>11/15/2017</a:t>
             </a:fld>
             <a:endParaRPr lang="en-US"/>
           </a:p>
@@ -1767,7 +1767,7 @@
           <a:p>
             <a:fld id="{E504D85E-2087-4C48-BE7E-1A197735EA07}" type="datetimeFigureOut">
               <a:rPr lang="en-US" smtClean="0"/>
-              <a:t>11/14/2017</a:t>
+              <a:t>11/15/2017</a:t>
             </a:fld>
             <a:endParaRPr lang="en-US"/>
           </a:p>
@@ -2032,7 +2032,7 @@
           <a:p>
             <a:fld id="{E504D85E-2087-4C48-BE7E-1A197735EA07}" type="datetimeFigureOut">
               <a:rPr lang="en-US" smtClean="0"/>
-              <a:t>11/14/2017</a:t>
+              <a:t>11/15/2017</a:t>
             </a:fld>
             <a:endParaRPr lang="en-US"/>
           </a:p>
@@ -2444,7 +2444,7 @@
           <a:p>
             <a:fld id="{E504D85E-2087-4C48-BE7E-1A197735EA07}" type="datetimeFigureOut">
               <a:rPr lang="en-US" smtClean="0"/>
-              <a:t>11/14/2017</a:t>
+              <a:t>11/15/2017</a:t>
             </a:fld>
             <a:endParaRPr lang="en-US"/>
           </a:p>
@@ -2585,7 +2585,7 @@
           <a:p>
             <a:fld id="{E504D85E-2087-4C48-BE7E-1A197735EA07}" type="datetimeFigureOut">
               <a:rPr lang="en-US" smtClean="0"/>
-              <a:t>11/14/2017</a:t>
+              <a:t>11/15/2017</a:t>
             </a:fld>
             <a:endParaRPr lang="en-US"/>
           </a:p>
@@ -2698,7 +2698,7 @@
           <a:p>
             <a:fld id="{E504D85E-2087-4C48-BE7E-1A197735EA07}" type="datetimeFigureOut">
               <a:rPr lang="en-US" smtClean="0"/>
-              <a:t>11/14/2017</a:t>
+              <a:t>11/15/2017</a:t>
             </a:fld>
             <a:endParaRPr lang="en-US"/>
           </a:p>
@@ -3009,7 +3009,7 @@
           <a:p>
             <a:fld id="{E504D85E-2087-4C48-BE7E-1A197735EA07}" type="datetimeFigureOut">
               <a:rPr lang="en-US" smtClean="0"/>
-              <a:t>11/14/2017</a:t>
+              <a:t>11/15/2017</a:t>
             </a:fld>
             <a:endParaRPr lang="en-US"/>
           </a:p>
@@ -3297,7 +3297,7 @@
           <a:p>
             <a:fld id="{E504D85E-2087-4C48-BE7E-1A197735EA07}" type="datetimeFigureOut">
               <a:rPr lang="en-US" smtClean="0"/>
-              <a:t>11/14/2017</a:t>
+              <a:t>11/15/2017</a:t>
             </a:fld>
             <a:endParaRPr lang="en-US"/>
           </a:p>
@@ -3538,7 +3538,7 @@
           <a:p>
             <a:fld id="{E504D85E-2087-4C48-BE7E-1A197735EA07}" type="datetimeFigureOut">
               <a:rPr lang="en-US" smtClean="0"/>
-              <a:t>11/14/2017</a:t>
+              <a:t>11/15/2017</a:t>
             </a:fld>
             <a:endParaRPr lang="en-US"/>
           </a:p>
@@ -6694,6 +6694,66 @@
               </a:rPr>
               <a:t>Monaco</a:t>
             </a:r>
+          </a:p>
+          <a:p>
+            <a:pPr marL="0" marR="0" lvl="0" indent="0" algn="ctr" defTabSz="932472" eaLnBrk="1" fontAlgn="base" latinLnBrk="0" hangingPunct="1">
+              <a:lnSpc>
+                <a:spcPct val="90000"/>
+              </a:lnSpc>
+              <a:spcBef>
+                <a:spcPct val="0"/>
+              </a:spcBef>
+              <a:spcAft>
+                <a:spcPct val="0"/>
+              </a:spcAft>
+              <a:buClrTx/>
+              <a:buSzTx/>
+              <a:buFontTx/>
+              <a:buNone/>
+              <a:tabLst/>
+              <a:defRPr/>
+            </a:pPr>
+            <a:r>
+              <a:rPr lang="en-US" sz="1000" kern="0" dirty="0">
+                <a:gradFill>
+                  <a:gsLst>
+                    <a:gs pos="0">
+                      <a:srgbClr val="FFFFFF"/>
+                    </a:gs>
+                    <a:gs pos="100000">
+                      <a:srgbClr val="FFFFFF"/>
+                    </a:gs>
+                  </a:gsLst>
+                  <a:lin ang="5400000" scaled="0"/>
+                </a:gradFill>
+                <a:latin typeface="Segoe UI"/>
+                <a:ea typeface="Segoe UI" pitchFamily="34" charset="0"/>
+                <a:cs typeface="Segoe UI" pitchFamily="34" charset="0"/>
+              </a:rPr>
+              <a:t>Static TypeScript</a:t>
+            </a:r>
+            <a:endParaRPr kumimoji="0" lang="en-US" sz="1000" i="0" u="none" strike="noStrike" kern="0" cap="none" spc="0" normalizeH="0" baseline="0" noProof="0" dirty="0">
+              <a:ln>
+                <a:noFill/>
+              </a:ln>
+              <a:gradFill>
+                <a:gsLst>
+                  <a:gs pos="0">
+                    <a:srgbClr val="FFFFFF"/>
+                  </a:gs>
+                  <a:gs pos="100000">
+                    <a:srgbClr val="FFFFFF"/>
+                  </a:gs>
+                </a:gsLst>
+                <a:lin ang="5400000" scaled="0"/>
+              </a:gradFill>
+              <a:effectLst/>
+              <a:uLnTx/>
+              <a:uFillTx/>
+              <a:latin typeface="Segoe UI"/>
+              <a:ea typeface="Segoe UI" pitchFamily="34" charset="0"/>
+              <a:cs typeface="Segoe UI" pitchFamily="34" charset="0"/>
+            </a:endParaRPr>
           </a:p>
         </p:txBody>
       </p:sp>

</xml_diff>